<commit_message>
Edit modem + add budget config g24
</commit_message>
<xml_diff>
--- a/opdracht03/G24/Voorstelling G24.pptx
+++ b/opdracht03/G24/Voorstelling G24.pptx
@@ -5,38 +5,45 @@
     <p:sldMasterId id="2147483762" r:id="rId1"/>
   </p:sldMasterIdLst>
   <p:notesMasterIdLst>
-    <p:notesMasterId r:id="rId31"/>
+    <p:notesMasterId r:id="rId38"/>
   </p:notesMasterIdLst>
   <p:sldIdLst>
     <p:sldId id="258" r:id="rId2"/>
-    <p:sldId id="285" r:id="rId3"/>
-    <p:sldId id="259" r:id="rId4"/>
-    <p:sldId id="262" r:id="rId5"/>
-    <p:sldId id="263" r:id="rId6"/>
-    <p:sldId id="286" r:id="rId7"/>
-    <p:sldId id="264" r:id="rId8"/>
-    <p:sldId id="265" r:id="rId9"/>
-    <p:sldId id="266" r:id="rId10"/>
-    <p:sldId id="260" r:id="rId11"/>
-    <p:sldId id="267" r:id="rId12"/>
-    <p:sldId id="268" r:id="rId13"/>
-    <p:sldId id="269" r:id="rId14"/>
-    <p:sldId id="270" r:id="rId15"/>
-    <p:sldId id="281" r:id="rId16"/>
-    <p:sldId id="271" r:id="rId17"/>
-    <p:sldId id="272" r:id="rId18"/>
-    <p:sldId id="273" r:id="rId19"/>
-    <p:sldId id="284" r:id="rId20"/>
-    <p:sldId id="274" r:id="rId21"/>
-    <p:sldId id="261" r:id="rId22"/>
-    <p:sldId id="275" r:id="rId23"/>
-    <p:sldId id="276" r:id="rId24"/>
-    <p:sldId id="277" r:id="rId25"/>
-    <p:sldId id="278" r:id="rId26"/>
-    <p:sldId id="279" r:id="rId27"/>
-    <p:sldId id="280" r:id="rId28"/>
-    <p:sldId id="282" r:id="rId29"/>
-    <p:sldId id="283" r:id="rId30"/>
+    <p:sldId id="287" r:id="rId3"/>
+    <p:sldId id="285" r:id="rId4"/>
+    <p:sldId id="259" r:id="rId5"/>
+    <p:sldId id="286" r:id="rId6"/>
+    <p:sldId id="288" r:id="rId7"/>
+    <p:sldId id="262" r:id="rId8"/>
+    <p:sldId id="263" r:id="rId9"/>
+    <p:sldId id="264" r:id="rId10"/>
+    <p:sldId id="289" r:id="rId11"/>
+    <p:sldId id="290" r:id="rId12"/>
+    <p:sldId id="291" r:id="rId13"/>
+    <p:sldId id="292" r:id="rId14"/>
+    <p:sldId id="265" r:id="rId15"/>
+    <p:sldId id="266" r:id="rId16"/>
+    <p:sldId id="260" r:id="rId17"/>
+    <p:sldId id="267" r:id="rId18"/>
+    <p:sldId id="268" r:id="rId19"/>
+    <p:sldId id="269" r:id="rId20"/>
+    <p:sldId id="270" r:id="rId21"/>
+    <p:sldId id="281" r:id="rId22"/>
+    <p:sldId id="271" r:id="rId23"/>
+    <p:sldId id="272" r:id="rId24"/>
+    <p:sldId id="273" r:id="rId25"/>
+    <p:sldId id="284" r:id="rId26"/>
+    <p:sldId id="274" r:id="rId27"/>
+    <p:sldId id="261" r:id="rId28"/>
+    <p:sldId id="275" r:id="rId29"/>
+    <p:sldId id="276" r:id="rId30"/>
+    <p:sldId id="277" r:id="rId31"/>
+    <p:sldId id="278" r:id="rId32"/>
+    <p:sldId id="279" r:id="rId33"/>
+    <p:sldId id="280" r:id="rId34"/>
+    <p:sldId id="282" r:id="rId35"/>
+    <p:sldId id="293" r:id="rId36"/>
+    <p:sldId id="283" r:id="rId37"/>
   </p:sldIdLst>
   <p:sldSz cx="12192000" cy="6858000"/>
   <p:notesSz cx="6858000" cy="9144000"/>
@@ -225,7 +232,7 @@
           <a:p>
             <a:fld id="{8795BD13-A9C0-4833-9A37-05C32DB0F83C}" type="datetimeFigureOut">
               <a:rPr lang="en-GB" smtClean="0"/>
-              <a:t>25/04/2019</a:t>
+              <a:t>27/04/2019</a:t>
             </a:fld>
             <a:endParaRPr lang="en-GB"/>
           </a:p>
@@ -719,7 +726,7 @@
           <a:p>
             <a:fld id="{76FCA46D-55D7-4D00-B507-F3F903E4163B}" type="datetimeFigureOut">
               <a:rPr lang="en-GB" smtClean="0"/>
-              <a:t>25/04/2019</a:t>
+              <a:t>27/04/2019</a:t>
             </a:fld>
             <a:endParaRPr lang="en-GB"/>
           </a:p>
@@ -930,7 +937,7 @@
           <a:p>
             <a:fld id="{76FCA46D-55D7-4D00-B507-F3F903E4163B}" type="datetimeFigureOut">
               <a:rPr lang="en-GB" smtClean="0"/>
-              <a:t>25/04/2019</a:t>
+              <a:t>27/04/2019</a:t>
             </a:fld>
             <a:endParaRPr lang="en-GB"/>
           </a:p>
@@ -1189,7 +1196,7 @@
           <a:p>
             <a:fld id="{76FCA46D-55D7-4D00-B507-F3F903E4163B}" type="datetimeFigureOut">
               <a:rPr lang="en-GB" smtClean="0"/>
-              <a:t>25/04/2019</a:t>
+              <a:t>27/04/2019</a:t>
             </a:fld>
             <a:endParaRPr lang="en-GB"/>
           </a:p>
@@ -1362,7 +1369,7 @@
           <a:p>
             <a:fld id="{76FCA46D-55D7-4D00-B507-F3F903E4163B}" type="datetimeFigureOut">
               <a:rPr lang="en-GB" smtClean="0"/>
-              <a:t>25/04/2019</a:t>
+              <a:t>27/04/2019</a:t>
             </a:fld>
             <a:endParaRPr lang="en-GB"/>
           </a:p>
@@ -1708,7 +1715,7 @@
           <a:p>
             <a:fld id="{76FCA46D-55D7-4D00-B507-F3F903E4163B}" type="datetimeFigureOut">
               <a:rPr lang="en-GB" smtClean="0"/>
-              <a:t>25/04/2019</a:t>
+              <a:t>27/04/2019</a:t>
             </a:fld>
             <a:endParaRPr lang="en-GB"/>
           </a:p>
@@ -1986,7 +1993,7 @@
           <a:p>
             <a:fld id="{76FCA46D-55D7-4D00-B507-F3F903E4163B}" type="datetimeFigureOut">
               <a:rPr lang="en-GB" smtClean="0"/>
-              <a:t>25/04/2019</a:t>
+              <a:t>27/04/2019</a:t>
             </a:fld>
             <a:endParaRPr lang="en-GB"/>
           </a:p>
@@ -2368,7 +2375,7 @@
           <a:p>
             <a:fld id="{76FCA46D-55D7-4D00-B507-F3F903E4163B}" type="datetimeFigureOut">
               <a:rPr lang="en-GB" smtClean="0"/>
-              <a:t>25/04/2019</a:t>
+              <a:t>27/04/2019</a:t>
             </a:fld>
             <a:endParaRPr lang="en-GB"/>
           </a:p>
@@ -2489,7 +2496,7 @@
           <a:p>
             <a:fld id="{76FCA46D-55D7-4D00-B507-F3F903E4163B}" type="datetimeFigureOut">
               <a:rPr lang="en-GB" smtClean="0"/>
-              <a:t>25/04/2019</a:t>
+              <a:t>27/04/2019</a:t>
             </a:fld>
             <a:endParaRPr lang="en-GB"/>
           </a:p>
@@ -2663,7 +2670,7 @@
           <a:p>
             <a:fld id="{76FCA46D-55D7-4D00-B507-F3F903E4163B}" type="datetimeFigureOut">
               <a:rPr lang="en-GB" smtClean="0"/>
-              <a:t>25/04/2019</a:t>
+              <a:t>27/04/2019</a:t>
             </a:fld>
             <a:endParaRPr lang="en-GB"/>
           </a:p>
@@ -3020,7 +3027,7 @@
           <a:p>
             <a:fld id="{76FCA46D-55D7-4D00-B507-F3F903E4163B}" type="datetimeFigureOut">
               <a:rPr lang="en-GB" smtClean="0"/>
-              <a:t>25/04/2019</a:t>
+              <a:t>27/04/2019</a:t>
             </a:fld>
             <a:endParaRPr lang="en-GB"/>
           </a:p>
@@ -3400,7 +3407,7 @@
           <a:p>
             <a:fld id="{76FCA46D-55D7-4D00-B507-F3F903E4163B}" type="datetimeFigureOut">
               <a:rPr lang="en-GB" smtClean="0"/>
-              <a:t>25/04/2019</a:t>
+              <a:t>27/04/2019</a:t>
             </a:fld>
             <a:endParaRPr lang="en-GB"/>
           </a:p>
@@ -3690,7 +3697,7 @@
           <a:p>
             <a:fld id="{76FCA46D-55D7-4D00-B507-F3F903E4163B}" type="datetimeFigureOut">
               <a:rPr lang="en-GB" smtClean="0"/>
-              <a:t>25/04/2019</a:t>
+              <a:t>27/04/2019</a:t>
             </a:fld>
             <a:endParaRPr lang="en-GB"/>
           </a:p>
@@ -4838,6 +4845,1567 @@
           <p:cNvPr id="2" name="Titel 1">
             <a:extLst>
               <a:ext uri="{FF2B5EF4-FFF2-40B4-BE49-F238E27FC236}">
+                <a16:creationId xmlns:a16="http://schemas.microsoft.com/office/drawing/2014/main" id="{4AF879A2-ED60-43B0-A02B-F947BFB76F52}"/>
+              </a:ext>
+            </a:extLst>
+          </p:cNvPr>
+          <p:cNvSpPr>
+            <a:spLocks noGrp="1"/>
+          </p:cNvSpPr>
+          <p:nvPr>
+            <p:ph type="title"/>
+          </p:nvPr>
+        </p:nvSpPr>
+        <p:spPr/>
+        <p:txBody>
+          <a:bodyPr/>
+          <a:lstStyle/>
+          <a:p>
+            <a:pPr algn="ctr"/>
+            <a:r>
+              <a:rPr lang="en-GB" dirty="0">
+                <a:latin typeface="Segoe UI" panose="020B0502040204020203" pitchFamily="34" charset="0"/>
+                <a:cs typeface="Segoe UI" panose="020B0502040204020203" pitchFamily="34" charset="0"/>
+              </a:rPr>
+              <a:t>Budget </a:t>
+            </a:r>
+            <a:r>
+              <a:rPr lang="en-GB" dirty="0" err="1">
+                <a:latin typeface="Segoe UI" panose="020B0502040204020203" pitchFamily="34" charset="0"/>
+                <a:cs typeface="Segoe UI" panose="020B0502040204020203" pitchFamily="34" charset="0"/>
+              </a:rPr>
+              <a:t>Configuratie</a:t>
+            </a:r>
+            <a:endParaRPr lang="en-GB" dirty="0">
+              <a:latin typeface="Segoe UI" panose="020B0502040204020203" pitchFamily="34" charset="0"/>
+              <a:cs typeface="Segoe UI" panose="020B0502040204020203" pitchFamily="34" charset="0"/>
+            </a:endParaRPr>
+          </a:p>
+        </p:txBody>
+      </p:sp>
+      <p:sp>
+        <p:nvSpPr>
+          <p:cNvPr id="3" name="Tijdelijke aanduiding voor inhoud 2">
+            <a:extLst>
+              <a:ext uri="{FF2B5EF4-FFF2-40B4-BE49-F238E27FC236}">
+                <a16:creationId xmlns:a16="http://schemas.microsoft.com/office/drawing/2014/main" id="{B71D167F-4518-4701-96C1-B1327EB6AC97}"/>
+              </a:ext>
+            </a:extLst>
+          </p:cNvPr>
+          <p:cNvSpPr>
+            <a:spLocks noGrp="1"/>
+          </p:cNvSpPr>
+          <p:nvPr>
+            <p:ph idx="1"/>
+          </p:nvPr>
+        </p:nvSpPr>
+        <p:spPr/>
+        <p:txBody>
+          <a:bodyPr/>
+          <a:lstStyle/>
+          <a:p>
+            <a:endParaRPr lang="en-GB" dirty="0"/>
+          </a:p>
+        </p:txBody>
+      </p:sp>
+    </p:spTree>
+    <p:extLst>
+      <p:ext uri="{BB962C8B-B14F-4D97-AF65-F5344CB8AC3E}">
+        <p14:creationId xmlns:p14="http://schemas.microsoft.com/office/powerpoint/2010/main" val="857419743"/>
+      </p:ext>
+    </p:extLst>
+  </p:cSld>
+  <p:clrMapOvr>
+    <a:masterClrMapping/>
+  </p:clrMapOvr>
+  <p:transition>
+    <p:fade/>
+  </p:transition>
+</p:sld>
+</file>
+
+<file path=ppt/slides/slide11.xml><?xml version="1.0" encoding="utf-8"?>
+<p:sld xmlns:a="http://schemas.openxmlformats.org/drawingml/2006/main" xmlns:r="http://schemas.openxmlformats.org/officeDocument/2006/relationships" xmlns:p="http://schemas.openxmlformats.org/presentationml/2006/main">
+  <p:cSld>
+    <p:spTree>
+      <p:nvGrpSpPr>
+        <p:cNvPr id="1" name=""/>
+        <p:cNvGrpSpPr/>
+        <p:nvPr/>
+      </p:nvGrpSpPr>
+      <p:grpSpPr>
+        <a:xfrm>
+          <a:off x="0" y="0"/>
+          <a:ext cx="0" cy="0"/>
+          <a:chOff x="0" y="0"/>
+          <a:chExt cx="0" cy="0"/>
+        </a:xfrm>
+      </p:grpSpPr>
+      <p:sp>
+        <p:nvSpPr>
+          <p:cNvPr id="2" name="Titel 1">
+            <a:extLst>
+              <a:ext uri="{FF2B5EF4-FFF2-40B4-BE49-F238E27FC236}">
+                <a16:creationId xmlns:a16="http://schemas.microsoft.com/office/drawing/2014/main" id="{C14BB42F-A8DE-4CEE-9D20-3A4B413AC00A}"/>
+              </a:ext>
+            </a:extLst>
+          </p:cNvPr>
+          <p:cNvSpPr>
+            <a:spLocks noGrp="1"/>
+          </p:cNvSpPr>
+          <p:nvPr>
+            <p:ph type="title"/>
+          </p:nvPr>
+        </p:nvSpPr>
+        <p:spPr/>
+        <p:txBody>
+          <a:bodyPr/>
+          <a:lstStyle/>
+          <a:p>
+            <a:r>
+              <a:rPr lang="en-GB" dirty="0">
+                <a:latin typeface="Segoe UI" panose="020B0502040204020203" pitchFamily="34" charset="0"/>
+                <a:cs typeface="Segoe UI" panose="020B0502040204020203" pitchFamily="34" charset="0"/>
+              </a:rPr>
+              <a:t>Router</a:t>
+            </a:r>
+          </a:p>
+        </p:txBody>
+      </p:sp>
+      <p:sp>
+        <p:nvSpPr>
+          <p:cNvPr id="3" name="Tijdelijke aanduiding voor inhoud 2">
+            <a:extLst>
+              <a:ext uri="{FF2B5EF4-FFF2-40B4-BE49-F238E27FC236}">
+                <a16:creationId xmlns:a16="http://schemas.microsoft.com/office/drawing/2014/main" id="{17B7BCCE-7046-40C6-B77A-7C29214DA368}"/>
+              </a:ext>
+            </a:extLst>
+          </p:cNvPr>
+          <p:cNvSpPr>
+            <a:spLocks noGrp="1"/>
+          </p:cNvSpPr>
+          <p:nvPr>
+            <p:ph idx="1"/>
+          </p:nvPr>
+        </p:nvSpPr>
+        <p:spPr/>
+        <p:txBody>
+          <a:bodyPr/>
+          <a:lstStyle/>
+          <a:p>
+            <a:pPr>
+              <a:buFont typeface="Arial" panose="020B0604020202020204" pitchFamily="34" charset="0"/>
+              <a:buChar char="•"/>
+            </a:pPr>
+            <a:r>
+              <a:rPr lang="en-GB" dirty="0">
+                <a:latin typeface="Segoe UI" panose="020B0502040204020203" pitchFamily="34" charset="0"/>
+                <a:cs typeface="Segoe UI" panose="020B0502040204020203" pitchFamily="34" charset="0"/>
+              </a:rPr>
+              <a:t> </a:t>
+            </a:r>
+            <a:r>
+              <a:rPr lang="en-GB" dirty="0" err="1">
+                <a:latin typeface="Segoe UI" panose="020B0502040204020203" pitchFamily="34" charset="0"/>
+                <a:cs typeface="Segoe UI" panose="020B0502040204020203" pitchFamily="34" charset="0"/>
+              </a:rPr>
+              <a:t>MikroTik</a:t>
+            </a:r>
+            <a:r>
+              <a:rPr lang="en-GB" dirty="0">
+                <a:latin typeface="Segoe UI" panose="020B0502040204020203" pitchFamily="34" charset="0"/>
+                <a:cs typeface="Segoe UI" panose="020B0502040204020203" pitchFamily="34" charset="0"/>
+              </a:rPr>
+              <a:t> </a:t>
+            </a:r>
+            <a:r>
+              <a:rPr lang="en-GB" dirty="0" err="1">
+                <a:latin typeface="Segoe UI" panose="020B0502040204020203" pitchFamily="34" charset="0"/>
+                <a:cs typeface="Segoe UI" panose="020B0502040204020203" pitchFamily="34" charset="0"/>
+              </a:rPr>
+              <a:t>hEX</a:t>
+            </a:r>
+            <a:r>
+              <a:rPr lang="en-GB" dirty="0">
+                <a:latin typeface="Segoe UI" panose="020B0502040204020203" pitchFamily="34" charset="0"/>
+                <a:cs typeface="Segoe UI" panose="020B0502040204020203" pitchFamily="34" charset="0"/>
+              </a:rPr>
+              <a:t> Lite</a:t>
+            </a:r>
+          </a:p>
+          <a:p>
+            <a:pPr>
+              <a:buFont typeface="Arial" panose="020B0604020202020204" pitchFamily="34" charset="0"/>
+              <a:buChar char="•"/>
+            </a:pPr>
+            <a:r>
+              <a:rPr lang="en-GB" dirty="0">
+                <a:latin typeface="Segoe UI" panose="020B0502040204020203" pitchFamily="34" charset="0"/>
+                <a:cs typeface="Segoe UI" panose="020B0502040204020203" pitchFamily="34" charset="0"/>
+              </a:rPr>
+              <a:t> Compact</a:t>
+            </a:r>
+          </a:p>
+          <a:p>
+            <a:pPr>
+              <a:buFont typeface="Arial" panose="020B0604020202020204" pitchFamily="34" charset="0"/>
+              <a:buChar char="•"/>
+            </a:pPr>
+            <a:r>
+              <a:rPr lang="en-GB" dirty="0">
+                <a:latin typeface="Segoe UI" panose="020B0502040204020203" pitchFamily="34" charset="0"/>
+                <a:cs typeface="Segoe UI" panose="020B0502040204020203" pitchFamily="34" charset="0"/>
+              </a:rPr>
+              <a:t> </a:t>
+            </a:r>
+            <a:r>
+              <a:rPr lang="en-GB" dirty="0" err="1">
+                <a:latin typeface="Segoe UI" panose="020B0502040204020203" pitchFamily="34" charset="0"/>
+                <a:cs typeface="Segoe UI" panose="020B0502040204020203" pitchFamily="34" charset="0"/>
+              </a:rPr>
+              <a:t>Beperkte</a:t>
+            </a:r>
+            <a:r>
+              <a:rPr lang="en-GB" dirty="0">
+                <a:latin typeface="Segoe UI" panose="020B0502040204020203" pitchFamily="34" charset="0"/>
+                <a:cs typeface="Segoe UI" panose="020B0502040204020203" pitchFamily="34" charset="0"/>
+              </a:rPr>
+              <a:t> </a:t>
+            </a:r>
+            <a:r>
+              <a:rPr lang="en-GB" dirty="0" err="1">
+                <a:latin typeface="Segoe UI" panose="020B0502040204020203" pitchFamily="34" charset="0"/>
+                <a:cs typeface="Segoe UI" panose="020B0502040204020203" pitchFamily="34" charset="0"/>
+              </a:rPr>
+              <a:t>configuratie</a:t>
+            </a:r>
+            <a:endParaRPr lang="en-GB" dirty="0">
+              <a:latin typeface="Segoe UI" panose="020B0502040204020203" pitchFamily="34" charset="0"/>
+              <a:cs typeface="Segoe UI" panose="020B0502040204020203" pitchFamily="34" charset="0"/>
+            </a:endParaRPr>
+          </a:p>
+          <a:p>
+            <a:pPr>
+              <a:buFont typeface="Arial" panose="020B0604020202020204" pitchFamily="34" charset="0"/>
+              <a:buChar char="•"/>
+            </a:pPr>
+            <a:r>
+              <a:rPr lang="en-GB" dirty="0">
+                <a:latin typeface="Segoe UI" panose="020B0502040204020203" pitchFamily="34" charset="0"/>
+                <a:cs typeface="Segoe UI" panose="020B0502040204020203" pitchFamily="34" charset="0"/>
+              </a:rPr>
+              <a:t> </a:t>
+            </a:r>
+            <a:r>
+              <a:rPr lang="en-GB" dirty="0" err="1">
+                <a:latin typeface="Segoe UI" panose="020B0502040204020203" pitchFamily="34" charset="0"/>
+                <a:cs typeface="Segoe UI" panose="020B0502040204020203" pitchFamily="34" charset="0"/>
+              </a:rPr>
+              <a:t>Energiezuinig</a:t>
+            </a:r>
+            <a:endParaRPr lang="en-GB" dirty="0">
+              <a:latin typeface="Segoe UI" panose="020B0502040204020203" pitchFamily="34" charset="0"/>
+              <a:cs typeface="Segoe UI" panose="020B0502040204020203" pitchFamily="34" charset="0"/>
+            </a:endParaRPr>
+          </a:p>
+          <a:p>
+            <a:pPr>
+              <a:buFont typeface="Arial" panose="020B0604020202020204" pitchFamily="34" charset="0"/>
+              <a:buChar char="•"/>
+            </a:pPr>
+            <a:endParaRPr lang="en-GB" dirty="0">
+              <a:latin typeface="Segoe UI" panose="020B0502040204020203" pitchFamily="34" charset="0"/>
+              <a:cs typeface="Segoe UI" panose="020B0502040204020203" pitchFamily="34" charset="0"/>
+            </a:endParaRPr>
+          </a:p>
+          <a:p>
+            <a:pPr>
+              <a:buFont typeface="Arial" panose="020B0604020202020204" pitchFamily="34" charset="0"/>
+              <a:buChar char="•"/>
+            </a:pPr>
+            <a:endParaRPr lang="en-GB" dirty="0">
+              <a:latin typeface="Segoe UI" panose="020B0502040204020203" pitchFamily="34" charset="0"/>
+              <a:cs typeface="Segoe UI" panose="020B0502040204020203" pitchFamily="34" charset="0"/>
+            </a:endParaRPr>
+          </a:p>
+          <a:p>
+            <a:pPr marL="0" indent="0">
+              <a:buNone/>
+            </a:pPr>
+            <a:endParaRPr lang="en-GB" dirty="0">
+              <a:latin typeface="Segoe UI" panose="020B0502040204020203" pitchFamily="34" charset="0"/>
+              <a:cs typeface="Segoe UI" panose="020B0502040204020203" pitchFamily="34" charset="0"/>
+            </a:endParaRPr>
+          </a:p>
+          <a:p>
+            <a:pPr>
+              <a:buFont typeface="Arial" panose="020B0604020202020204" pitchFamily="34" charset="0"/>
+              <a:buChar char="•"/>
+            </a:pPr>
+            <a:r>
+              <a:rPr lang="en-GB" dirty="0">
+                <a:latin typeface="Segoe UI" panose="020B0502040204020203" pitchFamily="34" charset="0"/>
+                <a:cs typeface="Segoe UI" panose="020B0502040204020203" pitchFamily="34" charset="0"/>
+              </a:rPr>
+              <a:t> € 35.00</a:t>
+            </a:r>
+          </a:p>
+        </p:txBody>
+      </p:sp>
+      <p:pic>
+        <p:nvPicPr>
+          <p:cNvPr id="1028" name="Picture 4" descr="mikrotik_hex_lite.jpg">
+            <a:extLst>
+              <a:ext uri="{FF2B5EF4-FFF2-40B4-BE49-F238E27FC236}">
+                <a16:creationId xmlns:a16="http://schemas.microsoft.com/office/drawing/2014/main" id="{A5455F7E-E14B-44AA-ABC5-1D32B8524C75}"/>
+              </a:ext>
+            </a:extLst>
+          </p:cNvPr>
+          <p:cNvPicPr>
+            <a:picLocks noChangeAspect="1" noChangeArrowheads="1"/>
+          </p:cNvPicPr>
+          <p:nvPr/>
+        </p:nvPicPr>
+        <p:blipFill>
+          <a:blip r:embed="rId2">
+            <a:extLst>
+              <a:ext uri="{28A0092B-C50C-407E-A947-70E740481C1C}">
+                <a14:useLocalDpi xmlns:a14="http://schemas.microsoft.com/office/drawing/2010/main" val="0"/>
+              </a:ext>
+            </a:extLst>
+          </a:blip>
+          <a:srcRect/>
+          <a:stretch>
+            <a:fillRect/>
+          </a:stretch>
+        </p:blipFill>
+        <p:spPr bwMode="auto">
+          <a:xfrm>
+            <a:off x="8589292" y="3767024"/>
+            <a:ext cx="3162119" cy="2371589"/>
+          </a:xfrm>
+          <a:prstGeom prst="rect">
+            <a:avLst/>
+          </a:prstGeom>
+          <a:noFill/>
+          <a:extLst>
+            <a:ext uri="{909E8E84-426E-40DD-AFC4-6F175D3DCCD1}">
+              <a14:hiddenFill xmlns:a14="http://schemas.microsoft.com/office/drawing/2010/main">
+                <a:solidFill>
+                  <a:srgbClr val="FFFFFF"/>
+                </a:solidFill>
+              </a14:hiddenFill>
+            </a:ext>
+          </a:extLst>
+        </p:spPr>
+      </p:pic>
+    </p:spTree>
+    <p:extLst>
+      <p:ext uri="{BB962C8B-B14F-4D97-AF65-F5344CB8AC3E}">
+        <p14:creationId xmlns:p14="http://schemas.microsoft.com/office/powerpoint/2010/main" val="266239435"/>
+      </p:ext>
+    </p:extLst>
+  </p:cSld>
+  <p:clrMapOvr>
+    <a:masterClrMapping/>
+  </p:clrMapOvr>
+  <p:transition>
+    <p:fade/>
+  </p:transition>
+</p:sld>
+</file>
+
+<file path=ppt/slides/slide12.xml><?xml version="1.0" encoding="utf-8"?>
+<p:sld xmlns:a="http://schemas.openxmlformats.org/drawingml/2006/main" xmlns:r="http://schemas.openxmlformats.org/officeDocument/2006/relationships" xmlns:p="http://schemas.openxmlformats.org/presentationml/2006/main">
+  <p:cSld>
+    <p:spTree>
+      <p:nvGrpSpPr>
+        <p:cNvPr id="1" name=""/>
+        <p:cNvGrpSpPr/>
+        <p:nvPr/>
+      </p:nvGrpSpPr>
+      <p:grpSpPr>
+        <a:xfrm>
+          <a:off x="0" y="0"/>
+          <a:ext cx="0" cy="0"/>
+          <a:chOff x="0" y="0"/>
+          <a:chExt cx="0" cy="0"/>
+        </a:xfrm>
+      </p:grpSpPr>
+      <p:sp>
+        <p:nvSpPr>
+          <p:cNvPr id="2" name="Titel 1">
+            <a:extLst>
+              <a:ext uri="{FF2B5EF4-FFF2-40B4-BE49-F238E27FC236}">
+                <a16:creationId xmlns:a16="http://schemas.microsoft.com/office/drawing/2014/main" id="{A3BDE141-DC23-4573-981F-677F607382E2}"/>
+              </a:ext>
+            </a:extLst>
+          </p:cNvPr>
+          <p:cNvSpPr>
+            <a:spLocks noGrp="1"/>
+          </p:cNvSpPr>
+          <p:nvPr>
+            <p:ph type="title"/>
+          </p:nvPr>
+        </p:nvSpPr>
+        <p:spPr/>
+        <p:txBody>
+          <a:bodyPr/>
+          <a:lstStyle/>
+          <a:p>
+            <a:r>
+              <a:rPr lang="en-GB" dirty="0">
+                <a:latin typeface="Segoe UI" panose="020B0502040204020203" pitchFamily="34" charset="0"/>
+                <a:cs typeface="Segoe UI" panose="020B0502040204020203" pitchFamily="34" charset="0"/>
+              </a:rPr>
+              <a:t>Switch </a:t>
+            </a:r>
+          </a:p>
+        </p:txBody>
+      </p:sp>
+      <p:sp>
+        <p:nvSpPr>
+          <p:cNvPr id="3" name="Tijdelijke aanduiding voor inhoud 2">
+            <a:extLst>
+              <a:ext uri="{FF2B5EF4-FFF2-40B4-BE49-F238E27FC236}">
+                <a16:creationId xmlns:a16="http://schemas.microsoft.com/office/drawing/2014/main" id="{2D80326A-F154-4DBC-A368-B1B22A19CE91}"/>
+              </a:ext>
+            </a:extLst>
+          </p:cNvPr>
+          <p:cNvSpPr>
+            <a:spLocks noGrp="1"/>
+          </p:cNvSpPr>
+          <p:nvPr>
+            <p:ph idx="1"/>
+          </p:nvPr>
+        </p:nvSpPr>
+        <p:spPr/>
+        <p:txBody>
+          <a:bodyPr/>
+          <a:lstStyle/>
+          <a:p>
+            <a:pPr>
+              <a:buFont typeface="Arial" panose="020B0604020202020204" pitchFamily="34" charset="0"/>
+              <a:buChar char="•"/>
+            </a:pPr>
+            <a:r>
+              <a:rPr lang="en-GB" dirty="0">
+                <a:latin typeface="Segoe UI" panose="020B0502040204020203" pitchFamily="34" charset="0"/>
+                <a:cs typeface="Segoe UI" panose="020B0502040204020203" pitchFamily="34" charset="0"/>
+              </a:rPr>
+              <a:t> </a:t>
+            </a:r>
+            <a:r>
+              <a:rPr lang="en-GB" dirty="0" err="1">
+                <a:latin typeface="Segoe UI" panose="020B0502040204020203" pitchFamily="34" charset="0"/>
+                <a:cs typeface="Segoe UI" panose="020B0502040204020203" pitchFamily="34" charset="0"/>
+              </a:rPr>
+              <a:t>Netgear</a:t>
+            </a:r>
+            <a:r>
+              <a:rPr lang="en-GB" dirty="0">
+                <a:latin typeface="Segoe UI" panose="020B0502040204020203" pitchFamily="34" charset="0"/>
+                <a:cs typeface="Segoe UI" panose="020B0502040204020203" pitchFamily="34" charset="0"/>
+              </a:rPr>
+              <a:t> JGS516PE</a:t>
+            </a:r>
+          </a:p>
+          <a:p>
+            <a:pPr>
+              <a:buFont typeface="Arial" panose="020B0604020202020204" pitchFamily="34" charset="0"/>
+              <a:buChar char="•"/>
+            </a:pPr>
+            <a:r>
+              <a:rPr lang="en-GB" dirty="0">
+                <a:latin typeface="Segoe UI" panose="020B0502040204020203" pitchFamily="34" charset="0"/>
+                <a:cs typeface="Segoe UI" panose="020B0502040204020203" pitchFamily="34" charset="0"/>
+              </a:rPr>
+              <a:t> 16 </a:t>
+            </a:r>
+            <a:r>
+              <a:rPr lang="en-GB" dirty="0" err="1">
+                <a:latin typeface="Segoe UI" panose="020B0502040204020203" pitchFamily="34" charset="0"/>
+                <a:cs typeface="Segoe UI" panose="020B0502040204020203" pitchFamily="34" charset="0"/>
+              </a:rPr>
+              <a:t>poorten</a:t>
+            </a:r>
+            <a:endParaRPr lang="en-GB" dirty="0">
+              <a:latin typeface="Segoe UI" panose="020B0502040204020203" pitchFamily="34" charset="0"/>
+              <a:cs typeface="Segoe UI" panose="020B0502040204020203" pitchFamily="34" charset="0"/>
+            </a:endParaRPr>
+          </a:p>
+          <a:p>
+            <a:pPr>
+              <a:buFont typeface="Arial" panose="020B0604020202020204" pitchFamily="34" charset="0"/>
+              <a:buChar char="•"/>
+            </a:pPr>
+            <a:r>
+              <a:rPr lang="en-GB" dirty="0">
+                <a:latin typeface="Segoe UI" panose="020B0502040204020203" pitchFamily="34" charset="0"/>
+                <a:cs typeface="Segoe UI" panose="020B0502040204020203" pitchFamily="34" charset="0"/>
+              </a:rPr>
+              <a:t> 8 PoE</a:t>
+            </a:r>
+          </a:p>
+          <a:p>
+            <a:pPr>
+              <a:buFont typeface="Arial" panose="020B0604020202020204" pitchFamily="34" charset="0"/>
+              <a:buChar char="•"/>
+            </a:pPr>
+            <a:r>
+              <a:rPr lang="en-GB" dirty="0">
+                <a:latin typeface="Segoe UI" panose="020B0502040204020203" pitchFamily="34" charset="0"/>
+                <a:cs typeface="Segoe UI" panose="020B0502040204020203" pitchFamily="34" charset="0"/>
+              </a:rPr>
+              <a:t> </a:t>
+            </a:r>
+            <a:r>
+              <a:rPr lang="en-GB" dirty="0" err="1">
+                <a:latin typeface="Segoe UI" panose="020B0502040204020203" pitchFamily="34" charset="0"/>
+                <a:cs typeface="Segoe UI" panose="020B0502040204020203" pitchFamily="34" charset="0"/>
+              </a:rPr>
+              <a:t>Configureerbaar</a:t>
+            </a:r>
+            <a:endParaRPr lang="en-GB" dirty="0">
+              <a:latin typeface="Segoe UI" panose="020B0502040204020203" pitchFamily="34" charset="0"/>
+              <a:cs typeface="Segoe UI" panose="020B0502040204020203" pitchFamily="34" charset="0"/>
+            </a:endParaRPr>
+          </a:p>
+          <a:p>
+            <a:pPr>
+              <a:buFont typeface="Arial" panose="020B0604020202020204" pitchFamily="34" charset="0"/>
+              <a:buChar char="•"/>
+            </a:pPr>
+            <a:r>
+              <a:rPr lang="en-GB" dirty="0">
+                <a:latin typeface="Segoe UI" panose="020B0502040204020203" pitchFamily="34" charset="0"/>
+                <a:cs typeface="Segoe UI" panose="020B0502040204020203" pitchFamily="34" charset="0"/>
+              </a:rPr>
+              <a:t> 1U</a:t>
+            </a:r>
+          </a:p>
+          <a:p>
+            <a:pPr marL="0" indent="0">
+              <a:buNone/>
+            </a:pPr>
+            <a:endParaRPr lang="en-GB" dirty="0">
+              <a:latin typeface="Segoe UI" panose="020B0502040204020203" pitchFamily="34" charset="0"/>
+              <a:cs typeface="Segoe UI" panose="020B0502040204020203" pitchFamily="34" charset="0"/>
+            </a:endParaRPr>
+          </a:p>
+          <a:p>
+            <a:pPr>
+              <a:buFont typeface="Arial" panose="020B0604020202020204" pitchFamily="34" charset="0"/>
+              <a:buChar char="•"/>
+            </a:pPr>
+            <a:endParaRPr lang="en-GB" dirty="0">
+              <a:latin typeface="Segoe UI" panose="020B0502040204020203" pitchFamily="34" charset="0"/>
+              <a:cs typeface="Segoe UI" panose="020B0502040204020203" pitchFamily="34" charset="0"/>
+            </a:endParaRPr>
+          </a:p>
+          <a:p>
+            <a:pPr>
+              <a:buFont typeface="Arial" panose="020B0604020202020204" pitchFamily="34" charset="0"/>
+              <a:buChar char="•"/>
+            </a:pPr>
+            <a:r>
+              <a:rPr lang="en-GB" dirty="0">
+                <a:latin typeface="Segoe UI" panose="020B0502040204020203" pitchFamily="34" charset="0"/>
+                <a:cs typeface="Segoe UI" panose="020B0502040204020203" pitchFamily="34" charset="0"/>
+              </a:rPr>
+              <a:t> € 107.80</a:t>
+            </a:r>
+          </a:p>
+        </p:txBody>
+      </p:sp>
+      <p:pic>
+        <p:nvPicPr>
+          <p:cNvPr id="2052" name="Picture 4" descr="https://www.netgear.com/images/OptionalVideos/jgs516.png">
+            <a:extLst>
+              <a:ext uri="{FF2B5EF4-FFF2-40B4-BE49-F238E27FC236}">
+                <a16:creationId xmlns:a16="http://schemas.microsoft.com/office/drawing/2014/main" id="{FD3E3E0D-3C12-48D7-AE13-34B1C570E3B2}"/>
+              </a:ext>
+            </a:extLst>
+          </p:cNvPr>
+          <p:cNvPicPr>
+            <a:picLocks noChangeAspect="1" noChangeArrowheads="1"/>
+          </p:cNvPicPr>
+          <p:nvPr/>
+        </p:nvPicPr>
+        <p:blipFill>
+          <a:blip r:embed="rId2">
+            <a:extLst>
+              <a:ext uri="{28A0092B-C50C-407E-A947-70E740481C1C}">
+                <a14:useLocalDpi xmlns:a14="http://schemas.microsoft.com/office/drawing/2010/main" val="0"/>
+              </a:ext>
+            </a:extLst>
+          </a:blip>
+          <a:srcRect/>
+          <a:stretch>
+            <a:fillRect/>
+          </a:stretch>
+        </p:blipFill>
+        <p:spPr bwMode="auto">
+          <a:xfrm>
+            <a:off x="8519955" y="4029501"/>
+            <a:ext cx="3277142" cy="2182279"/>
+          </a:xfrm>
+          <a:prstGeom prst="rect">
+            <a:avLst/>
+          </a:prstGeom>
+          <a:noFill/>
+          <a:extLst>
+            <a:ext uri="{909E8E84-426E-40DD-AFC4-6F175D3DCCD1}">
+              <a14:hiddenFill xmlns:a14="http://schemas.microsoft.com/office/drawing/2010/main">
+                <a:solidFill>
+                  <a:srgbClr val="FFFFFF"/>
+                </a:solidFill>
+              </a14:hiddenFill>
+            </a:ext>
+          </a:extLst>
+        </p:spPr>
+      </p:pic>
+    </p:spTree>
+    <p:extLst>
+      <p:ext uri="{BB962C8B-B14F-4D97-AF65-F5344CB8AC3E}">
+        <p14:creationId xmlns:p14="http://schemas.microsoft.com/office/powerpoint/2010/main" val="4203233244"/>
+      </p:ext>
+    </p:extLst>
+  </p:cSld>
+  <p:clrMapOvr>
+    <a:masterClrMapping/>
+  </p:clrMapOvr>
+  <p:transition>
+    <p:fade/>
+  </p:transition>
+</p:sld>
+</file>
+
+<file path=ppt/slides/slide13.xml><?xml version="1.0" encoding="utf-8"?>
+<p:sld xmlns:a="http://schemas.openxmlformats.org/drawingml/2006/main" xmlns:r="http://schemas.openxmlformats.org/officeDocument/2006/relationships" xmlns:p="http://schemas.openxmlformats.org/presentationml/2006/main">
+  <p:cSld>
+    <p:spTree>
+      <p:nvGrpSpPr>
+        <p:cNvPr id="1" name=""/>
+        <p:cNvGrpSpPr/>
+        <p:nvPr/>
+      </p:nvGrpSpPr>
+      <p:grpSpPr>
+        <a:xfrm>
+          <a:off x="0" y="0"/>
+          <a:ext cx="0" cy="0"/>
+          <a:chOff x="0" y="0"/>
+          <a:chExt cx="0" cy="0"/>
+        </a:xfrm>
+      </p:grpSpPr>
+      <p:sp>
+        <p:nvSpPr>
+          <p:cNvPr id="2" name="Titel 1">
+            <a:extLst>
+              <a:ext uri="{FF2B5EF4-FFF2-40B4-BE49-F238E27FC236}">
+                <a16:creationId xmlns:a16="http://schemas.microsoft.com/office/drawing/2014/main" id="{F4D34022-F1E1-4EB6-844B-7D4180E745BC}"/>
+              </a:ext>
+            </a:extLst>
+          </p:cNvPr>
+          <p:cNvSpPr>
+            <a:spLocks noGrp="1"/>
+          </p:cNvSpPr>
+          <p:nvPr>
+            <p:ph type="title"/>
+          </p:nvPr>
+        </p:nvSpPr>
+        <p:spPr/>
+        <p:txBody>
+          <a:bodyPr/>
+          <a:lstStyle/>
+          <a:p>
+            <a:r>
+              <a:rPr lang="en-GB" dirty="0">
+                <a:latin typeface="Segoe UI" panose="020B0502040204020203" pitchFamily="34" charset="0"/>
+                <a:cs typeface="Segoe UI" panose="020B0502040204020203" pitchFamily="34" charset="0"/>
+              </a:rPr>
+              <a:t>Access Point</a:t>
+            </a:r>
+          </a:p>
+        </p:txBody>
+      </p:sp>
+      <p:sp>
+        <p:nvSpPr>
+          <p:cNvPr id="3" name="Tijdelijke aanduiding voor inhoud 2">
+            <a:extLst>
+              <a:ext uri="{FF2B5EF4-FFF2-40B4-BE49-F238E27FC236}">
+                <a16:creationId xmlns:a16="http://schemas.microsoft.com/office/drawing/2014/main" id="{C99F5C9E-A9B5-413B-B174-98432D316ABF}"/>
+              </a:ext>
+            </a:extLst>
+          </p:cNvPr>
+          <p:cNvSpPr>
+            <a:spLocks noGrp="1"/>
+          </p:cNvSpPr>
+          <p:nvPr>
+            <p:ph idx="1"/>
+          </p:nvPr>
+        </p:nvSpPr>
+        <p:spPr/>
+        <p:txBody>
+          <a:bodyPr/>
+          <a:lstStyle/>
+          <a:p>
+            <a:pPr>
+              <a:buFont typeface="Arial" panose="020B0604020202020204" pitchFamily="34" charset="0"/>
+              <a:buChar char="•"/>
+            </a:pPr>
+            <a:r>
+              <a:rPr lang="en-GB" dirty="0">
+                <a:latin typeface="Segoe UI" panose="020B0502040204020203" pitchFamily="34" charset="0"/>
+                <a:cs typeface="Segoe UI" panose="020B0502040204020203" pitchFamily="34" charset="0"/>
+              </a:rPr>
+              <a:t> TP-Link Wireless N300 2T2R</a:t>
+            </a:r>
+          </a:p>
+          <a:p>
+            <a:pPr>
+              <a:buFont typeface="Arial" panose="020B0604020202020204" pitchFamily="34" charset="0"/>
+              <a:buChar char="•"/>
+            </a:pPr>
+            <a:r>
+              <a:rPr lang="en-GB" dirty="0">
+                <a:latin typeface="Segoe UI" panose="020B0502040204020203" pitchFamily="34" charset="0"/>
+                <a:cs typeface="Segoe UI" panose="020B0502040204020203" pitchFamily="34" charset="0"/>
+              </a:rPr>
+              <a:t> </a:t>
+            </a:r>
+            <a:r>
+              <a:rPr lang="en-GB" dirty="0" err="1">
+                <a:latin typeface="Segoe UI" panose="020B0502040204020203" pitchFamily="34" charset="0"/>
+                <a:cs typeface="Segoe UI" panose="020B0502040204020203" pitchFamily="34" charset="0"/>
+              </a:rPr>
+              <a:t>Meerdere</a:t>
+            </a:r>
+            <a:r>
+              <a:rPr lang="en-GB" dirty="0">
+                <a:latin typeface="Segoe UI" panose="020B0502040204020203" pitchFamily="34" charset="0"/>
+                <a:cs typeface="Segoe UI" panose="020B0502040204020203" pitchFamily="34" charset="0"/>
+              </a:rPr>
+              <a:t> SSIDs (</a:t>
+            </a:r>
+            <a:r>
+              <a:rPr lang="en-GB" dirty="0" err="1">
+                <a:latin typeface="Segoe UI" panose="020B0502040204020203" pitchFamily="34" charset="0"/>
+                <a:cs typeface="Segoe UI" panose="020B0502040204020203" pitchFamily="34" charset="0"/>
+              </a:rPr>
+              <a:t>Wifi</a:t>
+            </a:r>
+            <a:r>
+              <a:rPr lang="en-GB" dirty="0">
+                <a:latin typeface="Segoe UI" panose="020B0502040204020203" pitchFamily="34" charset="0"/>
+                <a:cs typeface="Segoe UI" panose="020B0502040204020203" pitchFamily="34" charset="0"/>
+              </a:rPr>
+              <a:t> </a:t>
+            </a:r>
+            <a:r>
+              <a:rPr lang="en-GB" dirty="0" err="1">
+                <a:latin typeface="Segoe UI" panose="020B0502040204020203" pitchFamily="34" charset="0"/>
+                <a:cs typeface="Segoe UI" panose="020B0502040204020203" pitchFamily="34" charset="0"/>
+              </a:rPr>
+              <a:t>netwerken</a:t>
+            </a:r>
+            <a:r>
+              <a:rPr lang="en-GB" dirty="0">
+                <a:latin typeface="Segoe UI" panose="020B0502040204020203" pitchFamily="34" charset="0"/>
+                <a:cs typeface="Segoe UI" panose="020B0502040204020203" pitchFamily="34" charset="0"/>
+              </a:rPr>
+              <a:t>)</a:t>
+            </a:r>
+          </a:p>
+          <a:p>
+            <a:pPr>
+              <a:buFont typeface="Arial" panose="020B0604020202020204" pitchFamily="34" charset="0"/>
+              <a:buChar char="•"/>
+            </a:pPr>
+            <a:r>
+              <a:rPr lang="en-GB" dirty="0">
+                <a:latin typeface="Segoe UI" panose="020B0502040204020203" pitchFamily="34" charset="0"/>
+                <a:cs typeface="Segoe UI" panose="020B0502040204020203" pitchFamily="34" charset="0"/>
+              </a:rPr>
+              <a:t> PoE</a:t>
+            </a:r>
+          </a:p>
+          <a:p>
+            <a:pPr>
+              <a:buFont typeface="Arial" panose="020B0604020202020204" pitchFamily="34" charset="0"/>
+              <a:buChar char="•"/>
+            </a:pPr>
+            <a:endParaRPr lang="en-GB" dirty="0">
+              <a:latin typeface="Segoe UI" panose="020B0502040204020203" pitchFamily="34" charset="0"/>
+              <a:cs typeface="Segoe UI" panose="020B0502040204020203" pitchFamily="34" charset="0"/>
+            </a:endParaRPr>
+          </a:p>
+          <a:p>
+            <a:pPr>
+              <a:buFont typeface="Arial" panose="020B0604020202020204" pitchFamily="34" charset="0"/>
+              <a:buChar char="•"/>
+            </a:pPr>
+            <a:endParaRPr lang="en-GB" dirty="0">
+              <a:latin typeface="Segoe UI" panose="020B0502040204020203" pitchFamily="34" charset="0"/>
+              <a:cs typeface="Segoe UI" panose="020B0502040204020203" pitchFamily="34" charset="0"/>
+            </a:endParaRPr>
+          </a:p>
+          <a:p>
+            <a:pPr marL="0" indent="0">
+              <a:buNone/>
+            </a:pPr>
+            <a:endParaRPr lang="en-GB" dirty="0">
+              <a:latin typeface="Segoe UI" panose="020B0502040204020203" pitchFamily="34" charset="0"/>
+              <a:cs typeface="Segoe UI" panose="020B0502040204020203" pitchFamily="34" charset="0"/>
+            </a:endParaRPr>
+          </a:p>
+          <a:p>
+            <a:pPr marL="0" indent="0">
+              <a:buNone/>
+            </a:pPr>
+            <a:endParaRPr lang="en-GB" dirty="0">
+              <a:latin typeface="Segoe UI" panose="020B0502040204020203" pitchFamily="34" charset="0"/>
+              <a:cs typeface="Segoe UI" panose="020B0502040204020203" pitchFamily="34" charset="0"/>
+            </a:endParaRPr>
+          </a:p>
+          <a:p>
+            <a:pPr>
+              <a:buFont typeface="Arial" panose="020B0604020202020204" pitchFamily="34" charset="0"/>
+              <a:buChar char="•"/>
+            </a:pPr>
+            <a:r>
+              <a:rPr lang="en-GB" dirty="0">
+                <a:latin typeface="Segoe UI" panose="020B0502040204020203" pitchFamily="34" charset="0"/>
+                <a:cs typeface="Segoe UI" panose="020B0502040204020203" pitchFamily="34" charset="0"/>
+              </a:rPr>
+              <a:t> € 17.80</a:t>
+            </a:r>
+          </a:p>
+        </p:txBody>
+      </p:sp>
+      <p:pic>
+        <p:nvPicPr>
+          <p:cNvPr id="5122" name="Picture 2" descr="https://images-na.ssl-images-amazon.com/images/I/61Ebk7ldyML._SL1500_.jpg">
+            <a:extLst>
+              <a:ext uri="{FF2B5EF4-FFF2-40B4-BE49-F238E27FC236}">
+                <a16:creationId xmlns:a16="http://schemas.microsoft.com/office/drawing/2014/main" id="{A59FB29A-16D7-45E5-82D5-9A1D79A23745}"/>
+              </a:ext>
+            </a:extLst>
+          </p:cNvPr>
+          <p:cNvPicPr>
+            <a:picLocks noChangeAspect="1" noChangeArrowheads="1"/>
+          </p:cNvPicPr>
+          <p:nvPr/>
+        </p:nvPicPr>
+        <p:blipFill>
+          <a:blip r:embed="rId2">
+            <a:extLst>
+              <a:ext uri="{28A0092B-C50C-407E-A947-70E740481C1C}">
+                <a14:useLocalDpi xmlns:a14="http://schemas.microsoft.com/office/drawing/2010/main" val="0"/>
+              </a:ext>
+            </a:extLst>
+          </a:blip>
+          <a:srcRect/>
+          <a:stretch>
+            <a:fillRect/>
+          </a:stretch>
+        </p:blipFill>
+        <p:spPr bwMode="auto">
+          <a:xfrm>
+            <a:off x="8914316" y="3127293"/>
+            <a:ext cx="2751551" cy="2790305"/>
+          </a:xfrm>
+          <a:prstGeom prst="rect">
+            <a:avLst/>
+          </a:prstGeom>
+          <a:noFill/>
+          <a:extLst>
+            <a:ext uri="{909E8E84-426E-40DD-AFC4-6F175D3DCCD1}">
+              <a14:hiddenFill xmlns:a14="http://schemas.microsoft.com/office/drawing/2010/main">
+                <a:solidFill>
+                  <a:srgbClr val="FFFFFF"/>
+                </a:solidFill>
+              </a14:hiddenFill>
+            </a:ext>
+          </a:extLst>
+        </p:spPr>
+      </p:pic>
+    </p:spTree>
+    <p:extLst>
+      <p:ext uri="{BB962C8B-B14F-4D97-AF65-F5344CB8AC3E}">
+        <p14:creationId xmlns:p14="http://schemas.microsoft.com/office/powerpoint/2010/main" val="150959487"/>
+      </p:ext>
+    </p:extLst>
+  </p:cSld>
+  <p:clrMapOvr>
+    <a:masterClrMapping/>
+  </p:clrMapOvr>
+  <p:transition>
+    <p:fade/>
+  </p:transition>
+</p:sld>
+</file>
+
+<file path=ppt/slides/slide14.xml><?xml version="1.0" encoding="utf-8"?>
+<p:sld xmlns:a="http://schemas.openxmlformats.org/drawingml/2006/main" xmlns:r="http://schemas.openxmlformats.org/officeDocument/2006/relationships" xmlns:p="http://schemas.openxmlformats.org/presentationml/2006/main">
+  <p:cSld>
+    <p:spTree>
+      <p:nvGrpSpPr>
+        <p:cNvPr id="1" name=""/>
+        <p:cNvGrpSpPr/>
+        <p:nvPr/>
+      </p:nvGrpSpPr>
+      <p:grpSpPr>
+        <a:xfrm>
+          <a:off x="0" y="0"/>
+          <a:ext cx="0" cy="0"/>
+          <a:chOff x="0" y="0"/>
+          <a:chExt cx="0" cy="0"/>
+        </a:xfrm>
+      </p:grpSpPr>
+      <p:sp>
+        <p:nvSpPr>
+          <p:cNvPr id="2" name="Titel 1">
+            <a:extLst>
+              <a:ext uri="{FF2B5EF4-FFF2-40B4-BE49-F238E27FC236}">
+                <a16:creationId xmlns:a16="http://schemas.microsoft.com/office/drawing/2014/main" id="{507F1CCA-6633-41A2-8ED2-169F30F91995}"/>
+              </a:ext>
+            </a:extLst>
+          </p:cNvPr>
+          <p:cNvSpPr>
+            <a:spLocks noGrp="1"/>
+          </p:cNvSpPr>
+          <p:nvPr>
+            <p:ph type="title"/>
+          </p:nvPr>
+        </p:nvSpPr>
+        <p:spPr/>
+        <p:txBody>
+          <a:bodyPr/>
+          <a:lstStyle/>
+          <a:p>
+            <a:r>
+              <a:rPr lang="en-GB" dirty="0" err="1">
+                <a:latin typeface="Segoe UI" panose="020B0502040204020203" pitchFamily="34" charset="0"/>
+                <a:cs typeface="Segoe UI" panose="020B0502040204020203" pitchFamily="34" charset="0"/>
+              </a:rPr>
+              <a:t>Netwerkapparatuur</a:t>
+            </a:r>
+            <a:r>
+              <a:rPr lang="en-GB" dirty="0">
+                <a:latin typeface="Segoe UI" panose="020B0502040204020203" pitchFamily="34" charset="0"/>
+                <a:cs typeface="Segoe UI" panose="020B0502040204020203" pitchFamily="34" charset="0"/>
+              </a:rPr>
+              <a:t>: Server Rack</a:t>
+            </a:r>
+          </a:p>
+        </p:txBody>
+      </p:sp>
+      <p:sp>
+        <p:nvSpPr>
+          <p:cNvPr id="3" name="Tijdelijke aanduiding voor inhoud 2">
+            <a:extLst>
+              <a:ext uri="{FF2B5EF4-FFF2-40B4-BE49-F238E27FC236}">
+                <a16:creationId xmlns:a16="http://schemas.microsoft.com/office/drawing/2014/main" id="{B1093ED1-2907-4E59-BCC1-0B7AA1E43016}"/>
+              </a:ext>
+            </a:extLst>
+          </p:cNvPr>
+          <p:cNvSpPr>
+            <a:spLocks noGrp="1"/>
+          </p:cNvSpPr>
+          <p:nvPr>
+            <p:ph idx="1"/>
+          </p:nvPr>
+        </p:nvSpPr>
+        <p:spPr/>
+        <p:txBody>
+          <a:bodyPr/>
+          <a:lstStyle/>
+          <a:p>
+            <a:pPr>
+              <a:buFont typeface="Arial" panose="020B0604020202020204" pitchFamily="34" charset="0"/>
+              <a:buChar char="•"/>
+            </a:pPr>
+            <a:r>
+              <a:rPr lang="en-GB" dirty="0">
+                <a:latin typeface="Segoe UI" panose="020B0502040204020203" pitchFamily="34" charset="0"/>
+                <a:cs typeface="Segoe UI" panose="020B0502040204020203" pitchFamily="34" charset="0"/>
+              </a:rPr>
+              <a:t> StarTech Server Rack + </a:t>
+            </a:r>
+            <a:r>
+              <a:rPr lang="en-GB" dirty="0" err="1">
+                <a:latin typeface="Segoe UI" panose="020B0502040204020203" pitchFamily="34" charset="0"/>
+                <a:cs typeface="Segoe UI" panose="020B0502040204020203" pitchFamily="34" charset="0"/>
+              </a:rPr>
+              <a:t>Schap</a:t>
+            </a:r>
+            <a:r>
+              <a:rPr lang="en-GB" dirty="0">
+                <a:latin typeface="Segoe UI" panose="020B0502040204020203" pitchFamily="34" charset="0"/>
+                <a:cs typeface="Segoe UI" panose="020B0502040204020203" pitchFamily="34" charset="0"/>
+              </a:rPr>
+              <a:t> </a:t>
+            </a:r>
+          </a:p>
+          <a:p>
+            <a:pPr>
+              <a:buFont typeface="Arial" panose="020B0604020202020204" pitchFamily="34" charset="0"/>
+              <a:buChar char="•"/>
+            </a:pPr>
+            <a:r>
+              <a:rPr lang="en-GB" dirty="0">
+                <a:latin typeface="Segoe UI" panose="020B0502040204020203" pitchFamily="34" charset="0"/>
+                <a:cs typeface="Segoe UI" panose="020B0502040204020203" pitchFamily="34" charset="0"/>
+              </a:rPr>
+              <a:t> </a:t>
+            </a:r>
+            <a:r>
+              <a:rPr lang="en-GB" dirty="0" err="1">
+                <a:latin typeface="Segoe UI" panose="020B0502040204020203" pitchFamily="34" charset="0"/>
+                <a:cs typeface="Segoe UI" panose="020B0502040204020203" pitchFamily="34" charset="0"/>
+              </a:rPr>
+              <a:t>Wandmontage</a:t>
+            </a:r>
+            <a:r>
+              <a:rPr lang="en-GB" dirty="0">
+                <a:latin typeface="Segoe UI" panose="020B0502040204020203" pitchFamily="34" charset="0"/>
+                <a:cs typeface="Segoe UI" panose="020B0502040204020203" pitchFamily="34" charset="0"/>
+              </a:rPr>
+              <a:t> </a:t>
+            </a:r>
+          </a:p>
+          <a:p>
+            <a:pPr>
+              <a:buFont typeface="Arial" panose="020B0604020202020204" pitchFamily="34" charset="0"/>
+              <a:buChar char="•"/>
+            </a:pPr>
+            <a:r>
+              <a:rPr lang="en-GB" dirty="0">
+                <a:latin typeface="Segoe UI" panose="020B0502040204020203" pitchFamily="34" charset="0"/>
+                <a:cs typeface="Segoe UI" panose="020B0502040204020203" pitchFamily="34" charset="0"/>
+              </a:rPr>
+              <a:t> 4U </a:t>
+            </a:r>
+            <a:r>
+              <a:rPr lang="en-GB" dirty="0">
+                <a:latin typeface="Segoe UI" panose="020B0502040204020203" pitchFamily="34" charset="0"/>
+                <a:cs typeface="Segoe UI" panose="020B0502040204020203" pitchFamily="34" charset="0"/>
+                <a:sym typeface="Wingdings" panose="05000000000000000000" pitchFamily="2" charset="2"/>
+              </a:rPr>
+              <a:t> </a:t>
+            </a:r>
+            <a:r>
+              <a:rPr lang="en-GB" dirty="0" err="1">
+                <a:latin typeface="Segoe UI" panose="020B0502040204020203" pitchFamily="34" charset="0"/>
+                <a:cs typeface="Segoe UI" panose="020B0502040204020203" pitchFamily="34" charset="0"/>
+                <a:sym typeface="Wingdings" panose="05000000000000000000" pitchFamily="2" charset="2"/>
+              </a:rPr>
+              <a:t>uitbreiding</a:t>
+            </a:r>
+            <a:r>
+              <a:rPr lang="en-GB" dirty="0">
+                <a:latin typeface="Segoe UI" panose="020B0502040204020203" pitchFamily="34" charset="0"/>
+                <a:cs typeface="Segoe UI" panose="020B0502040204020203" pitchFamily="34" charset="0"/>
+                <a:sym typeface="Wingdings" panose="05000000000000000000" pitchFamily="2" charset="2"/>
+              </a:rPr>
+              <a:t> </a:t>
+            </a:r>
+            <a:r>
+              <a:rPr lang="en-GB" dirty="0" err="1">
+                <a:latin typeface="Segoe UI" panose="020B0502040204020203" pitchFamily="34" charset="0"/>
+                <a:cs typeface="Segoe UI" panose="020B0502040204020203" pitchFamily="34" charset="0"/>
+                <a:sym typeface="Wingdings" panose="05000000000000000000" pitchFamily="2" charset="2"/>
+              </a:rPr>
+              <a:t>mogelijk</a:t>
+            </a:r>
+            <a:endParaRPr lang="en-GB" dirty="0">
+              <a:latin typeface="Segoe UI" panose="020B0502040204020203" pitchFamily="34" charset="0"/>
+              <a:cs typeface="Segoe UI" panose="020B0502040204020203" pitchFamily="34" charset="0"/>
+            </a:endParaRPr>
+          </a:p>
+          <a:p>
+            <a:pPr>
+              <a:buFont typeface="Arial" panose="020B0604020202020204" pitchFamily="34" charset="0"/>
+              <a:buChar char="•"/>
+            </a:pPr>
+            <a:r>
+              <a:rPr lang="en-GB" dirty="0">
+                <a:latin typeface="Segoe UI" panose="020B0502040204020203" pitchFamily="34" charset="0"/>
+                <a:cs typeface="Segoe UI" panose="020B0502040204020203" pitchFamily="34" charset="0"/>
+              </a:rPr>
+              <a:t> </a:t>
+            </a:r>
+            <a:r>
+              <a:rPr lang="en-GB" dirty="0" err="1">
+                <a:latin typeface="Segoe UI" panose="020B0502040204020203" pitchFamily="34" charset="0"/>
+                <a:cs typeface="Segoe UI" panose="020B0502040204020203" pitchFamily="34" charset="0"/>
+              </a:rPr>
+              <a:t>Massief</a:t>
+            </a:r>
+            <a:r>
+              <a:rPr lang="en-GB" dirty="0">
+                <a:latin typeface="Segoe UI" panose="020B0502040204020203" pitchFamily="34" charset="0"/>
+                <a:cs typeface="Segoe UI" panose="020B0502040204020203" pitchFamily="34" charset="0"/>
+              </a:rPr>
+              <a:t> </a:t>
+            </a:r>
+            <a:r>
+              <a:rPr lang="en-GB" dirty="0" err="1">
+                <a:latin typeface="Segoe UI" panose="020B0502040204020203" pitchFamily="34" charset="0"/>
+                <a:cs typeface="Segoe UI" panose="020B0502040204020203" pitchFamily="34" charset="0"/>
+              </a:rPr>
+              <a:t>staal</a:t>
+            </a:r>
+            <a:endParaRPr lang="en-GB" dirty="0">
+              <a:latin typeface="Segoe UI" panose="020B0502040204020203" pitchFamily="34" charset="0"/>
+              <a:cs typeface="Segoe UI" panose="020B0502040204020203" pitchFamily="34" charset="0"/>
+            </a:endParaRPr>
+          </a:p>
+        </p:txBody>
+      </p:sp>
+      <p:pic>
+        <p:nvPicPr>
+          <p:cNvPr id="2050" name="Picture 2" descr="Thumbnail 1 for Wall-Mount Server Rack with Built-in Shelf - Solid Steel - 4U">
+            <a:extLst>
+              <a:ext uri="{FF2B5EF4-FFF2-40B4-BE49-F238E27FC236}">
+                <a16:creationId xmlns:a16="http://schemas.microsoft.com/office/drawing/2014/main" id="{1618FD7D-2936-4BA3-9491-869B628927B9}"/>
+              </a:ext>
+            </a:extLst>
+          </p:cNvPr>
+          <p:cNvPicPr>
+            <a:picLocks noChangeAspect="1" noChangeArrowheads="1"/>
+          </p:cNvPicPr>
+          <p:nvPr/>
+        </p:nvPicPr>
+        <p:blipFill>
+          <a:blip r:embed="rId2">
+            <a:extLst>
+              <a:ext uri="{28A0092B-C50C-407E-A947-70E740481C1C}">
+                <a14:useLocalDpi xmlns:a14="http://schemas.microsoft.com/office/drawing/2010/main" val="0"/>
+              </a:ext>
+            </a:extLst>
+          </a:blip>
+          <a:srcRect/>
+          <a:stretch>
+            <a:fillRect/>
+          </a:stretch>
+        </p:blipFill>
+        <p:spPr bwMode="auto">
+          <a:xfrm>
+            <a:off x="6395022" y="3514589"/>
+            <a:ext cx="2405028" cy="2405028"/>
+          </a:xfrm>
+          <a:prstGeom prst="rect">
+            <a:avLst/>
+          </a:prstGeom>
+          <a:noFill/>
+          <a:extLst>
+            <a:ext uri="{909E8E84-426E-40DD-AFC4-6F175D3DCCD1}">
+              <a14:hiddenFill xmlns:a14="http://schemas.microsoft.com/office/drawing/2010/main">
+                <a:solidFill>
+                  <a:srgbClr val="FFFFFF"/>
+                </a:solidFill>
+              </a14:hiddenFill>
+            </a:ext>
+          </a:extLst>
+        </p:spPr>
+      </p:pic>
+      <p:pic>
+        <p:nvPicPr>
+          <p:cNvPr id="2052" name="Picture 4" descr="Thumbnail 2 for Wall-Mount Server Rack with Built-in Shelf - Solid Steel - 4U">
+            <a:extLst>
+              <a:ext uri="{FF2B5EF4-FFF2-40B4-BE49-F238E27FC236}">
+                <a16:creationId xmlns:a16="http://schemas.microsoft.com/office/drawing/2014/main" id="{B21F69AE-EDE7-4FBF-9953-3675136DBBA2}"/>
+              </a:ext>
+            </a:extLst>
+          </p:cNvPr>
+          <p:cNvPicPr>
+            <a:picLocks noChangeAspect="1" noChangeArrowheads="1"/>
+          </p:cNvPicPr>
+          <p:nvPr/>
+        </p:nvPicPr>
+        <p:blipFill>
+          <a:blip r:embed="rId3">
+            <a:extLst>
+              <a:ext uri="{28A0092B-C50C-407E-A947-70E740481C1C}">
+                <a14:useLocalDpi xmlns:a14="http://schemas.microsoft.com/office/drawing/2010/main" val="0"/>
+              </a:ext>
+            </a:extLst>
+          </a:blip>
+          <a:srcRect/>
+          <a:stretch>
+            <a:fillRect/>
+          </a:stretch>
+        </p:blipFill>
+        <p:spPr bwMode="auto">
+          <a:xfrm>
+            <a:off x="8999545" y="3337993"/>
+            <a:ext cx="2857500" cy="2857500"/>
+          </a:xfrm>
+          <a:prstGeom prst="rect">
+            <a:avLst/>
+          </a:prstGeom>
+          <a:noFill/>
+          <a:extLst>
+            <a:ext uri="{909E8E84-426E-40DD-AFC4-6F175D3DCCD1}">
+              <a14:hiddenFill xmlns:a14="http://schemas.microsoft.com/office/drawing/2010/main">
+                <a:solidFill>
+                  <a:srgbClr val="FFFFFF"/>
+                </a:solidFill>
+              </a14:hiddenFill>
+            </a:ext>
+          </a:extLst>
+        </p:spPr>
+      </p:pic>
+    </p:spTree>
+    <p:extLst>
+      <p:ext uri="{BB962C8B-B14F-4D97-AF65-F5344CB8AC3E}">
+        <p14:creationId xmlns:p14="http://schemas.microsoft.com/office/powerpoint/2010/main" val="2773309958"/>
+      </p:ext>
+    </p:extLst>
+  </p:cSld>
+  <p:clrMapOvr>
+    <a:masterClrMapping/>
+  </p:clrMapOvr>
+  <p:transition>
+    <p:fade/>
+  </p:transition>
+</p:sld>
+</file>
+
+<file path=ppt/slides/slide15.xml><?xml version="1.0" encoding="utf-8"?>
+<p:sld xmlns:a="http://schemas.openxmlformats.org/drawingml/2006/main" xmlns:r="http://schemas.openxmlformats.org/officeDocument/2006/relationships" xmlns:p="http://schemas.openxmlformats.org/presentationml/2006/main">
+  <p:cSld>
+    <p:spTree>
+      <p:nvGrpSpPr>
+        <p:cNvPr id="1" name=""/>
+        <p:cNvGrpSpPr/>
+        <p:nvPr/>
+      </p:nvGrpSpPr>
+      <p:grpSpPr>
+        <a:xfrm>
+          <a:off x="0" y="0"/>
+          <a:ext cx="0" cy="0"/>
+          <a:chOff x="0" y="0"/>
+          <a:chExt cx="0" cy="0"/>
+        </a:xfrm>
+      </p:grpSpPr>
+      <p:sp>
+        <p:nvSpPr>
+          <p:cNvPr id="2" name="Titel 1">
+            <a:extLst>
+              <a:ext uri="{FF2B5EF4-FFF2-40B4-BE49-F238E27FC236}">
+                <a16:creationId xmlns:a16="http://schemas.microsoft.com/office/drawing/2014/main" id="{A5E43959-96F4-4FD6-B3E6-B2D6B20CBAB3}"/>
+              </a:ext>
+            </a:extLst>
+          </p:cNvPr>
+          <p:cNvSpPr>
+            <a:spLocks noGrp="1"/>
+          </p:cNvSpPr>
+          <p:nvPr>
+            <p:ph type="title"/>
+          </p:nvPr>
+        </p:nvSpPr>
+        <p:spPr/>
+        <p:txBody>
+          <a:bodyPr/>
+          <a:lstStyle/>
+          <a:p>
+            <a:r>
+              <a:rPr lang="en-GB" dirty="0" err="1">
+                <a:latin typeface="Segoe UI" panose="020B0502040204020203" pitchFamily="34" charset="0"/>
+                <a:cs typeface="Segoe UI" panose="020B0502040204020203" pitchFamily="34" charset="0"/>
+              </a:rPr>
+              <a:t>Netwerkapparatuur</a:t>
+            </a:r>
+            <a:r>
+              <a:rPr lang="en-GB" dirty="0">
+                <a:latin typeface="Segoe UI" panose="020B0502040204020203" pitchFamily="34" charset="0"/>
+                <a:cs typeface="Segoe UI" panose="020B0502040204020203" pitchFamily="34" charset="0"/>
+              </a:rPr>
+              <a:t>: Bekabeling</a:t>
+            </a:r>
+          </a:p>
+        </p:txBody>
+      </p:sp>
+      <p:sp>
+        <p:nvSpPr>
+          <p:cNvPr id="3" name="Tijdelijke aanduiding voor inhoud 2">
+            <a:extLst>
+              <a:ext uri="{FF2B5EF4-FFF2-40B4-BE49-F238E27FC236}">
+                <a16:creationId xmlns:a16="http://schemas.microsoft.com/office/drawing/2014/main" id="{1E556DD1-731A-4814-922E-085457DEE772}"/>
+              </a:ext>
+            </a:extLst>
+          </p:cNvPr>
+          <p:cNvSpPr>
+            <a:spLocks noGrp="1"/>
+          </p:cNvSpPr>
+          <p:nvPr>
+            <p:ph idx="1"/>
+          </p:nvPr>
+        </p:nvSpPr>
+        <p:spPr/>
+        <p:txBody>
+          <a:bodyPr/>
+          <a:lstStyle/>
+          <a:p>
+            <a:pPr>
+              <a:buFont typeface="Arial" panose="020B0604020202020204" pitchFamily="34" charset="0"/>
+              <a:buChar char="•"/>
+            </a:pPr>
+            <a:r>
+              <a:rPr lang="nl-NL" dirty="0">
+                <a:latin typeface="Segoe UI" panose="020B0502040204020203" pitchFamily="34" charset="0"/>
+                <a:cs typeface="Segoe UI" panose="020B0502040204020203" pitchFamily="34" charset="0"/>
+              </a:rPr>
+              <a:t> </a:t>
+            </a:r>
+            <a:r>
+              <a:rPr lang="nl-NL" dirty="0" err="1">
+                <a:latin typeface="Segoe UI" panose="020B0502040204020203" pitchFamily="34" charset="0"/>
+                <a:cs typeface="Segoe UI" panose="020B0502040204020203" pitchFamily="34" charset="0"/>
+              </a:rPr>
+              <a:t>Equip</a:t>
+            </a:r>
+            <a:r>
+              <a:rPr lang="nl-NL" dirty="0">
+                <a:latin typeface="Segoe UI" panose="020B0502040204020203" pitchFamily="34" charset="0"/>
+                <a:cs typeface="Segoe UI" panose="020B0502040204020203" pitchFamily="34" charset="0"/>
+              </a:rPr>
+              <a:t> 625423 - 0,25 m x 2</a:t>
+            </a:r>
+          </a:p>
+          <a:p>
+            <a:pPr>
+              <a:buFont typeface="Arial" panose="020B0604020202020204" pitchFamily="34" charset="0"/>
+              <a:buChar char="•"/>
+            </a:pPr>
+            <a:r>
+              <a:rPr lang="nl-NL" dirty="0">
+                <a:latin typeface="Segoe UI" panose="020B0502040204020203" pitchFamily="34" charset="0"/>
+                <a:cs typeface="Segoe UI" panose="020B0502040204020203" pitchFamily="34" charset="0"/>
+              </a:rPr>
+              <a:t> </a:t>
+            </a:r>
+            <a:r>
+              <a:rPr lang="nl-NL" dirty="0" err="1">
+                <a:latin typeface="Segoe UI" panose="020B0502040204020203" pitchFamily="34" charset="0"/>
+                <a:cs typeface="Segoe UI" panose="020B0502040204020203" pitchFamily="34" charset="0"/>
+              </a:rPr>
+              <a:t>Equip</a:t>
+            </a:r>
+            <a:r>
+              <a:rPr lang="nl-NL" dirty="0">
+                <a:latin typeface="Segoe UI" panose="020B0502040204020203" pitchFamily="34" charset="0"/>
+                <a:cs typeface="Segoe UI" panose="020B0502040204020203" pitchFamily="34" charset="0"/>
+              </a:rPr>
+              <a:t> 625427 - 0,5 m x 3</a:t>
+            </a:r>
+          </a:p>
+          <a:p>
+            <a:pPr>
+              <a:buFont typeface="Arial" panose="020B0604020202020204" pitchFamily="34" charset="0"/>
+              <a:buChar char="•"/>
+            </a:pPr>
+            <a:r>
+              <a:rPr lang="nl-NL" dirty="0">
+                <a:latin typeface="Segoe UI" panose="020B0502040204020203" pitchFamily="34" charset="0"/>
+                <a:cs typeface="Segoe UI" panose="020B0502040204020203" pitchFamily="34" charset="0"/>
+              </a:rPr>
+              <a:t> </a:t>
+            </a:r>
+            <a:r>
+              <a:rPr lang="nl-NL" dirty="0" err="1">
+                <a:latin typeface="Segoe UI" panose="020B0502040204020203" pitchFamily="34" charset="0"/>
+                <a:cs typeface="Segoe UI" panose="020B0502040204020203" pitchFamily="34" charset="0"/>
+              </a:rPr>
+              <a:t>Equip</a:t>
+            </a:r>
+            <a:r>
+              <a:rPr lang="nl-NL" dirty="0">
+                <a:latin typeface="Segoe UI" panose="020B0502040204020203" pitchFamily="34" charset="0"/>
+                <a:cs typeface="Segoe UI" panose="020B0502040204020203" pitchFamily="34" charset="0"/>
+              </a:rPr>
+              <a:t> 625421 - 2 m x 1</a:t>
+            </a:r>
+          </a:p>
+          <a:p>
+            <a:pPr>
+              <a:buFont typeface="Arial" panose="020B0604020202020204" pitchFamily="34" charset="0"/>
+              <a:buChar char="•"/>
+            </a:pPr>
+            <a:r>
+              <a:rPr lang="nl-NL" dirty="0">
+                <a:latin typeface="Segoe UI" panose="020B0502040204020203" pitchFamily="34" charset="0"/>
+                <a:cs typeface="Segoe UI" panose="020B0502040204020203" pitchFamily="34" charset="0"/>
+              </a:rPr>
+              <a:t> </a:t>
+            </a:r>
+            <a:r>
+              <a:rPr lang="nl-NL" dirty="0" err="1">
+                <a:latin typeface="Segoe UI" panose="020B0502040204020203" pitchFamily="34" charset="0"/>
+                <a:cs typeface="Segoe UI" panose="020B0502040204020203" pitchFamily="34" charset="0"/>
+              </a:rPr>
+              <a:t>Equip</a:t>
+            </a:r>
+            <a:r>
+              <a:rPr lang="nl-NL" dirty="0">
+                <a:latin typeface="Segoe UI" panose="020B0502040204020203" pitchFamily="34" charset="0"/>
+                <a:cs typeface="Segoe UI" panose="020B0502040204020203" pitchFamily="34" charset="0"/>
+              </a:rPr>
+              <a:t> 625426 - 10 m x 5</a:t>
+            </a:r>
+          </a:p>
+          <a:p>
+            <a:pPr>
+              <a:buFont typeface="Arial" panose="020B0604020202020204" pitchFamily="34" charset="0"/>
+              <a:buChar char="•"/>
+            </a:pPr>
+            <a:r>
+              <a:rPr lang="en-GB" dirty="0">
+                <a:latin typeface="Segoe UI" panose="020B0502040204020203" pitchFamily="34" charset="0"/>
+                <a:cs typeface="Segoe UI" panose="020B0502040204020203" pitchFamily="34" charset="0"/>
+              </a:rPr>
+              <a:t> Cat6 </a:t>
+            </a:r>
+            <a:r>
+              <a:rPr lang="en-GB" dirty="0" err="1">
+                <a:latin typeface="Segoe UI" panose="020B0502040204020203" pitchFamily="34" charset="0"/>
+                <a:cs typeface="Segoe UI" panose="020B0502040204020203" pitchFamily="34" charset="0"/>
+              </a:rPr>
+              <a:t>bekabeling</a:t>
+            </a:r>
+            <a:endParaRPr lang="en-GB" dirty="0">
+              <a:latin typeface="Segoe UI" panose="020B0502040204020203" pitchFamily="34" charset="0"/>
+              <a:cs typeface="Segoe UI" panose="020B0502040204020203" pitchFamily="34" charset="0"/>
+            </a:endParaRPr>
+          </a:p>
+          <a:p>
+            <a:pPr>
+              <a:buFont typeface="Arial" panose="020B0604020202020204" pitchFamily="34" charset="0"/>
+              <a:buChar char="•"/>
+            </a:pPr>
+            <a:r>
+              <a:rPr lang="en-GB" dirty="0">
+                <a:latin typeface="Segoe UI" panose="020B0502040204020203" pitchFamily="34" charset="0"/>
+                <a:cs typeface="Segoe UI" panose="020B0502040204020203" pitchFamily="34" charset="0"/>
+              </a:rPr>
+              <a:t> </a:t>
+            </a:r>
+            <a:r>
+              <a:rPr lang="en-GB" dirty="0" err="1">
+                <a:latin typeface="Segoe UI" panose="020B0502040204020203" pitchFamily="34" charset="0"/>
+                <a:cs typeface="Segoe UI" panose="020B0502040204020203" pitchFamily="34" charset="0"/>
+              </a:rPr>
+              <a:t>Hogere</a:t>
+            </a:r>
+            <a:r>
+              <a:rPr lang="en-GB" dirty="0">
+                <a:latin typeface="Segoe UI" panose="020B0502040204020203" pitchFamily="34" charset="0"/>
+                <a:cs typeface="Segoe UI" panose="020B0502040204020203" pitchFamily="34" charset="0"/>
+              </a:rPr>
+              <a:t> </a:t>
+            </a:r>
+            <a:r>
+              <a:rPr lang="en-GB" dirty="0" err="1">
+                <a:latin typeface="Segoe UI" panose="020B0502040204020203" pitchFamily="34" charset="0"/>
+                <a:cs typeface="Segoe UI" panose="020B0502040204020203" pitchFamily="34" charset="0"/>
+              </a:rPr>
+              <a:t>bandbreedte</a:t>
+            </a:r>
+            <a:endParaRPr lang="en-GB" dirty="0">
+              <a:latin typeface="Segoe UI" panose="020B0502040204020203" pitchFamily="34" charset="0"/>
+              <a:cs typeface="Segoe UI" panose="020B0502040204020203" pitchFamily="34" charset="0"/>
+            </a:endParaRPr>
+          </a:p>
+        </p:txBody>
+      </p:sp>
+      <p:pic>
+        <p:nvPicPr>
+          <p:cNvPr id="3074" name="Picture 2" descr="https://mijnitshop-product-images.s3.eu-central-1.amazonaws.com/00/86/90/01.jpg">
+            <a:extLst>
+              <a:ext uri="{FF2B5EF4-FFF2-40B4-BE49-F238E27FC236}">
+                <a16:creationId xmlns:a16="http://schemas.microsoft.com/office/drawing/2014/main" id="{E8044121-239F-4009-88CE-5832DFB1B624}"/>
+              </a:ext>
+            </a:extLst>
+          </p:cNvPr>
+          <p:cNvPicPr>
+            <a:picLocks noChangeAspect="1" noChangeArrowheads="1"/>
+          </p:cNvPicPr>
+          <p:nvPr/>
+        </p:nvPicPr>
+        <p:blipFill>
+          <a:blip r:embed="rId2">
+            <a:extLst>
+              <a:ext uri="{28A0092B-C50C-407E-A947-70E740481C1C}">
+                <a14:useLocalDpi xmlns:a14="http://schemas.microsoft.com/office/drawing/2010/main" val="0"/>
+              </a:ext>
+            </a:extLst>
+          </a:blip>
+          <a:srcRect/>
+          <a:stretch>
+            <a:fillRect/>
+          </a:stretch>
+        </p:blipFill>
+        <p:spPr bwMode="auto">
+          <a:xfrm>
+            <a:off x="9230674" y="4159412"/>
+            <a:ext cx="2524561" cy="1922458"/>
+          </a:xfrm>
+          <a:prstGeom prst="rect">
+            <a:avLst/>
+          </a:prstGeom>
+          <a:noFill/>
+          <a:extLst>
+            <a:ext uri="{909E8E84-426E-40DD-AFC4-6F175D3DCCD1}">
+              <a14:hiddenFill xmlns:a14="http://schemas.microsoft.com/office/drawing/2010/main">
+                <a:solidFill>
+                  <a:srgbClr val="FFFFFF"/>
+                </a:solidFill>
+              </a14:hiddenFill>
+            </a:ext>
+          </a:extLst>
+        </p:spPr>
+      </p:pic>
+    </p:spTree>
+    <p:extLst>
+      <p:ext uri="{BB962C8B-B14F-4D97-AF65-F5344CB8AC3E}">
+        <p14:creationId xmlns:p14="http://schemas.microsoft.com/office/powerpoint/2010/main" val="326328332"/>
+      </p:ext>
+    </p:extLst>
+  </p:cSld>
+  <p:clrMapOvr>
+    <a:masterClrMapping/>
+  </p:clrMapOvr>
+  <p:transition>
+    <p:fade/>
+  </p:transition>
+</p:sld>
+</file>
+
+<file path=ppt/slides/slide16.xml><?xml version="1.0" encoding="utf-8"?>
+<p:sld xmlns:a="http://schemas.openxmlformats.org/drawingml/2006/main" xmlns:r="http://schemas.openxmlformats.org/officeDocument/2006/relationships" xmlns:p="http://schemas.openxmlformats.org/presentationml/2006/main">
+  <p:cSld>
+    <p:spTree>
+      <p:nvGrpSpPr>
+        <p:cNvPr id="1" name=""/>
+        <p:cNvGrpSpPr/>
+        <p:nvPr/>
+      </p:nvGrpSpPr>
+      <p:grpSpPr>
+        <a:xfrm>
+          <a:off x="0" y="0"/>
+          <a:ext cx="0" cy="0"/>
+          <a:chOff x="0" y="0"/>
+          <a:chExt cx="0" cy="0"/>
+        </a:xfrm>
+      </p:grpSpPr>
+      <p:sp>
+        <p:nvSpPr>
+          <p:cNvPr id="2" name="Titel 1">
+            <a:extLst>
+              <a:ext uri="{FF2B5EF4-FFF2-40B4-BE49-F238E27FC236}">
                 <a16:creationId xmlns:a16="http://schemas.microsoft.com/office/drawing/2014/main" id="{0D3243D0-41AB-4A59-88B7-6E8B6C014CB2}"/>
               </a:ext>
             </a:extLst>
@@ -5094,7 +6662,7 @@
 </p:sld>
 </file>
 
-<file path=ppt/slides/slide11.xml><?xml version="1.0" encoding="utf-8"?>
+<file path=ppt/slides/slide17.xml><?xml version="1.0" encoding="utf-8"?>
 <p:sld xmlns:a="http://schemas.openxmlformats.org/drawingml/2006/main" xmlns:r="http://schemas.openxmlformats.org/officeDocument/2006/relationships" xmlns:p="http://schemas.openxmlformats.org/presentationml/2006/main">
   <p:cSld>
     <p:spTree>
@@ -5361,7 +6929,7 @@
 </p:sld>
 </file>
 
-<file path=ppt/slides/slide12.xml><?xml version="1.0" encoding="utf-8"?>
+<file path=ppt/slides/slide18.xml><?xml version="1.0" encoding="utf-8"?>
 <p:sld xmlns:a="http://schemas.openxmlformats.org/drawingml/2006/main" xmlns:r="http://schemas.openxmlformats.org/officeDocument/2006/relationships" xmlns:p="http://schemas.openxmlformats.org/presentationml/2006/main">
   <p:cSld>
     <p:spTree>
@@ -5665,7 +7233,7 @@
 </p:sld>
 </file>
 
-<file path=ppt/slides/slide13.xml><?xml version="1.0" encoding="utf-8"?>
+<file path=ppt/slides/slide19.xml><?xml version="1.0" encoding="utf-8"?>
 <p:sld xmlns:a="http://schemas.openxmlformats.org/drawingml/2006/main" xmlns:r="http://schemas.openxmlformats.org/officeDocument/2006/relationships" xmlns:p="http://schemas.openxmlformats.org/presentationml/2006/main">
   <p:cSld>
     <p:spTree>
@@ -5983,7 +7551,214 @@
 </p:sld>
 </file>
 
-<file path=ppt/slides/slide14.xml><?xml version="1.0" encoding="utf-8"?>
+<file path=ppt/slides/slide2.xml><?xml version="1.0" encoding="utf-8"?>
+<p:sld xmlns:a="http://schemas.openxmlformats.org/drawingml/2006/main" xmlns:r="http://schemas.openxmlformats.org/officeDocument/2006/relationships" xmlns:p="http://schemas.openxmlformats.org/presentationml/2006/main">
+  <p:cSld>
+    <p:spTree>
+      <p:nvGrpSpPr>
+        <p:cNvPr id="1" name=""/>
+        <p:cNvGrpSpPr/>
+        <p:nvPr/>
+      </p:nvGrpSpPr>
+      <p:grpSpPr>
+        <a:xfrm>
+          <a:off x="0" y="0"/>
+          <a:ext cx="0" cy="0"/>
+          <a:chOff x="0" y="0"/>
+          <a:chExt cx="0" cy="0"/>
+        </a:xfrm>
+      </p:grpSpPr>
+      <p:sp>
+        <p:nvSpPr>
+          <p:cNvPr id="2" name="Titel 1">
+            <a:extLst>
+              <a:ext uri="{FF2B5EF4-FFF2-40B4-BE49-F238E27FC236}">
+                <a16:creationId xmlns:a16="http://schemas.microsoft.com/office/drawing/2014/main" id="{F05BC4F7-6C5C-4D84-AD09-21A1BD725ADE}"/>
+              </a:ext>
+            </a:extLst>
+          </p:cNvPr>
+          <p:cNvSpPr>
+            <a:spLocks noGrp="1"/>
+          </p:cNvSpPr>
+          <p:nvPr>
+            <p:ph type="title"/>
+          </p:nvPr>
+        </p:nvSpPr>
+        <p:spPr/>
+        <p:txBody>
+          <a:bodyPr/>
+          <a:lstStyle/>
+          <a:p>
+            <a:r>
+              <a:rPr lang="en-GB" dirty="0" err="1">
+                <a:latin typeface="Segoe UI" panose="020B0502040204020203" pitchFamily="34" charset="0"/>
+                <a:cs typeface="Segoe UI" panose="020B0502040204020203" pitchFamily="34" charset="0"/>
+              </a:rPr>
+              <a:t>Voor</a:t>
+            </a:r>
+            <a:r>
+              <a:rPr lang="en-GB" dirty="0">
+                <a:latin typeface="Segoe UI" panose="020B0502040204020203" pitchFamily="34" charset="0"/>
+                <a:cs typeface="Segoe UI" panose="020B0502040204020203" pitchFamily="34" charset="0"/>
+              </a:rPr>
+              <a:t> We </a:t>
+            </a:r>
+            <a:r>
+              <a:rPr lang="en-GB" dirty="0" err="1">
+                <a:latin typeface="Segoe UI" panose="020B0502040204020203" pitchFamily="34" charset="0"/>
+                <a:cs typeface="Segoe UI" panose="020B0502040204020203" pitchFamily="34" charset="0"/>
+              </a:rPr>
+              <a:t>Beginnen</a:t>
+            </a:r>
+            <a:endParaRPr lang="en-GB" dirty="0">
+              <a:latin typeface="Segoe UI" panose="020B0502040204020203" pitchFamily="34" charset="0"/>
+              <a:cs typeface="Segoe UI" panose="020B0502040204020203" pitchFamily="34" charset="0"/>
+            </a:endParaRPr>
+          </a:p>
+        </p:txBody>
+      </p:sp>
+      <p:sp>
+        <p:nvSpPr>
+          <p:cNvPr id="3" name="Tijdelijke aanduiding voor inhoud 2">
+            <a:extLst>
+              <a:ext uri="{FF2B5EF4-FFF2-40B4-BE49-F238E27FC236}">
+                <a16:creationId xmlns:a16="http://schemas.microsoft.com/office/drawing/2014/main" id="{5DFEDF63-63CB-4163-BD78-EBCED782625E}"/>
+              </a:ext>
+            </a:extLst>
+          </p:cNvPr>
+          <p:cNvSpPr>
+            <a:spLocks noGrp="1"/>
+          </p:cNvSpPr>
+          <p:nvPr>
+            <p:ph idx="1"/>
+          </p:nvPr>
+        </p:nvSpPr>
+        <p:spPr/>
+        <p:txBody>
+          <a:bodyPr/>
+          <a:lstStyle/>
+          <a:p>
+            <a:pPr>
+              <a:buFont typeface="Arial" panose="020B0604020202020204" pitchFamily="34" charset="0"/>
+              <a:buChar char="•"/>
+            </a:pPr>
+            <a:r>
+              <a:rPr lang="en-GB" dirty="0">
+                <a:latin typeface="Segoe UI" panose="020B0502040204020203" pitchFamily="34" charset="0"/>
+                <a:cs typeface="Segoe UI" panose="020B0502040204020203" pitchFamily="34" charset="0"/>
+              </a:rPr>
+              <a:t> </a:t>
+            </a:r>
+            <a:r>
+              <a:rPr lang="en-GB" dirty="0" err="1">
+                <a:latin typeface="Segoe UI" panose="020B0502040204020203" pitchFamily="34" charset="0"/>
+                <a:cs typeface="Segoe UI" panose="020B0502040204020203" pitchFamily="34" charset="0"/>
+              </a:rPr>
+              <a:t>Vrijblijvend</a:t>
+            </a:r>
+            <a:endParaRPr lang="en-GB" dirty="0">
+              <a:latin typeface="Segoe UI" panose="020B0502040204020203" pitchFamily="34" charset="0"/>
+              <a:cs typeface="Segoe UI" panose="020B0502040204020203" pitchFamily="34" charset="0"/>
+            </a:endParaRPr>
+          </a:p>
+          <a:p>
+            <a:pPr>
+              <a:buFont typeface="Arial" panose="020B0604020202020204" pitchFamily="34" charset="0"/>
+              <a:buChar char="•"/>
+            </a:pPr>
+            <a:r>
+              <a:rPr lang="en-GB" dirty="0">
+                <a:latin typeface="Segoe UI" panose="020B0502040204020203" pitchFamily="34" charset="0"/>
+                <a:cs typeface="Segoe UI" panose="020B0502040204020203" pitchFamily="34" charset="0"/>
+              </a:rPr>
+              <a:t> </a:t>
+            </a:r>
+            <a:r>
+              <a:rPr lang="en-GB" dirty="0" err="1">
+                <a:latin typeface="Segoe UI" panose="020B0502040204020203" pitchFamily="34" charset="0"/>
+                <a:cs typeface="Segoe UI" panose="020B0502040204020203" pitchFamily="34" charset="0"/>
+              </a:rPr>
+              <a:t>Aanpassingen</a:t>
+            </a:r>
+            <a:r>
+              <a:rPr lang="en-GB" dirty="0">
+                <a:latin typeface="Segoe UI" panose="020B0502040204020203" pitchFamily="34" charset="0"/>
+                <a:cs typeface="Segoe UI" panose="020B0502040204020203" pitchFamily="34" charset="0"/>
+              </a:rPr>
+              <a:t> </a:t>
+            </a:r>
+            <a:r>
+              <a:rPr lang="en-GB" dirty="0" err="1">
+                <a:latin typeface="Segoe UI" panose="020B0502040204020203" pitchFamily="34" charset="0"/>
+                <a:cs typeface="Segoe UI" panose="020B0502040204020203" pitchFamily="34" charset="0"/>
+              </a:rPr>
+              <a:t>mogelijk</a:t>
+            </a:r>
+            <a:endParaRPr lang="en-GB" dirty="0">
+              <a:latin typeface="Segoe UI" panose="020B0502040204020203" pitchFamily="34" charset="0"/>
+              <a:cs typeface="Segoe UI" panose="020B0502040204020203" pitchFamily="34" charset="0"/>
+            </a:endParaRPr>
+          </a:p>
+          <a:p>
+            <a:pPr>
+              <a:buFont typeface="Arial" panose="020B0604020202020204" pitchFamily="34" charset="0"/>
+              <a:buChar char="•"/>
+            </a:pPr>
+            <a:r>
+              <a:rPr lang="en-GB" dirty="0">
+                <a:latin typeface="Segoe UI" panose="020B0502040204020203" pitchFamily="34" charset="0"/>
+                <a:cs typeface="Segoe UI" panose="020B0502040204020203" pitchFamily="34" charset="0"/>
+              </a:rPr>
+              <a:t> </a:t>
+            </a:r>
+            <a:r>
+              <a:rPr lang="en-GB" dirty="0" err="1">
+                <a:latin typeface="Segoe UI" panose="020B0502040204020203" pitchFamily="34" charset="0"/>
+                <a:cs typeface="Segoe UI" panose="020B0502040204020203" pitchFamily="34" charset="0"/>
+              </a:rPr>
+              <a:t>Vragen</a:t>
+            </a:r>
+            <a:r>
+              <a:rPr lang="en-GB" dirty="0">
+                <a:latin typeface="Segoe UI" panose="020B0502040204020203" pitchFamily="34" charset="0"/>
+                <a:cs typeface="Segoe UI" panose="020B0502040204020203" pitchFamily="34" charset="0"/>
+              </a:rPr>
+              <a:t>? </a:t>
+            </a:r>
+            <a:r>
+              <a:rPr lang="en-GB" dirty="0" err="1">
+                <a:latin typeface="Segoe UI" panose="020B0502040204020203" pitchFamily="34" charset="0"/>
+                <a:cs typeface="Segoe UI" panose="020B0502040204020203" pitchFamily="34" charset="0"/>
+              </a:rPr>
+              <a:t>Stel</a:t>
+            </a:r>
+            <a:r>
+              <a:rPr lang="en-GB" dirty="0">
+                <a:latin typeface="Segoe UI" panose="020B0502040204020203" pitchFamily="34" charset="0"/>
+                <a:cs typeface="Segoe UI" panose="020B0502040204020203" pitchFamily="34" charset="0"/>
+              </a:rPr>
+              <a:t> ze</a:t>
+            </a:r>
+          </a:p>
+        </p:txBody>
+      </p:sp>
+    </p:spTree>
+    <p:extLst>
+      <p:ext uri="{BB962C8B-B14F-4D97-AF65-F5344CB8AC3E}">
+        <p14:creationId xmlns:p14="http://schemas.microsoft.com/office/powerpoint/2010/main" val="3476582551"/>
+      </p:ext>
+    </p:extLst>
+  </p:cSld>
+  <p:clrMapOvr>
+    <a:masterClrMapping/>
+  </p:clrMapOvr>
+  <p:transition>
+    <p:fade/>
+  </p:transition>
+</p:sld>
+</file>
+
+<file path=ppt/slides/slide20.xml><?xml version="1.0" encoding="utf-8"?>
 <p:sld xmlns:a="http://schemas.openxmlformats.org/drawingml/2006/main" xmlns:r="http://schemas.openxmlformats.org/officeDocument/2006/relationships" xmlns:p="http://schemas.openxmlformats.org/presentationml/2006/main">
   <p:cSld>
     <p:spTree>
@@ -6230,7 +8005,7 @@
 </p:sld>
 </file>
 
-<file path=ppt/slides/slide15.xml><?xml version="1.0" encoding="utf-8"?>
+<file path=ppt/slides/slide21.xml><?xml version="1.0" encoding="utf-8"?>
 <p:sld xmlns:a="http://schemas.openxmlformats.org/drawingml/2006/main" xmlns:r="http://schemas.openxmlformats.org/officeDocument/2006/relationships" xmlns:p="http://schemas.openxmlformats.org/presentationml/2006/main">
   <p:cSld>
     <p:spTree>
@@ -6648,7 +8423,7 @@
 </p:sld>
 </file>
 
-<file path=ppt/slides/slide16.xml><?xml version="1.0" encoding="utf-8"?>
+<file path=ppt/slides/slide22.xml><?xml version="1.0" encoding="utf-8"?>
 <p:sld xmlns:a="http://schemas.openxmlformats.org/drawingml/2006/main" xmlns:r="http://schemas.openxmlformats.org/officeDocument/2006/relationships" xmlns:p="http://schemas.openxmlformats.org/presentationml/2006/main">
   <p:cSld>
     <p:spTree>
@@ -6999,7 +8774,7 @@
 </p:sld>
 </file>
 
-<file path=ppt/slides/slide17.xml><?xml version="1.0" encoding="utf-8"?>
+<file path=ppt/slides/slide23.xml><?xml version="1.0" encoding="utf-8"?>
 <p:sld xmlns:a="http://schemas.openxmlformats.org/drawingml/2006/main" xmlns:r="http://schemas.openxmlformats.org/officeDocument/2006/relationships" xmlns:p="http://schemas.openxmlformats.org/presentationml/2006/main">
   <p:cSld>
     <p:spTree>
@@ -7334,7 +9109,7 @@
 </p:sld>
 </file>
 
-<file path=ppt/slides/slide18.xml><?xml version="1.0" encoding="utf-8"?>
+<file path=ppt/slides/slide24.xml><?xml version="1.0" encoding="utf-8"?>
 <p:sld xmlns:a="http://schemas.openxmlformats.org/drawingml/2006/main" xmlns:r="http://schemas.openxmlformats.org/officeDocument/2006/relationships" xmlns:p="http://schemas.openxmlformats.org/presentationml/2006/main">
   <p:cSld>
     <p:spTree>
@@ -7564,7 +9339,7 @@
 </p:sld>
 </file>
 
-<file path=ppt/slides/slide19.xml><?xml version="1.0" encoding="utf-8"?>
+<file path=ppt/slides/slide25.xml><?xml version="1.0" encoding="utf-8"?>
 <p:sld xmlns:a="http://schemas.openxmlformats.org/drawingml/2006/main" xmlns:r="http://schemas.openxmlformats.org/officeDocument/2006/relationships" xmlns:p="http://schemas.openxmlformats.org/presentationml/2006/main">
   <p:cSld>
     <p:spTree>
@@ -7802,130 +9577,7 @@
 </p:sld>
 </file>
 
-<file path=ppt/slides/slide2.xml><?xml version="1.0" encoding="utf-8"?>
-<p:sld xmlns:a="http://schemas.openxmlformats.org/drawingml/2006/main" xmlns:r="http://schemas.openxmlformats.org/officeDocument/2006/relationships" xmlns:p="http://schemas.openxmlformats.org/presentationml/2006/main">
-  <p:cSld>
-    <p:spTree>
-      <p:nvGrpSpPr>
-        <p:cNvPr id="1" name=""/>
-        <p:cNvGrpSpPr/>
-        <p:nvPr/>
-      </p:nvGrpSpPr>
-      <p:grpSpPr>
-        <a:xfrm>
-          <a:off x="0" y="0"/>
-          <a:ext cx="0" cy="0"/>
-          <a:chOff x="0" y="0"/>
-          <a:chExt cx="0" cy="0"/>
-        </a:xfrm>
-      </p:grpSpPr>
-      <p:sp>
-        <p:nvSpPr>
-          <p:cNvPr id="2" name="Titel 1">
-            <a:extLst>
-              <a:ext uri="{FF2B5EF4-FFF2-40B4-BE49-F238E27FC236}">
-                <a16:creationId xmlns:a16="http://schemas.microsoft.com/office/drawing/2014/main" id="{4865F1CF-3A67-4500-9C2F-A1DA5CA128AB}"/>
-              </a:ext>
-            </a:extLst>
-          </p:cNvPr>
-          <p:cNvSpPr>
-            <a:spLocks noGrp="1"/>
-          </p:cNvSpPr>
-          <p:nvPr>
-            <p:ph type="title"/>
-          </p:nvPr>
-        </p:nvSpPr>
-        <p:spPr/>
-        <p:txBody>
-          <a:bodyPr/>
-          <a:lstStyle/>
-          <a:p>
-            <a:r>
-              <a:rPr lang="en-GB" dirty="0" err="1">
-                <a:latin typeface="Segoe UI" panose="020B0502040204020203" pitchFamily="34" charset="0"/>
-                <a:cs typeface="Segoe UI" panose="020B0502040204020203" pitchFamily="34" charset="0"/>
-              </a:rPr>
-              <a:t>Overzicht</a:t>
-            </a:r>
-            <a:endParaRPr lang="en-GB" dirty="0">
-              <a:latin typeface="Segoe UI" panose="020B0502040204020203" pitchFamily="34" charset="0"/>
-              <a:cs typeface="Segoe UI" panose="020B0502040204020203" pitchFamily="34" charset="0"/>
-            </a:endParaRPr>
-          </a:p>
-        </p:txBody>
-      </p:sp>
-      <p:sp>
-        <p:nvSpPr>
-          <p:cNvPr id="3" name="Tijdelijke aanduiding voor inhoud 2">
-            <a:extLst>
-              <a:ext uri="{FF2B5EF4-FFF2-40B4-BE49-F238E27FC236}">
-                <a16:creationId xmlns:a16="http://schemas.microsoft.com/office/drawing/2014/main" id="{DD8AF65E-14E8-4629-AFD6-F11E99BF5AC9}"/>
-              </a:ext>
-            </a:extLst>
-          </p:cNvPr>
-          <p:cNvSpPr>
-            <a:spLocks noGrp="1"/>
-          </p:cNvSpPr>
-          <p:nvPr>
-            <p:ph idx="1"/>
-          </p:nvPr>
-        </p:nvSpPr>
-        <p:spPr/>
-        <p:txBody>
-          <a:bodyPr/>
-          <a:lstStyle/>
-          <a:p>
-            <a:endParaRPr lang="en-GB"/>
-          </a:p>
-        </p:txBody>
-      </p:sp>
-      <p:pic>
-        <p:nvPicPr>
-          <p:cNvPr id="4" name="Afbeelding 3">
-            <a:extLst>
-              <a:ext uri="{FF2B5EF4-FFF2-40B4-BE49-F238E27FC236}">
-                <a16:creationId xmlns:a16="http://schemas.microsoft.com/office/drawing/2014/main" id="{83AD4EA6-4CCE-44F9-A383-8A3D5530F953}"/>
-              </a:ext>
-            </a:extLst>
-          </p:cNvPr>
-          <p:cNvPicPr>
-            <a:picLocks noChangeAspect="1"/>
-          </p:cNvPicPr>
-          <p:nvPr/>
-        </p:nvPicPr>
-        <p:blipFill>
-          <a:blip r:embed="rId2"/>
-          <a:stretch>
-            <a:fillRect/>
-          </a:stretch>
-        </p:blipFill>
-        <p:spPr>
-          <a:xfrm>
-            <a:off x="2270298" y="1870556"/>
-            <a:ext cx="7712364" cy="3973715"/>
-          </a:xfrm>
-          <a:prstGeom prst="rect">
-            <a:avLst/>
-          </a:prstGeom>
-        </p:spPr>
-      </p:pic>
-    </p:spTree>
-    <p:extLst>
-      <p:ext uri="{BB962C8B-B14F-4D97-AF65-F5344CB8AC3E}">
-        <p14:creationId xmlns:p14="http://schemas.microsoft.com/office/powerpoint/2010/main" val="301097239"/>
-      </p:ext>
-    </p:extLst>
-  </p:cSld>
-  <p:clrMapOvr>
-    <a:masterClrMapping/>
-  </p:clrMapOvr>
-  <p:transition>
-    <p:fade/>
-  </p:transition>
-</p:sld>
-</file>
-
-<file path=ppt/slides/slide20.xml><?xml version="1.0" encoding="utf-8"?>
+<file path=ppt/slides/slide26.xml><?xml version="1.0" encoding="utf-8"?>
 <p:sld xmlns:a="http://schemas.openxmlformats.org/drawingml/2006/main" xmlns:r="http://schemas.openxmlformats.org/officeDocument/2006/relationships" xmlns:p="http://schemas.openxmlformats.org/presentationml/2006/main">
   <p:cSld>
     <p:spTree>
@@ -8265,7 +9917,7 @@
 </p:sld>
 </file>
 
-<file path=ppt/slides/slide21.xml><?xml version="1.0" encoding="utf-8"?>
+<file path=ppt/slides/slide27.xml><?xml version="1.0" encoding="utf-8"?>
 <p:sld xmlns:a="http://schemas.openxmlformats.org/drawingml/2006/main" xmlns:r="http://schemas.openxmlformats.org/officeDocument/2006/relationships" xmlns:p="http://schemas.openxmlformats.org/presentationml/2006/main">
   <p:cSld>
     <p:spTree>
@@ -8488,7 +10140,7 @@
 </p:sld>
 </file>
 
-<file path=ppt/slides/slide22.xml><?xml version="1.0" encoding="utf-8"?>
+<file path=ppt/slides/slide28.xml><?xml version="1.0" encoding="utf-8"?>
 <p:sld xmlns:a="http://schemas.openxmlformats.org/drawingml/2006/main" xmlns:r="http://schemas.openxmlformats.org/officeDocument/2006/relationships" xmlns:p="http://schemas.openxmlformats.org/presentationml/2006/main">
   <p:cSld>
     <p:spTree>
@@ -8735,7 +10387,7 @@
 </p:sld>
 </file>
 
-<file path=ppt/slides/slide23.xml><?xml version="1.0" encoding="utf-8"?>
+<file path=ppt/slides/slide29.xml><?xml version="1.0" encoding="utf-8"?>
 <p:sld xmlns:a="http://schemas.openxmlformats.org/drawingml/2006/main" xmlns:r="http://schemas.openxmlformats.org/officeDocument/2006/relationships" xmlns:p="http://schemas.openxmlformats.org/presentationml/2006/main">
   <p:cSld>
     <p:spTree>
@@ -8991,7 +10643,130 @@
 </p:sld>
 </file>
 
-<file path=ppt/slides/slide24.xml><?xml version="1.0" encoding="utf-8"?>
+<file path=ppt/slides/slide3.xml><?xml version="1.0" encoding="utf-8"?>
+<p:sld xmlns:a="http://schemas.openxmlformats.org/drawingml/2006/main" xmlns:r="http://schemas.openxmlformats.org/officeDocument/2006/relationships" xmlns:p="http://schemas.openxmlformats.org/presentationml/2006/main">
+  <p:cSld>
+    <p:spTree>
+      <p:nvGrpSpPr>
+        <p:cNvPr id="1" name=""/>
+        <p:cNvGrpSpPr/>
+        <p:nvPr/>
+      </p:nvGrpSpPr>
+      <p:grpSpPr>
+        <a:xfrm>
+          <a:off x="0" y="0"/>
+          <a:ext cx="0" cy="0"/>
+          <a:chOff x="0" y="0"/>
+          <a:chExt cx="0" cy="0"/>
+        </a:xfrm>
+      </p:grpSpPr>
+      <p:sp>
+        <p:nvSpPr>
+          <p:cNvPr id="2" name="Titel 1">
+            <a:extLst>
+              <a:ext uri="{FF2B5EF4-FFF2-40B4-BE49-F238E27FC236}">
+                <a16:creationId xmlns:a16="http://schemas.microsoft.com/office/drawing/2014/main" id="{4865F1CF-3A67-4500-9C2F-A1DA5CA128AB}"/>
+              </a:ext>
+            </a:extLst>
+          </p:cNvPr>
+          <p:cNvSpPr>
+            <a:spLocks noGrp="1"/>
+          </p:cNvSpPr>
+          <p:nvPr>
+            <p:ph type="title"/>
+          </p:nvPr>
+        </p:nvSpPr>
+        <p:spPr/>
+        <p:txBody>
+          <a:bodyPr/>
+          <a:lstStyle/>
+          <a:p>
+            <a:r>
+              <a:rPr lang="en-GB" dirty="0" err="1">
+                <a:latin typeface="Segoe UI" panose="020B0502040204020203" pitchFamily="34" charset="0"/>
+                <a:cs typeface="Segoe UI" panose="020B0502040204020203" pitchFamily="34" charset="0"/>
+              </a:rPr>
+              <a:t>Overzicht</a:t>
+            </a:r>
+            <a:endParaRPr lang="en-GB" dirty="0">
+              <a:latin typeface="Segoe UI" panose="020B0502040204020203" pitchFamily="34" charset="0"/>
+              <a:cs typeface="Segoe UI" panose="020B0502040204020203" pitchFamily="34" charset="0"/>
+            </a:endParaRPr>
+          </a:p>
+        </p:txBody>
+      </p:sp>
+      <p:sp>
+        <p:nvSpPr>
+          <p:cNvPr id="3" name="Tijdelijke aanduiding voor inhoud 2">
+            <a:extLst>
+              <a:ext uri="{FF2B5EF4-FFF2-40B4-BE49-F238E27FC236}">
+                <a16:creationId xmlns:a16="http://schemas.microsoft.com/office/drawing/2014/main" id="{DD8AF65E-14E8-4629-AFD6-F11E99BF5AC9}"/>
+              </a:ext>
+            </a:extLst>
+          </p:cNvPr>
+          <p:cNvSpPr>
+            <a:spLocks noGrp="1"/>
+          </p:cNvSpPr>
+          <p:nvPr>
+            <p:ph idx="1"/>
+          </p:nvPr>
+        </p:nvSpPr>
+        <p:spPr/>
+        <p:txBody>
+          <a:bodyPr/>
+          <a:lstStyle/>
+          <a:p>
+            <a:endParaRPr lang="en-GB"/>
+          </a:p>
+        </p:txBody>
+      </p:sp>
+      <p:pic>
+        <p:nvPicPr>
+          <p:cNvPr id="4" name="Afbeelding 3">
+            <a:extLst>
+              <a:ext uri="{FF2B5EF4-FFF2-40B4-BE49-F238E27FC236}">
+                <a16:creationId xmlns:a16="http://schemas.microsoft.com/office/drawing/2014/main" id="{83AD4EA6-4CCE-44F9-A383-8A3D5530F953}"/>
+              </a:ext>
+            </a:extLst>
+          </p:cNvPr>
+          <p:cNvPicPr>
+            <a:picLocks noChangeAspect="1"/>
+          </p:cNvPicPr>
+          <p:nvPr/>
+        </p:nvPicPr>
+        <p:blipFill>
+          <a:blip r:embed="rId2"/>
+          <a:stretch>
+            <a:fillRect/>
+          </a:stretch>
+        </p:blipFill>
+        <p:spPr>
+          <a:xfrm>
+            <a:off x="2270298" y="1870556"/>
+            <a:ext cx="7712364" cy="3973715"/>
+          </a:xfrm>
+          <a:prstGeom prst="rect">
+            <a:avLst/>
+          </a:prstGeom>
+        </p:spPr>
+      </p:pic>
+    </p:spTree>
+    <p:extLst>
+      <p:ext uri="{BB962C8B-B14F-4D97-AF65-F5344CB8AC3E}">
+        <p14:creationId xmlns:p14="http://schemas.microsoft.com/office/powerpoint/2010/main" val="301097239"/>
+      </p:ext>
+    </p:extLst>
+  </p:cSld>
+  <p:clrMapOvr>
+    <a:masterClrMapping/>
+  </p:clrMapOvr>
+  <p:transition>
+    <p:fade/>
+  </p:transition>
+</p:sld>
+</file>
+
+<file path=ppt/slides/slide30.xml><?xml version="1.0" encoding="utf-8"?>
 <p:sld xmlns:a="http://schemas.openxmlformats.org/drawingml/2006/main" xmlns:r="http://schemas.openxmlformats.org/officeDocument/2006/relationships" xmlns:p="http://schemas.openxmlformats.org/presentationml/2006/main">
   <p:cSld>
     <p:spTree>
@@ -9262,7 +11037,7 @@
 </p:sld>
 </file>
 
-<file path=ppt/slides/slide25.xml><?xml version="1.0" encoding="utf-8"?>
+<file path=ppt/slides/slide31.xml><?xml version="1.0" encoding="utf-8"?>
 <p:sld xmlns:a="http://schemas.openxmlformats.org/drawingml/2006/main" xmlns:r="http://schemas.openxmlformats.org/officeDocument/2006/relationships" xmlns:p="http://schemas.openxmlformats.org/presentationml/2006/main">
   <p:cSld>
     <p:spTree>
@@ -9500,7 +11275,7 @@
 </p:sld>
 </file>
 
-<file path=ppt/slides/slide26.xml><?xml version="1.0" encoding="utf-8"?>
+<file path=ppt/slides/slide32.xml><?xml version="1.0" encoding="utf-8"?>
 <p:sld xmlns:a="http://schemas.openxmlformats.org/drawingml/2006/main" xmlns:r="http://schemas.openxmlformats.org/officeDocument/2006/relationships" xmlns:p="http://schemas.openxmlformats.org/presentationml/2006/main">
   <p:cSld>
     <p:spTree>
@@ -9730,7 +11505,7 @@
 </p:sld>
 </file>
 
-<file path=ppt/slides/slide27.xml><?xml version="1.0" encoding="utf-8"?>
+<file path=ppt/slides/slide33.xml><?xml version="1.0" encoding="utf-8"?>
 <p:sld xmlns:a="http://schemas.openxmlformats.org/drawingml/2006/main" xmlns:r="http://schemas.openxmlformats.org/officeDocument/2006/relationships" xmlns:p="http://schemas.openxmlformats.org/presentationml/2006/main">
   <p:cSld>
     <p:spTree>
@@ -9930,7 +11705,7 @@
 </p:sld>
 </file>
 
-<file path=ppt/slides/slide28.xml><?xml version="1.0" encoding="utf-8"?>
+<file path=ppt/slides/slide34.xml><?xml version="1.0" encoding="utf-8"?>
 <p:sld xmlns:a="http://schemas.openxmlformats.org/drawingml/2006/main" xmlns:r="http://schemas.openxmlformats.org/officeDocument/2006/relationships" xmlns:p="http://schemas.openxmlformats.org/presentationml/2006/main">
   <p:cSld>
     <p:spTree>
@@ -10265,7 +12040,130 @@
 </p:sld>
 </file>
 
-<file path=ppt/slides/slide29.xml><?xml version="1.0" encoding="utf-8"?>
+<file path=ppt/slides/slide35.xml><?xml version="1.0" encoding="utf-8"?>
+<p:sld xmlns:a="http://schemas.openxmlformats.org/drawingml/2006/main" xmlns:r="http://schemas.openxmlformats.org/officeDocument/2006/relationships" xmlns:p="http://schemas.openxmlformats.org/presentationml/2006/main">
+  <p:cSld>
+    <p:spTree>
+      <p:nvGrpSpPr>
+        <p:cNvPr id="1" name=""/>
+        <p:cNvGrpSpPr/>
+        <p:nvPr/>
+      </p:nvGrpSpPr>
+      <p:grpSpPr>
+        <a:xfrm>
+          <a:off x="0" y="0"/>
+          <a:ext cx="0" cy="0"/>
+          <a:chOff x="0" y="0"/>
+          <a:chExt cx="0" cy="0"/>
+        </a:xfrm>
+      </p:grpSpPr>
+      <p:sp>
+        <p:nvSpPr>
+          <p:cNvPr id="2" name="Titel 1">
+            <a:extLst>
+              <a:ext uri="{FF2B5EF4-FFF2-40B4-BE49-F238E27FC236}">
+                <a16:creationId xmlns:a16="http://schemas.microsoft.com/office/drawing/2014/main" id="{B9150B5B-D4AB-4360-8885-408FB39752A3}"/>
+              </a:ext>
+            </a:extLst>
+          </p:cNvPr>
+          <p:cNvSpPr>
+            <a:spLocks noGrp="1"/>
+          </p:cNvSpPr>
+          <p:nvPr>
+            <p:ph type="title"/>
+          </p:nvPr>
+        </p:nvSpPr>
+        <p:spPr/>
+        <p:txBody>
+          <a:bodyPr/>
+          <a:lstStyle/>
+          <a:p>
+            <a:r>
+              <a:rPr lang="en-GB" dirty="0" err="1">
+                <a:latin typeface="Segoe UI" panose="020B0502040204020203" pitchFamily="34" charset="0"/>
+                <a:cs typeface="Segoe UI" panose="020B0502040204020203" pitchFamily="34" charset="0"/>
+              </a:rPr>
+              <a:t>Prijs</a:t>
+            </a:r>
+            <a:endParaRPr lang="en-GB" dirty="0">
+              <a:latin typeface="Segoe UI" panose="020B0502040204020203" pitchFamily="34" charset="0"/>
+              <a:cs typeface="Segoe UI" panose="020B0502040204020203" pitchFamily="34" charset="0"/>
+            </a:endParaRPr>
+          </a:p>
+        </p:txBody>
+      </p:sp>
+      <p:sp>
+        <p:nvSpPr>
+          <p:cNvPr id="3" name="Tijdelijke aanduiding voor inhoud 2">
+            <a:extLst>
+              <a:ext uri="{FF2B5EF4-FFF2-40B4-BE49-F238E27FC236}">
+                <a16:creationId xmlns:a16="http://schemas.microsoft.com/office/drawing/2014/main" id="{C1C42E82-4AC8-4912-9E78-20E5801CCCED}"/>
+              </a:ext>
+            </a:extLst>
+          </p:cNvPr>
+          <p:cNvSpPr>
+            <a:spLocks noGrp="1"/>
+          </p:cNvSpPr>
+          <p:nvPr>
+            <p:ph idx="1"/>
+          </p:nvPr>
+        </p:nvSpPr>
+        <p:spPr/>
+        <p:txBody>
+          <a:bodyPr/>
+          <a:lstStyle/>
+          <a:p>
+            <a:r>
+              <a:rPr lang="nl-NL" dirty="0">
+                <a:latin typeface="Segoe UI" panose="020B0502040204020203" pitchFamily="34" charset="0"/>
+                <a:cs typeface="Segoe UI" panose="020B0502040204020203" pitchFamily="34" charset="0"/>
+              </a:rPr>
+              <a:t>Totaal zonder BTW		 € 15,561.29 </a:t>
+            </a:r>
+          </a:p>
+          <a:p>
+            <a:r>
+              <a:rPr lang="nl-NL" dirty="0">
+                <a:latin typeface="Segoe UI" panose="020B0502040204020203" pitchFamily="34" charset="0"/>
+                <a:cs typeface="Segoe UI" panose="020B0502040204020203" pitchFamily="34" charset="0"/>
+              </a:rPr>
+              <a:t>BTW bedrag 21%		 € 3,267.87 </a:t>
+            </a:r>
+          </a:p>
+          <a:p>
+            <a:r>
+              <a:rPr lang="nl-NL" dirty="0">
+                <a:latin typeface="Segoe UI" panose="020B0502040204020203" pitchFamily="34" charset="0"/>
+                <a:cs typeface="Segoe UI" panose="020B0502040204020203" pitchFamily="34" charset="0"/>
+              </a:rPr>
+              <a:t>Eindtotaal			 € 18,829.16 </a:t>
+            </a:r>
+          </a:p>
+          <a:p>
+            <a:endParaRPr lang="en-GB" dirty="0">
+              <a:latin typeface="Segoe UI" panose="020B0502040204020203" pitchFamily="34" charset="0"/>
+              <a:cs typeface="Segoe UI" panose="020B0502040204020203" pitchFamily="34" charset="0"/>
+            </a:endParaRPr>
+          </a:p>
+        </p:txBody>
+      </p:sp>
+    </p:spTree>
+    <p:extLst>
+      <p:ext uri="{BB962C8B-B14F-4D97-AF65-F5344CB8AC3E}">
+        <p14:creationId xmlns:p14="http://schemas.microsoft.com/office/powerpoint/2010/main" val="685820991"/>
+      </p:ext>
+    </p:extLst>
+  </p:cSld>
+  <p:clrMapOvr>
+    <a:masterClrMapping/>
+  </p:clrMapOvr>
+  <p:transition>
+    <p:fade/>
+  </p:transition>
+</p:sld>
+</file>
+
+<file path=ppt/slides/slide36.xml><?xml version="1.0" encoding="utf-8"?>
 <p:sld xmlns:a="http://schemas.openxmlformats.org/drawingml/2006/main" xmlns:r="http://schemas.openxmlformats.org/officeDocument/2006/relationships" xmlns:p="http://schemas.openxmlformats.org/presentationml/2006/main">
   <p:cSld>
     <p:bg>
@@ -10845,255 +12743,6 @@
 </p:sld>
 </file>
 
-<file path=ppt/slides/slide3.xml><?xml version="1.0" encoding="utf-8"?>
-<p:sld xmlns:a="http://schemas.openxmlformats.org/drawingml/2006/main" xmlns:r="http://schemas.openxmlformats.org/officeDocument/2006/relationships" xmlns:p="http://schemas.openxmlformats.org/presentationml/2006/main">
-  <p:cSld>
-    <p:spTree>
-      <p:nvGrpSpPr>
-        <p:cNvPr id="1" name=""/>
-        <p:cNvGrpSpPr/>
-        <p:nvPr/>
-      </p:nvGrpSpPr>
-      <p:grpSpPr>
-        <a:xfrm>
-          <a:off x="0" y="0"/>
-          <a:ext cx="0" cy="0"/>
-          <a:chOff x="0" y="0"/>
-          <a:chExt cx="0" cy="0"/>
-        </a:xfrm>
-      </p:grpSpPr>
-      <p:sp>
-        <p:nvSpPr>
-          <p:cNvPr id="2" name="Titel 1">
-            <a:extLst>
-              <a:ext uri="{FF2B5EF4-FFF2-40B4-BE49-F238E27FC236}">
-                <a16:creationId xmlns:a16="http://schemas.microsoft.com/office/drawing/2014/main" id="{C0E21A47-A5AC-46CB-9F3E-6367E3ABE574}"/>
-              </a:ext>
-            </a:extLst>
-          </p:cNvPr>
-          <p:cNvSpPr>
-            <a:spLocks noGrp="1"/>
-          </p:cNvSpPr>
-          <p:nvPr>
-            <p:ph type="title"/>
-          </p:nvPr>
-        </p:nvSpPr>
-        <p:spPr/>
-        <p:txBody>
-          <a:bodyPr/>
-          <a:lstStyle/>
-          <a:p>
-            <a:r>
-              <a:rPr lang="en-GB" dirty="0" err="1">
-                <a:latin typeface="Segoe UI" panose="020B0502040204020203" pitchFamily="34" charset="0"/>
-                <a:cs typeface="Segoe UI" panose="020B0502040204020203" pitchFamily="34" charset="0"/>
-              </a:rPr>
-              <a:t>Netwerkapparatuur</a:t>
-            </a:r>
-            <a:r>
-              <a:rPr lang="en-GB" dirty="0">
-                <a:latin typeface="Segoe UI" panose="020B0502040204020203" pitchFamily="34" charset="0"/>
-                <a:cs typeface="Segoe UI" panose="020B0502040204020203" pitchFamily="34" charset="0"/>
-              </a:rPr>
-              <a:t>: </a:t>
-            </a:r>
-            <a:r>
-              <a:rPr lang="en-GB" dirty="0" err="1">
-                <a:latin typeface="Segoe UI" panose="020B0502040204020203" pitchFamily="34" charset="0"/>
-                <a:cs typeface="Segoe UI" panose="020B0502040204020203" pitchFamily="34" charset="0"/>
-              </a:rPr>
-              <a:t>Overzicht</a:t>
-            </a:r>
-            <a:endParaRPr lang="en-GB" dirty="0">
-              <a:latin typeface="Segoe UI" panose="020B0502040204020203" pitchFamily="34" charset="0"/>
-              <a:cs typeface="Segoe UI" panose="020B0502040204020203" pitchFamily="34" charset="0"/>
-            </a:endParaRPr>
-          </a:p>
-        </p:txBody>
-      </p:sp>
-      <p:sp>
-        <p:nvSpPr>
-          <p:cNvPr id="3" name="Tijdelijke aanduiding voor inhoud 2">
-            <a:extLst>
-              <a:ext uri="{FF2B5EF4-FFF2-40B4-BE49-F238E27FC236}">
-                <a16:creationId xmlns:a16="http://schemas.microsoft.com/office/drawing/2014/main" id="{384E7A50-A4AF-4968-A605-C572B33ED2E6}"/>
-              </a:ext>
-            </a:extLst>
-          </p:cNvPr>
-          <p:cNvSpPr>
-            <a:spLocks noGrp="1"/>
-          </p:cNvSpPr>
-          <p:nvPr>
-            <p:ph idx="1"/>
-          </p:nvPr>
-        </p:nvSpPr>
-        <p:spPr/>
-        <p:txBody>
-          <a:bodyPr/>
-          <a:lstStyle/>
-          <a:p>
-            <a:pPr>
-              <a:buFont typeface="Arial" panose="020B0604020202020204" pitchFamily="34" charset="0"/>
-              <a:buChar char="•"/>
-            </a:pPr>
-            <a:r>
-              <a:rPr lang="en-GB" dirty="0">
-                <a:latin typeface="Segoe UI" panose="020B0502040204020203" pitchFamily="34" charset="0"/>
-                <a:cs typeface="Segoe UI" panose="020B0502040204020203" pitchFamily="34" charset="0"/>
-              </a:rPr>
-              <a:t> Router: TP-Link </a:t>
-            </a:r>
-            <a:r>
-              <a:rPr lang="en-GB" dirty="0" err="1">
-                <a:latin typeface="Segoe UI" panose="020B0502040204020203" pitchFamily="34" charset="0"/>
-                <a:cs typeface="Segoe UI" panose="020B0502040204020203" pitchFamily="34" charset="0"/>
-              </a:rPr>
-              <a:t>SafeStream</a:t>
-            </a:r>
-            <a:r>
-              <a:rPr lang="en-GB" dirty="0">
-                <a:latin typeface="Segoe UI" panose="020B0502040204020203" pitchFamily="34" charset="0"/>
-                <a:cs typeface="Segoe UI" panose="020B0502040204020203" pitchFamily="34" charset="0"/>
-              </a:rPr>
-              <a:t> TL-ER6020</a:t>
-            </a:r>
-          </a:p>
-          <a:p>
-            <a:pPr>
-              <a:buFont typeface="Arial" panose="020B0604020202020204" pitchFamily="34" charset="0"/>
-              <a:buChar char="•"/>
-            </a:pPr>
-            <a:r>
-              <a:rPr lang="en-GB" dirty="0">
-                <a:latin typeface="Segoe UI" panose="020B0502040204020203" pitchFamily="34" charset="0"/>
-                <a:cs typeface="Segoe UI" panose="020B0502040204020203" pitchFamily="34" charset="0"/>
-              </a:rPr>
-              <a:t> Switch: </a:t>
-            </a:r>
-            <a:r>
-              <a:rPr lang="en-GB" dirty="0" err="1">
-                <a:latin typeface="Segoe UI" panose="020B0502040204020203" pitchFamily="34" charset="0"/>
-                <a:cs typeface="Segoe UI" panose="020B0502040204020203" pitchFamily="34" charset="0"/>
-              </a:rPr>
-              <a:t>Netgear</a:t>
-            </a:r>
-            <a:r>
-              <a:rPr lang="en-GB" dirty="0">
-                <a:latin typeface="Segoe UI" panose="020B0502040204020203" pitchFamily="34" charset="0"/>
-                <a:cs typeface="Segoe UI" panose="020B0502040204020203" pitchFamily="34" charset="0"/>
-              </a:rPr>
-              <a:t> JGS524PE</a:t>
-            </a:r>
-          </a:p>
-          <a:p>
-            <a:pPr>
-              <a:buFont typeface="Arial" panose="020B0604020202020204" pitchFamily="34" charset="0"/>
-              <a:buChar char="•"/>
-            </a:pPr>
-            <a:r>
-              <a:rPr lang="en-GB" dirty="0">
-                <a:latin typeface="Segoe UI" panose="020B0502040204020203" pitchFamily="34" charset="0"/>
-                <a:cs typeface="Segoe UI" panose="020B0502040204020203" pitchFamily="34" charset="0"/>
-              </a:rPr>
-              <a:t> Modem: TP-Link DOCSIS 3.0</a:t>
-            </a:r>
-          </a:p>
-          <a:p>
-            <a:pPr>
-              <a:buFont typeface="Arial" panose="020B0604020202020204" pitchFamily="34" charset="0"/>
-              <a:buChar char="•"/>
-            </a:pPr>
-            <a:r>
-              <a:rPr lang="en-GB" dirty="0">
-                <a:latin typeface="Segoe UI" panose="020B0502040204020203" pitchFamily="34" charset="0"/>
-                <a:cs typeface="Segoe UI" panose="020B0502040204020203" pitchFamily="34" charset="0"/>
-              </a:rPr>
-              <a:t> Access Point: TP-Link EAP110</a:t>
-            </a:r>
-          </a:p>
-          <a:p>
-            <a:pPr>
-              <a:buFont typeface="Arial" panose="020B0604020202020204" pitchFamily="34" charset="0"/>
-              <a:buChar char="•"/>
-            </a:pPr>
-            <a:r>
-              <a:rPr lang="en-GB" dirty="0">
-                <a:latin typeface="Segoe UI" panose="020B0502040204020203" pitchFamily="34" charset="0"/>
-                <a:cs typeface="Segoe UI" panose="020B0502040204020203" pitchFamily="34" charset="0"/>
-              </a:rPr>
-              <a:t> Server Rack: StarTech - 4U</a:t>
-            </a:r>
-          </a:p>
-          <a:p>
-            <a:pPr>
-              <a:buFont typeface="Arial" panose="020B0604020202020204" pitchFamily="34" charset="0"/>
-              <a:buChar char="•"/>
-            </a:pPr>
-            <a:r>
-              <a:rPr lang="en-GB" dirty="0">
-                <a:latin typeface="Segoe UI" panose="020B0502040204020203" pitchFamily="34" charset="0"/>
-                <a:cs typeface="Segoe UI" panose="020B0502040204020203" pitchFamily="34" charset="0"/>
-              </a:rPr>
-              <a:t> Bekabeling: Equip</a:t>
-            </a:r>
-          </a:p>
-          <a:p>
-            <a:pPr lvl="1">
-              <a:buFont typeface="Arial" panose="020B0604020202020204" pitchFamily="34" charset="0"/>
-              <a:buChar char="•"/>
-            </a:pPr>
-            <a:r>
-              <a:rPr lang="en-GB" dirty="0">
-                <a:latin typeface="Segoe UI" panose="020B0502040204020203" pitchFamily="34" charset="0"/>
-                <a:cs typeface="Segoe UI" panose="020B0502040204020203" pitchFamily="34" charset="0"/>
-              </a:rPr>
-              <a:t>2 x 0,25m </a:t>
-            </a:r>
-          </a:p>
-          <a:p>
-            <a:pPr lvl="1">
-              <a:buFont typeface="Arial" panose="020B0604020202020204" pitchFamily="34" charset="0"/>
-              <a:buChar char="•"/>
-            </a:pPr>
-            <a:r>
-              <a:rPr lang="en-GB" dirty="0">
-                <a:latin typeface="Segoe UI" panose="020B0502040204020203" pitchFamily="34" charset="0"/>
-                <a:cs typeface="Segoe UI" panose="020B0502040204020203" pitchFamily="34" charset="0"/>
-              </a:rPr>
-              <a:t>3 x 0,5m </a:t>
-            </a:r>
-          </a:p>
-          <a:p>
-            <a:pPr lvl="1">
-              <a:buFont typeface="Arial" panose="020B0604020202020204" pitchFamily="34" charset="0"/>
-              <a:buChar char="•"/>
-            </a:pPr>
-            <a:r>
-              <a:rPr lang="en-GB" dirty="0">
-                <a:latin typeface="Segoe UI" panose="020B0502040204020203" pitchFamily="34" charset="0"/>
-                <a:cs typeface="Segoe UI" panose="020B0502040204020203" pitchFamily="34" charset="0"/>
-              </a:rPr>
-              <a:t>5 x 10m</a:t>
-            </a:r>
-          </a:p>
-        </p:txBody>
-      </p:sp>
-    </p:spTree>
-    <p:extLst>
-      <p:ext uri="{BB962C8B-B14F-4D97-AF65-F5344CB8AC3E}">
-        <p14:creationId xmlns:p14="http://schemas.microsoft.com/office/powerpoint/2010/main" val="2992356179"/>
-      </p:ext>
-    </p:extLst>
-  </p:cSld>
-  <p:clrMapOvr>
-    <a:masterClrMapping/>
-  </p:clrMapOvr>
-  <p:transition>
-    <p:fade/>
-  </p:transition>
-</p:sld>
-</file>
-
 <file path=ppt/slides/slide4.xml><?xml version="1.0" encoding="utf-8"?>
 <p:sld xmlns:a="http://schemas.openxmlformats.org/drawingml/2006/main" xmlns:r="http://schemas.openxmlformats.org/officeDocument/2006/relationships" xmlns:p="http://schemas.openxmlformats.org/presentationml/2006/main">
   <p:cSld>
@@ -11116,7 +12765,7 @@
           <p:cNvPr id="2" name="Titel 1">
             <a:extLst>
               <a:ext uri="{FF2B5EF4-FFF2-40B4-BE49-F238E27FC236}">
-                <a16:creationId xmlns:a16="http://schemas.microsoft.com/office/drawing/2014/main" id="{FE14A2C6-A52D-4AF0-B446-482F06F3A4BD}"/>
+                <a16:creationId xmlns:a16="http://schemas.microsoft.com/office/drawing/2014/main" id="{C0E21A47-A5AC-46CB-9F3E-6367E3ABE574}"/>
               </a:ext>
             </a:extLst>
           </p:cNvPr>
@@ -11144,8 +12793,19 @@
                 <a:latin typeface="Segoe UI" panose="020B0502040204020203" pitchFamily="34" charset="0"/>
                 <a:cs typeface="Segoe UI" panose="020B0502040204020203" pitchFamily="34" charset="0"/>
               </a:rPr>
-              <a:t>: Router</a:t>
-            </a:r>
+              <a:t>: </a:t>
+            </a:r>
+            <a:r>
+              <a:rPr lang="en-GB" dirty="0" err="1">
+                <a:latin typeface="Segoe UI" panose="020B0502040204020203" pitchFamily="34" charset="0"/>
+                <a:cs typeface="Segoe UI" panose="020B0502040204020203" pitchFamily="34" charset="0"/>
+              </a:rPr>
+              <a:t>Overzicht</a:t>
+            </a:r>
+            <a:endParaRPr lang="en-GB" dirty="0">
+              <a:latin typeface="Segoe UI" panose="020B0502040204020203" pitchFamily="34" charset="0"/>
+              <a:cs typeface="Segoe UI" panose="020B0502040204020203" pitchFamily="34" charset="0"/>
+            </a:endParaRPr>
           </a:p>
         </p:txBody>
       </p:sp>
@@ -11154,7 +12814,7 @@
           <p:cNvPr id="3" name="Tijdelijke aanduiding voor inhoud 2">
             <a:extLst>
               <a:ext uri="{FF2B5EF4-FFF2-40B4-BE49-F238E27FC236}">
-                <a16:creationId xmlns:a16="http://schemas.microsoft.com/office/drawing/2014/main" id="{6B447035-AF1D-4F40-A5E0-52628D3BBE99}"/>
+                <a16:creationId xmlns:a16="http://schemas.microsoft.com/office/drawing/2014/main" id="{384E7A50-A4AF-4968-A605-C572B33ED2E6}"/>
               </a:ext>
             </a:extLst>
           </p:cNvPr>
@@ -11179,7 +12839,20 @@
                 <a:latin typeface="Segoe UI" panose="020B0502040204020203" pitchFamily="34" charset="0"/>
                 <a:cs typeface="Segoe UI" panose="020B0502040204020203" pitchFamily="34" charset="0"/>
               </a:rPr>
-              <a:t> TP-Link </a:t>
+              <a:t> Modem: TP-Link DOCSIS 3.0 </a:t>
+            </a:r>
+          </a:p>
+          <a:p>
+            <a:pPr>
+              <a:buFont typeface="Arial" panose="020B0604020202020204" pitchFamily="34" charset="0"/>
+              <a:buChar char="•"/>
+            </a:pPr>
+            <a:r>
+              <a:rPr lang="en-GB" dirty="0">
+                <a:latin typeface="Segoe UI" panose="020B0502040204020203" pitchFamily="34" charset="0"/>
+                <a:cs typeface="Segoe UI" panose="020B0502040204020203" pitchFamily="34" charset="0"/>
+              </a:rPr>
+              <a:t> Router: TP-Link </a:t>
             </a:r>
             <a:r>
               <a:rPr lang="en-GB" dirty="0" err="1">
@@ -11206,80 +12879,387 @@
                 <a:latin typeface="Segoe UI" panose="020B0502040204020203" pitchFamily="34" charset="0"/>
                 <a:cs typeface="Segoe UI" panose="020B0502040204020203" pitchFamily="34" charset="0"/>
               </a:rPr>
-              <a:t> </a:t>
-            </a:r>
-            <a:r>
-              <a:rPr lang="en-GB" dirty="0" err="1">
-                <a:latin typeface="Segoe UI" panose="020B0502040204020203" pitchFamily="34" charset="0"/>
-                <a:cs typeface="Segoe UI" panose="020B0502040204020203" pitchFamily="34" charset="0"/>
-              </a:rPr>
-              <a:t>Kwalitatieve</a:t>
-            </a:r>
-            <a:r>
-              <a:rPr lang="en-GB" dirty="0">
-                <a:latin typeface="Segoe UI" panose="020B0502040204020203" pitchFamily="34" charset="0"/>
-                <a:cs typeface="Segoe UI" panose="020B0502040204020203" pitchFamily="34" charset="0"/>
-              </a:rPr>
-              <a:t> router </a:t>
-            </a:r>
-            <a:r>
-              <a:rPr lang="en-GB" dirty="0" err="1">
-                <a:latin typeface="Segoe UI" panose="020B0502040204020203" pitchFamily="34" charset="0"/>
-                <a:cs typeface="Segoe UI" panose="020B0502040204020203" pitchFamily="34" charset="0"/>
-              </a:rPr>
-              <a:t>voor</a:t>
-            </a:r>
-            <a:r>
-              <a:rPr lang="en-GB" dirty="0">
-                <a:latin typeface="Segoe UI" panose="020B0502040204020203" pitchFamily="34" charset="0"/>
-                <a:cs typeface="Segoe UI" panose="020B0502040204020203" pitchFamily="34" charset="0"/>
-              </a:rPr>
-              <a:t> </a:t>
-            </a:r>
-            <a:r>
-              <a:rPr lang="en-GB" dirty="0" err="1">
-                <a:latin typeface="Segoe UI" panose="020B0502040204020203" pitchFamily="34" charset="0"/>
-                <a:cs typeface="Segoe UI" panose="020B0502040204020203" pitchFamily="34" charset="0"/>
-              </a:rPr>
-              <a:t>kleine</a:t>
-            </a:r>
-            <a:r>
-              <a:rPr lang="en-GB" dirty="0">
-                <a:latin typeface="Segoe UI" panose="020B0502040204020203" pitchFamily="34" charset="0"/>
-                <a:cs typeface="Segoe UI" panose="020B0502040204020203" pitchFamily="34" charset="0"/>
-              </a:rPr>
-              <a:t> </a:t>
-            </a:r>
-            <a:r>
-              <a:rPr lang="en-GB" dirty="0" err="1">
-                <a:latin typeface="Segoe UI" panose="020B0502040204020203" pitchFamily="34" charset="0"/>
-                <a:cs typeface="Segoe UI" panose="020B0502040204020203" pitchFamily="34" charset="0"/>
-              </a:rPr>
-              <a:t>bedrijven</a:t>
-            </a:r>
+              <a:t> Switch: </a:t>
+            </a:r>
+            <a:r>
+              <a:rPr lang="en-GB" dirty="0" err="1">
+                <a:latin typeface="Segoe UI" panose="020B0502040204020203" pitchFamily="34" charset="0"/>
+                <a:cs typeface="Segoe UI" panose="020B0502040204020203" pitchFamily="34" charset="0"/>
+              </a:rPr>
+              <a:t>Netgear</a:t>
+            </a:r>
+            <a:r>
+              <a:rPr lang="en-GB" dirty="0">
+                <a:latin typeface="Segoe UI" panose="020B0502040204020203" pitchFamily="34" charset="0"/>
+                <a:cs typeface="Segoe UI" panose="020B0502040204020203" pitchFamily="34" charset="0"/>
+              </a:rPr>
+              <a:t> JGS524PE</a:t>
+            </a:r>
+          </a:p>
+          <a:p>
+            <a:pPr>
+              <a:buFont typeface="Arial" panose="020B0604020202020204" pitchFamily="34" charset="0"/>
+              <a:buChar char="•"/>
+            </a:pPr>
+            <a:r>
+              <a:rPr lang="en-GB" dirty="0">
+                <a:latin typeface="Segoe UI" panose="020B0502040204020203" pitchFamily="34" charset="0"/>
+                <a:cs typeface="Segoe UI" panose="020B0502040204020203" pitchFamily="34" charset="0"/>
+              </a:rPr>
+              <a:t> Access Point: TP-Link EAP110</a:t>
+            </a:r>
+          </a:p>
+          <a:p>
+            <a:pPr>
+              <a:buFont typeface="Arial" panose="020B0604020202020204" pitchFamily="34" charset="0"/>
+              <a:buChar char="•"/>
+            </a:pPr>
+            <a:r>
+              <a:rPr lang="en-GB" dirty="0">
+                <a:latin typeface="Segoe UI" panose="020B0502040204020203" pitchFamily="34" charset="0"/>
+                <a:cs typeface="Segoe UI" panose="020B0502040204020203" pitchFamily="34" charset="0"/>
+              </a:rPr>
+              <a:t> Server Rack: StarTech - 4U</a:t>
+            </a:r>
+          </a:p>
+          <a:p>
+            <a:pPr>
+              <a:buFont typeface="Arial" panose="020B0604020202020204" pitchFamily="34" charset="0"/>
+              <a:buChar char="•"/>
+            </a:pPr>
+            <a:r>
+              <a:rPr lang="en-GB" dirty="0">
+                <a:latin typeface="Segoe UI" panose="020B0502040204020203" pitchFamily="34" charset="0"/>
+                <a:cs typeface="Segoe UI" panose="020B0502040204020203" pitchFamily="34" charset="0"/>
+              </a:rPr>
+              <a:t> Bekabeling: Equip</a:t>
+            </a:r>
+          </a:p>
+          <a:p>
+            <a:pPr lvl="1">
+              <a:buFont typeface="Arial" panose="020B0604020202020204" pitchFamily="34" charset="0"/>
+              <a:buChar char="•"/>
+            </a:pPr>
+            <a:r>
+              <a:rPr lang="en-GB" dirty="0">
+                <a:latin typeface="Segoe UI" panose="020B0502040204020203" pitchFamily="34" charset="0"/>
+                <a:cs typeface="Segoe UI" panose="020B0502040204020203" pitchFamily="34" charset="0"/>
+              </a:rPr>
+              <a:t>2 x 0,25m </a:t>
+            </a:r>
+          </a:p>
+          <a:p>
+            <a:pPr lvl="1">
+              <a:buFont typeface="Arial" panose="020B0604020202020204" pitchFamily="34" charset="0"/>
+              <a:buChar char="•"/>
+            </a:pPr>
+            <a:r>
+              <a:rPr lang="en-GB" dirty="0">
+                <a:latin typeface="Segoe UI" panose="020B0502040204020203" pitchFamily="34" charset="0"/>
+                <a:cs typeface="Segoe UI" panose="020B0502040204020203" pitchFamily="34" charset="0"/>
+              </a:rPr>
+              <a:t>3 x 0,5m </a:t>
+            </a:r>
+          </a:p>
+          <a:p>
+            <a:pPr lvl="1">
+              <a:buFont typeface="Arial" panose="020B0604020202020204" pitchFamily="34" charset="0"/>
+              <a:buChar char="•"/>
+            </a:pPr>
+            <a:r>
+              <a:rPr lang="en-GB" dirty="0">
+                <a:latin typeface="Segoe UI" panose="020B0502040204020203" pitchFamily="34" charset="0"/>
+                <a:cs typeface="Segoe UI" panose="020B0502040204020203" pitchFamily="34" charset="0"/>
+              </a:rPr>
+              <a:t>1 x 2m</a:t>
+            </a:r>
+          </a:p>
+          <a:p>
+            <a:pPr lvl="1">
+              <a:buFont typeface="Arial" panose="020B0604020202020204" pitchFamily="34" charset="0"/>
+              <a:buChar char="•"/>
+            </a:pPr>
+            <a:r>
+              <a:rPr lang="en-GB" dirty="0">
+                <a:latin typeface="Segoe UI" panose="020B0502040204020203" pitchFamily="34" charset="0"/>
+                <a:cs typeface="Segoe UI" panose="020B0502040204020203" pitchFamily="34" charset="0"/>
+              </a:rPr>
+              <a:t>5 x 10m</a:t>
+            </a:r>
+          </a:p>
+        </p:txBody>
+      </p:sp>
+    </p:spTree>
+    <p:extLst>
+      <p:ext uri="{BB962C8B-B14F-4D97-AF65-F5344CB8AC3E}">
+        <p14:creationId xmlns:p14="http://schemas.microsoft.com/office/powerpoint/2010/main" val="2992356179"/>
+      </p:ext>
+    </p:extLst>
+  </p:cSld>
+  <p:clrMapOvr>
+    <a:masterClrMapping/>
+  </p:clrMapOvr>
+  <p:transition>
+    <p:fade/>
+  </p:transition>
+</p:sld>
+</file>
+
+<file path=ppt/slides/slide5.xml><?xml version="1.0" encoding="utf-8"?>
+<p:sld xmlns:a="http://schemas.openxmlformats.org/drawingml/2006/main" xmlns:r="http://schemas.openxmlformats.org/officeDocument/2006/relationships" xmlns:p="http://schemas.openxmlformats.org/presentationml/2006/main">
+  <p:cSld>
+    <p:spTree>
+      <p:nvGrpSpPr>
+        <p:cNvPr id="1" name=""/>
+        <p:cNvGrpSpPr/>
+        <p:nvPr/>
+      </p:nvGrpSpPr>
+      <p:grpSpPr>
+        <a:xfrm>
+          <a:off x="0" y="0"/>
+          <a:ext cx="0" cy="0"/>
+          <a:chOff x="0" y="0"/>
+          <a:chExt cx="0" cy="0"/>
+        </a:xfrm>
+      </p:grpSpPr>
+      <p:sp>
+        <p:nvSpPr>
+          <p:cNvPr id="2" name="Titel 1">
+            <a:extLst>
+              <a:ext uri="{FF2B5EF4-FFF2-40B4-BE49-F238E27FC236}">
+                <a16:creationId xmlns:a16="http://schemas.microsoft.com/office/drawing/2014/main" id="{37BEF1FF-D48F-4A21-9FB6-0C68B098F2BD}"/>
+              </a:ext>
+            </a:extLst>
+          </p:cNvPr>
+          <p:cNvSpPr>
+            <a:spLocks noGrp="1"/>
+          </p:cNvSpPr>
+          <p:nvPr>
+            <p:ph type="title"/>
+          </p:nvPr>
+        </p:nvSpPr>
+        <p:spPr/>
+        <p:txBody>
+          <a:bodyPr/>
+          <a:lstStyle/>
+          <a:p>
+            <a:r>
+              <a:rPr lang="en-GB" dirty="0" err="1">
+                <a:latin typeface="Segoe UI" panose="020B0502040204020203" pitchFamily="34" charset="0"/>
+                <a:cs typeface="Segoe UI" panose="020B0502040204020203" pitchFamily="34" charset="0"/>
+              </a:rPr>
+              <a:t>Netwerkapparatuur</a:t>
+            </a:r>
+            <a:r>
+              <a:rPr lang="en-GB" dirty="0">
+                <a:latin typeface="Segoe UI" panose="020B0502040204020203" pitchFamily="34" charset="0"/>
+                <a:cs typeface="Segoe UI" panose="020B0502040204020203" pitchFamily="34" charset="0"/>
+              </a:rPr>
+              <a:t>: Modem</a:t>
+            </a:r>
+          </a:p>
+        </p:txBody>
+      </p:sp>
+      <p:sp>
+        <p:nvSpPr>
+          <p:cNvPr id="3" name="Tijdelijke aanduiding voor inhoud 2">
+            <a:extLst>
+              <a:ext uri="{FF2B5EF4-FFF2-40B4-BE49-F238E27FC236}">
+                <a16:creationId xmlns:a16="http://schemas.microsoft.com/office/drawing/2014/main" id="{A8DFC525-6745-4F30-B24D-CF127D7A92F3}"/>
+              </a:ext>
+            </a:extLst>
+          </p:cNvPr>
+          <p:cNvSpPr>
+            <a:spLocks noGrp="1"/>
+          </p:cNvSpPr>
+          <p:nvPr>
+            <p:ph idx="1"/>
+          </p:nvPr>
+        </p:nvSpPr>
+        <p:spPr/>
+        <p:txBody>
+          <a:bodyPr/>
+          <a:lstStyle/>
+          <a:p>
+            <a:pPr>
+              <a:buFont typeface="Arial" panose="020B0604020202020204" pitchFamily="34" charset="0"/>
+              <a:buChar char="•"/>
+            </a:pPr>
+            <a:r>
+              <a:rPr lang="en-GB" dirty="0" err="1">
+                <a:latin typeface="Segoe UI" panose="020B0502040204020203" pitchFamily="34" charset="0"/>
+                <a:cs typeface="Segoe UI" panose="020B0502040204020203" pitchFamily="34" charset="0"/>
+              </a:rPr>
+              <a:t>Netgear</a:t>
+            </a:r>
+            <a:r>
+              <a:rPr lang="en-GB" dirty="0">
+                <a:latin typeface="Segoe UI" panose="020B0502040204020203" pitchFamily="34" charset="0"/>
+                <a:cs typeface="Segoe UI" panose="020B0502040204020203" pitchFamily="34" charset="0"/>
+              </a:rPr>
+              <a:t> CM500-1AZNAS DOCSIS 3.0	</a:t>
+            </a:r>
+          </a:p>
+          <a:p>
+            <a:pPr>
+              <a:buFont typeface="Arial" panose="020B0604020202020204" pitchFamily="34" charset="0"/>
+              <a:buChar char="•"/>
+            </a:pPr>
+            <a:r>
+              <a:rPr lang="en-GB" dirty="0">
+                <a:latin typeface="Segoe UI" panose="020B0502040204020203" pitchFamily="34" charset="0"/>
+                <a:cs typeface="Segoe UI" panose="020B0502040204020203" pitchFamily="34" charset="0"/>
+              </a:rPr>
+              <a:t> 300 Mb/s Download</a:t>
+            </a:r>
+          </a:p>
+          <a:p>
+            <a:pPr>
+              <a:buFont typeface="Arial" panose="020B0604020202020204" pitchFamily="34" charset="0"/>
+              <a:buChar char="•"/>
+            </a:pPr>
+            <a:r>
+              <a:rPr lang="en-GB" dirty="0">
+                <a:latin typeface="Segoe UI" panose="020B0502040204020203" pitchFamily="34" charset="0"/>
+                <a:cs typeface="Segoe UI" panose="020B0502040204020203" pitchFamily="34" charset="0"/>
+              </a:rPr>
+              <a:t>Kabel</a:t>
+            </a:r>
+          </a:p>
+          <a:p>
+            <a:pPr>
+              <a:buFont typeface="Arial" panose="020B0604020202020204" pitchFamily="34" charset="0"/>
+              <a:buChar char="•"/>
+            </a:pPr>
+            <a:r>
+              <a:rPr lang="en-GB" dirty="0">
+                <a:latin typeface="Segoe UI" panose="020B0502040204020203" pitchFamily="34" charset="0"/>
+                <a:cs typeface="Segoe UI" panose="020B0502040204020203" pitchFamily="34" charset="0"/>
+              </a:rPr>
+              <a:t> 24/7 Support</a:t>
+            </a:r>
+          </a:p>
+          <a:p>
+            <a:pPr>
+              <a:buFont typeface="Arial" panose="020B0604020202020204" pitchFamily="34" charset="0"/>
+              <a:buChar char="•"/>
+            </a:pPr>
             <a:endParaRPr lang="en-GB" dirty="0">
               <a:latin typeface="Segoe UI" panose="020B0502040204020203" pitchFamily="34" charset="0"/>
               <a:cs typeface="Segoe UI" panose="020B0502040204020203" pitchFamily="34" charset="0"/>
             </a:endParaRPr>
           </a:p>
-          <a:p>
-            <a:pPr>
-              <a:buFont typeface="Arial" panose="020B0604020202020204" pitchFamily="34" charset="0"/>
-              <a:buChar char="•"/>
-            </a:pPr>
-            <a:r>
-              <a:rPr lang="en-GB" dirty="0">
-                <a:latin typeface="Segoe UI" panose="020B0502040204020203" pitchFamily="34" charset="0"/>
-                <a:cs typeface="Segoe UI" panose="020B0502040204020203" pitchFamily="34" charset="0"/>
-              </a:rPr>
-              <a:t> VPN</a:t>
-            </a:r>
-          </a:p>
-          <a:p>
-            <a:pPr>
-              <a:buFont typeface="Arial" panose="020B0604020202020204" pitchFamily="34" charset="0"/>
-              <a:buChar char="•"/>
-            </a:pPr>
+        </p:txBody>
+      </p:sp>
+      <p:pic>
+        <p:nvPicPr>
+          <p:cNvPr id="4098" name="Picture 2" descr="https://images-na.ssl-images-amazon.com/images/I/51WfgjZu-cL._SL1350_.jpg">
+            <a:extLst>
+              <a:ext uri="{FF2B5EF4-FFF2-40B4-BE49-F238E27FC236}">
+                <a16:creationId xmlns:a16="http://schemas.microsoft.com/office/drawing/2014/main" id="{D4A3292C-3C79-4690-8FA3-8B1E3FC62FB0}"/>
+              </a:ext>
+            </a:extLst>
+          </p:cNvPr>
+          <p:cNvPicPr>
+            <a:picLocks noChangeAspect="1" noChangeArrowheads="1"/>
+          </p:cNvPicPr>
+          <p:nvPr/>
+        </p:nvPicPr>
+        <p:blipFill>
+          <a:blip r:embed="rId2">
+            <a:extLst>
+              <a:ext uri="{28A0092B-C50C-407E-A947-70E740481C1C}">
+                <a14:useLocalDpi xmlns:a14="http://schemas.microsoft.com/office/drawing/2010/main" val="0"/>
+              </a:ext>
+            </a:extLst>
+          </a:blip>
+          <a:srcRect/>
+          <a:stretch>
+            <a:fillRect/>
+          </a:stretch>
+        </p:blipFill>
+        <p:spPr bwMode="auto">
+          <a:xfrm>
+            <a:off x="9135333" y="1991851"/>
+            <a:ext cx="2452507" cy="4133761"/>
+          </a:xfrm>
+          <a:prstGeom prst="rect">
+            <a:avLst/>
+          </a:prstGeom>
+          <a:noFill/>
+          <a:extLst>
+            <a:ext uri="{909E8E84-426E-40DD-AFC4-6F175D3DCCD1}">
+              <a14:hiddenFill xmlns:a14="http://schemas.microsoft.com/office/drawing/2010/main">
+                <a:solidFill>
+                  <a:srgbClr val="FFFFFF"/>
+                </a:solidFill>
+              </a14:hiddenFill>
+            </a:ext>
+          </a:extLst>
+        </p:spPr>
+      </p:pic>
+    </p:spTree>
+    <p:extLst>
+      <p:ext uri="{BB962C8B-B14F-4D97-AF65-F5344CB8AC3E}">
+        <p14:creationId xmlns:p14="http://schemas.microsoft.com/office/powerpoint/2010/main" val="404390170"/>
+      </p:ext>
+    </p:extLst>
+  </p:cSld>
+  <p:clrMapOvr>
+    <a:masterClrMapping/>
+  </p:clrMapOvr>
+  <p:transition>
+    <p:fade/>
+  </p:transition>
+</p:sld>
+</file>
+
+<file path=ppt/slides/slide6.xml><?xml version="1.0" encoding="utf-8"?>
+<p:sld xmlns:a="http://schemas.openxmlformats.org/drawingml/2006/main" xmlns:r="http://schemas.openxmlformats.org/officeDocument/2006/relationships" xmlns:p="http://schemas.openxmlformats.org/presentationml/2006/main">
+  <p:cSld>
+    <p:spTree>
+      <p:nvGrpSpPr>
+        <p:cNvPr id="1" name=""/>
+        <p:cNvGrpSpPr/>
+        <p:nvPr/>
+      </p:nvGrpSpPr>
+      <p:grpSpPr>
+        <a:xfrm>
+          <a:off x="0" y="0"/>
+          <a:ext cx="0" cy="0"/>
+          <a:chOff x="0" y="0"/>
+          <a:chExt cx="0" cy="0"/>
+        </a:xfrm>
+      </p:grpSpPr>
+      <p:sp>
+        <p:nvSpPr>
+          <p:cNvPr id="2" name="Titel 1">
+            <a:extLst>
+              <a:ext uri="{FF2B5EF4-FFF2-40B4-BE49-F238E27FC236}">
+                <a16:creationId xmlns:a16="http://schemas.microsoft.com/office/drawing/2014/main" id="{1E9B49D5-C7A1-4028-9837-C9E02CBA23E0}"/>
+              </a:ext>
+            </a:extLst>
+          </p:cNvPr>
+          <p:cNvSpPr>
+            <a:spLocks noGrp="1"/>
+          </p:cNvSpPr>
+          <p:nvPr>
+            <p:ph type="title"/>
+          </p:nvPr>
+        </p:nvSpPr>
+        <p:spPr/>
+        <p:txBody>
+          <a:bodyPr/>
+          <a:lstStyle/>
+          <a:p>
+            <a:pPr algn="ctr"/>
+            <a:r>
+              <a:rPr lang="en-GB" dirty="0" err="1">
+                <a:latin typeface="Segoe UI" panose="020B0502040204020203" pitchFamily="34" charset="0"/>
+                <a:cs typeface="Segoe UI" panose="020B0502040204020203" pitchFamily="34" charset="0"/>
+              </a:rPr>
+              <a:t>Aanbevolen</a:t>
+            </a:r>
             <a:r>
               <a:rPr lang="en-GB" dirty="0">
                 <a:latin typeface="Segoe UI" panose="020B0502040204020203" pitchFamily="34" charset="0"/>
@@ -11292,27 +13272,151 @@
                 <a:latin typeface="Segoe UI" panose="020B0502040204020203" pitchFamily="34" charset="0"/>
                 <a:cs typeface="Segoe UI" panose="020B0502040204020203" pitchFamily="34" charset="0"/>
               </a:rPr>
-              <a:t>Uitgebreide</a:t>
-            </a:r>
-            <a:r>
-              <a:rPr lang="en-GB" dirty="0">
-                <a:latin typeface="Segoe UI" panose="020B0502040204020203" pitchFamily="34" charset="0"/>
-                <a:cs typeface="Segoe UI" panose="020B0502040204020203" pitchFamily="34" charset="0"/>
-              </a:rPr>
-              <a:t> </a:t>
-            </a:r>
-            <a:r>
-              <a:rPr lang="en-GB" dirty="0" err="1">
-                <a:latin typeface="Segoe UI" panose="020B0502040204020203" pitchFamily="34" charset="0"/>
-                <a:cs typeface="Segoe UI" panose="020B0502040204020203" pitchFamily="34" charset="0"/>
-              </a:rPr>
-              <a:t>beveiliging</a:t>
+              <a:t>Configuratie</a:t>
             </a:r>
             <a:endParaRPr lang="en-GB" dirty="0">
               <a:latin typeface="Segoe UI" panose="020B0502040204020203" pitchFamily="34" charset="0"/>
               <a:cs typeface="Segoe UI" panose="020B0502040204020203" pitchFamily="34" charset="0"/>
             </a:endParaRPr>
           </a:p>
+        </p:txBody>
+      </p:sp>
+      <p:sp>
+        <p:nvSpPr>
+          <p:cNvPr id="3" name="Tijdelijke aanduiding voor inhoud 2">
+            <a:extLst>
+              <a:ext uri="{FF2B5EF4-FFF2-40B4-BE49-F238E27FC236}">
+                <a16:creationId xmlns:a16="http://schemas.microsoft.com/office/drawing/2014/main" id="{15F71DD5-9419-43FB-BA50-3AEA3500F646}"/>
+              </a:ext>
+            </a:extLst>
+          </p:cNvPr>
+          <p:cNvSpPr>
+            <a:spLocks noGrp="1"/>
+          </p:cNvSpPr>
+          <p:nvPr>
+            <p:ph idx="1"/>
+          </p:nvPr>
+        </p:nvSpPr>
+        <p:spPr/>
+        <p:txBody>
+          <a:bodyPr/>
+          <a:lstStyle/>
+          <a:p>
+            <a:endParaRPr lang="en-GB"/>
+          </a:p>
+        </p:txBody>
+      </p:sp>
+    </p:spTree>
+    <p:extLst>
+      <p:ext uri="{BB962C8B-B14F-4D97-AF65-F5344CB8AC3E}">
+        <p14:creationId xmlns:p14="http://schemas.microsoft.com/office/powerpoint/2010/main" val="2843152225"/>
+      </p:ext>
+    </p:extLst>
+  </p:cSld>
+  <p:clrMapOvr>
+    <a:masterClrMapping/>
+  </p:clrMapOvr>
+  <p:transition>
+    <p:fade/>
+  </p:transition>
+</p:sld>
+</file>
+
+<file path=ppt/slides/slide7.xml><?xml version="1.0" encoding="utf-8"?>
+<p:sld xmlns:a="http://schemas.openxmlformats.org/drawingml/2006/main" xmlns:r="http://schemas.openxmlformats.org/officeDocument/2006/relationships" xmlns:p="http://schemas.openxmlformats.org/presentationml/2006/main">
+  <p:cSld>
+    <p:spTree>
+      <p:nvGrpSpPr>
+        <p:cNvPr id="1" name=""/>
+        <p:cNvGrpSpPr/>
+        <p:nvPr/>
+      </p:nvGrpSpPr>
+      <p:grpSpPr>
+        <a:xfrm>
+          <a:off x="0" y="0"/>
+          <a:ext cx="0" cy="0"/>
+          <a:chOff x="0" y="0"/>
+          <a:chExt cx="0" cy="0"/>
+        </a:xfrm>
+      </p:grpSpPr>
+      <p:sp>
+        <p:nvSpPr>
+          <p:cNvPr id="2" name="Titel 1">
+            <a:extLst>
+              <a:ext uri="{FF2B5EF4-FFF2-40B4-BE49-F238E27FC236}">
+                <a16:creationId xmlns:a16="http://schemas.microsoft.com/office/drawing/2014/main" id="{FE14A2C6-A52D-4AF0-B446-482F06F3A4BD}"/>
+              </a:ext>
+            </a:extLst>
+          </p:cNvPr>
+          <p:cNvSpPr>
+            <a:spLocks noGrp="1"/>
+          </p:cNvSpPr>
+          <p:nvPr>
+            <p:ph type="title"/>
+          </p:nvPr>
+        </p:nvSpPr>
+        <p:spPr/>
+        <p:txBody>
+          <a:bodyPr/>
+          <a:lstStyle/>
+          <a:p>
+            <a:r>
+              <a:rPr lang="en-GB" dirty="0">
+                <a:latin typeface="Segoe UI" panose="020B0502040204020203" pitchFamily="34" charset="0"/>
+                <a:cs typeface="Segoe UI" panose="020B0502040204020203" pitchFamily="34" charset="0"/>
+              </a:rPr>
+              <a:t>Router</a:t>
+            </a:r>
+          </a:p>
+        </p:txBody>
+      </p:sp>
+      <p:sp>
+        <p:nvSpPr>
+          <p:cNvPr id="3" name="Tijdelijke aanduiding voor inhoud 2">
+            <a:extLst>
+              <a:ext uri="{FF2B5EF4-FFF2-40B4-BE49-F238E27FC236}">
+                <a16:creationId xmlns:a16="http://schemas.microsoft.com/office/drawing/2014/main" id="{6B447035-AF1D-4F40-A5E0-52628D3BBE99}"/>
+              </a:ext>
+            </a:extLst>
+          </p:cNvPr>
+          <p:cNvSpPr>
+            <a:spLocks noGrp="1"/>
+          </p:cNvSpPr>
+          <p:nvPr>
+            <p:ph idx="1"/>
+          </p:nvPr>
+        </p:nvSpPr>
+        <p:spPr/>
+        <p:txBody>
+          <a:bodyPr/>
+          <a:lstStyle/>
+          <a:p>
+            <a:pPr>
+              <a:buFont typeface="Arial" panose="020B0604020202020204" pitchFamily="34" charset="0"/>
+              <a:buChar char="•"/>
+            </a:pPr>
+            <a:r>
+              <a:rPr lang="en-GB" dirty="0">
+                <a:latin typeface="Segoe UI" panose="020B0502040204020203" pitchFamily="34" charset="0"/>
+                <a:cs typeface="Segoe UI" panose="020B0502040204020203" pitchFamily="34" charset="0"/>
+              </a:rPr>
+              <a:t> TP-Link </a:t>
+            </a:r>
+            <a:r>
+              <a:rPr lang="en-GB" dirty="0" err="1">
+                <a:latin typeface="Segoe UI" panose="020B0502040204020203" pitchFamily="34" charset="0"/>
+                <a:cs typeface="Segoe UI" panose="020B0502040204020203" pitchFamily="34" charset="0"/>
+              </a:rPr>
+              <a:t>SafeStream</a:t>
+            </a:r>
+            <a:r>
+              <a:rPr lang="en-GB" dirty="0">
+                <a:latin typeface="Segoe UI" panose="020B0502040204020203" pitchFamily="34" charset="0"/>
+                <a:cs typeface="Segoe UI" panose="020B0502040204020203" pitchFamily="34" charset="0"/>
+              </a:rPr>
+              <a:t> TL-ER6020</a:t>
+            </a:r>
+          </a:p>
           <a:p>
             <a:pPr>
               <a:buFont typeface="Arial" panose="020B0604020202020204" pitchFamily="34" charset="0"/>
@@ -11330,6 +13434,123 @@
                 <a:latin typeface="Segoe UI" panose="020B0502040204020203" pitchFamily="34" charset="0"/>
                 <a:cs typeface="Segoe UI" panose="020B0502040204020203" pitchFamily="34" charset="0"/>
               </a:rPr>
+              <a:t>Kwalitatieve</a:t>
+            </a:r>
+            <a:r>
+              <a:rPr lang="en-GB" dirty="0">
+                <a:latin typeface="Segoe UI" panose="020B0502040204020203" pitchFamily="34" charset="0"/>
+                <a:cs typeface="Segoe UI" panose="020B0502040204020203" pitchFamily="34" charset="0"/>
+              </a:rPr>
+              <a:t> router </a:t>
+            </a:r>
+            <a:r>
+              <a:rPr lang="en-GB" dirty="0" err="1">
+                <a:latin typeface="Segoe UI" panose="020B0502040204020203" pitchFamily="34" charset="0"/>
+                <a:cs typeface="Segoe UI" panose="020B0502040204020203" pitchFamily="34" charset="0"/>
+              </a:rPr>
+              <a:t>voor</a:t>
+            </a:r>
+            <a:r>
+              <a:rPr lang="en-GB" dirty="0">
+                <a:latin typeface="Segoe UI" panose="020B0502040204020203" pitchFamily="34" charset="0"/>
+                <a:cs typeface="Segoe UI" panose="020B0502040204020203" pitchFamily="34" charset="0"/>
+              </a:rPr>
+              <a:t> </a:t>
+            </a:r>
+            <a:r>
+              <a:rPr lang="en-GB" dirty="0" err="1">
+                <a:latin typeface="Segoe UI" panose="020B0502040204020203" pitchFamily="34" charset="0"/>
+                <a:cs typeface="Segoe UI" panose="020B0502040204020203" pitchFamily="34" charset="0"/>
+              </a:rPr>
+              <a:t>kleine</a:t>
+            </a:r>
+            <a:r>
+              <a:rPr lang="en-GB" dirty="0">
+                <a:latin typeface="Segoe UI" panose="020B0502040204020203" pitchFamily="34" charset="0"/>
+                <a:cs typeface="Segoe UI" panose="020B0502040204020203" pitchFamily="34" charset="0"/>
+              </a:rPr>
+              <a:t> </a:t>
+            </a:r>
+            <a:r>
+              <a:rPr lang="en-GB" dirty="0" err="1">
+                <a:latin typeface="Segoe UI" panose="020B0502040204020203" pitchFamily="34" charset="0"/>
+                <a:cs typeface="Segoe UI" panose="020B0502040204020203" pitchFamily="34" charset="0"/>
+              </a:rPr>
+              <a:t>bedrijven</a:t>
+            </a:r>
+            <a:endParaRPr lang="en-GB" dirty="0">
+              <a:latin typeface="Segoe UI" panose="020B0502040204020203" pitchFamily="34" charset="0"/>
+              <a:cs typeface="Segoe UI" panose="020B0502040204020203" pitchFamily="34" charset="0"/>
+            </a:endParaRPr>
+          </a:p>
+          <a:p>
+            <a:pPr>
+              <a:buFont typeface="Arial" panose="020B0604020202020204" pitchFamily="34" charset="0"/>
+              <a:buChar char="•"/>
+            </a:pPr>
+            <a:r>
+              <a:rPr lang="en-GB" dirty="0">
+                <a:latin typeface="Segoe UI" panose="020B0502040204020203" pitchFamily="34" charset="0"/>
+                <a:cs typeface="Segoe UI" panose="020B0502040204020203" pitchFamily="34" charset="0"/>
+              </a:rPr>
+              <a:t> VPN</a:t>
+            </a:r>
+          </a:p>
+          <a:p>
+            <a:pPr>
+              <a:buFont typeface="Arial" panose="020B0604020202020204" pitchFamily="34" charset="0"/>
+              <a:buChar char="•"/>
+            </a:pPr>
+            <a:r>
+              <a:rPr lang="en-GB" dirty="0">
+                <a:latin typeface="Segoe UI" panose="020B0502040204020203" pitchFamily="34" charset="0"/>
+                <a:cs typeface="Segoe UI" panose="020B0502040204020203" pitchFamily="34" charset="0"/>
+              </a:rPr>
+              <a:t> </a:t>
+            </a:r>
+            <a:r>
+              <a:rPr lang="en-GB" dirty="0" err="1">
+                <a:latin typeface="Segoe UI" panose="020B0502040204020203" pitchFamily="34" charset="0"/>
+                <a:cs typeface="Segoe UI" panose="020B0502040204020203" pitchFamily="34" charset="0"/>
+              </a:rPr>
+              <a:t>Uitgebreide</a:t>
+            </a:r>
+            <a:r>
+              <a:rPr lang="en-GB" dirty="0">
+                <a:latin typeface="Segoe UI" panose="020B0502040204020203" pitchFamily="34" charset="0"/>
+                <a:cs typeface="Segoe UI" panose="020B0502040204020203" pitchFamily="34" charset="0"/>
+              </a:rPr>
+              <a:t> </a:t>
+            </a:r>
+            <a:r>
+              <a:rPr lang="en-GB" dirty="0" err="1">
+                <a:latin typeface="Segoe UI" panose="020B0502040204020203" pitchFamily="34" charset="0"/>
+                <a:cs typeface="Segoe UI" panose="020B0502040204020203" pitchFamily="34" charset="0"/>
+              </a:rPr>
+              <a:t>beveiliging</a:t>
+            </a:r>
+            <a:endParaRPr lang="en-GB" dirty="0">
+              <a:latin typeface="Segoe UI" panose="020B0502040204020203" pitchFamily="34" charset="0"/>
+              <a:cs typeface="Segoe UI" panose="020B0502040204020203" pitchFamily="34" charset="0"/>
+            </a:endParaRPr>
+          </a:p>
+          <a:p>
+            <a:pPr>
+              <a:buFont typeface="Arial" panose="020B0604020202020204" pitchFamily="34" charset="0"/>
+              <a:buChar char="•"/>
+            </a:pPr>
+            <a:r>
+              <a:rPr lang="en-GB" dirty="0">
+                <a:latin typeface="Segoe UI" panose="020B0502040204020203" pitchFamily="34" charset="0"/>
+                <a:cs typeface="Segoe UI" panose="020B0502040204020203" pitchFamily="34" charset="0"/>
+              </a:rPr>
+              <a:t> </a:t>
+            </a:r>
+            <a:r>
+              <a:rPr lang="en-GB" dirty="0" err="1">
+                <a:latin typeface="Segoe UI" panose="020B0502040204020203" pitchFamily="34" charset="0"/>
+                <a:cs typeface="Segoe UI" panose="020B0502040204020203" pitchFamily="34" charset="0"/>
+              </a:rPr>
               <a:t>Bescherming</a:t>
             </a:r>
             <a:r>
@@ -11379,6 +13600,29 @@
                 <a:cs typeface="Segoe UI" panose="020B0502040204020203" pitchFamily="34" charset="0"/>
               </a:rPr>
               <a:t> 1U</a:t>
+            </a:r>
+          </a:p>
+          <a:p>
+            <a:pPr>
+              <a:buFont typeface="Arial" panose="020B0604020202020204" pitchFamily="34" charset="0"/>
+              <a:buChar char="•"/>
+            </a:pPr>
+            <a:endParaRPr lang="en-GB" dirty="0">
+              <a:latin typeface="Segoe UI" panose="020B0502040204020203" pitchFamily="34" charset="0"/>
+              <a:cs typeface="Segoe UI" panose="020B0502040204020203" pitchFamily="34" charset="0"/>
+            </a:endParaRPr>
+          </a:p>
+          <a:p>
+            <a:pPr>
+              <a:buFont typeface="Arial" panose="020B0604020202020204" pitchFamily="34" charset="0"/>
+              <a:buChar char="•"/>
+            </a:pPr>
+            <a:r>
+              <a:rPr lang="en-GB" dirty="0">
+                <a:latin typeface="Segoe UI" panose="020B0502040204020203" pitchFamily="34" charset="0"/>
+                <a:cs typeface="Segoe UI" panose="020B0502040204020203" pitchFamily="34" charset="0"/>
+              </a:rPr>
+              <a:t> € 118.20</a:t>
             </a:r>
           </a:p>
         </p:txBody>
@@ -11444,7 +13688,7 @@
 </p:sld>
 </file>
 
-<file path=ppt/slides/slide5.xml><?xml version="1.0" encoding="utf-8"?>
+<file path=ppt/slides/slide8.xml><?xml version="1.0" encoding="utf-8"?>
 <p:sld xmlns:a="http://schemas.openxmlformats.org/drawingml/2006/main" xmlns:r="http://schemas.openxmlformats.org/officeDocument/2006/relationships" xmlns:p="http://schemas.openxmlformats.org/presentationml/2006/main">
   <p:cSld>
     <p:spTree>
@@ -11483,18 +13727,11 @@
           <a:lstStyle/>
           <a:p>
             <a:r>
-              <a:rPr lang="en-GB" dirty="0" err="1">
-                <a:latin typeface="Segoe UI" panose="020B0502040204020203" pitchFamily="34" charset="0"/>
-                <a:cs typeface="Segoe UI" panose="020B0502040204020203" pitchFamily="34" charset="0"/>
-              </a:rPr>
-              <a:t>Netwerkapparatuur</a:t>
-            </a:r>
-            <a:r>
-              <a:rPr lang="en-GB" dirty="0">
-                <a:latin typeface="Segoe UI" panose="020B0502040204020203" pitchFamily="34" charset="0"/>
-                <a:cs typeface="Segoe UI" panose="020B0502040204020203" pitchFamily="34" charset="0"/>
-              </a:rPr>
-              <a:t>: Switch</a:t>
+              <a:rPr lang="en-GB" dirty="0">
+                <a:latin typeface="Segoe UI" panose="020B0502040204020203" pitchFamily="34" charset="0"/>
+                <a:cs typeface="Segoe UI" panose="020B0502040204020203" pitchFamily="34" charset="0"/>
+              </a:rPr>
+              <a:t>Switch</a:t>
             </a:r>
           </a:p>
         </p:txBody>
@@ -11604,8 +13841,98 @@
                 <a:latin typeface="Segoe UI" panose="020B0502040204020203" pitchFamily="34" charset="0"/>
                 <a:cs typeface="Segoe UI" panose="020B0502040204020203" pitchFamily="34" charset="0"/>
               </a:rPr>
+              <a:t> </a:t>
+            </a:r>
+            <a:r>
+              <a:rPr lang="en-GB" dirty="0" err="1">
+                <a:latin typeface="Segoe UI" panose="020B0502040204020203" pitchFamily="34" charset="0"/>
+                <a:cs typeface="Segoe UI" panose="020B0502040204020203" pitchFamily="34" charset="0"/>
+              </a:rPr>
+              <a:t>Volledig</a:t>
+            </a:r>
+            <a:r>
+              <a:rPr lang="en-GB" dirty="0">
+                <a:latin typeface="Segoe UI" panose="020B0502040204020203" pitchFamily="34" charset="0"/>
+                <a:cs typeface="Segoe UI" panose="020B0502040204020203" pitchFamily="34" charset="0"/>
+              </a:rPr>
+              <a:t> </a:t>
+            </a:r>
+            <a:r>
+              <a:rPr lang="en-GB" dirty="0" err="1">
+                <a:latin typeface="Segoe UI" panose="020B0502040204020203" pitchFamily="34" charset="0"/>
+                <a:cs typeface="Segoe UI" panose="020B0502040204020203" pitchFamily="34" charset="0"/>
+              </a:rPr>
+              <a:t>configureerbaar</a:t>
+            </a:r>
+            <a:endParaRPr lang="en-GB" dirty="0">
+              <a:latin typeface="Segoe UI" panose="020B0502040204020203" pitchFamily="34" charset="0"/>
+              <a:cs typeface="Segoe UI" panose="020B0502040204020203" pitchFamily="34" charset="0"/>
+            </a:endParaRPr>
+          </a:p>
+          <a:p>
+            <a:pPr>
+              <a:buFont typeface="Arial" panose="020B0604020202020204" pitchFamily="34" charset="0"/>
+              <a:buChar char="•"/>
+            </a:pPr>
+            <a:r>
+              <a:rPr lang="en-GB" dirty="0">
+                <a:latin typeface="Segoe UI" panose="020B0502040204020203" pitchFamily="34" charset="0"/>
+                <a:cs typeface="Segoe UI" panose="020B0502040204020203" pitchFamily="34" charset="0"/>
+              </a:rPr>
               <a:t> 1U</a:t>
             </a:r>
+          </a:p>
+          <a:p>
+            <a:pPr>
+              <a:buFont typeface="Arial" panose="020B0604020202020204" pitchFamily="34" charset="0"/>
+              <a:buChar char="•"/>
+            </a:pPr>
+            <a:endParaRPr lang="en-GB" dirty="0">
+              <a:latin typeface="Segoe UI" panose="020B0502040204020203" pitchFamily="34" charset="0"/>
+              <a:cs typeface="Segoe UI" panose="020B0502040204020203" pitchFamily="34" charset="0"/>
+            </a:endParaRPr>
+          </a:p>
+          <a:p>
+            <a:pPr marL="0" indent="0">
+              <a:buNone/>
+            </a:pPr>
+            <a:endParaRPr lang="en-GB" dirty="0">
+              <a:latin typeface="Segoe UI" panose="020B0502040204020203" pitchFamily="34" charset="0"/>
+              <a:cs typeface="Segoe UI" panose="020B0502040204020203" pitchFamily="34" charset="0"/>
+            </a:endParaRPr>
+          </a:p>
+          <a:p>
+            <a:pPr>
+              <a:buFont typeface="Arial" panose="020B0604020202020204" pitchFamily="34" charset="0"/>
+              <a:buChar char="•"/>
+            </a:pPr>
+            <a:r>
+              <a:rPr lang="en-GB" dirty="0">
+                <a:latin typeface="Segoe UI" panose="020B0502040204020203" pitchFamily="34" charset="0"/>
+                <a:cs typeface="Segoe UI" panose="020B0502040204020203" pitchFamily="34" charset="0"/>
+              </a:rPr>
+              <a:t> € 145.00</a:t>
+            </a:r>
+          </a:p>
+          <a:p>
+            <a:pPr>
+              <a:buFont typeface="Arial" panose="020B0604020202020204" pitchFamily="34" charset="0"/>
+              <a:buChar char="•"/>
+            </a:pPr>
+            <a:endParaRPr lang="en-GB" dirty="0">
+              <a:latin typeface="Segoe UI" panose="020B0502040204020203" pitchFamily="34" charset="0"/>
+              <a:cs typeface="Segoe UI" panose="020B0502040204020203" pitchFamily="34" charset="0"/>
+            </a:endParaRPr>
+          </a:p>
+          <a:p>
+            <a:pPr>
+              <a:buFont typeface="Arial" panose="020B0604020202020204" pitchFamily="34" charset="0"/>
+              <a:buChar char="•"/>
+            </a:pPr>
+            <a:endParaRPr lang="en-GB" dirty="0">
+              <a:latin typeface="Segoe UI" panose="020B0502040204020203" pitchFamily="34" charset="0"/>
+              <a:cs typeface="Segoe UI" panose="020B0502040204020203" pitchFamily="34" charset="0"/>
+            </a:endParaRPr>
           </a:p>
         </p:txBody>
       </p:sp>
@@ -11672,7 +13999,7 @@
 </p:sld>
 </file>
 
-<file path=ppt/slides/slide6.xml><?xml version="1.0" encoding="utf-8"?>
+<file path=ppt/slides/slide9.xml><?xml version="1.0" encoding="utf-8"?>
 <p:sld xmlns:a="http://schemas.openxmlformats.org/drawingml/2006/main" xmlns:r="http://schemas.openxmlformats.org/officeDocument/2006/relationships" xmlns:p="http://schemas.openxmlformats.org/presentationml/2006/main">
   <p:cSld>
     <p:spTree>
@@ -11694,7 +14021,7 @@
           <p:cNvPr id="2" name="Titel 1">
             <a:extLst>
               <a:ext uri="{FF2B5EF4-FFF2-40B4-BE49-F238E27FC236}">
-                <a16:creationId xmlns:a16="http://schemas.microsoft.com/office/drawing/2014/main" id="{37BEF1FF-D48F-4A21-9FB6-0C68B098F2BD}"/>
+                <a16:creationId xmlns:a16="http://schemas.microsoft.com/office/drawing/2014/main" id="{E0767DA0-A28B-48E4-808B-674A808B6874}"/>
               </a:ext>
             </a:extLst>
           </p:cNvPr>
@@ -11711,220 +14038,11 @@
           <a:lstStyle/>
           <a:p>
             <a:r>
-              <a:rPr lang="en-GB" dirty="0" err="1">
-                <a:latin typeface="Segoe UI" panose="020B0502040204020203" pitchFamily="34" charset="0"/>
-                <a:cs typeface="Segoe UI" panose="020B0502040204020203" pitchFamily="34" charset="0"/>
-              </a:rPr>
-              <a:t>Netwerkapparatuur</a:t>
-            </a:r>
-            <a:r>
-              <a:rPr lang="en-GB" dirty="0">
-                <a:latin typeface="Segoe UI" panose="020B0502040204020203" pitchFamily="34" charset="0"/>
-                <a:cs typeface="Segoe UI" panose="020B0502040204020203" pitchFamily="34" charset="0"/>
-              </a:rPr>
-              <a:t>: Modem</a:t>
-            </a:r>
-          </a:p>
-        </p:txBody>
-      </p:sp>
-      <p:sp>
-        <p:nvSpPr>
-          <p:cNvPr id="3" name="Tijdelijke aanduiding voor inhoud 2">
-            <a:extLst>
-              <a:ext uri="{FF2B5EF4-FFF2-40B4-BE49-F238E27FC236}">
-                <a16:creationId xmlns:a16="http://schemas.microsoft.com/office/drawing/2014/main" id="{A8DFC525-6745-4F30-B24D-CF127D7A92F3}"/>
-              </a:ext>
-            </a:extLst>
-          </p:cNvPr>
-          <p:cNvSpPr>
-            <a:spLocks noGrp="1"/>
-          </p:cNvSpPr>
-          <p:nvPr>
-            <p:ph idx="1"/>
-          </p:nvPr>
-        </p:nvSpPr>
-        <p:spPr/>
-        <p:txBody>
-          <a:bodyPr/>
-          <a:lstStyle/>
-          <a:p>
-            <a:pPr>
-              <a:buFont typeface="Arial" panose="020B0604020202020204" pitchFamily="34" charset="0"/>
-              <a:buChar char="•"/>
-            </a:pPr>
-            <a:r>
-              <a:rPr lang="en-GB" dirty="0">
-                <a:latin typeface="Segoe UI" panose="020B0502040204020203" pitchFamily="34" charset="0"/>
-                <a:cs typeface="Segoe UI" panose="020B0502040204020203" pitchFamily="34" charset="0"/>
-              </a:rPr>
-              <a:t> 680 Mb/s Download</a:t>
-            </a:r>
-          </a:p>
-          <a:p>
-            <a:pPr>
-              <a:buFont typeface="Arial" panose="020B0604020202020204" pitchFamily="34" charset="0"/>
-              <a:buChar char="•"/>
-            </a:pPr>
-            <a:r>
-              <a:rPr lang="en-GB" dirty="0">
-                <a:latin typeface="Segoe UI" panose="020B0502040204020203" pitchFamily="34" charset="0"/>
-                <a:cs typeface="Segoe UI" panose="020B0502040204020203" pitchFamily="34" charset="0"/>
-              </a:rPr>
-              <a:t> 143 Mb/s Upload</a:t>
-            </a:r>
-          </a:p>
-          <a:p>
-            <a:pPr>
-              <a:buFont typeface="Arial" panose="020B0604020202020204" pitchFamily="34" charset="0"/>
-              <a:buChar char="•"/>
-            </a:pPr>
-            <a:r>
-              <a:rPr lang="en-GB" dirty="0">
-                <a:latin typeface="Segoe UI" panose="020B0502040204020203" pitchFamily="34" charset="0"/>
-                <a:cs typeface="Segoe UI" panose="020B0502040204020203" pitchFamily="34" charset="0"/>
-              </a:rPr>
-              <a:t> Kabel</a:t>
-            </a:r>
-          </a:p>
-          <a:p>
-            <a:pPr>
-              <a:buFont typeface="Arial" panose="020B0604020202020204" pitchFamily="34" charset="0"/>
-              <a:buChar char="•"/>
-            </a:pPr>
-            <a:r>
-              <a:rPr lang="en-GB" dirty="0">
-                <a:latin typeface="Segoe UI" panose="020B0502040204020203" pitchFamily="34" charset="0"/>
-                <a:cs typeface="Segoe UI" panose="020B0502040204020203" pitchFamily="34" charset="0"/>
-              </a:rPr>
-              <a:t> 24/7 Support</a:t>
-            </a:r>
-          </a:p>
-          <a:p>
-            <a:pPr>
-              <a:buFont typeface="Arial" panose="020B0604020202020204" pitchFamily="34" charset="0"/>
-              <a:buChar char="•"/>
-            </a:pPr>
-            <a:endParaRPr lang="en-GB" dirty="0">
-              <a:latin typeface="Segoe UI" panose="020B0502040204020203" pitchFamily="34" charset="0"/>
-              <a:cs typeface="Segoe UI" panose="020B0502040204020203" pitchFamily="34" charset="0"/>
-            </a:endParaRPr>
-          </a:p>
-        </p:txBody>
-      </p:sp>
-      <p:pic>
-        <p:nvPicPr>
-          <p:cNvPr id="1026" name="Picture 2" descr="https://images-na.ssl-images-amazon.com/images/I/91QX3vhQPQL._SL1500_.jpg">
-            <a:extLst>
-              <a:ext uri="{FF2B5EF4-FFF2-40B4-BE49-F238E27FC236}">
-                <a16:creationId xmlns:a16="http://schemas.microsoft.com/office/drawing/2014/main" id="{ACC3D910-4B75-4732-A1AF-C603B1C4A2B4}"/>
-              </a:ext>
-            </a:extLst>
-          </p:cNvPr>
-          <p:cNvPicPr>
-            <a:picLocks noChangeAspect="1" noChangeArrowheads="1"/>
-          </p:cNvPicPr>
-          <p:nvPr/>
-        </p:nvPicPr>
-        <p:blipFill>
-          <a:blip r:embed="rId2">
-            <a:extLst>
-              <a:ext uri="{28A0092B-C50C-407E-A947-70E740481C1C}">
-                <a14:useLocalDpi xmlns:a14="http://schemas.microsoft.com/office/drawing/2010/main" val="0"/>
-              </a:ext>
-            </a:extLst>
-          </a:blip>
-          <a:srcRect/>
-          <a:stretch>
-            <a:fillRect/>
-          </a:stretch>
-        </p:blipFill>
-        <p:spPr bwMode="auto">
-          <a:xfrm>
-            <a:off x="9826920" y="3024887"/>
-            <a:ext cx="1688219" cy="3024930"/>
-          </a:xfrm>
-          <a:prstGeom prst="rect">
-            <a:avLst/>
-          </a:prstGeom>
-          <a:noFill/>
-          <a:extLst>
-            <a:ext uri="{909E8E84-426E-40DD-AFC4-6F175D3DCCD1}">
-              <a14:hiddenFill xmlns:a14="http://schemas.microsoft.com/office/drawing/2010/main">
-                <a:solidFill>
-                  <a:srgbClr val="FFFFFF"/>
-                </a:solidFill>
-              </a14:hiddenFill>
-            </a:ext>
-          </a:extLst>
-        </p:spPr>
-      </p:pic>
-    </p:spTree>
-    <p:extLst>
-      <p:ext uri="{BB962C8B-B14F-4D97-AF65-F5344CB8AC3E}">
-        <p14:creationId xmlns:p14="http://schemas.microsoft.com/office/powerpoint/2010/main" val="404390170"/>
-      </p:ext>
-    </p:extLst>
-  </p:cSld>
-  <p:clrMapOvr>
-    <a:masterClrMapping/>
-  </p:clrMapOvr>
-  <p:transition>
-    <p:fade/>
-  </p:transition>
-</p:sld>
-</file>
-
-<file path=ppt/slides/slide7.xml><?xml version="1.0" encoding="utf-8"?>
-<p:sld xmlns:a="http://schemas.openxmlformats.org/drawingml/2006/main" xmlns:r="http://schemas.openxmlformats.org/officeDocument/2006/relationships" xmlns:p="http://schemas.openxmlformats.org/presentationml/2006/main">
-  <p:cSld>
-    <p:spTree>
-      <p:nvGrpSpPr>
-        <p:cNvPr id="1" name=""/>
-        <p:cNvGrpSpPr/>
-        <p:nvPr/>
-      </p:nvGrpSpPr>
-      <p:grpSpPr>
-        <a:xfrm>
-          <a:off x="0" y="0"/>
-          <a:ext cx="0" cy="0"/>
-          <a:chOff x="0" y="0"/>
-          <a:chExt cx="0" cy="0"/>
-        </a:xfrm>
-      </p:grpSpPr>
-      <p:sp>
-        <p:nvSpPr>
-          <p:cNvPr id="2" name="Titel 1">
-            <a:extLst>
-              <a:ext uri="{FF2B5EF4-FFF2-40B4-BE49-F238E27FC236}">
-                <a16:creationId xmlns:a16="http://schemas.microsoft.com/office/drawing/2014/main" id="{E0767DA0-A28B-48E4-808B-674A808B6874}"/>
-              </a:ext>
-            </a:extLst>
-          </p:cNvPr>
-          <p:cNvSpPr>
-            <a:spLocks noGrp="1"/>
-          </p:cNvSpPr>
-          <p:nvPr>
-            <p:ph type="title"/>
-          </p:nvPr>
-        </p:nvSpPr>
-        <p:spPr/>
-        <p:txBody>
-          <a:bodyPr/>
-          <a:lstStyle/>
-          <a:p>
-            <a:r>
-              <a:rPr lang="en-GB" dirty="0" err="1">
-                <a:latin typeface="Segoe UI" panose="020B0502040204020203" pitchFamily="34" charset="0"/>
-                <a:cs typeface="Segoe UI" panose="020B0502040204020203" pitchFamily="34" charset="0"/>
-              </a:rPr>
-              <a:t>Netwerkapparatuur</a:t>
-            </a:r>
-            <a:r>
-              <a:rPr lang="en-GB" dirty="0">
-                <a:latin typeface="Segoe UI" panose="020B0502040204020203" pitchFamily="34" charset="0"/>
-                <a:cs typeface="Segoe UI" panose="020B0502040204020203" pitchFamily="34" charset="0"/>
-              </a:rPr>
-              <a:t>: Access Point</a:t>
+              <a:rPr lang="en-GB" dirty="0">
+                <a:latin typeface="Segoe UI" panose="020B0502040204020203" pitchFamily="34" charset="0"/>
+                <a:cs typeface="Segoe UI" panose="020B0502040204020203" pitchFamily="34" charset="0"/>
+              </a:rPr>
+              <a:t>Access Point</a:t>
             </a:r>
           </a:p>
         </p:txBody>
@@ -12123,6 +14241,29 @@
               <a:latin typeface="Segoe UI" panose="020B0502040204020203" pitchFamily="34" charset="0"/>
               <a:cs typeface="Segoe UI" panose="020B0502040204020203" pitchFamily="34" charset="0"/>
             </a:endParaRPr>
+          </a:p>
+          <a:p>
+            <a:pPr>
+              <a:buFont typeface="Arial" panose="020B0604020202020204" pitchFamily="34" charset="0"/>
+              <a:buChar char="•"/>
+            </a:pPr>
+            <a:endParaRPr lang="en-GB" dirty="0">
+              <a:latin typeface="Segoe UI" panose="020B0502040204020203" pitchFamily="34" charset="0"/>
+              <a:cs typeface="Segoe UI" panose="020B0502040204020203" pitchFamily="34" charset="0"/>
+            </a:endParaRPr>
+          </a:p>
+          <a:p>
+            <a:pPr>
+              <a:buFont typeface="Arial" panose="020B0604020202020204" pitchFamily="34" charset="0"/>
+              <a:buChar char="•"/>
+            </a:pPr>
+            <a:r>
+              <a:rPr lang="en-GB" dirty="0">
+                <a:latin typeface="Segoe UI" panose="020B0502040204020203" pitchFamily="34" charset="0"/>
+                <a:cs typeface="Segoe UI" panose="020B0502040204020203" pitchFamily="34" charset="0"/>
+              </a:rPr>
+              <a:t> € 42.00</a:t>
+            </a:r>
           </a:p>
         </p:txBody>
       </p:sp>
@@ -12177,617 +14318,6 @@
     <p:extLst>
       <p:ext uri="{BB962C8B-B14F-4D97-AF65-F5344CB8AC3E}">
         <p14:creationId xmlns:p14="http://schemas.microsoft.com/office/powerpoint/2010/main" val="3102298165"/>
-      </p:ext>
-    </p:extLst>
-  </p:cSld>
-  <p:clrMapOvr>
-    <a:masterClrMapping/>
-  </p:clrMapOvr>
-  <p:transition>
-    <p:fade/>
-  </p:transition>
-</p:sld>
-</file>
-
-<file path=ppt/slides/slide8.xml><?xml version="1.0" encoding="utf-8"?>
-<p:sld xmlns:a="http://schemas.openxmlformats.org/drawingml/2006/main" xmlns:r="http://schemas.openxmlformats.org/officeDocument/2006/relationships" xmlns:p="http://schemas.openxmlformats.org/presentationml/2006/main">
-  <p:cSld>
-    <p:spTree>
-      <p:nvGrpSpPr>
-        <p:cNvPr id="1" name=""/>
-        <p:cNvGrpSpPr/>
-        <p:nvPr/>
-      </p:nvGrpSpPr>
-      <p:grpSpPr>
-        <a:xfrm>
-          <a:off x="0" y="0"/>
-          <a:ext cx="0" cy="0"/>
-          <a:chOff x="0" y="0"/>
-          <a:chExt cx="0" cy="0"/>
-        </a:xfrm>
-      </p:grpSpPr>
-      <p:sp>
-        <p:nvSpPr>
-          <p:cNvPr id="2" name="Titel 1">
-            <a:extLst>
-              <a:ext uri="{FF2B5EF4-FFF2-40B4-BE49-F238E27FC236}">
-                <a16:creationId xmlns:a16="http://schemas.microsoft.com/office/drawing/2014/main" id="{507F1CCA-6633-41A2-8ED2-169F30F91995}"/>
-              </a:ext>
-            </a:extLst>
-          </p:cNvPr>
-          <p:cNvSpPr>
-            <a:spLocks noGrp="1"/>
-          </p:cNvSpPr>
-          <p:nvPr>
-            <p:ph type="title"/>
-          </p:nvPr>
-        </p:nvSpPr>
-        <p:spPr/>
-        <p:txBody>
-          <a:bodyPr/>
-          <a:lstStyle/>
-          <a:p>
-            <a:r>
-              <a:rPr lang="en-GB" dirty="0" err="1">
-                <a:latin typeface="Segoe UI" panose="020B0502040204020203" pitchFamily="34" charset="0"/>
-                <a:cs typeface="Segoe UI" panose="020B0502040204020203" pitchFamily="34" charset="0"/>
-              </a:rPr>
-              <a:t>Netwerkapparatuur</a:t>
-            </a:r>
-            <a:r>
-              <a:rPr lang="en-GB" dirty="0">
-                <a:latin typeface="Segoe UI" panose="020B0502040204020203" pitchFamily="34" charset="0"/>
-                <a:cs typeface="Segoe UI" panose="020B0502040204020203" pitchFamily="34" charset="0"/>
-              </a:rPr>
-              <a:t>: Server Rack</a:t>
-            </a:r>
-          </a:p>
-        </p:txBody>
-      </p:sp>
-      <p:sp>
-        <p:nvSpPr>
-          <p:cNvPr id="3" name="Tijdelijke aanduiding voor inhoud 2">
-            <a:extLst>
-              <a:ext uri="{FF2B5EF4-FFF2-40B4-BE49-F238E27FC236}">
-                <a16:creationId xmlns:a16="http://schemas.microsoft.com/office/drawing/2014/main" id="{B1093ED1-2907-4E59-BCC1-0B7AA1E43016}"/>
-              </a:ext>
-            </a:extLst>
-          </p:cNvPr>
-          <p:cNvSpPr>
-            <a:spLocks noGrp="1"/>
-          </p:cNvSpPr>
-          <p:nvPr>
-            <p:ph idx="1"/>
-          </p:nvPr>
-        </p:nvSpPr>
-        <p:spPr/>
-        <p:txBody>
-          <a:bodyPr/>
-          <a:lstStyle/>
-          <a:p>
-            <a:pPr>
-              <a:buFont typeface="Arial" panose="020B0604020202020204" pitchFamily="34" charset="0"/>
-              <a:buChar char="•"/>
-            </a:pPr>
-            <a:r>
-              <a:rPr lang="en-GB" dirty="0">
-                <a:latin typeface="Segoe UI" panose="020B0502040204020203" pitchFamily="34" charset="0"/>
-                <a:cs typeface="Segoe UI" panose="020B0502040204020203" pitchFamily="34" charset="0"/>
-              </a:rPr>
-              <a:t> StarTech Server Rack + </a:t>
-            </a:r>
-            <a:r>
-              <a:rPr lang="en-GB" dirty="0" err="1">
-                <a:latin typeface="Segoe UI" panose="020B0502040204020203" pitchFamily="34" charset="0"/>
-                <a:cs typeface="Segoe UI" panose="020B0502040204020203" pitchFamily="34" charset="0"/>
-              </a:rPr>
-              <a:t>Schap</a:t>
-            </a:r>
-            <a:r>
-              <a:rPr lang="en-GB" dirty="0">
-                <a:latin typeface="Segoe UI" panose="020B0502040204020203" pitchFamily="34" charset="0"/>
-                <a:cs typeface="Segoe UI" panose="020B0502040204020203" pitchFamily="34" charset="0"/>
-              </a:rPr>
-              <a:t> </a:t>
-            </a:r>
-          </a:p>
-          <a:p>
-            <a:pPr>
-              <a:buFont typeface="Arial" panose="020B0604020202020204" pitchFamily="34" charset="0"/>
-              <a:buChar char="•"/>
-            </a:pPr>
-            <a:r>
-              <a:rPr lang="en-GB" dirty="0">
-                <a:latin typeface="Segoe UI" panose="020B0502040204020203" pitchFamily="34" charset="0"/>
-                <a:cs typeface="Segoe UI" panose="020B0502040204020203" pitchFamily="34" charset="0"/>
-              </a:rPr>
-              <a:t> </a:t>
-            </a:r>
-            <a:r>
-              <a:rPr lang="en-GB" dirty="0" err="1">
-                <a:latin typeface="Segoe UI" panose="020B0502040204020203" pitchFamily="34" charset="0"/>
-                <a:cs typeface="Segoe UI" panose="020B0502040204020203" pitchFamily="34" charset="0"/>
-              </a:rPr>
-              <a:t>Wandmontage</a:t>
-            </a:r>
-            <a:r>
-              <a:rPr lang="en-GB" dirty="0">
-                <a:latin typeface="Segoe UI" panose="020B0502040204020203" pitchFamily="34" charset="0"/>
-                <a:cs typeface="Segoe UI" panose="020B0502040204020203" pitchFamily="34" charset="0"/>
-              </a:rPr>
-              <a:t> </a:t>
-            </a:r>
-          </a:p>
-          <a:p>
-            <a:pPr>
-              <a:buFont typeface="Arial" panose="020B0604020202020204" pitchFamily="34" charset="0"/>
-              <a:buChar char="•"/>
-            </a:pPr>
-            <a:r>
-              <a:rPr lang="en-GB" dirty="0">
-                <a:latin typeface="Segoe UI" panose="020B0502040204020203" pitchFamily="34" charset="0"/>
-                <a:cs typeface="Segoe UI" panose="020B0502040204020203" pitchFamily="34" charset="0"/>
-              </a:rPr>
-              <a:t> 4U </a:t>
-            </a:r>
-            <a:r>
-              <a:rPr lang="en-GB" dirty="0">
-                <a:latin typeface="Segoe UI" panose="020B0502040204020203" pitchFamily="34" charset="0"/>
-                <a:cs typeface="Segoe UI" panose="020B0502040204020203" pitchFamily="34" charset="0"/>
-                <a:sym typeface="Wingdings" panose="05000000000000000000" pitchFamily="2" charset="2"/>
-              </a:rPr>
-              <a:t> </a:t>
-            </a:r>
-            <a:r>
-              <a:rPr lang="en-GB" dirty="0" err="1">
-                <a:latin typeface="Segoe UI" panose="020B0502040204020203" pitchFamily="34" charset="0"/>
-                <a:cs typeface="Segoe UI" panose="020B0502040204020203" pitchFamily="34" charset="0"/>
-                <a:sym typeface="Wingdings" panose="05000000000000000000" pitchFamily="2" charset="2"/>
-              </a:rPr>
-              <a:t>uitbreiding</a:t>
-            </a:r>
-            <a:r>
-              <a:rPr lang="en-GB" dirty="0">
-                <a:latin typeface="Segoe UI" panose="020B0502040204020203" pitchFamily="34" charset="0"/>
-                <a:cs typeface="Segoe UI" panose="020B0502040204020203" pitchFamily="34" charset="0"/>
-                <a:sym typeface="Wingdings" panose="05000000000000000000" pitchFamily="2" charset="2"/>
-              </a:rPr>
-              <a:t> </a:t>
-            </a:r>
-            <a:r>
-              <a:rPr lang="en-GB" dirty="0" err="1">
-                <a:latin typeface="Segoe UI" panose="020B0502040204020203" pitchFamily="34" charset="0"/>
-                <a:cs typeface="Segoe UI" panose="020B0502040204020203" pitchFamily="34" charset="0"/>
-                <a:sym typeface="Wingdings" panose="05000000000000000000" pitchFamily="2" charset="2"/>
-              </a:rPr>
-              <a:t>mogelijk</a:t>
-            </a:r>
-            <a:endParaRPr lang="en-GB" dirty="0">
-              <a:latin typeface="Segoe UI" panose="020B0502040204020203" pitchFamily="34" charset="0"/>
-              <a:cs typeface="Segoe UI" panose="020B0502040204020203" pitchFamily="34" charset="0"/>
-            </a:endParaRPr>
-          </a:p>
-          <a:p>
-            <a:pPr>
-              <a:buFont typeface="Arial" panose="020B0604020202020204" pitchFamily="34" charset="0"/>
-              <a:buChar char="•"/>
-            </a:pPr>
-            <a:r>
-              <a:rPr lang="en-GB" dirty="0">
-                <a:latin typeface="Segoe UI" panose="020B0502040204020203" pitchFamily="34" charset="0"/>
-                <a:cs typeface="Segoe UI" panose="020B0502040204020203" pitchFamily="34" charset="0"/>
-              </a:rPr>
-              <a:t> </a:t>
-            </a:r>
-            <a:r>
-              <a:rPr lang="en-GB" dirty="0" err="1">
-                <a:latin typeface="Segoe UI" panose="020B0502040204020203" pitchFamily="34" charset="0"/>
-                <a:cs typeface="Segoe UI" panose="020B0502040204020203" pitchFamily="34" charset="0"/>
-              </a:rPr>
-              <a:t>Massief</a:t>
-            </a:r>
-            <a:r>
-              <a:rPr lang="en-GB" dirty="0">
-                <a:latin typeface="Segoe UI" panose="020B0502040204020203" pitchFamily="34" charset="0"/>
-                <a:cs typeface="Segoe UI" panose="020B0502040204020203" pitchFamily="34" charset="0"/>
-              </a:rPr>
-              <a:t> </a:t>
-            </a:r>
-            <a:r>
-              <a:rPr lang="en-GB" dirty="0" err="1">
-                <a:latin typeface="Segoe UI" panose="020B0502040204020203" pitchFamily="34" charset="0"/>
-                <a:cs typeface="Segoe UI" panose="020B0502040204020203" pitchFamily="34" charset="0"/>
-              </a:rPr>
-              <a:t>staal</a:t>
-            </a:r>
-            <a:endParaRPr lang="en-GB" dirty="0">
-              <a:latin typeface="Segoe UI" panose="020B0502040204020203" pitchFamily="34" charset="0"/>
-              <a:cs typeface="Segoe UI" panose="020B0502040204020203" pitchFamily="34" charset="0"/>
-            </a:endParaRPr>
-          </a:p>
-        </p:txBody>
-      </p:sp>
-      <p:pic>
-        <p:nvPicPr>
-          <p:cNvPr id="2050" name="Picture 2" descr="Thumbnail 1 for Wall-Mount Server Rack with Built-in Shelf - Solid Steel - 4U">
-            <a:extLst>
-              <a:ext uri="{FF2B5EF4-FFF2-40B4-BE49-F238E27FC236}">
-                <a16:creationId xmlns:a16="http://schemas.microsoft.com/office/drawing/2014/main" id="{1618FD7D-2936-4BA3-9491-869B628927B9}"/>
-              </a:ext>
-            </a:extLst>
-          </p:cNvPr>
-          <p:cNvPicPr>
-            <a:picLocks noChangeAspect="1" noChangeArrowheads="1"/>
-          </p:cNvPicPr>
-          <p:nvPr/>
-        </p:nvPicPr>
-        <p:blipFill>
-          <a:blip r:embed="rId2">
-            <a:extLst>
-              <a:ext uri="{28A0092B-C50C-407E-A947-70E740481C1C}">
-                <a14:useLocalDpi xmlns:a14="http://schemas.microsoft.com/office/drawing/2010/main" val="0"/>
-              </a:ext>
-            </a:extLst>
-          </a:blip>
-          <a:srcRect/>
-          <a:stretch>
-            <a:fillRect/>
-          </a:stretch>
-        </p:blipFill>
-        <p:spPr bwMode="auto">
-          <a:xfrm>
-            <a:off x="6395022" y="3514589"/>
-            <a:ext cx="2405028" cy="2405028"/>
-          </a:xfrm>
-          <a:prstGeom prst="rect">
-            <a:avLst/>
-          </a:prstGeom>
-          <a:noFill/>
-          <a:extLst>
-            <a:ext uri="{909E8E84-426E-40DD-AFC4-6F175D3DCCD1}">
-              <a14:hiddenFill xmlns:a14="http://schemas.microsoft.com/office/drawing/2010/main">
-                <a:solidFill>
-                  <a:srgbClr val="FFFFFF"/>
-                </a:solidFill>
-              </a14:hiddenFill>
-            </a:ext>
-          </a:extLst>
-        </p:spPr>
-      </p:pic>
-      <p:pic>
-        <p:nvPicPr>
-          <p:cNvPr id="2052" name="Picture 4" descr="Thumbnail 2 for Wall-Mount Server Rack with Built-in Shelf - Solid Steel - 4U">
-            <a:extLst>
-              <a:ext uri="{FF2B5EF4-FFF2-40B4-BE49-F238E27FC236}">
-                <a16:creationId xmlns:a16="http://schemas.microsoft.com/office/drawing/2014/main" id="{B21F69AE-EDE7-4FBF-9953-3675136DBBA2}"/>
-              </a:ext>
-            </a:extLst>
-          </p:cNvPr>
-          <p:cNvPicPr>
-            <a:picLocks noChangeAspect="1" noChangeArrowheads="1"/>
-          </p:cNvPicPr>
-          <p:nvPr/>
-        </p:nvPicPr>
-        <p:blipFill>
-          <a:blip r:embed="rId3">
-            <a:extLst>
-              <a:ext uri="{28A0092B-C50C-407E-A947-70E740481C1C}">
-                <a14:useLocalDpi xmlns:a14="http://schemas.microsoft.com/office/drawing/2010/main" val="0"/>
-              </a:ext>
-            </a:extLst>
-          </a:blip>
-          <a:srcRect/>
-          <a:stretch>
-            <a:fillRect/>
-          </a:stretch>
-        </p:blipFill>
-        <p:spPr bwMode="auto">
-          <a:xfrm>
-            <a:off x="8999545" y="3337993"/>
-            <a:ext cx="2857500" cy="2857500"/>
-          </a:xfrm>
-          <a:prstGeom prst="rect">
-            <a:avLst/>
-          </a:prstGeom>
-          <a:noFill/>
-          <a:extLst>
-            <a:ext uri="{909E8E84-426E-40DD-AFC4-6F175D3DCCD1}">
-              <a14:hiddenFill xmlns:a14="http://schemas.microsoft.com/office/drawing/2010/main">
-                <a:solidFill>
-                  <a:srgbClr val="FFFFFF"/>
-                </a:solidFill>
-              </a14:hiddenFill>
-            </a:ext>
-          </a:extLst>
-        </p:spPr>
-      </p:pic>
-    </p:spTree>
-    <p:extLst>
-      <p:ext uri="{BB962C8B-B14F-4D97-AF65-F5344CB8AC3E}">
-        <p14:creationId xmlns:p14="http://schemas.microsoft.com/office/powerpoint/2010/main" val="2773309958"/>
-      </p:ext>
-    </p:extLst>
-  </p:cSld>
-  <p:clrMapOvr>
-    <a:masterClrMapping/>
-  </p:clrMapOvr>
-  <p:transition>
-    <p:fade/>
-  </p:transition>
-</p:sld>
-</file>
-
-<file path=ppt/slides/slide9.xml><?xml version="1.0" encoding="utf-8"?>
-<p:sld xmlns:a="http://schemas.openxmlformats.org/drawingml/2006/main" xmlns:r="http://schemas.openxmlformats.org/officeDocument/2006/relationships" xmlns:p="http://schemas.openxmlformats.org/presentationml/2006/main">
-  <p:cSld>
-    <p:spTree>
-      <p:nvGrpSpPr>
-        <p:cNvPr id="1" name=""/>
-        <p:cNvGrpSpPr/>
-        <p:nvPr/>
-      </p:nvGrpSpPr>
-      <p:grpSpPr>
-        <a:xfrm>
-          <a:off x="0" y="0"/>
-          <a:ext cx="0" cy="0"/>
-          <a:chOff x="0" y="0"/>
-          <a:chExt cx="0" cy="0"/>
-        </a:xfrm>
-      </p:grpSpPr>
-      <p:sp>
-        <p:nvSpPr>
-          <p:cNvPr id="2" name="Titel 1">
-            <a:extLst>
-              <a:ext uri="{FF2B5EF4-FFF2-40B4-BE49-F238E27FC236}">
-                <a16:creationId xmlns:a16="http://schemas.microsoft.com/office/drawing/2014/main" id="{A5E43959-96F4-4FD6-B3E6-B2D6B20CBAB3}"/>
-              </a:ext>
-            </a:extLst>
-          </p:cNvPr>
-          <p:cNvSpPr>
-            <a:spLocks noGrp="1"/>
-          </p:cNvSpPr>
-          <p:nvPr>
-            <p:ph type="title"/>
-          </p:nvPr>
-        </p:nvSpPr>
-        <p:spPr/>
-        <p:txBody>
-          <a:bodyPr/>
-          <a:lstStyle/>
-          <a:p>
-            <a:r>
-              <a:rPr lang="en-GB" dirty="0" err="1">
-                <a:latin typeface="Segoe UI" panose="020B0502040204020203" pitchFamily="34" charset="0"/>
-                <a:cs typeface="Segoe UI" panose="020B0502040204020203" pitchFamily="34" charset="0"/>
-              </a:rPr>
-              <a:t>Netwerkapparatuur</a:t>
-            </a:r>
-            <a:r>
-              <a:rPr lang="en-GB" dirty="0">
-                <a:latin typeface="Segoe UI" panose="020B0502040204020203" pitchFamily="34" charset="0"/>
-                <a:cs typeface="Segoe UI" panose="020B0502040204020203" pitchFamily="34" charset="0"/>
-              </a:rPr>
-              <a:t>: Bekabeling</a:t>
-            </a:r>
-          </a:p>
-        </p:txBody>
-      </p:sp>
-      <p:sp>
-        <p:nvSpPr>
-          <p:cNvPr id="3" name="Tijdelijke aanduiding voor inhoud 2">
-            <a:extLst>
-              <a:ext uri="{FF2B5EF4-FFF2-40B4-BE49-F238E27FC236}">
-                <a16:creationId xmlns:a16="http://schemas.microsoft.com/office/drawing/2014/main" id="{1E556DD1-731A-4814-922E-085457DEE772}"/>
-              </a:ext>
-            </a:extLst>
-          </p:cNvPr>
-          <p:cNvSpPr>
-            <a:spLocks noGrp="1"/>
-          </p:cNvSpPr>
-          <p:nvPr>
-            <p:ph idx="1"/>
-          </p:nvPr>
-        </p:nvSpPr>
-        <p:spPr/>
-        <p:txBody>
-          <a:bodyPr/>
-          <a:lstStyle/>
-          <a:p>
-            <a:pPr>
-              <a:buFont typeface="Arial" panose="020B0604020202020204" pitchFamily="34" charset="0"/>
-              <a:buChar char="•"/>
-            </a:pPr>
-            <a:r>
-              <a:rPr lang="nl-NL" dirty="0">
-                <a:latin typeface="Segoe UI" panose="020B0502040204020203" pitchFamily="34" charset="0"/>
-                <a:cs typeface="Segoe UI" panose="020B0502040204020203" pitchFamily="34" charset="0"/>
-              </a:rPr>
-              <a:t> </a:t>
-            </a:r>
-            <a:r>
-              <a:rPr lang="nl-NL" dirty="0" err="1">
-                <a:latin typeface="Segoe UI" panose="020B0502040204020203" pitchFamily="34" charset="0"/>
-                <a:cs typeface="Segoe UI" panose="020B0502040204020203" pitchFamily="34" charset="0"/>
-              </a:rPr>
-              <a:t>Equip</a:t>
-            </a:r>
-            <a:r>
-              <a:rPr lang="nl-NL" dirty="0">
-                <a:latin typeface="Segoe UI" panose="020B0502040204020203" pitchFamily="34" charset="0"/>
-                <a:cs typeface="Segoe UI" panose="020B0502040204020203" pitchFamily="34" charset="0"/>
-              </a:rPr>
-              <a:t> 625423 - 0,25 m x 2</a:t>
-            </a:r>
-          </a:p>
-          <a:p>
-            <a:pPr>
-              <a:buFont typeface="Arial" panose="020B0604020202020204" pitchFamily="34" charset="0"/>
-              <a:buChar char="•"/>
-            </a:pPr>
-            <a:r>
-              <a:rPr lang="nl-NL" dirty="0">
-                <a:latin typeface="Segoe UI" panose="020B0502040204020203" pitchFamily="34" charset="0"/>
-                <a:cs typeface="Segoe UI" panose="020B0502040204020203" pitchFamily="34" charset="0"/>
-              </a:rPr>
-              <a:t> </a:t>
-            </a:r>
-            <a:r>
-              <a:rPr lang="nl-NL" dirty="0" err="1">
-                <a:latin typeface="Segoe UI" panose="020B0502040204020203" pitchFamily="34" charset="0"/>
-                <a:cs typeface="Segoe UI" panose="020B0502040204020203" pitchFamily="34" charset="0"/>
-              </a:rPr>
-              <a:t>Equip</a:t>
-            </a:r>
-            <a:r>
-              <a:rPr lang="nl-NL" dirty="0">
-                <a:latin typeface="Segoe UI" panose="020B0502040204020203" pitchFamily="34" charset="0"/>
-                <a:cs typeface="Segoe UI" panose="020B0502040204020203" pitchFamily="34" charset="0"/>
-              </a:rPr>
-              <a:t> 625427 - 0,5 m x 3</a:t>
-            </a:r>
-          </a:p>
-          <a:p>
-            <a:pPr>
-              <a:buFont typeface="Arial" panose="020B0604020202020204" pitchFamily="34" charset="0"/>
-              <a:buChar char="•"/>
-            </a:pPr>
-            <a:r>
-              <a:rPr lang="nl-NL" dirty="0">
-                <a:latin typeface="Segoe UI" panose="020B0502040204020203" pitchFamily="34" charset="0"/>
-                <a:cs typeface="Segoe UI" panose="020B0502040204020203" pitchFamily="34" charset="0"/>
-              </a:rPr>
-              <a:t> </a:t>
-            </a:r>
-            <a:r>
-              <a:rPr lang="nl-NL" dirty="0" err="1">
-                <a:latin typeface="Segoe UI" panose="020B0502040204020203" pitchFamily="34" charset="0"/>
-                <a:cs typeface="Segoe UI" panose="020B0502040204020203" pitchFamily="34" charset="0"/>
-              </a:rPr>
-              <a:t>Equip</a:t>
-            </a:r>
-            <a:r>
-              <a:rPr lang="nl-NL" dirty="0">
-                <a:latin typeface="Segoe UI" panose="020B0502040204020203" pitchFamily="34" charset="0"/>
-                <a:cs typeface="Segoe UI" panose="020B0502040204020203" pitchFamily="34" charset="0"/>
-              </a:rPr>
-              <a:t> 625426 - 10 m x 5</a:t>
-            </a:r>
-          </a:p>
-          <a:p>
-            <a:pPr>
-              <a:buFont typeface="Arial" panose="020B0604020202020204" pitchFamily="34" charset="0"/>
-              <a:buChar char="•"/>
-            </a:pPr>
-            <a:r>
-              <a:rPr lang="en-GB" dirty="0">
-                <a:latin typeface="Segoe UI" panose="020B0502040204020203" pitchFamily="34" charset="0"/>
-                <a:cs typeface="Segoe UI" panose="020B0502040204020203" pitchFamily="34" charset="0"/>
-              </a:rPr>
-              <a:t> Cat6 </a:t>
-            </a:r>
-            <a:r>
-              <a:rPr lang="en-GB" dirty="0" err="1">
-                <a:latin typeface="Segoe UI" panose="020B0502040204020203" pitchFamily="34" charset="0"/>
-                <a:cs typeface="Segoe UI" panose="020B0502040204020203" pitchFamily="34" charset="0"/>
-              </a:rPr>
-              <a:t>bekabeling</a:t>
-            </a:r>
-            <a:endParaRPr lang="en-GB" dirty="0">
-              <a:latin typeface="Segoe UI" panose="020B0502040204020203" pitchFamily="34" charset="0"/>
-              <a:cs typeface="Segoe UI" panose="020B0502040204020203" pitchFamily="34" charset="0"/>
-            </a:endParaRPr>
-          </a:p>
-          <a:p>
-            <a:pPr>
-              <a:buFont typeface="Arial" panose="020B0604020202020204" pitchFamily="34" charset="0"/>
-              <a:buChar char="•"/>
-            </a:pPr>
-            <a:r>
-              <a:rPr lang="en-GB" dirty="0">
-                <a:latin typeface="Segoe UI" panose="020B0502040204020203" pitchFamily="34" charset="0"/>
-                <a:cs typeface="Segoe UI" panose="020B0502040204020203" pitchFamily="34" charset="0"/>
-              </a:rPr>
-              <a:t> </a:t>
-            </a:r>
-            <a:r>
-              <a:rPr lang="en-GB" dirty="0" err="1">
-                <a:latin typeface="Segoe UI" panose="020B0502040204020203" pitchFamily="34" charset="0"/>
-                <a:cs typeface="Segoe UI" panose="020B0502040204020203" pitchFamily="34" charset="0"/>
-              </a:rPr>
-              <a:t>Hogere</a:t>
-            </a:r>
-            <a:r>
-              <a:rPr lang="en-GB" dirty="0">
-                <a:latin typeface="Segoe UI" panose="020B0502040204020203" pitchFamily="34" charset="0"/>
-                <a:cs typeface="Segoe UI" panose="020B0502040204020203" pitchFamily="34" charset="0"/>
-              </a:rPr>
-              <a:t> </a:t>
-            </a:r>
-            <a:r>
-              <a:rPr lang="en-GB" dirty="0" err="1">
-                <a:latin typeface="Segoe UI" panose="020B0502040204020203" pitchFamily="34" charset="0"/>
-                <a:cs typeface="Segoe UI" panose="020B0502040204020203" pitchFamily="34" charset="0"/>
-              </a:rPr>
-              <a:t>bandbreedte</a:t>
-            </a:r>
-            <a:endParaRPr lang="en-GB" dirty="0">
-              <a:latin typeface="Segoe UI" panose="020B0502040204020203" pitchFamily="34" charset="0"/>
-              <a:cs typeface="Segoe UI" panose="020B0502040204020203" pitchFamily="34" charset="0"/>
-            </a:endParaRPr>
-          </a:p>
-        </p:txBody>
-      </p:sp>
-      <p:pic>
-        <p:nvPicPr>
-          <p:cNvPr id="3074" name="Picture 2" descr="https://mijnitshop-product-images.s3.eu-central-1.amazonaws.com/00/86/90/01.jpg">
-            <a:extLst>
-              <a:ext uri="{FF2B5EF4-FFF2-40B4-BE49-F238E27FC236}">
-                <a16:creationId xmlns:a16="http://schemas.microsoft.com/office/drawing/2014/main" id="{E8044121-239F-4009-88CE-5832DFB1B624}"/>
-              </a:ext>
-            </a:extLst>
-          </p:cNvPr>
-          <p:cNvPicPr>
-            <a:picLocks noChangeAspect="1" noChangeArrowheads="1"/>
-          </p:cNvPicPr>
-          <p:nvPr/>
-        </p:nvPicPr>
-        <p:blipFill>
-          <a:blip r:embed="rId2">
-            <a:extLst>
-              <a:ext uri="{28A0092B-C50C-407E-A947-70E740481C1C}">
-                <a14:useLocalDpi xmlns:a14="http://schemas.microsoft.com/office/drawing/2010/main" val="0"/>
-              </a:ext>
-            </a:extLst>
-          </a:blip>
-          <a:srcRect/>
-          <a:stretch>
-            <a:fillRect/>
-          </a:stretch>
-        </p:blipFill>
-        <p:spPr bwMode="auto">
-          <a:xfrm>
-            <a:off x="9230674" y="4159412"/>
-            <a:ext cx="2524561" cy="1922458"/>
-          </a:xfrm>
-          <a:prstGeom prst="rect">
-            <a:avLst/>
-          </a:prstGeom>
-          <a:noFill/>
-          <a:extLst>
-            <a:ext uri="{909E8E84-426E-40DD-AFC4-6F175D3DCCD1}">
-              <a14:hiddenFill xmlns:a14="http://schemas.microsoft.com/office/drawing/2010/main">
-                <a:solidFill>
-                  <a:srgbClr val="FFFFFF"/>
-                </a:solidFill>
-              </a14:hiddenFill>
-            </a:ext>
-          </a:extLst>
-        </p:spPr>
-      </p:pic>
-    </p:spTree>
-    <p:extLst>
-      <p:ext uri="{BB962C8B-B14F-4D97-AF65-F5344CB8AC3E}">
-        <p14:creationId xmlns:p14="http://schemas.microsoft.com/office/powerpoint/2010/main" val="326328332"/>
       </p:ext>
     </p:extLst>
   </p:cSld>

</xml_diff>

<commit_message>
G24-36-40 Offertes + Voorstelling
</commit_message>
<xml_diff>
--- a/opdracht03/G24/Voorstelling G24.pptx
+++ b/opdracht03/G24/Voorstelling G24.pptx
@@ -232,7 +232,7 @@
           <a:p>
             <a:fld id="{8795BD13-A9C0-4833-9A37-05C32DB0F83C}" type="datetimeFigureOut">
               <a:rPr lang="en-GB" smtClean="0"/>
-              <a:t>27/04/2019</a:t>
+              <a:t>28/04/2019</a:t>
             </a:fld>
             <a:endParaRPr lang="en-GB"/>
           </a:p>
@@ -726,7 +726,7 @@
           <a:p>
             <a:fld id="{76FCA46D-55D7-4D00-B507-F3F903E4163B}" type="datetimeFigureOut">
               <a:rPr lang="en-GB" smtClean="0"/>
-              <a:t>27/04/2019</a:t>
+              <a:t>28/04/2019</a:t>
             </a:fld>
             <a:endParaRPr lang="en-GB"/>
           </a:p>
@@ -937,7 +937,7 @@
           <a:p>
             <a:fld id="{76FCA46D-55D7-4D00-B507-F3F903E4163B}" type="datetimeFigureOut">
               <a:rPr lang="en-GB" smtClean="0"/>
-              <a:t>27/04/2019</a:t>
+              <a:t>28/04/2019</a:t>
             </a:fld>
             <a:endParaRPr lang="en-GB"/>
           </a:p>
@@ -1196,7 +1196,7 @@
           <a:p>
             <a:fld id="{76FCA46D-55D7-4D00-B507-F3F903E4163B}" type="datetimeFigureOut">
               <a:rPr lang="en-GB" smtClean="0"/>
-              <a:t>27/04/2019</a:t>
+              <a:t>28/04/2019</a:t>
             </a:fld>
             <a:endParaRPr lang="en-GB"/>
           </a:p>
@@ -1369,7 +1369,7 @@
           <a:p>
             <a:fld id="{76FCA46D-55D7-4D00-B507-F3F903E4163B}" type="datetimeFigureOut">
               <a:rPr lang="en-GB" smtClean="0"/>
-              <a:t>27/04/2019</a:t>
+              <a:t>28/04/2019</a:t>
             </a:fld>
             <a:endParaRPr lang="en-GB"/>
           </a:p>
@@ -1715,7 +1715,7 @@
           <a:p>
             <a:fld id="{76FCA46D-55D7-4D00-B507-F3F903E4163B}" type="datetimeFigureOut">
               <a:rPr lang="en-GB" smtClean="0"/>
-              <a:t>27/04/2019</a:t>
+              <a:t>28/04/2019</a:t>
             </a:fld>
             <a:endParaRPr lang="en-GB"/>
           </a:p>
@@ -1993,7 +1993,7 @@
           <a:p>
             <a:fld id="{76FCA46D-55D7-4D00-B507-F3F903E4163B}" type="datetimeFigureOut">
               <a:rPr lang="en-GB" smtClean="0"/>
-              <a:t>27/04/2019</a:t>
+              <a:t>28/04/2019</a:t>
             </a:fld>
             <a:endParaRPr lang="en-GB"/>
           </a:p>
@@ -2375,7 +2375,7 @@
           <a:p>
             <a:fld id="{76FCA46D-55D7-4D00-B507-F3F903E4163B}" type="datetimeFigureOut">
               <a:rPr lang="en-GB" smtClean="0"/>
-              <a:t>27/04/2019</a:t>
+              <a:t>28/04/2019</a:t>
             </a:fld>
             <a:endParaRPr lang="en-GB"/>
           </a:p>
@@ -2496,7 +2496,7 @@
           <a:p>
             <a:fld id="{76FCA46D-55D7-4D00-B507-F3F903E4163B}" type="datetimeFigureOut">
               <a:rPr lang="en-GB" smtClean="0"/>
-              <a:t>27/04/2019</a:t>
+              <a:t>28/04/2019</a:t>
             </a:fld>
             <a:endParaRPr lang="en-GB"/>
           </a:p>
@@ -2670,7 +2670,7 @@
           <a:p>
             <a:fld id="{76FCA46D-55D7-4D00-B507-F3F903E4163B}" type="datetimeFigureOut">
               <a:rPr lang="en-GB" smtClean="0"/>
-              <a:t>27/04/2019</a:t>
+              <a:t>28/04/2019</a:t>
             </a:fld>
             <a:endParaRPr lang="en-GB"/>
           </a:p>
@@ -3027,7 +3027,7 @@
           <a:p>
             <a:fld id="{76FCA46D-55D7-4D00-B507-F3F903E4163B}" type="datetimeFigureOut">
               <a:rPr lang="en-GB" smtClean="0"/>
-              <a:t>27/04/2019</a:t>
+              <a:t>28/04/2019</a:t>
             </a:fld>
             <a:endParaRPr lang="en-GB"/>
           </a:p>
@@ -3407,7 +3407,7 @@
           <a:p>
             <a:fld id="{76FCA46D-55D7-4D00-B507-F3F903E4163B}" type="datetimeFigureOut">
               <a:rPr lang="en-GB" smtClean="0"/>
-              <a:t>27/04/2019</a:t>
+              <a:t>28/04/2019</a:t>
             </a:fld>
             <a:endParaRPr lang="en-GB"/>
           </a:p>
@@ -3697,7 +3697,7 @@
           <a:p>
             <a:fld id="{76FCA46D-55D7-4D00-B507-F3F903E4163B}" type="datetimeFigureOut">
               <a:rPr lang="en-GB" smtClean="0"/>
-              <a:t>27/04/2019</a:t>
+              <a:t>28/04/2019</a:t>
             </a:fld>
             <a:endParaRPr lang="en-GB"/>
           </a:p>
@@ -6593,36 +6593,33 @@
                 <a:latin typeface="Segoe UI" panose="020B0502040204020203" pitchFamily="34" charset="0"/>
                 <a:cs typeface="Segoe UI" panose="020B0502040204020203" pitchFamily="34" charset="0"/>
               </a:rPr>
-              <a:t> VoIP </a:t>
-            </a:r>
-            <a:r>
-              <a:rPr lang="en-GB" dirty="0" err="1">
-                <a:latin typeface="Segoe UI" panose="020B0502040204020203" pitchFamily="34" charset="0"/>
-                <a:cs typeface="Segoe UI" panose="020B0502040204020203" pitchFamily="34" charset="0"/>
-              </a:rPr>
-              <a:t>Telefoon</a:t>
-            </a:r>
-            <a:r>
-              <a:rPr lang="en-GB" dirty="0">
-                <a:latin typeface="Segoe UI" panose="020B0502040204020203" pitchFamily="34" charset="0"/>
-                <a:cs typeface="Segoe UI" panose="020B0502040204020203" pitchFamily="34" charset="0"/>
-              </a:rPr>
-              <a:t>: </a:t>
-            </a:r>
-            <a:r>
-              <a:rPr lang="en-GB" dirty="0" err="1">
-                <a:latin typeface="Segoe UI" panose="020B0502040204020203" pitchFamily="34" charset="0"/>
-                <a:cs typeface="Segoe UI" panose="020B0502040204020203" pitchFamily="34" charset="0"/>
-              </a:rPr>
-              <a:t>Htek</a:t>
-            </a:r>
-            <a:r>
-              <a:rPr lang="en-GB" dirty="0">
-                <a:latin typeface="Segoe UI" panose="020B0502040204020203" pitchFamily="34" charset="0"/>
-                <a:cs typeface="Segoe UI" panose="020B0502040204020203" pitchFamily="34" charset="0"/>
-              </a:rPr>
-              <a:t> UC924 4-Line Gigabit</a:t>
-            </a:r>
+              <a:t> VoIP: </a:t>
+            </a:r>
+            <a:r>
+              <a:rPr lang="nl-NL" dirty="0">
+                <a:latin typeface="Segoe UI" panose="020B0502040204020203" pitchFamily="34" charset="0"/>
+                <a:cs typeface="Segoe UI" panose="020B0502040204020203" pitchFamily="34" charset="0"/>
+              </a:rPr>
+              <a:t>Telenet </a:t>
+            </a:r>
+            <a:r>
+              <a:rPr lang="nl-NL" dirty="0" err="1">
+                <a:latin typeface="Segoe UI" panose="020B0502040204020203" pitchFamily="34" charset="0"/>
+                <a:cs typeface="Segoe UI" panose="020B0502040204020203" pitchFamily="34" charset="0"/>
+              </a:rPr>
+              <a:t>FreePhone</a:t>
+            </a:r>
+            <a:r>
+              <a:rPr lang="nl-NL" dirty="0">
+                <a:latin typeface="Segoe UI" panose="020B0502040204020203" pitchFamily="34" charset="0"/>
+                <a:cs typeface="Segoe UI" panose="020B0502040204020203" pitchFamily="34" charset="0"/>
+              </a:rPr>
+              <a:t> Business</a:t>
+            </a:r>
+            <a:endParaRPr lang="en-GB" dirty="0">
+              <a:latin typeface="Segoe UI" panose="020B0502040204020203" pitchFamily="34" charset="0"/>
+              <a:cs typeface="Segoe UI" panose="020B0502040204020203" pitchFamily="34" charset="0"/>
+            </a:endParaRPr>
           </a:p>
           <a:p>
             <a:pPr>
@@ -9152,19 +9149,8 @@
                 <a:latin typeface="Segoe UI" panose="020B0502040204020203" pitchFamily="34" charset="0"/>
                 <a:cs typeface="Segoe UI" panose="020B0502040204020203" pitchFamily="34" charset="0"/>
               </a:rPr>
-              <a:t>Hardware: VoIP </a:t>
-            </a:r>
-            <a:r>
-              <a:rPr lang="en-GB" dirty="0" err="1">
-                <a:latin typeface="Segoe UI" panose="020B0502040204020203" pitchFamily="34" charset="0"/>
-                <a:cs typeface="Segoe UI" panose="020B0502040204020203" pitchFamily="34" charset="0"/>
-              </a:rPr>
-              <a:t>Telefoon</a:t>
-            </a:r>
-            <a:endParaRPr lang="en-GB" dirty="0">
-              <a:latin typeface="Segoe UI" panose="020B0502040204020203" pitchFamily="34" charset="0"/>
-              <a:cs typeface="Segoe UI" panose="020B0502040204020203" pitchFamily="34" charset="0"/>
-            </a:endParaRPr>
+              <a:t>Hardware: VoIP</a:t>
+            </a:r>
           </a:p>
         </p:txBody>
       </p:sp>
@@ -9205,47 +9191,8 @@
                 <a:latin typeface="Segoe UI" panose="020B0502040204020203" pitchFamily="34" charset="0"/>
                 <a:cs typeface="Segoe UI" panose="020B0502040204020203" pitchFamily="34" charset="0"/>
               </a:rPr>
-              <a:t>Htek</a:t>
-            </a:r>
-            <a:r>
-              <a:rPr lang="en-GB" dirty="0">
-                <a:latin typeface="Segoe UI" panose="020B0502040204020203" pitchFamily="34" charset="0"/>
-                <a:cs typeface="Segoe UI" panose="020B0502040204020203" pitchFamily="34" charset="0"/>
-              </a:rPr>
-              <a:t> UC924 4-Line Gigabit</a:t>
-            </a:r>
-          </a:p>
-          <a:p>
-            <a:pPr>
-              <a:buFont typeface="Arial" panose="020B0604020202020204" pitchFamily="34" charset="0"/>
-              <a:buChar char="•"/>
-            </a:pPr>
-            <a:r>
-              <a:rPr lang="en-GB" dirty="0">
-                <a:latin typeface="Segoe UI" panose="020B0502040204020203" pitchFamily="34" charset="0"/>
-                <a:cs typeface="Segoe UI" panose="020B0502040204020203" pitchFamily="34" charset="0"/>
-              </a:rPr>
-              <a:t> PoE</a:t>
-            </a:r>
-          </a:p>
-          <a:p>
-            <a:pPr>
-              <a:buFont typeface="Arial" panose="020B0604020202020204" pitchFamily="34" charset="0"/>
-              <a:buChar char="•"/>
-            </a:pPr>
-            <a:r>
-              <a:rPr lang="en-GB" dirty="0">
-                <a:latin typeface="Segoe UI" panose="020B0502040204020203" pitchFamily="34" charset="0"/>
-                <a:cs typeface="Segoe UI" panose="020B0502040204020203" pitchFamily="34" charset="0"/>
-              </a:rPr>
-              <a:t> Group Conferencing</a:t>
-            </a:r>
-          </a:p>
-          <a:p>
-            <a:pPr>
-              <a:buFont typeface="Arial" panose="020B0604020202020204" pitchFamily="34" charset="0"/>
-              <a:buChar char="•"/>
-            </a:pPr>
+              <a:t>Telenet</a:t>
+            </a:r>
             <a:r>
               <a:rPr lang="en-GB" dirty="0">
                 <a:latin typeface="Segoe UI" panose="020B0502040204020203" pitchFamily="34" charset="0"/>
@@ -9258,7 +9205,62 @@
                 <a:latin typeface="Segoe UI" panose="020B0502040204020203" pitchFamily="34" charset="0"/>
                 <a:cs typeface="Segoe UI" panose="020B0502040204020203" pitchFamily="34" charset="0"/>
               </a:rPr>
-              <a:t>Telefoonboek</a:t>
+              <a:t>FreePhone</a:t>
+            </a:r>
+            <a:r>
+              <a:rPr lang="en-GB" dirty="0">
+                <a:latin typeface="Segoe UI" panose="020B0502040204020203" pitchFamily="34" charset="0"/>
+                <a:cs typeface="Segoe UI" panose="020B0502040204020203" pitchFamily="34" charset="0"/>
+              </a:rPr>
+              <a:t> Business</a:t>
+            </a:r>
+          </a:p>
+          <a:p>
+            <a:pPr>
+              <a:buFont typeface="Arial" panose="020B0604020202020204" pitchFamily="34" charset="0"/>
+              <a:buChar char="•"/>
+            </a:pPr>
+            <a:r>
+              <a:rPr lang="en-GB" dirty="0">
+                <a:latin typeface="Segoe UI" panose="020B0502040204020203" pitchFamily="34" charset="0"/>
+                <a:cs typeface="Segoe UI" panose="020B0502040204020203" pitchFamily="34" charset="0"/>
+              </a:rPr>
+              <a:t> </a:t>
+            </a:r>
+            <a:r>
+              <a:rPr lang="en-GB" dirty="0" err="1">
+                <a:latin typeface="Segoe UI" panose="020B0502040204020203" pitchFamily="34" charset="0"/>
+                <a:cs typeface="Segoe UI" panose="020B0502040204020203" pitchFamily="34" charset="0"/>
+              </a:rPr>
+              <a:t>Meerdere</a:t>
+            </a:r>
+            <a:r>
+              <a:rPr lang="en-GB" dirty="0">
+                <a:latin typeface="Segoe UI" panose="020B0502040204020203" pitchFamily="34" charset="0"/>
+                <a:cs typeface="Segoe UI" panose="020B0502040204020203" pitchFamily="34" charset="0"/>
+              </a:rPr>
+              <a:t> </a:t>
+            </a:r>
+            <a:r>
+              <a:rPr lang="en-GB" dirty="0" err="1">
+                <a:latin typeface="Segoe UI" panose="020B0502040204020203" pitchFamily="34" charset="0"/>
+                <a:cs typeface="Segoe UI" panose="020B0502040204020203" pitchFamily="34" charset="0"/>
+              </a:rPr>
+              <a:t>oproepen</a:t>
+            </a:r>
+            <a:r>
+              <a:rPr lang="en-GB" dirty="0">
+                <a:latin typeface="Segoe UI" panose="020B0502040204020203" pitchFamily="34" charset="0"/>
+                <a:cs typeface="Segoe UI" panose="020B0502040204020203" pitchFamily="34" charset="0"/>
+              </a:rPr>
+              <a:t> </a:t>
+            </a:r>
+            <a:r>
+              <a:rPr lang="en-GB" dirty="0" err="1">
+                <a:latin typeface="Segoe UI" panose="020B0502040204020203" pitchFamily="34" charset="0"/>
+                <a:cs typeface="Segoe UI" panose="020B0502040204020203" pitchFamily="34" charset="0"/>
+              </a:rPr>
+              <a:t>tegelijkertijd</a:t>
             </a:r>
             <a:endParaRPr lang="en-GB" dirty="0">
               <a:latin typeface="Segoe UI" panose="020B0502040204020203" pitchFamily="34" charset="0"/>
@@ -9266,9 +9268,74 @@
             </a:endParaRPr>
           </a:p>
           <a:p>
-            <a:pPr marL="0" indent="0">
-              <a:buNone/>
-            </a:pPr>
+            <a:pPr>
+              <a:buFont typeface="Arial" panose="020B0604020202020204" pitchFamily="34" charset="0"/>
+              <a:buChar char="•"/>
+            </a:pPr>
+            <a:r>
+              <a:rPr lang="en-GB" dirty="0">
+                <a:latin typeface="Segoe UI" panose="020B0502040204020203" pitchFamily="34" charset="0"/>
+                <a:cs typeface="Segoe UI" panose="020B0502040204020203" pitchFamily="34" charset="0"/>
+              </a:rPr>
+              <a:t> </a:t>
+            </a:r>
+            <a:r>
+              <a:rPr lang="nl-NL" dirty="0">
+                <a:latin typeface="Segoe UI" panose="020B0502040204020203" pitchFamily="34" charset="0"/>
+                <a:cs typeface="Segoe UI" panose="020B0502040204020203" pitchFamily="34" charset="0"/>
+              </a:rPr>
+              <a:t>Keuzemenu met automatisch welkomst- en voicemailboodschap</a:t>
+            </a:r>
+          </a:p>
+          <a:p>
+            <a:pPr>
+              <a:buFont typeface="Arial" panose="020B0604020202020204" pitchFamily="34" charset="0"/>
+              <a:buChar char="•"/>
+            </a:pPr>
+            <a:r>
+              <a:rPr lang="nl-NL" dirty="0">
+                <a:latin typeface="Segoe UI" panose="020B0502040204020203" pitchFamily="34" charset="0"/>
+                <a:cs typeface="Segoe UI" panose="020B0502040204020203" pitchFamily="34" charset="0"/>
+              </a:rPr>
+              <a:t> </a:t>
+            </a:r>
+            <a:r>
+              <a:rPr lang="nl-NL" dirty="0" err="1">
+                <a:latin typeface="Segoe UI" panose="020B0502040204020203" pitchFamily="34" charset="0"/>
+                <a:cs typeface="Segoe UI" panose="020B0502040204020203" pitchFamily="34" charset="0"/>
+              </a:rPr>
+              <a:t>Doorschakelingsopties</a:t>
+            </a:r>
+            <a:endParaRPr lang="nl-NL" dirty="0">
+              <a:latin typeface="Segoe UI" panose="020B0502040204020203" pitchFamily="34" charset="0"/>
+              <a:cs typeface="Segoe UI" panose="020B0502040204020203" pitchFamily="34" charset="0"/>
+            </a:endParaRPr>
+          </a:p>
+          <a:p>
+            <a:pPr>
+              <a:buFont typeface="Arial" panose="020B0604020202020204" pitchFamily="34" charset="0"/>
+              <a:buChar char="•"/>
+            </a:pPr>
+            <a:r>
+              <a:rPr lang="nl-NL" dirty="0">
+                <a:latin typeface="Segoe UI" panose="020B0502040204020203" pitchFamily="34" charset="0"/>
+                <a:cs typeface="Segoe UI" panose="020B0502040204020203" pitchFamily="34" charset="0"/>
+              </a:rPr>
+              <a:t> Opnemen en doorschakelen naar GSM</a:t>
+            </a:r>
+          </a:p>
+          <a:p>
+            <a:pPr>
+              <a:buFont typeface="Arial" panose="020B0604020202020204" pitchFamily="34" charset="0"/>
+              <a:buChar char="•"/>
+            </a:pPr>
+            <a:r>
+              <a:rPr lang="nl-NL" dirty="0">
+                <a:latin typeface="Segoe UI" panose="020B0502040204020203" pitchFamily="34" charset="0"/>
+                <a:cs typeface="Segoe UI" panose="020B0502040204020203" pitchFamily="34" charset="0"/>
+              </a:rPr>
+              <a:t> Volledig zelf instelbaar</a:t>
+            </a:r>
             <a:endParaRPr lang="en-GB" dirty="0">
               <a:latin typeface="Segoe UI" panose="020B0502040204020203" pitchFamily="34" charset="0"/>
               <a:cs typeface="Segoe UI" panose="020B0502040204020203" pitchFamily="34" charset="0"/>
@@ -9278,10 +9345,10 @@
       </p:sp>
       <p:pic>
         <p:nvPicPr>
-          <p:cNvPr id="5122" name="Picture 2" descr="https://cdn3.volusion.com/2hew6.esfv2/v/vspfiles/photos/UC924-2T.jpg?1527830524">
+          <p:cNvPr id="2050" name="Picture 2" descr="https://www2.telenet.be/nl/business/producten-diensten/telefonie/freephone-business/_jcr_content/background_fullwidth/templatesection/section_content/grouping/grouped/tabs/tab2/content/nested_columns/parsys-0/grouping/grouped/image.img.png/1523352132415.png">
             <a:extLst>
               <a:ext uri="{FF2B5EF4-FFF2-40B4-BE49-F238E27FC236}">
-                <a16:creationId xmlns:a16="http://schemas.microsoft.com/office/drawing/2014/main" id="{BB1D590D-0A12-44C5-BBF1-363CCDDC5AAA}"/>
+                <a16:creationId xmlns:a16="http://schemas.microsoft.com/office/drawing/2014/main" id="{74114D5F-305F-46B9-9252-D908B50B0B33}"/>
               </a:ext>
             </a:extLst>
           </p:cNvPr>
@@ -9305,8 +9372,8 @@
         </p:blipFill>
         <p:spPr bwMode="auto">
           <a:xfrm>
-            <a:off x="8639153" y="3090276"/>
-            <a:ext cx="3095625" cy="3095625"/>
+            <a:off x="9195688" y="3596218"/>
+            <a:ext cx="2381250" cy="2381250"/>
           </a:xfrm>
           <a:prstGeom prst="rect">
             <a:avLst/>
@@ -11843,6 +11910,61 @@
                 <a:latin typeface="Segoe UI" panose="020B0502040204020203" pitchFamily="34" charset="0"/>
                 <a:cs typeface="Segoe UI" panose="020B0502040204020203" pitchFamily="34" charset="0"/>
               </a:rPr>
+              <a:t>: 5 </a:t>
+            </a:r>
+            <a:r>
+              <a:rPr lang="en-GB" dirty="0" err="1">
+                <a:latin typeface="Segoe UI" panose="020B0502040204020203" pitchFamily="34" charset="0"/>
+                <a:cs typeface="Segoe UI" panose="020B0502040204020203" pitchFamily="34" charset="0"/>
+              </a:rPr>
+              <a:t>werkdagen</a:t>
+            </a:r>
+            <a:r>
+              <a:rPr lang="en-GB" dirty="0">
+                <a:latin typeface="Segoe UI" panose="020B0502040204020203" pitchFamily="34" charset="0"/>
+                <a:cs typeface="Segoe UI" panose="020B0502040204020203" pitchFamily="34" charset="0"/>
+              </a:rPr>
+              <a:t> (40 </a:t>
+            </a:r>
+            <a:r>
+              <a:rPr lang="en-GB" dirty="0" err="1">
+                <a:latin typeface="Segoe UI" panose="020B0502040204020203" pitchFamily="34" charset="0"/>
+                <a:cs typeface="Segoe UI" panose="020B0502040204020203" pitchFamily="34" charset="0"/>
+              </a:rPr>
+              <a:t>uur</a:t>
+            </a:r>
+            <a:r>
+              <a:rPr lang="en-GB" dirty="0">
+                <a:latin typeface="Segoe UI" panose="020B0502040204020203" pitchFamily="34" charset="0"/>
+                <a:cs typeface="Segoe UI" panose="020B0502040204020203" pitchFamily="34" charset="0"/>
+              </a:rPr>
+              <a:t>)</a:t>
+            </a:r>
+          </a:p>
+          <a:p>
+            <a:pPr>
+              <a:buFont typeface="Arial" panose="020B0604020202020204" pitchFamily="34" charset="0"/>
+              <a:buChar char="•"/>
+            </a:pPr>
+            <a:r>
+              <a:rPr lang="en-GB" dirty="0">
+                <a:latin typeface="Segoe UI" panose="020B0502040204020203" pitchFamily="34" charset="0"/>
+                <a:cs typeface="Segoe UI" panose="020B0502040204020203" pitchFamily="34" charset="0"/>
+              </a:rPr>
+              <a:t> </a:t>
+            </a:r>
+            <a:r>
+              <a:rPr lang="en-GB" dirty="0" err="1">
+                <a:latin typeface="Segoe UI" panose="020B0502040204020203" pitchFamily="34" charset="0"/>
+                <a:cs typeface="Segoe UI" panose="020B0502040204020203" pitchFamily="34" charset="0"/>
+              </a:rPr>
+              <a:t>Opleiding</a:t>
+            </a:r>
+            <a:r>
+              <a:rPr lang="en-GB" dirty="0">
+                <a:latin typeface="Segoe UI" panose="020B0502040204020203" pitchFamily="34" charset="0"/>
+                <a:cs typeface="Segoe UI" panose="020B0502040204020203" pitchFamily="34" charset="0"/>
+              </a:rPr>
               <a:t>: 2 </a:t>
             </a:r>
             <a:r>
@@ -11850,7 +11972,7 @@
                 <a:latin typeface="Segoe UI" panose="020B0502040204020203" pitchFamily="34" charset="0"/>
                 <a:cs typeface="Segoe UI" panose="020B0502040204020203" pitchFamily="34" charset="0"/>
               </a:rPr>
-              <a:t>werkdagen</a:t>
+              <a:t>dagen</a:t>
             </a:r>
             <a:r>
               <a:rPr lang="en-GB" dirty="0">
@@ -12118,7 +12240,7 @@
                 <a:latin typeface="Segoe UI" panose="020B0502040204020203" pitchFamily="34" charset="0"/>
                 <a:cs typeface="Segoe UI" panose="020B0502040204020203" pitchFamily="34" charset="0"/>
               </a:rPr>
-              <a:t>Totaal zonder BTW		 € 15,561.29 </a:t>
+              <a:t>Totaal zonder BTW		 € 18,573.79 	</a:t>
             </a:r>
           </a:p>
           <a:p>
@@ -12127,7 +12249,7 @@
                 <a:latin typeface="Segoe UI" panose="020B0502040204020203" pitchFamily="34" charset="0"/>
                 <a:cs typeface="Segoe UI" panose="020B0502040204020203" pitchFamily="34" charset="0"/>
               </a:rPr>
-              <a:t>BTW bedrag 21%		 € 3,267.87 </a:t>
+              <a:t>BTW bedrag 21%		 € 3,900.50 </a:t>
             </a:r>
           </a:p>
           <a:p>
@@ -12136,7 +12258,7 @@
                 <a:latin typeface="Segoe UI" panose="020B0502040204020203" pitchFamily="34" charset="0"/>
                 <a:cs typeface="Segoe UI" panose="020B0502040204020203" pitchFamily="34" charset="0"/>
               </a:rPr>
-              <a:t>Eindtotaal			 € 18,829.16 </a:t>
+              <a:t>Eindtotaal			 € 22,474.29 </a:t>
             </a:r>
           </a:p>
           <a:p>

</xml_diff>

<commit_message>
Presentaties edit order - config
</commit_message>
<xml_diff>
--- a/opdracht03/G24/Voorstelling G24.pptx
+++ b/opdracht03/G24/Voorstelling G24.pptx
@@ -5,7 +5,7 @@
     <p:sldMasterId id="2147483762" r:id="rId1"/>
   </p:sldMasterIdLst>
   <p:notesMasterIdLst>
-    <p:notesMasterId r:id="rId38"/>
+    <p:notesMasterId r:id="rId39"/>
   </p:notesMasterIdLst>
   <p:sldIdLst>
     <p:sldId id="258" r:id="rId2"/>
@@ -21,29 +21,30 @@
     <p:sldId id="290" r:id="rId12"/>
     <p:sldId id="291" r:id="rId13"/>
     <p:sldId id="292" r:id="rId14"/>
-    <p:sldId id="265" r:id="rId15"/>
-    <p:sldId id="266" r:id="rId16"/>
-    <p:sldId id="260" r:id="rId17"/>
-    <p:sldId id="267" r:id="rId18"/>
-    <p:sldId id="268" r:id="rId19"/>
-    <p:sldId id="269" r:id="rId20"/>
-    <p:sldId id="270" r:id="rId21"/>
-    <p:sldId id="281" r:id="rId22"/>
-    <p:sldId id="271" r:id="rId23"/>
-    <p:sldId id="272" r:id="rId24"/>
-    <p:sldId id="273" r:id="rId25"/>
-    <p:sldId id="284" r:id="rId26"/>
-    <p:sldId id="274" r:id="rId27"/>
-    <p:sldId id="261" r:id="rId28"/>
-    <p:sldId id="275" r:id="rId29"/>
-    <p:sldId id="276" r:id="rId30"/>
-    <p:sldId id="277" r:id="rId31"/>
-    <p:sldId id="278" r:id="rId32"/>
-    <p:sldId id="279" r:id="rId33"/>
-    <p:sldId id="280" r:id="rId34"/>
-    <p:sldId id="282" r:id="rId35"/>
-    <p:sldId id="293" r:id="rId36"/>
-    <p:sldId id="283" r:id="rId37"/>
+    <p:sldId id="294" r:id="rId15"/>
+    <p:sldId id="265" r:id="rId16"/>
+    <p:sldId id="266" r:id="rId17"/>
+    <p:sldId id="260" r:id="rId18"/>
+    <p:sldId id="267" r:id="rId19"/>
+    <p:sldId id="268" r:id="rId20"/>
+    <p:sldId id="269" r:id="rId21"/>
+    <p:sldId id="270" r:id="rId22"/>
+    <p:sldId id="281" r:id="rId23"/>
+    <p:sldId id="271" r:id="rId24"/>
+    <p:sldId id="272" r:id="rId25"/>
+    <p:sldId id="273" r:id="rId26"/>
+    <p:sldId id="284" r:id="rId27"/>
+    <p:sldId id="274" r:id="rId28"/>
+    <p:sldId id="261" r:id="rId29"/>
+    <p:sldId id="275" r:id="rId30"/>
+    <p:sldId id="276" r:id="rId31"/>
+    <p:sldId id="277" r:id="rId32"/>
+    <p:sldId id="278" r:id="rId33"/>
+    <p:sldId id="279" r:id="rId34"/>
+    <p:sldId id="280" r:id="rId35"/>
+    <p:sldId id="282" r:id="rId36"/>
+    <p:sldId id="293" r:id="rId37"/>
+    <p:sldId id="283" r:id="rId38"/>
   </p:sldIdLst>
   <p:sldSz cx="12192000" cy="6858000"/>
   <p:notesSz cx="6858000" cy="9144000"/>
@@ -232,7 +233,7 @@
           <a:p>
             <a:fld id="{8795BD13-A9C0-4833-9A37-05C32DB0F83C}" type="datetimeFigureOut">
               <a:rPr lang="en-GB" smtClean="0"/>
-              <a:t>28/04/2019</a:t>
+              <a:t>05/05/2019</a:t>
             </a:fld>
             <a:endParaRPr lang="en-GB"/>
           </a:p>
@@ -726,7 +727,7 @@
           <a:p>
             <a:fld id="{76FCA46D-55D7-4D00-B507-F3F903E4163B}" type="datetimeFigureOut">
               <a:rPr lang="en-GB" smtClean="0"/>
-              <a:t>28/04/2019</a:t>
+              <a:t>05/05/2019</a:t>
             </a:fld>
             <a:endParaRPr lang="en-GB"/>
           </a:p>
@@ -937,7 +938,7 @@
           <a:p>
             <a:fld id="{76FCA46D-55D7-4D00-B507-F3F903E4163B}" type="datetimeFigureOut">
               <a:rPr lang="en-GB" smtClean="0"/>
-              <a:t>28/04/2019</a:t>
+              <a:t>05/05/2019</a:t>
             </a:fld>
             <a:endParaRPr lang="en-GB"/>
           </a:p>
@@ -1196,7 +1197,7 @@
           <a:p>
             <a:fld id="{76FCA46D-55D7-4D00-B507-F3F903E4163B}" type="datetimeFigureOut">
               <a:rPr lang="en-GB" smtClean="0"/>
-              <a:t>28/04/2019</a:t>
+              <a:t>05/05/2019</a:t>
             </a:fld>
             <a:endParaRPr lang="en-GB"/>
           </a:p>
@@ -1369,7 +1370,7 @@
           <a:p>
             <a:fld id="{76FCA46D-55D7-4D00-B507-F3F903E4163B}" type="datetimeFigureOut">
               <a:rPr lang="en-GB" smtClean="0"/>
-              <a:t>28/04/2019</a:t>
+              <a:t>05/05/2019</a:t>
             </a:fld>
             <a:endParaRPr lang="en-GB"/>
           </a:p>
@@ -1715,7 +1716,7 @@
           <a:p>
             <a:fld id="{76FCA46D-55D7-4D00-B507-F3F903E4163B}" type="datetimeFigureOut">
               <a:rPr lang="en-GB" smtClean="0"/>
-              <a:t>28/04/2019</a:t>
+              <a:t>05/05/2019</a:t>
             </a:fld>
             <a:endParaRPr lang="en-GB"/>
           </a:p>
@@ -1993,7 +1994,7 @@
           <a:p>
             <a:fld id="{76FCA46D-55D7-4D00-B507-F3F903E4163B}" type="datetimeFigureOut">
               <a:rPr lang="en-GB" smtClean="0"/>
-              <a:t>28/04/2019</a:t>
+              <a:t>05/05/2019</a:t>
             </a:fld>
             <a:endParaRPr lang="en-GB"/>
           </a:p>
@@ -2375,7 +2376,7 @@
           <a:p>
             <a:fld id="{76FCA46D-55D7-4D00-B507-F3F903E4163B}" type="datetimeFigureOut">
               <a:rPr lang="en-GB" smtClean="0"/>
-              <a:t>28/04/2019</a:t>
+              <a:t>05/05/2019</a:t>
             </a:fld>
             <a:endParaRPr lang="en-GB"/>
           </a:p>
@@ -2496,7 +2497,7 @@
           <a:p>
             <a:fld id="{76FCA46D-55D7-4D00-B507-F3F903E4163B}" type="datetimeFigureOut">
               <a:rPr lang="en-GB" smtClean="0"/>
-              <a:t>28/04/2019</a:t>
+              <a:t>05/05/2019</a:t>
             </a:fld>
             <a:endParaRPr lang="en-GB"/>
           </a:p>
@@ -2670,7 +2671,7 @@
           <a:p>
             <a:fld id="{76FCA46D-55D7-4D00-B507-F3F903E4163B}" type="datetimeFigureOut">
               <a:rPr lang="en-GB" smtClean="0"/>
-              <a:t>28/04/2019</a:t>
+              <a:t>05/05/2019</a:t>
             </a:fld>
             <a:endParaRPr lang="en-GB"/>
           </a:p>
@@ -3027,7 +3028,7 @@
           <a:p>
             <a:fld id="{76FCA46D-55D7-4D00-B507-F3F903E4163B}" type="datetimeFigureOut">
               <a:rPr lang="en-GB" smtClean="0"/>
-              <a:t>28/04/2019</a:t>
+              <a:t>05/05/2019</a:t>
             </a:fld>
             <a:endParaRPr lang="en-GB"/>
           </a:p>
@@ -3407,7 +3408,7 @@
           <a:p>
             <a:fld id="{76FCA46D-55D7-4D00-B507-F3F903E4163B}" type="datetimeFigureOut">
               <a:rPr lang="en-GB" smtClean="0"/>
-              <a:t>28/04/2019</a:t>
+              <a:t>05/05/2019</a:t>
             </a:fld>
             <a:endParaRPr lang="en-GB"/>
           </a:p>
@@ -3697,7 +3698,7 @@
           <a:p>
             <a:fld id="{76FCA46D-55D7-4D00-B507-F3F903E4163B}" type="datetimeFigureOut">
               <a:rPr lang="en-GB" smtClean="0"/>
-              <a:t>28/04/2019</a:t>
+              <a:t>05/05/2019</a:t>
             </a:fld>
             <a:endParaRPr lang="en-GB"/>
           </a:p>
@@ -5768,6 +5769,512 @@
           <p:cNvPr id="2" name="Titel 1">
             <a:extLst>
               <a:ext uri="{FF2B5EF4-FFF2-40B4-BE49-F238E27FC236}">
+                <a16:creationId xmlns:a16="http://schemas.microsoft.com/office/drawing/2014/main" id="{D8072935-77FD-4B59-9730-69DFA4AC0C57}"/>
+              </a:ext>
+            </a:extLst>
+          </p:cNvPr>
+          <p:cNvSpPr>
+            <a:spLocks noGrp="1"/>
+          </p:cNvSpPr>
+          <p:nvPr>
+            <p:ph type="title"/>
+          </p:nvPr>
+        </p:nvSpPr>
+        <p:spPr/>
+        <p:txBody>
+          <a:bodyPr/>
+          <a:lstStyle/>
+          <a:p>
+            <a:r>
+              <a:rPr lang="en-GB" dirty="0" err="1">
+                <a:latin typeface="Segoe UI" panose="020B0502040204020203" pitchFamily="34" charset="0"/>
+                <a:cs typeface="Segoe UI" panose="020B0502040204020203" pitchFamily="34" charset="0"/>
+              </a:rPr>
+              <a:t>Vergelijking</a:t>
+            </a:r>
+            <a:endParaRPr lang="en-GB" dirty="0">
+              <a:latin typeface="Segoe UI" panose="020B0502040204020203" pitchFamily="34" charset="0"/>
+              <a:cs typeface="Segoe UI" panose="020B0502040204020203" pitchFamily="34" charset="0"/>
+            </a:endParaRPr>
+          </a:p>
+        </p:txBody>
+      </p:sp>
+      <p:sp>
+        <p:nvSpPr>
+          <p:cNvPr id="4" name="Tijdelijke aanduiding voor tekst 3">
+            <a:extLst>
+              <a:ext uri="{FF2B5EF4-FFF2-40B4-BE49-F238E27FC236}">
+                <a16:creationId xmlns:a16="http://schemas.microsoft.com/office/drawing/2014/main" id="{6DAFED22-3513-4370-A70C-8D6FE2EBFA94}"/>
+              </a:ext>
+            </a:extLst>
+          </p:cNvPr>
+          <p:cNvSpPr>
+            <a:spLocks noGrp="1"/>
+          </p:cNvSpPr>
+          <p:nvPr>
+            <p:ph type="body" idx="1"/>
+          </p:nvPr>
+        </p:nvSpPr>
+        <p:spPr/>
+        <p:txBody>
+          <a:bodyPr/>
+          <a:lstStyle/>
+          <a:p>
+            <a:r>
+              <a:rPr lang="en-GB" dirty="0" err="1">
+                <a:latin typeface="Segoe UI" panose="020B0502040204020203" pitchFamily="34" charset="0"/>
+                <a:cs typeface="Segoe UI" panose="020B0502040204020203" pitchFamily="34" charset="0"/>
+              </a:rPr>
+              <a:t>Aanbevolen</a:t>
+            </a:r>
+            <a:endParaRPr lang="en-GB" dirty="0">
+              <a:latin typeface="Segoe UI" panose="020B0502040204020203" pitchFamily="34" charset="0"/>
+              <a:cs typeface="Segoe UI" panose="020B0502040204020203" pitchFamily="34" charset="0"/>
+            </a:endParaRPr>
+          </a:p>
+        </p:txBody>
+      </p:sp>
+      <p:sp>
+        <p:nvSpPr>
+          <p:cNvPr id="5" name="Tijdelijke aanduiding voor inhoud 4">
+            <a:extLst>
+              <a:ext uri="{FF2B5EF4-FFF2-40B4-BE49-F238E27FC236}">
+                <a16:creationId xmlns:a16="http://schemas.microsoft.com/office/drawing/2014/main" id="{FDB3AD0C-4196-4516-B0AC-66BC45B34E28}"/>
+              </a:ext>
+            </a:extLst>
+          </p:cNvPr>
+          <p:cNvSpPr>
+            <a:spLocks noGrp="1"/>
+          </p:cNvSpPr>
+          <p:nvPr>
+            <p:ph sz="half" idx="2"/>
+          </p:nvPr>
+        </p:nvSpPr>
+        <p:spPr/>
+        <p:txBody>
+          <a:bodyPr/>
+          <a:lstStyle/>
+          <a:p>
+            <a:pPr>
+              <a:buFont typeface="Arial" panose="020B0604020202020204" pitchFamily="34" charset="0"/>
+              <a:buChar char="•"/>
+            </a:pPr>
+            <a:r>
+              <a:rPr lang="en-GB" dirty="0">
+                <a:latin typeface="Segoe UI" panose="020B0502040204020203" pitchFamily="34" charset="0"/>
+                <a:cs typeface="Segoe UI" panose="020B0502040204020203" pitchFamily="34" charset="0"/>
+              </a:rPr>
+              <a:t> Router </a:t>
+            </a:r>
+            <a:r>
+              <a:rPr lang="en-GB" dirty="0" err="1">
+                <a:latin typeface="Segoe UI" panose="020B0502040204020203" pitchFamily="34" charset="0"/>
+                <a:cs typeface="Segoe UI" panose="020B0502040204020203" pitchFamily="34" charset="0"/>
+              </a:rPr>
+              <a:t>volledig</a:t>
+            </a:r>
+            <a:r>
+              <a:rPr lang="en-GB" dirty="0">
+                <a:latin typeface="Segoe UI" panose="020B0502040204020203" pitchFamily="34" charset="0"/>
+                <a:cs typeface="Segoe UI" panose="020B0502040204020203" pitchFamily="34" charset="0"/>
+              </a:rPr>
+              <a:t> </a:t>
+            </a:r>
+            <a:r>
+              <a:rPr lang="en-GB" dirty="0" err="1">
+                <a:latin typeface="Segoe UI" panose="020B0502040204020203" pitchFamily="34" charset="0"/>
+                <a:cs typeface="Segoe UI" panose="020B0502040204020203" pitchFamily="34" charset="0"/>
+              </a:rPr>
+              <a:t>configureerbaar</a:t>
+            </a:r>
+            <a:endParaRPr lang="en-GB" dirty="0">
+              <a:latin typeface="Segoe UI" panose="020B0502040204020203" pitchFamily="34" charset="0"/>
+              <a:cs typeface="Segoe UI" panose="020B0502040204020203" pitchFamily="34" charset="0"/>
+            </a:endParaRPr>
+          </a:p>
+          <a:p>
+            <a:pPr>
+              <a:buFont typeface="Arial" panose="020B0604020202020204" pitchFamily="34" charset="0"/>
+              <a:buChar char="•"/>
+            </a:pPr>
+            <a:r>
+              <a:rPr lang="en-GB" dirty="0">
+                <a:latin typeface="Segoe UI" panose="020B0502040204020203" pitchFamily="34" charset="0"/>
+                <a:cs typeface="Segoe UI" panose="020B0502040204020203" pitchFamily="34" charset="0"/>
+              </a:rPr>
+              <a:t> Access Point </a:t>
+            </a:r>
+            <a:r>
+              <a:rPr lang="en-GB" dirty="0" err="1">
+                <a:latin typeface="Segoe UI" panose="020B0502040204020203" pitchFamily="34" charset="0"/>
+                <a:cs typeface="Segoe UI" panose="020B0502040204020203" pitchFamily="34" charset="0"/>
+              </a:rPr>
+              <a:t>volledig</a:t>
+            </a:r>
+            <a:r>
+              <a:rPr lang="en-GB" dirty="0">
+                <a:latin typeface="Segoe UI" panose="020B0502040204020203" pitchFamily="34" charset="0"/>
+                <a:cs typeface="Segoe UI" panose="020B0502040204020203" pitchFamily="34" charset="0"/>
+              </a:rPr>
+              <a:t> </a:t>
+            </a:r>
+            <a:r>
+              <a:rPr lang="en-GB" dirty="0" err="1">
+                <a:latin typeface="Segoe UI" panose="020B0502040204020203" pitchFamily="34" charset="0"/>
+                <a:cs typeface="Segoe UI" panose="020B0502040204020203" pitchFamily="34" charset="0"/>
+              </a:rPr>
+              <a:t>configureerbaar</a:t>
+            </a:r>
+            <a:endParaRPr lang="en-GB" dirty="0">
+              <a:latin typeface="Segoe UI" panose="020B0502040204020203" pitchFamily="34" charset="0"/>
+              <a:cs typeface="Segoe UI" panose="020B0502040204020203" pitchFamily="34" charset="0"/>
+            </a:endParaRPr>
+          </a:p>
+          <a:p>
+            <a:pPr>
+              <a:buFont typeface="Arial" panose="020B0604020202020204" pitchFamily="34" charset="0"/>
+              <a:buChar char="•"/>
+            </a:pPr>
+            <a:r>
+              <a:rPr lang="en-GB" dirty="0">
+                <a:latin typeface="Segoe UI" panose="020B0502040204020203" pitchFamily="34" charset="0"/>
+                <a:cs typeface="Segoe UI" panose="020B0502040204020203" pitchFamily="34" charset="0"/>
+              </a:rPr>
+              <a:t> </a:t>
+            </a:r>
+            <a:r>
+              <a:rPr lang="en-GB" dirty="0" err="1">
+                <a:latin typeface="Segoe UI" panose="020B0502040204020203" pitchFamily="34" charset="0"/>
+                <a:cs typeface="Segoe UI" panose="020B0502040204020203" pitchFamily="34" charset="0"/>
+              </a:rPr>
+              <a:t>Uitgebreidere</a:t>
+            </a:r>
+            <a:r>
+              <a:rPr lang="en-GB" dirty="0">
+                <a:latin typeface="Segoe UI" panose="020B0502040204020203" pitchFamily="34" charset="0"/>
+                <a:cs typeface="Segoe UI" panose="020B0502040204020203" pitchFamily="34" charset="0"/>
+              </a:rPr>
+              <a:t> </a:t>
+            </a:r>
+            <a:r>
+              <a:rPr lang="en-GB" dirty="0" err="1">
+                <a:latin typeface="Segoe UI" panose="020B0502040204020203" pitchFamily="34" charset="0"/>
+                <a:cs typeface="Segoe UI" panose="020B0502040204020203" pitchFamily="34" charset="0"/>
+              </a:rPr>
+              <a:t>beveiliging</a:t>
+            </a:r>
+            <a:endParaRPr lang="en-GB" dirty="0">
+              <a:latin typeface="Segoe UI" panose="020B0502040204020203" pitchFamily="34" charset="0"/>
+              <a:cs typeface="Segoe UI" panose="020B0502040204020203" pitchFamily="34" charset="0"/>
+            </a:endParaRPr>
+          </a:p>
+          <a:p>
+            <a:pPr>
+              <a:buFont typeface="Arial" panose="020B0604020202020204" pitchFamily="34" charset="0"/>
+              <a:buChar char="•"/>
+            </a:pPr>
+            <a:r>
+              <a:rPr lang="en-GB" dirty="0">
+                <a:latin typeface="Segoe UI" panose="020B0502040204020203" pitchFamily="34" charset="0"/>
+                <a:cs typeface="Segoe UI" panose="020B0502040204020203" pitchFamily="34" charset="0"/>
+              </a:rPr>
+              <a:t> </a:t>
+            </a:r>
+            <a:r>
+              <a:rPr lang="nl-BE" dirty="0">
+                <a:latin typeface="Segoe UI" panose="020B0502040204020203" pitchFamily="34" charset="0"/>
+                <a:cs typeface="Segoe UI" panose="020B0502040204020203" pitchFamily="34" charset="0"/>
+              </a:rPr>
+              <a:t>Kortsluitingsbestendig</a:t>
+            </a:r>
+            <a:endParaRPr lang="en-GB" dirty="0">
+              <a:latin typeface="Segoe UI" panose="020B0502040204020203" pitchFamily="34" charset="0"/>
+              <a:cs typeface="Segoe UI" panose="020B0502040204020203" pitchFamily="34" charset="0"/>
+            </a:endParaRPr>
+          </a:p>
+          <a:p>
+            <a:pPr>
+              <a:buFont typeface="Arial" panose="020B0604020202020204" pitchFamily="34" charset="0"/>
+              <a:buChar char="•"/>
+            </a:pPr>
+            <a:endParaRPr lang="en-GB" dirty="0">
+              <a:latin typeface="Segoe UI" panose="020B0502040204020203" pitchFamily="34" charset="0"/>
+              <a:cs typeface="Segoe UI" panose="020B0502040204020203" pitchFamily="34" charset="0"/>
+            </a:endParaRPr>
+          </a:p>
+          <a:p>
+            <a:pPr>
+              <a:buFont typeface="Arial" panose="020B0604020202020204" pitchFamily="34" charset="0"/>
+              <a:buChar char="•"/>
+            </a:pPr>
+            <a:r>
+              <a:rPr lang="en-GB" dirty="0">
+                <a:latin typeface="Segoe UI" panose="020B0502040204020203" pitchFamily="34" charset="0"/>
+                <a:cs typeface="Segoe UI" panose="020B0502040204020203" pitchFamily="34" charset="0"/>
+              </a:rPr>
+              <a:t> </a:t>
+            </a:r>
+            <a:r>
+              <a:rPr lang="en-GB" dirty="0" err="1">
+                <a:latin typeface="Segoe UI" panose="020B0502040204020203" pitchFamily="34" charset="0"/>
+                <a:cs typeface="Segoe UI" panose="020B0502040204020203" pitchFamily="34" charset="0"/>
+              </a:rPr>
+              <a:t>Prijs</a:t>
+            </a:r>
+            <a:r>
+              <a:rPr lang="en-GB" dirty="0">
+                <a:latin typeface="Segoe UI" panose="020B0502040204020203" pitchFamily="34" charset="0"/>
+                <a:cs typeface="Segoe UI" panose="020B0502040204020203" pitchFamily="34" charset="0"/>
+              </a:rPr>
+              <a:t>:  € 305.20</a:t>
+            </a:r>
+          </a:p>
+        </p:txBody>
+      </p:sp>
+      <p:sp>
+        <p:nvSpPr>
+          <p:cNvPr id="6" name="Tijdelijke aanduiding voor tekst 5">
+            <a:extLst>
+              <a:ext uri="{FF2B5EF4-FFF2-40B4-BE49-F238E27FC236}">
+                <a16:creationId xmlns:a16="http://schemas.microsoft.com/office/drawing/2014/main" id="{951FE8C3-4234-42BB-A14F-254C82728272}"/>
+              </a:ext>
+            </a:extLst>
+          </p:cNvPr>
+          <p:cNvSpPr>
+            <a:spLocks noGrp="1"/>
+          </p:cNvSpPr>
+          <p:nvPr>
+            <p:ph type="body" sz="quarter" idx="3"/>
+          </p:nvPr>
+        </p:nvSpPr>
+        <p:spPr/>
+        <p:txBody>
+          <a:bodyPr/>
+          <a:lstStyle/>
+          <a:p>
+            <a:r>
+              <a:rPr lang="en-GB" dirty="0">
+                <a:latin typeface="Segoe UI" panose="020B0502040204020203" pitchFamily="34" charset="0"/>
+                <a:cs typeface="Segoe UI" panose="020B0502040204020203" pitchFamily="34" charset="0"/>
+              </a:rPr>
+              <a:t>Budget</a:t>
+            </a:r>
+          </a:p>
+        </p:txBody>
+      </p:sp>
+      <p:sp>
+        <p:nvSpPr>
+          <p:cNvPr id="7" name="Tijdelijke aanduiding voor inhoud 6">
+            <a:extLst>
+              <a:ext uri="{FF2B5EF4-FFF2-40B4-BE49-F238E27FC236}">
+                <a16:creationId xmlns:a16="http://schemas.microsoft.com/office/drawing/2014/main" id="{92001AF8-5F1C-408F-BE8F-1471C2BF467F}"/>
+              </a:ext>
+            </a:extLst>
+          </p:cNvPr>
+          <p:cNvSpPr>
+            <a:spLocks noGrp="1"/>
+          </p:cNvSpPr>
+          <p:nvPr>
+            <p:ph sz="quarter" idx="4"/>
+          </p:nvPr>
+        </p:nvSpPr>
+        <p:spPr/>
+        <p:txBody>
+          <a:bodyPr/>
+          <a:lstStyle/>
+          <a:p>
+            <a:pPr>
+              <a:buFont typeface="Arial" panose="020B0604020202020204" pitchFamily="34" charset="0"/>
+              <a:buChar char="•"/>
+            </a:pPr>
+            <a:r>
+              <a:rPr lang="en-GB" dirty="0">
+                <a:latin typeface="Segoe UI" panose="020B0502040204020203" pitchFamily="34" charset="0"/>
+                <a:cs typeface="Segoe UI" panose="020B0502040204020203" pitchFamily="34" charset="0"/>
+              </a:rPr>
+              <a:t> </a:t>
+            </a:r>
+            <a:r>
+              <a:rPr lang="en-GB" dirty="0" err="1">
+                <a:latin typeface="Segoe UI" panose="020B0502040204020203" pitchFamily="34" charset="0"/>
+                <a:cs typeface="Segoe UI" panose="020B0502040204020203" pitchFamily="34" charset="0"/>
+              </a:rPr>
+              <a:t>Beperkte</a:t>
+            </a:r>
+            <a:r>
+              <a:rPr lang="en-GB" dirty="0">
+                <a:latin typeface="Segoe UI" panose="020B0502040204020203" pitchFamily="34" charset="0"/>
+                <a:cs typeface="Segoe UI" panose="020B0502040204020203" pitchFamily="34" charset="0"/>
+              </a:rPr>
+              <a:t> </a:t>
+            </a:r>
+            <a:r>
+              <a:rPr lang="en-GB" dirty="0" err="1">
+                <a:latin typeface="Segoe UI" panose="020B0502040204020203" pitchFamily="34" charset="0"/>
+                <a:cs typeface="Segoe UI" panose="020B0502040204020203" pitchFamily="34" charset="0"/>
+              </a:rPr>
+              <a:t>configuratie</a:t>
+            </a:r>
+            <a:r>
+              <a:rPr lang="en-GB" dirty="0">
+                <a:latin typeface="Segoe UI" panose="020B0502040204020203" pitchFamily="34" charset="0"/>
+                <a:cs typeface="Segoe UI" panose="020B0502040204020203" pitchFamily="34" charset="0"/>
+              </a:rPr>
+              <a:t> op router</a:t>
+            </a:r>
+          </a:p>
+          <a:p>
+            <a:pPr>
+              <a:buFont typeface="Arial" panose="020B0604020202020204" pitchFamily="34" charset="0"/>
+              <a:buChar char="•"/>
+            </a:pPr>
+            <a:r>
+              <a:rPr lang="en-GB" dirty="0">
+                <a:latin typeface="Segoe UI" panose="020B0502040204020203" pitchFamily="34" charset="0"/>
+                <a:cs typeface="Segoe UI" panose="020B0502040204020203" pitchFamily="34" charset="0"/>
+              </a:rPr>
+              <a:t> Minder </a:t>
+            </a:r>
+            <a:r>
+              <a:rPr lang="en-GB" dirty="0" err="1">
+                <a:latin typeface="Segoe UI" panose="020B0502040204020203" pitchFamily="34" charset="0"/>
+                <a:cs typeface="Segoe UI" panose="020B0502040204020203" pitchFamily="34" charset="0"/>
+              </a:rPr>
+              <a:t>switchpoorten</a:t>
+            </a:r>
+            <a:endParaRPr lang="en-GB" dirty="0">
+              <a:latin typeface="Segoe UI" panose="020B0502040204020203" pitchFamily="34" charset="0"/>
+              <a:cs typeface="Segoe UI" panose="020B0502040204020203" pitchFamily="34" charset="0"/>
+            </a:endParaRPr>
+          </a:p>
+          <a:p>
+            <a:pPr>
+              <a:buFont typeface="Arial" panose="020B0604020202020204" pitchFamily="34" charset="0"/>
+              <a:buChar char="•"/>
+            </a:pPr>
+            <a:r>
+              <a:rPr lang="en-GB" dirty="0">
+                <a:latin typeface="Segoe UI" panose="020B0502040204020203" pitchFamily="34" charset="0"/>
+                <a:cs typeface="Segoe UI" panose="020B0502040204020203" pitchFamily="34" charset="0"/>
+              </a:rPr>
+              <a:t> Access Point </a:t>
+            </a:r>
+            <a:r>
+              <a:rPr lang="en-GB" dirty="0" err="1">
+                <a:latin typeface="Segoe UI" panose="020B0502040204020203" pitchFamily="34" charset="0"/>
+                <a:cs typeface="Segoe UI" panose="020B0502040204020203" pitchFamily="34" charset="0"/>
+              </a:rPr>
+              <a:t>beperkt</a:t>
+            </a:r>
+            <a:r>
+              <a:rPr lang="en-GB" dirty="0">
+                <a:latin typeface="Segoe UI" panose="020B0502040204020203" pitchFamily="34" charset="0"/>
+                <a:cs typeface="Segoe UI" panose="020B0502040204020203" pitchFamily="34" charset="0"/>
+              </a:rPr>
+              <a:t> in </a:t>
+            </a:r>
+            <a:r>
+              <a:rPr lang="en-GB" dirty="0" err="1">
+                <a:latin typeface="Segoe UI" panose="020B0502040204020203" pitchFamily="34" charset="0"/>
+                <a:cs typeface="Segoe UI" panose="020B0502040204020203" pitchFamily="34" charset="0"/>
+              </a:rPr>
+              <a:t>configuratie</a:t>
+            </a:r>
+            <a:endParaRPr lang="en-GB" dirty="0">
+              <a:latin typeface="Segoe UI" panose="020B0502040204020203" pitchFamily="34" charset="0"/>
+              <a:cs typeface="Segoe UI" panose="020B0502040204020203" pitchFamily="34" charset="0"/>
+            </a:endParaRPr>
+          </a:p>
+          <a:p>
+            <a:pPr>
+              <a:buFont typeface="Arial" panose="020B0604020202020204" pitchFamily="34" charset="0"/>
+              <a:buChar char="•"/>
+            </a:pPr>
+            <a:r>
+              <a:rPr lang="en-GB" dirty="0">
+                <a:latin typeface="Segoe UI" panose="020B0502040204020203" pitchFamily="34" charset="0"/>
+                <a:cs typeface="Segoe UI" panose="020B0502040204020203" pitchFamily="34" charset="0"/>
+              </a:rPr>
+              <a:t> Compacter</a:t>
+            </a:r>
+          </a:p>
+          <a:p>
+            <a:pPr>
+              <a:buFont typeface="Arial" panose="020B0604020202020204" pitchFamily="34" charset="0"/>
+              <a:buChar char="•"/>
+            </a:pPr>
+            <a:endParaRPr lang="en-GB" dirty="0">
+              <a:latin typeface="Segoe UI" panose="020B0502040204020203" pitchFamily="34" charset="0"/>
+              <a:cs typeface="Segoe UI" panose="020B0502040204020203" pitchFamily="34" charset="0"/>
+            </a:endParaRPr>
+          </a:p>
+          <a:p>
+            <a:pPr>
+              <a:buFont typeface="Arial" panose="020B0604020202020204" pitchFamily="34" charset="0"/>
+              <a:buChar char="•"/>
+            </a:pPr>
+            <a:r>
+              <a:rPr lang="en-GB" dirty="0">
+                <a:latin typeface="Segoe UI" panose="020B0502040204020203" pitchFamily="34" charset="0"/>
+                <a:cs typeface="Segoe UI" panose="020B0502040204020203" pitchFamily="34" charset="0"/>
+              </a:rPr>
+              <a:t> </a:t>
+            </a:r>
+            <a:r>
+              <a:rPr lang="en-GB" dirty="0" err="1">
+                <a:latin typeface="Segoe UI" panose="020B0502040204020203" pitchFamily="34" charset="0"/>
+                <a:cs typeface="Segoe UI" panose="020B0502040204020203" pitchFamily="34" charset="0"/>
+              </a:rPr>
+              <a:t>Prijs</a:t>
+            </a:r>
+            <a:r>
+              <a:rPr lang="en-GB" dirty="0">
+                <a:latin typeface="Segoe UI" panose="020B0502040204020203" pitchFamily="34" charset="0"/>
+                <a:cs typeface="Segoe UI" panose="020B0502040204020203" pitchFamily="34" charset="0"/>
+              </a:rPr>
+              <a:t>: €160.60</a:t>
+            </a:r>
+          </a:p>
+        </p:txBody>
+      </p:sp>
+    </p:spTree>
+    <p:extLst>
+      <p:ext uri="{BB962C8B-B14F-4D97-AF65-F5344CB8AC3E}">
+        <p14:creationId xmlns:p14="http://schemas.microsoft.com/office/powerpoint/2010/main" val="2600559136"/>
+      </p:ext>
+    </p:extLst>
+  </p:cSld>
+  <p:clrMapOvr>
+    <a:masterClrMapping/>
+  </p:clrMapOvr>
+  <p:transition>
+    <p:fade/>
+  </p:transition>
+</p:sld>
+</file>
+
+<file path=ppt/slides/slide15.xml><?xml version="1.0" encoding="utf-8"?>
+<p:sld xmlns:a="http://schemas.openxmlformats.org/drawingml/2006/main" xmlns:r="http://schemas.openxmlformats.org/officeDocument/2006/relationships" xmlns:p="http://schemas.openxmlformats.org/presentationml/2006/main">
+  <p:cSld>
+    <p:spTree>
+      <p:nvGrpSpPr>
+        <p:cNvPr id="1" name=""/>
+        <p:cNvGrpSpPr/>
+        <p:nvPr/>
+      </p:nvGrpSpPr>
+      <p:grpSpPr>
+        <a:xfrm>
+          <a:off x="0" y="0"/>
+          <a:ext cx="0" cy="0"/>
+          <a:chOff x="0" y="0"/>
+          <a:chExt cx="0" cy="0"/>
+        </a:xfrm>
+      </p:grpSpPr>
+      <p:sp>
+        <p:nvSpPr>
+          <p:cNvPr id="2" name="Titel 1">
+            <a:extLst>
+              <a:ext uri="{FF2B5EF4-FFF2-40B4-BE49-F238E27FC236}">
                 <a16:creationId xmlns:a16="http://schemas.microsoft.com/office/drawing/2014/main" id="{507F1CCA-6633-41A2-8ED2-169F30F91995}"/>
               </a:ext>
             </a:extLst>
@@ -6074,7 +6581,7 @@
 </p:sld>
 </file>
 
-<file path=ppt/slides/slide15.xml><?xml version="1.0" encoding="utf-8"?>
+<file path=ppt/slides/slide16.xml><?xml version="1.0" encoding="utf-8"?>
 <p:sld xmlns:a="http://schemas.openxmlformats.org/drawingml/2006/main" xmlns:r="http://schemas.openxmlformats.org/officeDocument/2006/relationships" xmlns:p="http://schemas.openxmlformats.org/presentationml/2006/main">
   <p:cSld>
     <p:spTree>
@@ -6384,7 +6891,7 @@
 </p:sld>
 </file>
 
-<file path=ppt/slides/slide16.xml><?xml version="1.0" encoding="utf-8"?>
+<file path=ppt/slides/slide17.xml><?xml version="1.0" encoding="utf-8"?>
 <p:sld xmlns:a="http://schemas.openxmlformats.org/drawingml/2006/main" xmlns:r="http://schemas.openxmlformats.org/officeDocument/2006/relationships" xmlns:p="http://schemas.openxmlformats.org/presentationml/2006/main">
   <p:cSld>
     <p:spTree>
@@ -6659,7 +7166,7 @@
 </p:sld>
 </file>
 
-<file path=ppt/slides/slide17.xml><?xml version="1.0" encoding="utf-8"?>
+<file path=ppt/slides/slide18.xml><?xml version="1.0" encoding="utf-8"?>
 <p:sld xmlns:a="http://schemas.openxmlformats.org/drawingml/2006/main" xmlns:r="http://schemas.openxmlformats.org/officeDocument/2006/relationships" xmlns:p="http://schemas.openxmlformats.org/presentationml/2006/main">
   <p:cSld>
     <p:spTree>
@@ -6926,7 +7433,7 @@
 </p:sld>
 </file>
 
-<file path=ppt/slides/slide18.xml><?xml version="1.0" encoding="utf-8"?>
+<file path=ppt/slides/slide19.xml><?xml version="1.0" encoding="utf-8"?>
 <p:sld xmlns:a="http://schemas.openxmlformats.org/drawingml/2006/main" xmlns:r="http://schemas.openxmlformats.org/officeDocument/2006/relationships" xmlns:p="http://schemas.openxmlformats.org/presentationml/2006/main">
   <p:cSld>
     <p:spTree>
@@ -7230,7 +7737,255 @@
 </p:sld>
 </file>
 
-<file path=ppt/slides/slide19.xml><?xml version="1.0" encoding="utf-8"?>
+<file path=ppt/slides/slide2.xml><?xml version="1.0" encoding="utf-8"?>
+<p:sld xmlns:a="http://schemas.openxmlformats.org/drawingml/2006/main" xmlns:r="http://schemas.openxmlformats.org/officeDocument/2006/relationships" xmlns:p="http://schemas.openxmlformats.org/presentationml/2006/main">
+  <p:cSld>
+    <p:spTree>
+      <p:nvGrpSpPr>
+        <p:cNvPr id="1" name=""/>
+        <p:cNvGrpSpPr/>
+        <p:nvPr/>
+      </p:nvGrpSpPr>
+      <p:grpSpPr>
+        <a:xfrm>
+          <a:off x="0" y="0"/>
+          <a:ext cx="0" cy="0"/>
+          <a:chOff x="0" y="0"/>
+          <a:chExt cx="0" cy="0"/>
+        </a:xfrm>
+      </p:grpSpPr>
+      <p:sp>
+        <p:nvSpPr>
+          <p:cNvPr id="2" name="Titel 1">
+            <a:extLst>
+              <a:ext uri="{FF2B5EF4-FFF2-40B4-BE49-F238E27FC236}">
+                <a16:creationId xmlns:a16="http://schemas.microsoft.com/office/drawing/2014/main" id="{F05BC4F7-6C5C-4D84-AD09-21A1BD725ADE}"/>
+              </a:ext>
+            </a:extLst>
+          </p:cNvPr>
+          <p:cNvSpPr>
+            <a:spLocks noGrp="1"/>
+          </p:cNvSpPr>
+          <p:nvPr>
+            <p:ph type="title"/>
+          </p:nvPr>
+        </p:nvSpPr>
+        <p:spPr/>
+        <p:txBody>
+          <a:bodyPr/>
+          <a:lstStyle/>
+          <a:p>
+            <a:r>
+              <a:rPr lang="en-GB" dirty="0" err="1">
+                <a:latin typeface="Segoe UI" panose="020B0502040204020203" pitchFamily="34" charset="0"/>
+                <a:cs typeface="Segoe UI" panose="020B0502040204020203" pitchFamily="34" charset="0"/>
+              </a:rPr>
+              <a:t>Voor</a:t>
+            </a:r>
+            <a:r>
+              <a:rPr lang="en-GB" dirty="0">
+                <a:latin typeface="Segoe UI" panose="020B0502040204020203" pitchFamily="34" charset="0"/>
+                <a:cs typeface="Segoe UI" panose="020B0502040204020203" pitchFamily="34" charset="0"/>
+              </a:rPr>
+              <a:t> We </a:t>
+            </a:r>
+            <a:r>
+              <a:rPr lang="en-GB" dirty="0" err="1">
+                <a:latin typeface="Segoe UI" panose="020B0502040204020203" pitchFamily="34" charset="0"/>
+                <a:cs typeface="Segoe UI" panose="020B0502040204020203" pitchFamily="34" charset="0"/>
+              </a:rPr>
+              <a:t>Beginnen</a:t>
+            </a:r>
+            <a:endParaRPr lang="en-GB" dirty="0">
+              <a:latin typeface="Segoe UI" panose="020B0502040204020203" pitchFamily="34" charset="0"/>
+              <a:cs typeface="Segoe UI" panose="020B0502040204020203" pitchFamily="34" charset="0"/>
+            </a:endParaRPr>
+          </a:p>
+        </p:txBody>
+      </p:sp>
+      <p:sp>
+        <p:nvSpPr>
+          <p:cNvPr id="3" name="Tijdelijke aanduiding voor inhoud 2">
+            <a:extLst>
+              <a:ext uri="{FF2B5EF4-FFF2-40B4-BE49-F238E27FC236}">
+                <a16:creationId xmlns:a16="http://schemas.microsoft.com/office/drawing/2014/main" id="{5DFEDF63-63CB-4163-BD78-EBCED782625E}"/>
+              </a:ext>
+            </a:extLst>
+          </p:cNvPr>
+          <p:cNvSpPr>
+            <a:spLocks noGrp="1"/>
+          </p:cNvSpPr>
+          <p:nvPr>
+            <p:ph idx="1"/>
+          </p:nvPr>
+        </p:nvSpPr>
+        <p:spPr/>
+        <p:txBody>
+          <a:bodyPr/>
+          <a:lstStyle/>
+          <a:p>
+            <a:pPr>
+              <a:buFont typeface="Arial" panose="020B0604020202020204" pitchFamily="34" charset="0"/>
+              <a:buChar char="•"/>
+            </a:pPr>
+            <a:r>
+              <a:rPr lang="en-GB" dirty="0">
+                <a:latin typeface="Segoe UI" panose="020B0502040204020203" pitchFamily="34" charset="0"/>
+                <a:cs typeface="Segoe UI" panose="020B0502040204020203" pitchFamily="34" charset="0"/>
+              </a:rPr>
+              <a:t> </a:t>
+            </a:r>
+            <a:r>
+              <a:rPr lang="en-GB" dirty="0" err="1">
+                <a:latin typeface="Segoe UI" panose="020B0502040204020203" pitchFamily="34" charset="0"/>
+                <a:cs typeface="Segoe UI" panose="020B0502040204020203" pitchFamily="34" charset="0"/>
+              </a:rPr>
+              <a:t>Vrijblijvend</a:t>
+            </a:r>
+            <a:endParaRPr lang="en-GB" dirty="0">
+              <a:latin typeface="Segoe UI" panose="020B0502040204020203" pitchFamily="34" charset="0"/>
+              <a:cs typeface="Segoe UI" panose="020B0502040204020203" pitchFamily="34" charset="0"/>
+            </a:endParaRPr>
+          </a:p>
+          <a:p>
+            <a:pPr>
+              <a:buFont typeface="Arial" panose="020B0604020202020204" pitchFamily="34" charset="0"/>
+              <a:buChar char="•"/>
+            </a:pPr>
+            <a:r>
+              <a:rPr lang="en-GB" dirty="0">
+                <a:latin typeface="Segoe UI" panose="020B0502040204020203" pitchFamily="34" charset="0"/>
+                <a:cs typeface="Segoe UI" panose="020B0502040204020203" pitchFamily="34" charset="0"/>
+              </a:rPr>
+              <a:t> </a:t>
+            </a:r>
+            <a:r>
+              <a:rPr lang="en-GB" dirty="0" err="1">
+                <a:latin typeface="Segoe UI" panose="020B0502040204020203" pitchFamily="34" charset="0"/>
+                <a:cs typeface="Segoe UI" panose="020B0502040204020203" pitchFamily="34" charset="0"/>
+              </a:rPr>
+              <a:t>Aanpassingen</a:t>
+            </a:r>
+            <a:r>
+              <a:rPr lang="en-GB" dirty="0">
+                <a:latin typeface="Segoe UI" panose="020B0502040204020203" pitchFamily="34" charset="0"/>
+                <a:cs typeface="Segoe UI" panose="020B0502040204020203" pitchFamily="34" charset="0"/>
+              </a:rPr>
+              <a:t> </a:t>
+            </a:r>
+            <a:r>
+              <a:rPr lang="en-GB" dirty="0" err="1">
+                <a:latin typeface="Segoe UI" panose="020B0502040204020203" pitchFamily="34" charset="0"/>
+                <a:cs typeface="Segoe UI" panose="020B0502040204020203" pitchFamily="34" charset="0"/>
+              </a:rPr>
+              <a:t>mogelijk</a:t>
+            </a:r>
+            <a:endParaRPr lang="en-GB" dirty="0">
+              <a:latin typeface="Segoe UI" panose="020B0502040204020203" pitchFamily="34" charset="0"/>
+              <a:cs typeface="Segoe UI" panose="020B0502040204020203" pitchFamily="34" charset="0"/>
+            </a:endParaRPr>
+          </a:p>
+          <a:p>
+            <a:pPr>
+              <a:buFont typeface="Arial" panose="020B0604020202020204" pitchFamily="34" charset="0"/>
+              <a:buChar char="•"/>
+            </a:pPr>
+            <a:r>
+              <a:rPr lang="en-GB" dirty="0">
+                <a:latin typeface="Segoe UI" panose="020B0502040204020203" pitchFamily="34" charset="0"/>
+                <a:cs typeface="Segoe UI" panose="020B0502040204020203" pitchFamily="34" charset="0"/>
+              </a:rPr>
+              <a:t> </a:t>
+            </a:r>
+            <a:r>
+              <a:rPr lang="en-GB" dirty="0" err="1">
+                <a:latin typeface="Segoe UI" panose="020B0502040204020203" pitchFamily="34" charset="0"/>
+                <a:cs typeface="Segoe UI" panose="020B0502040204020203" pitchFamily="34" charset="0"/>
+              </a:rPr>
+              <a:t>Vragen</a:t>
+            </a:r>
+            <a:r>
+              <a:rPr lang="en-GB" dirty="0">
+                <a:latin typeface="Segoe UI" panose="020B0502040204020203" pitchFamily="34" charset="0"/>
+                <a:cs typeface="Segoe UI" panose="020B0502040204020203" pitchFamily="34" charset="0"/>
+              </a:rPr>
+              <a:t>? </a:t>
+            </a:r>
+            <a:r>
+              <a:rPr lang="en-GB" dirty="0" err="1">
+                <a:latin typeface="Segoe UI" panose="020B0502040204020203" pitchFamily="34" charset="0"/>
+                <a:cs typeface="Segoe UI" panose="020B0502040204020203" pitchFamily="34" charset="0"/>
+              </a:rPr>
+              <a:t>Stel</a:t>
+            </a:r>
+            <a:r>
+              <a:rPr lang="en-GB" dirty="0">
+                <a:latin typeface="Segoe UI" panose="020B0502040204020203" pitchFamily="34" charset="0"/>
+                <a:cs typeface="Segoe UI" panose="020B0502040204020203" pitchFamily="34" charset="0"/>
+              </a:rPr>
+              <a:t> ze</a:t>
+            </a:r>
+          </a:p>
+          <a:p>
+            <a:pPr>
+              <a:buFont typeface="Arial" panose="020B0604020202020204" pitchFamily="34" charset="0"/>
+              <a:buChar char="•"/>
+            </a:pPr>
+            <a:r>
+              <a:rPr lang="en-GB" dirty="0">
+                <a:latin typeface="Segoe UI" panose="020B0502040204020203" pitchFamily="34" charset="0"/>
+                <a:cs typeface="Segoe UI" panose="020B0502040204020203" pitchFamily="34" charset="0"/>
+              </a:rPr>
+              <a:t> </a:t>
+            </a:r>
+            <a:r>
+              <a:rPr lang="en-GB" dirty="0" err="1">
+                <a:latin typeface="Segoe UI" panose="020B0502040204020203" pitchFamily="34" charset="0"/>
+                <a:cs typeface="Segoe UI" panose="020B0502040204020203" pitchFamily="34" charset="0"/>
+              </a:rPr>
+              <a:t>Prijzen</a:t>
+            </a:r>
+            <a:r>
+              <a:rPr lang="en-GB" dirty="0">
+                <a:latin typeface="Segoe UI" panose="020B0502040204020203" pitchFamily="34" charset="0"/>
+                <a:cs typeface="Segoe UI" panose="020B0502040204020203" pitchFamily="34" charset="0"/>
+              </a:rPr>
+              <a:t> </a:t>
+            </a:r>
+            <a:r>
+              <a:rPr lang="en-GB" dirty="0" err="1">
+                <a:latin typeface="Segoe UI" panose="020B0502040204020203" pitchFamily="34" charset="0"/>
+                <a:cs typeface="Segoe UI" panose="020B0502040204020203" pitchFamily="34" charset="0"/>
+              </a:rPr>
+              <a:t>zonder</a:t>
+            </a:r>
+            <a:r>
+              <a:rPr lang="en-GB" dirty="0">
+                <a:latin typeface="Segoe UI" panose="020B0502040204020203" pitchFamily="34" charset="0"/>
+                <a:cs typeface="Segoe UI" panose="020B0502040204020203" pitchFamily="34" charset="0"/>
+              </a:rPr>
+              <a:t> BTW</a:t>
+            </a:r>
+          </a:p>
+        </p:txBody>
+      </p:sp>
+    </p:spTree>
+    <p:extLst>
+      <p:ext uri="{BB962C8B-B14F-4D97-AF65-F5344CB8AC3E}">
+        <p14:creationId xmlns:p14="http://schemas.microsoft.com/office/powerpoint/2010/main" val="3476582551"/>
+      </p:ext>
+    </p:extLst>
+  </p:cSld>
+  <p:clrMapOvr>
+    <a:masterClrMapping/>
+  </p:clrMapOvr>
+  <p:transition>
+    <p:fade/>
+  </p:transition>
+</p:sld>
+</file>
+
+<file path=ppt/slides/slide20.xml><?xml version="1.0" encoding="utf-8"?>
 <p:sld xmlns:a="http://schemas.openxmlformats.org/drawingml/2006/main" xmlns:r="http://schemas.openxmlformats.org/officeDocument/2006/relationships" xmlns:p="http://schemas.openxmlformats.org/presentationml/2006/main">
   <p:cSld>
     <p:spTree>
@@ -7548,214 +8303,7 @@
 </p:sld>
 </file>
 
-<file path=ppt/slides/slide2.xml><?xml version="1.0" encoding="utf-8"?>
-<p:sld xmlns:a="http://schemas.openxmlformats.org/drawingml/2006/main" xmlns:r="http://schemas.openxmlformats.org/officeDocument/2006/relationships" xmlns:p="http://schemas.openxmlformats.org/presentationml/2006/main">
-  <p:cSld>
-    <p:spTree>
-      <p:nvGrpSpPr>
-        <p:cNvPr id="1" name=""/>
-        <p:cNvGrpSpPr/>
-        <p:nvPr/>
-      </p:nvGrpSpPr>
-      <p:grpSpPr>
-        <a:xfrm>
-          <a:off x="0" y="0"/>
-          <a:ext cx="0" cy="0"/>
-          <a:chOff x="0" y="0"/>
-          <a:chExt cx="0" cy="0"/>
-        </a:xfrm>
-      </p:grpSpPr>
-      <p:sp>
-        <p:nvSpPr>
-          <p:cNvPr id="2" name="Titel 1">
-            <a:extLst>
-              <a:ext uri="{FF2B5EF4-FFF2-40B4-BE49-F238E27FC236}">
-                <a16:creationId xmlns:a16="http://schemas.microsoft.com/office/drawing/2014/main" id="{F05BC4F7-6C5C-4D84-AD09-21A1BD725ADE}"/>
-              </a:ext>
-            </a:extLst>
-          </p:cNvPr>
-          <p:cNvSpPr>
-            <a:spLocks noGrp="1"/>
-          </p:cNvSpPr>
-          <p:nvPr>
-            <p:ph type="title"/>
-          </p:nvPr>
-        </p:nvSpPr>
-        <p:spPr/>
-        <p:txBody>
-          <a:bodyPr/>
-          <a:lstStyle/>
-          <a:p>
-            <a:r>
-              <a:rPr lang="en-GB" dirty="0" err="1">
-                <a:latin typeface="Segoe UI" panose="020B0502040204020203" pitchFamily="34" charset="0"/>
-                <a:cs typeface="Segoe UI" panose="020B0502040204020203" pitchFamily="34" charset="0"/>
-              </a:rPr>
-              <a:t>Voor</a:t>
-            </a:r>
-            <a:r>
-              <a:rPr lang="en-GB" dirty="0">
-                <a:latin typeface="Segoe UI" panose="020B0502040204020203" pitchFamily="34" charset="0"/>
-                <a:cs typeface="Segoe UI" panose="020B0502040204020203" pitchFamily="34" charset="0"/>
-              </a:rPr>
-              <a:t> We </a:t>
-            </a:r>
-            <a:r>
-              <a:rPr lang="en-GB" dirty="0" err="1">
-                <a:latin typeface="Segoe UI" panose="020B0502040204020203" pitchFamily="34" charset="0"/>
-                <a:cs typeface="Segoe UI" panose="020B0502040204020203" pitchFamily="34" charset="0"/>
-              </a:rPr>
-              <a:t>Beginnen</a:t>
-            </a:r>
-            <a:endParaRPr lang="en-GB" dirty="0">
-              <a:latin typeface="Segoe UI" panose="020B0502040204020203" pitchFamily="34" charset="0"/>
-              <a:cs typeface="Segoe UI" panose="020B0502040204020203" pitchFamily="34" charset="0"/>
-            </a:endParaRPr>
-          </a:p>
-        </p:txBody>
-      </p:sp>
-      <p:sp>
-        <p:nvSpPr>
-          <p:cNvPr id="3" name="Tijdelijke aanduiding voor inhoud 2">
-            <a:extLst>
-              <a:ext uri="{FF2B5EF4-FFF2-40B4-BE49-F238E27FC236}">
-                <a16:creationId xmlns:a16="http://schemas.microsoft.com/office/drawing/2014/main" id="{5DFEDF63-63CB-4163-BD78-EBCED782625E}"/>
-              </a:ext>
-            </a:extLst>
-          </p:cNvPr>
-          <p:cNvSpPr>
-            <a:spLocks noGrp="1"/>
-          </p:cNvSpPr>
-          <p:nvPr>
-            <p:ph idx="1"/>
-          </p:nvPr>
-        </p:nvSpPr>
-        <p:spPr/>
-        <p:txBody>
-          <a:bodyPr/>
-          <a:lstStyle/>
-          <a:p>
-            <a:pPr>
-              <a:buFont typeface="Arial" panose="020B0604020202020204" pitchFamily="34" charset="0"/>
-              <a:buChar char="•"/>
-            </a:pPr>
-            <a:r>
-              <a:rPr lang="en-GB" dirty="0">
-                <a:latin typeface="Segoe UI" panose="020B0502040204020203" pitchFamily="34" charset="0"/>
-                <a:cs typeface="Segoe UI" panose="020B0502040204020203" pitchFamily="34" charset="0"/>
-              </a:rPr>
-              <a:t> </a:t>
-            </a:r>
-            <a:r>
-              <a:rPr lang="en-GB" dirty="0" err="1">
-                <a:latin typeface="Segoe UI" panose="020B0502040204020203" pitchFamily="34" charset="0"/>
-                <a:cs typeface="Segoe UI" panose="020B0502040204020203" pitchFamily="34" charset="0"/>
-              </a:rPr>
-              <a:t>Vrijblijvend</a:t>
-            </a:r>
-            <a:endParaRPr lang="en-GB" dirty="0">
-              <a:latin typeface="Segoe UI" panose="020B0502040204020203" pitchFamily="34" charset="0"/>
-              <a:cs typeface="Segoe UI" panose="020B0502040204020203" pitchFamily="34" charset="0"/>
-            </a:endParaRPr>
-          </a:p>
-          <a:p>
-            <a:pPr>
-              <a:buFont typeface="Arial" panose="020B0604020202020204" pitchFamily="34" charset="0"/>
-              <a:buChar char="•"/>
-            </a:pPr>
-            <a:r>
-              <a:rPr lang="en-GB" dirty="0">
-                <a:latin typeface="Segoe UI" panose="020B0502040204020203" pitchFamily="34" charset="0"/>
-                <a:cs typeface="Segoe UI" panose="020B0502040204020203" pitchFamily="34" charset="0"/>
-              </a:rPr>
-              <a:t> </a:t>
-            </a:r>
-            <a:r>
-              <a:rPr lang="en-GB" dirty="0" err="1">
-                <a:latin typeface="Segoe UI" panose="020B0502040204020203" pitchFamily="34" charset="0"/>
-                <a:cs typeface="Segoe UI" panose="020B0502040204020203" pitchFamily="34" charset="0"/>
-              </a:rPr>
-              <a:t>Aanpassingen</a:t>
-            </a:r>
-            <a:r>
-              <a:rPr lang="en-GB" dirty="0">
-                <a:latin typeface="Segoe UI" panose="020B0502040204020203" pitchFamily="34" charset="0"/>
-                <a:cs typeface="Segoe UI" panose="020B0502040204020203" pitchFamily="34" charset="0"/>
-              </a:rPr>
-              <a:t> </a:t>
-            </a:r>
-            <a:r>
-              <a:rPr lang="en-GB" dirty="0" err="1">
-                <a:latin typeface="Segoe UI" panose="020B0502040204020203" pitchFamily="34" charset="0"/>
-                <a:cs typeface="Segoe UI" panose="020B0502040204020203" pitchFamily="34" charset="0"/>
-              </a:rPr>
-              <a:t>mogelijk</a:t>
-            </a:r>
-            <a:endParaRPr lang="en-GB" dirty="0">
-              <a:latin typeface="Segoe UI" panose="020B0502040204020203" pitchFamily="34" charset="0"/>
-              <a:cs typeface="Segoe UI" panose="020B0502040204020203" pitchFamily="34" charset="0"/>
-            </a:endParaRPr>
-          </a:p>
-          <a:p>
-            <a:pPr>
-              <a:buFont typeface="Arial" panose="020B0604020202020204" pitchFamily="34" charset="0"/>
-              <a:buChar char="•"/>
-            </a:pPr>
-            <a:r>
-              <a:rPr lang="en-GB" dirty="0">
-                <a:latin typeface="Segoe UI" panose="020B0502040204020203" pitchFamily="34" charset="0"/>
-                <a:cs typeface="Segoe UI" panose="020B0502040204020203" pitchFamily="34" charset="0"/>
-              </a:rPr>
-              <a:t> </a:t>
-            </a:r>
-            <a:r>
-              <a:rPr lang="en-GB" dirty="0" err="1">
-                <a:latin typeface="Segoe UI" panose="020B0502040204020203" pitchFamily="34" charset="0"/>
-                <a:cs typeface="Segoe UI" panose="020B0502040204020203" pitchFamily="34" charset="0"/>
-              </a:rPr>
-              <a:t>Vragen</a:t>
-            </a:r>
-            <a:r>
-              <a:rPr lang="en-GB" dirty="0">
-                <a:latin typeface="Segoe UI" panose="020B0502040204020203" pitchFamily="34" charset="0"/>
-                <a:cs typeface="Segoe UI" panose="020B0502040204020203" pitchFamily="34" charset="0"/>
-              </a:rPr>
-              <a:t>? </a:t>
-            </a:r>
-            <a:r>
-              <a:rPr lang="en-GB" dirty="0" err="1">
-                <a:latin typeface="Segoe UI" panose="020B0502040204020203" pitchFamily="34" charset="0"/>
-                <a:cs typeface="Segoe UI" panose="020B0502040204020203" pitchFamily="34" charset="0"/>
-              </a:rPr>
-              <a:t>Stel</a:t>
-            </a:r>
-            <a:r>
-              <a:rPr lang="en-GB" dirty="0">
-                <a:latin typeface="Segoe UI" panose="020B0502040204020203" pitchFamily="34" charset="0"/>
-                <a:cs typeface="Segoe UI" panose="020B0502040204020203" pitchFamily="34" charset="0"/>
-              </a:rPr>
-              <a:t> ze</a:t>
-            </a:r>
-          </a:p>
-        </p:txBody>
-      </p:sp>
-    </p:spTree>
-    <p:extLst>
-      <p:ext uri="{BB962C8B-B14F-4D97-AF65-F5344CB8AC3E}">
-        <p14:creationId xmlns:p14="http://schemas.microsoft.com/office/powerpoint/2010/main" val="3476582551"/>
-      </p:ext>
-    </p:extLst>
-  </p:cSld>
-  <p:clrMapOvr>
-    <a:masterClrMapping/>
-  </p:clrMapOvr>
-  <p:transition>
-    <p:fade/>
-  </p:transition>
-</p:sld>
-</file>
-
-<file path=ppt/slides/slide20.xml><?xml version="1.0" encoding="utf-8"?>
+<file path=ppt/slides/slide21.xml><?xml version="1.0" encoding="utf-8"?>
 <p:sld xmlns:a="http://schemas.openxmlformats.org/drawingml/2006/main" xmlns:r="http://schemas.openxmlformats.org/officeDocument/2006/relationships" xmlns:p="http://schemas.openxmlformats.org/presentationml/2006/main">
   <p:cSld>
     <p:spTree>
@@ -8002,7 +8550,7 @@
 </p:sld>
 </file>
 
-<file path=ppt/slides/slide21.xml><?xml version="1.0" encoding="utf-8"?>
+<file path=ppt/slides/slide22.xml><?xml version="1.0" encoding="utf-8"?>
 <p:sld xmlns:a="http://schemas.openxmlformats.org/drawingml/2006/main" xmlns:r="http://schemas.openxmlformats.org/officeDocument/2006/relationships" xmlns:p="http://schemas.openxmlformats.org/presentationml/2006/main">
   <p:cSld>
     <p:spTree>
@@ -8420,7 +8968,7 @@
 </p:sld>
 </file>
 
-<file path=ppt/slides/slide22.xml><?xml version="1.0" encoding="utf-8"?>
+<file path=ppt/slides/slide23.xml><?xml version="1.0" encoding="utf-8"?>
 <p:sld xmlns:a="http://schemas.openxmlformats.org/drawingml/2006/main" xmlns:r="http://schemas.openxmlformats.org/officeDocument/2006/relationships" xmlns:p="http://schemas.openxmlformats.org/presentationml/2006/main">
   <p:cSld>
     <p:spTree>
@@ -8771,7 +9319,7 @@
 </p:sld>
 </file>
 
-<file path=ppt/slides/slide23.xml><?xml version="1.0" encoding="utf-8"?>
+<file path=ppt/slides/slide24.xml><?xml version="1.0" encoding="utf-8"?>
 <p:sld xmlns:a="http://schemas.openxmlformats.org/drawingml/2006/main" xmlns:r="http://schemas.openxmlformats.org/officeDocument/2006/relationships" xmlns:p="http://schemas.openxmlformats.org/presentationml/2006/main">
   <p:cSld>
     <p:spTree>
@@ -9106,7 +9654,7 @@
 </p:sld>
 </file>
 
-<file path=ppt/slides/slide24.xml><?xml version="1.0" encoding="utf-8"?>
+<file path=ppt/slides/slide25.xml><?xml version="1.0" encoding="utf-8"?>
 <p:sld xmlns:a="http://schemas.openxmlformats.org/drawingml/2006/main" xmlns:r="http://schemas.openxmlformats.org/officeDocument/2006/relationships" xmlns:p="http://schemas.openxmlformats.org/presentationml/2006/main">
   <p:cSld>
     <p:spTree>
@@ -9406,7 +9954,7 @@
 </p:sld>
 </file>
 
-<file path=ppt/slides/slide25.xml><?xml version="1.0" encoding="utf-8"?>
+<file path=ppt/slides/slide26.xml><?xml version="1.0" encoding="utf-8"?>
 <p:sld xmlns:a="http://schemas.openxmlformats.org/drawingml/2006/main" xmlns:r="http://schemas.openxmlformats.org/officeDocument/2006/relationships" xmlns:p="http://schemas.openxmlformats.org/presentationml/2006/main">
   <p:cSld>
     <p:spTree>
@@ -9644,7 +10192,7 @@
 </p:sld>
 </file>
 
-<file path=ppt/slides/slide26.xml><?xml version="1.0" encoding="utf-8"?>
+<file path=ppt/slides/slide27.xml><?xml version="1.0" encoding="utf-8"?>
 <p:sld xmlns:a="http://schemas.openxmlformats.org/drawingml/2006/main" xmlns:r="http://schemas.openxmlformats.org/officeDocument/2006/relationships" xmlns:p="http://schemas.openxmlformats.org/presentationml/2006/main">
   <p:cSld>
     <p:spTree>
@@ -9984,229 +10532,6 @@
 </p:sld>
 </file>
 
-<file path=ppt/slides/slide27.xml><?xml version="1.0" encoding="utf-8"?>
-<p:sld xmlns:a="http://schemas.openxmlformats.org/drawingml/2006/main" xmlns:r="http://schemas.openxmlformats.org/officeDocument/2006/relationships" xmlns:p="http://schemas.openxmlformats.org/presentationml/2006/main">
-  <p:cSld>
-    <p:spTree>
-      <p:nvGrpSpPr>
-        <p:cNvPr id="1" name=""/>
-        <p:cNvGrpSpPr/>
-        <p:nvPr/>
-      </p:nvGrpSpPr>
-      <p:grpSpPr>
-        <a:xfrm>
-          <a:off x="0" y="0"/>
-          <a:ext cx="0" cy="0"/>
-          <a:chOff x="0" y="0"/>
-          <a:chExt cx="0" cy="0"/>
-        </a:xfrm>
-      </p:grpSpPr>
-      <p:sp>
-        <p:nvSpPr>
-          <p:cNvPr id="2" name="Titel 1">
-            <a:extLst>
-              <a:ext uri="{FF2B5EF4-FFF2-40B4-BE49-F238E27FC236}">
-                <a16:creationId xmlns:a16="http://schemas.microsoft.com/office/drawing/2014/main" id="{8C379CF5-10C1-4248-830D-D079FAA84A63}"/>
-              </a:ext>
-            </a:extLst>
-          </p:cNvPr>
-          <p:cNvSpPr>
-            <a:spLocks noGrp="1"/>
-          </p:cNvSpPr>
-          <p:nvPr>
-            <p:ph type="title"/>
-          </p:nvPr>
-        </p:nvSpPr>
-        <p:spPr/>
-        <p:txBody>
-          <a:bodyPr/>
-          <a:lstStyle/>
-          <a:p>
-            <a:r>
-              <a:rPr lang="en-GB" dirty="0" err="1">
-                <a:latin typeface="Segoe UI" panose="020B0502040204020203" pitchFamily="34" charset="0"/>
-                <a:cs typeface="Segoe UI" panose="020B0502040204020203" pitchFamily="34" charset="0"/>
-              </a:rPr>
-              <a:t>Licenties</a:t>
-            </a:r>
-            <a:r>
-              <a:rPr lang="en-GB" dirty="0">
-                <a:latin typeface="Segoe UI" panose="020B0502040204020203" pitchFamily="34" charset="0"/>
-                <a:cs typeface="Segoe UI" panose="020B0502040204020203" pitchFamily="34" charset="0"/>
-              </a:rPr>
-              <a:t>: </a:t>
-            </a:r>
-            <a:r>
-              <a:rPr lang="en-GB" dirty="0" err="1">
-                <a:latin typeface="Segoe UI" panose="020B0502040204020203" pitchFamily="34" charset="0"/>
-                <a:cs typeface="Segoe UI" panose="020B0502040204020203" pitchFamily="34" charset="0"/>
-              </a:rPr>
-              <a:t>Overzicht</a:t>
-            </a:r>
-            <a:endParaRPr lang="en-GB" dirty="0">
-              <a:latin typeface="Segoe UI" panose="020B0502040204020203" pitchFamily="34" charset="0"/>
-              <a:cs typeface="Segoe UI" panose="020B0502040204020203" pitchFamily="34" charset="0"/>
-            </a:endParaRPr>
-          </a:p>
-        </p:txBody>
-      </p:sp>
-      <p:sp>
-        <p:nvSpPr>
-          <p:cNvPr id="3" name="Tijdelijke aanduiding voor inhoud 2">
-            <a:extLst>
-              <a:ext uri="{FF2B5EF4-FFF2-40B4-BE49-F238E27FC236}">
-                <a16:creationId xmlns:a16="http://schemas.microsoft.com/office/drawing/2014/main" id="{40BAA26D-A762-4517-8F81-1A4D03041A53}"/>
-              </a:ext>
-            </a:extLst>
-          </p:cNvPr>
-          <p:cNvSpPr>
-            <a:spLocks noGrp="1"/>
-          </p:cNvSpPr>
-          <p:nvPr>
-            <p:ph idx="1"/>
-          </p:nvPr>
-        </p:nvSpPr>
-        <p:spPr/>
-        <p:txBody>
-          <a:bodyPr/>
-          <a:lstStyle/>
-          <a:p>
-            <a:pPr>
-              <a:buFont typeface="Arial" panose="020B0604020202020204" pitchFamily="34" charset="0"/>
-              <a:buChar char="•"/>
-            </a:pPr>
-            <a:r>
-              <a:rPr lang="en-GB" dirty="0">
-                <a:latin typeface="Segoe UI" panose="020B0502040204020203" pitchFamily="34" charset="0"/>
-                <a:cs typeface="Segoe UI" panose="020B0502040204020203" pitchFamily="34" charset="0"/>
-              </a:rPr>
-              <a:t> Microsoft Windows 10 Pro</a:t>
-            </a:r>
-          </a:p>
-          <a:p>
-            <a:pPr>
-              <a:buFont typeface="Arial" panose="020B0604020202020204" pitchFamily="34" charset="0"/>
-              <a:buChar char="•"/>
-            </a:pPr>
-            <a:r>
-              <a:rPr lang="en-GB" dirty="0">
-                <a:latin typeface="Segoe UI" panose="020B0502040204020203" pitchFamily="34" charset="0"/>
-                <a:cs typeface="Segoe UI" panose="020B0502040204020203" pitchFamily="34" charset="0"/>
-              </a:rPr>
-              <a:t> Microsoft Office 365 </a:t>
-            </a:r>
-          </a:p>
-          <a:p>
-            <a:pPr>
-              <a:buFont typeface="Arial" panose="020B0604020202020204" pitchFamily="34" charset="0"/>
-              <a:buChar char="•"/>
-            </a:pPr>
-            <a:r>
-              <a:rPr lang="en-GB" dirty="0">
-                <a:latin typeface="Segoe UI" panose="020B0502040204020203" pitchFamily="34" charset="0"/>
-                <a:cs typeface="Segoe UI" panose="020B0502040204020203" pitchFamily="34" charset="0"/>
-              </a:rPr>
-              <a:t> AutoCAD</a:t>
-            </a:r>
-          </a:p>
-          <a:p>
-            <a:pPr>
-              <a:buFont typeface="Arial" panose="020B0604020202020204" pitchFamily="34" charset="0"/>
-              <a:buChar char="•"/>
-            </a:pPr>
-            <a:r>
-              <a:rPr lang="en-GB" dirty="0">
-                <a:latin typeface="Segoe UI" panose="020B0502040204020203" pitchFamily="34" charset="0"/>
-                <a:cs typeface="Segoe UI" panose="020B0502040204020203" pitchFamily="34" charset="0"/>
-              </a:rPr>
-              <a:t> </a:t>
-            </a:r>
-            <a:r>
-              <a:rPr lang="en-GB" dirty="0" err="1">
-                <a:latin typeface="Segoe UI" panose="020B0502040204020203" pitchFamily="34" charset="0"/>
-                <a:cs typeface="Segoe UI" panose="020B0502040204020203" pitchFamily="34" charset="0"/>
-              </a:rPr>
-              <a:t>Teamleader</a:t>
-            </a:r>
-            <a:r>
-              <a:rPr lang="en-GB" dirty="0">
-                <a:latin typeface="Segoe UI" panose="020B0502040204020203" pitchFamily="34" charset="0"/>
-                <a:cs typeface="Segoe UI" panose="020B0502040204020203" pitchFamily="34" charset="0"/>
-              </a:rPr>
-              <a:t> CRM</a:t>
-            </a:r>
-          </a:p>
-          <a:p>
-            <a:pPr>
-              <a:buFont typeface="Arial" panose="020B0604020202020204" pitchFamily="34" charset="0"/>
-              <a:buChar char="•"/>
-            </a:pPr>
-            <a:r>
-              <a:rPr lang="en-GB" dirty="0">
-                <a:latin typeface="Segoe UI" panose="020B0502040204020203" pitchFamily="34" charset="0"/>
-                <a:cs typeface="Segoe UI" panose="020B0502040204020203" pitchFamily="34" charset="0"/>
-              </a:rPr>
-              <a:t> </a:t>
-            </a:r>
-            <a:r>
-              <a:rPr lang="en-GB" dirty="0" err="1">
-                <a:latin typeface="Segoe UI" panose="020B0502040204020203" pitchFamily="34" charset="0"/>
-                <a:cs typeface="Segoe UI" panose="020B0502040204020203" pitchFamily="34" charset="0"/>
-              </a:rPr>
-              <a:t>IDrive</a:t>
-            </a:r>
-            <a:r>
-              <a:rPr lang="en-GB" dirty="0">
-                <a:latin typeface="Segoe UI" panose="020B0502040204020203" pitchFamily="34" charset="0"/>
-                <a:cs typeface="Segoe UI" panose="020B0502040204020203" pitchFamily="34" charset="0"/>
-              </a:rPr>
-              <a:t> Business Cloud Backup</a:t>
-            </a:r>
-          </a:p>
-          <a:p>
-            <a:pPr>
-              <a:buFont typeface="Arial" panose="020B0604020202020204" pitchFamily="34" charset="0"/>
-              <a:buChar char="•"/>
-            </a:pPr>
-            <a:r>
-              <a:rPr lang="en-GB" dirty="0">
-                <a:latin typeface="Segoe UI" panose="020B0502040204020203" pitchFamily="34" charset="0"/>
-                <a:cs typeface="Segoe UI" panose="020B0502040204020203" pitchFamily="34" charset="0"/>
-              </a:rPr>
-              <a:t> SketchUp</a:t>
-            </a:r>
-          </a:p>
-          <a:p>
-            <a:pPr>
-              <a:buFont typeface="Arial" panose="020B0604020202020204" pitchFamily="34" charset="0"/>
-              <a:buChar char="•"/>
-            </a:pPr>
-            <a:r>
-              <a:rPr lang="en-GB" dirty="0">
-                <a:latin typeface="Segoe UI" panose="020B0502040204020203" pitchFamily="34" charset="0"/>
-                <a:cs typeface="Segoe UI" panose="020B0502040204020203" pitchFamily="34" charset="0"/>
-              </a:rPr>
-              <a:t> GIMP</a:t>
-            </a:r>
-          </a:p>
-        </p:txBody>
-      </p:sp>
-    </p:spTree>
-    <p:extLst>
-      <p:ext uri="{BB962C8B-B14F-4D97-AF65-F5344CB8AC3E}">
-        <p14:creationId xmlns:p14="http://schemas.microsoft.com/office/powerpoint/2010/main" val="1043108648"/>
-      </p:ext>
-    </p:extLst>
-  </p:cSld>
-  <p:clrMapOvr>
-    <a:masterClrMapping/>
-  </p:clrMapOvr>
-  <p:transition>
-    <p:fade/>
-  </p:transition>
-</p:sld>
-</file>
-
 <file path=ppt/slides/slide28.xml><?xml version="1.0" encoding="utf-8"?>
 <p:sld xmlns:a="http://schemas.openxmlformats.org/drawingml/2006/main" xmlns:r="http://schemas.openxmlformats.org/officeDocument/2006/relationships" xmlns:p="http://schemas.openxmlformats.org/presentationml/2006/main">
   <p:cSld>
@@ -10229,7 +10554,7 @@
           <p:cNvPr id="2" name="Titel 1">
             <a:extLst>
               <a:ext uri="{FF2B5EF4-FFF2-40B4-BE49-F238E27FC236}">
-                <a16:creationId xmlns:a16="http://schemas.microsoft.com/office/drawing/2014/main" id="{8B254885-3ADA-4045-9ACB-BF13BC33B956}"/>
+                <a16:creationId xmlns:a16="http://schemas.microsoft.com/office/drawing/2014/main" id="{8C379CF5-10C1-4248-830D-D079FAA84A63}"/>
               </a:ext>
             </a:extLst>
           </p:cNvPr>
@@ -10257,8 +10582,19 @@
                 <a:latin typeface="Segoe UI" panose="020B0502040204020203" pitchFamily="34" charset="0"/>
                 <a:cs typeface="Segoe UI" panose="020B0502040204020203" pitchFamily="34" charset="0"/>
               </a:rPr>
-              <a:t>: Microsoft Windows 10 Pro</a:t>
-            </a:r>
+              <a:t>: </a:t>
+            </a:r>
+            <a:r>
+              <a:rPr lang="en-GB" dirty="0" err="1">
+                <a:latin typeface="Segoe UI" panose="020B0502040204020203" pitchFamily="34" charset="0"/>
+                <a:cs typeface="Segoe UI" panose="020B0502040204020203" pitchFamily="34" charset="0"/>
+              </a:rPr>
+              <a:t>Overzicht</a:t>
+            </a:r>
+            <a:endParaRPr lang="en-GB" dirty="0">
+              <a:latin typeface="Segoe UI" panose="020B0502040204020203" pitchFamily="34" charset="0"/>
+              <a:cs typeface="Segoe UI" panose="020B0502040204020203" pitchFamily="34" charset="0"/>
+            </a:endParaRPr>
           </a:p>
         </p:txBody>
       </p:sp>
@@ -10267,7 +10603,7 @@
           <p:cNvPr id="3" name="Tijdelijke aanduiding voor inhoud 2">
             <a:extLst>
               <a:ext uri="{FF2B5EF4-FFF2-40B4-BE49-F238E27FC236}">
-                <a16:creationId xmlns:a16="http://schemas.microsoft.com/office/drawing/2014/main" id="{CC7AC8B4-164A-461A-AEE1-2BDB77BAAEDD}"/>
+                <a16:creationId xmlns:a16="http://schemas.microsoft.com/office/drawing/2014/main" id="{40BAA26D-A762-4517-8F81-1A4D03041A53}"/>
               </a:ext>
             </a:extLst>
           </p:cNvPr>
@@ -10292,6 +10628,45 @@
                 <a:latin typeface="Segoe UI" panose="020B0502040204020203" pitchFamily="34" charset="0"/>
                 <a:cs typeface="Segoe UI" panose="020B0502040204020203" pitchFamily="34" charset="0"/>
               </a:rPr>
+              <a:t> Microsoft Windows 10 Pro</a:t>
+            </a:r>
+          </a:p>
+          <a:p>
+            <a:pPr>
+              <a:buFont typeface="Arial" panose="020B0604020202020204" pitchFamily="34" charset="0"/>
+              <a:buChar char="•"/>
+            </a:pPr>
+            <a:r>
+              <a:rPr lang="en-GB" dirty="0">
+                <a:latin typeface="Segoe UI" panose="020B0502040204020203" pitchFamily="34" charset="0"/>
+                <a:cs typeface="Segoe UI" panose="020B0502040204020203" pitchFamily="34" charset="0"/>
+              </a:rPr>
+              <a:t> Microsoft Office 365 </a:t>
+            </a:r>
+          </a:p>
+          <a:p>
+            <a:pPr>
+              <a:buFont typeface="Arial" panose="020B0604020202020204" pitchFamily="34" charset="0"/>
+              <a:buChar char="•"/>
+            </a:pPr>
+            <a:r>
+              <a:rPr lang="en-GB" dirty="0">
+                <a:latin typeface="Segoe UI" panose="020B0502040204020203" pitchFamily="34" charset="0"/>
+                <a:cs typeface="Segoe UI" panose="020B0502040204020203" pitchFamily="34" charset="0"/>
+              </a:rPr>
+              <a:t> AutoCAD</a:t>
+            </a:r>
+          </a:p>
+          <a:p>
+            <a:pPr>
+              <a:buFont typeface="Arial" panose="020B0604020202020204" pitchFamily="34" charset="0"/>
+              <a:buChar char="•"/>
+            </a:pPr>
+            <a:r>
+              <a:rPr lang="en-GB" dirty="0">
+                <a:latin typeface="Segoe UI" panose="020B0502040204020203" pitchFamily="34" charset="0"/>
+                <a:cs typeface="Segoe UI" panose="020B0502040204020203" pitchFamily="34" charset="0"/>
+              </a:rPr>
               <a:t> </a:t>
             </a:r>
             <a:r>
@@ -10299,8 +10674,21 @@
                 <a:latin typeface="Segoe UI" panose="020B0502040204020203" pitchFamily="34" charset="0"/>
                 <a:cs typeface="Segoe UI" panose="020B0502040204020203" pitchFamily="34" charset="0"/>
               </a:rPr>
-              <a:t>Geavanceerde</a:t>
-            </a:r>
+              <a:t>Teamleader</a:t>
+            </a:r>
+            <a:r>
+              <a:rPr lang="en-GB" dirty="0">
+                <a:latin typeface="Segoe UI" panose="020B0502040204020203" pitchFamily="34" charset="0"/>
+                <a:cs typeface="Segoe UI" panose="020B0502040204020203" pitchFamily="34" charset="0"/>
+              </a:rPr>
+              <a:t> CRM</a:t>
+            </a:r>
+          </a:p>
+          <a:p>
+            <a:pPr>
+              <a:buFont typeface="Arial" panose="020B0604020202020204" pitchFamily="34" charset="0"/>
+              <a:buChar char="•"/>
+            </a:pPr>
             <a:r>
               <a:rPr lang="en-GB" dirty="0">
                 <a:latin typeface="Segoe UI" panose="020B0502040204020203" pitchFamily="34" charset="0"/>
@@ -10313,135 +10701,48 @@
                 <a:latin typeface="Segoe UI" panose="020B0502040204020203" pitchFamily="34" charset="0"/>
                 <a:cs typeface="Segoe UI" panose="020B0502040204020203" pitchFamily="34" charset="0"/>
               </a:rPr>
-              <a:t>beveiliging</a:t>
-            </a:r>
-            <a:r>
-              <a:rPr lang="en-GB" dirty="0">
-                <a:latin typeface="Segoe UI" panose="020B0502040204020203" pitchFamily="34" charset="0"/>
-                <a:cs typeface="Segoe UI" panose="020B0502040204020203" pitchFamily="34" charset="0"/>
-              </a:rPr>
-              <a:t>: BitLocker</a:t>
-            </a:r>
-          </a:p>
-          <a:p>
-            <a:pPr>
-              <a:buFont typeface="Arial" panose="020B0604020202020204" pitchFamily="34" charset="0"/>
-              <a:buChar char="•"/>
-            </a:pPr>
-            <a:r>
-              <a:rPr lang="en-GB" dirty="0">
-                <a:latin typeface="Segoe UI" panose="020B0502040204020203" pitchFamily="34" charset="0"/>
-                <a:cs typeface="Segoe UI" panose="020B0502040204020203" pitchFamily="34" charset="0"/>
-              </a:rPr>
-              <a:t> Whiteboard</a:t>
-            </a:r>
-          </a:p>
-          <a:p>
-            <a:pPr>
-              <a:buFont typeface="Arial" panose="020B0604020202020204" pitchFamily="34" charset="0"/>
-              <a:buChar char="•"/>
-            </a:pPr>
-            <a:r>
-              <a:rPr lang="en-GB" dirty="0">
-                <a:latin typeface="Segoe UI" panose="020B0502040204020203" pitchFamily="34" charset="0"/>
-                <a:cs typeface="Segoe UI" panose="020B0502040204020203" pitchFamily="34" charset="0"/>
-              </a:rPr>
-              <a:t> Multi Device Integration</a:t>
-            </a:r>
-          </a:p>
-          <a:p>
-            <a:pPr>
-              <a:buFont typeface="Arial" panose="020B0604020202020204" pitchFamily="34" charset="0"/>
-              <a:buChar char="•"/>
-            </a:pPr>
-            <a:r>
-              <a:rPr lang="en-GB" dirty="0">
-                <a:latin typeface="Segoe UI" panose="020B0502040204020203" pitchFamily="34" charset="0"/>
-                <a:cs typeface="Segoe UI" panose="020B0502040204020203" pitchFamily="34" charset="0"/>
-              </a:rPr>
-              <a:t> Office 365 For Business </a:t>
-            </a:r>
-            <a:r>
-              <a:rPr lang="en-GB" dirty="0" err="1">
-                <a:latin typeface="Segoe UI" panose="020B0502040204020203" pitchFamily="34" charset="0"/>
-                <a:cs typeface="Segoe UI" panose="020B0502040204020203" pitchFamily="34" charset="0"/>
-              </a:rPr>
-              <a:t>integratie</a:t>
-            </a:r>
-            <a:endParaRPr lang="en-GB" dirty="0">
-              <a:latin typeface="Segoe UI" panose="020B0502040204020203" pitchFamily="34" charset="0"/>
-              <a:cs typeface="Segoe UI" panose="020B0502040204020203" pitchFamily="34" charset="0"/>
-            </a:endParaRPr>
-          </a:p>
-          <a:p>
-            <a:pPr>
-              <a:buFont typeface="Arial" panose="020B0604020202020204" pitchFamily="34" charset="0"/>
-              <a:buChar char="•"/>
-            </a:pPr>
-            <a:r>
-              <a:rPr lang="en-GB" dirty="0">
-                <a:latin typeface="Segoe UI" panose="020B0502040204020203" pitchFamily="34" charset="0"/>
-                <a:cs typeface="Segoe UI" panose="020B0502040204020203" pitchFamily="34" charset="0"/>
-              </a:rPr>
-              <a:t> </a:t>
-            </a:r>
-            <a:r>
-              <a:rPr lang="en-GB" dirty="0" err="1">
-                <a:latin typeface="Segoe UI" panose="020B0502040204020203" pitchFamily="34" charset="0"/>
-                <a:cs typeface="Segoe UI" panose="020B0502040204020203" pitchFamily="34" charset="0"/>
-              </a:rPr>
-              <a:t>Aantal</a:t>
-            </a:r>
-            <a:r>
-              <a:rPr lang="en-GB" dirty="0">
-                <a:latin typeface="Segoe UI" panose="020B0502040204020203" pitchFamily="34" charset="0"/>
-                <a:cs typeface="Segoe UI" panose="020B0502040204020203" pitchFamily="34" charset="0"/>
-              </a:rPr>
-              <a:t>: 5</a:t>
+              <a:t>IDrive</a:t>
+            </a:r>
+            <a:r>
+              <a:rPr lang="en-GB" dirty="0">
+                <a:latin typeface="Segoe UI" panose="020B0502040204020203" pitchFamily="34" charset="0"/>
+                <a:cs typeface="Segoe UI" panose="020B0502040204020203" pitchFamily="34" charset="0"/>
+              </a:rPr>
+              <a:t> Business Cloud Backup</a:t>
+            </a:r>
+          </a:p>
+          <a:p>
+            <a:pPr>
+              <a:buFont typeface="Arial" panose="020B0604020202020204" pitchFamily="34" charset="0"/>
+              <a:buChar char="•"/>
+            </a:pPr>
+            <a:r>
+              <a:rPr lang="en-GB" dirty="0">
+                <a:latin typeface="Segoe UI" panose="020B0502040204020203" pitchFamily="34" charset="0"/>
+                <a:cs typeface="Segoe UI" panose="020B0502040204020203" pitchFamily="34" charset="0"/>
+              </a:rPr>
+              <a:t> SketchUp</a:t>
+            </a:r>
+          </a:p>
+          <a:p>
+            <a:pPr>
+              <a:buFont typeface="Arial" panose="020B0604020202020204" pitchFamily="34" charset="0"/>
+              <a:buChar char="•"/>
+            </a:pPr>
+            <a:r>
+              <a:rPr lang="en-GB" dirty="0">
+                <a:latin typeface="Segoe UI" panose="020B0502040204020203" pitchFamily="34" charset="0"/>
+                <a:cs typeface="Segoe UI" panose="020B0502040204020203" pitchFamily="34" charset="0"/>
+              </a:rPr>
+              <a:t> GIMP</a:t>
             </a:r>
           </a:p>
         </p:txBody>
       </p:sp>
-      <p:pic>
-        <p:nvPicPr>
-          <p:cNvPr id="13" name="Afbeelding 12">
-            <a:extLst>
-              <a:ext uri="{FF2B5EF4-FFF2-40B4-BE49-F238E27FC236}">
-                <a16:creationId xmlns:a16="http://schemas.microsoft.com/office/drawing/2014/main" id="{2E47A4EF-AA04-40BF-BD04-8BEE8A5B05E0}"/>
-              </a:ext>
-            </a:extLst>
-          </p:cNvPr>
-          <p:cNvPicPr>
-            <a:picLocks noChangeAspect="1"/>
-          </p:cNvPicPr>
-          <p:nvPr/>
-        </p:nvPicPr>
-        <p:blipFill>
-          <a:blip r:embed="rId2">
-            <a:extLst>
-              <a:ext uri="{28A0092B-C50C-407E-A947-70E740481C1C}">
-                <a14:useLocalDpi xmlns:a14="http://schemas.microsoft.com/office/drawing/2010/main" val="0"/>
-              </a:ext>
-            </a:extLst>
-          </a:blip>
-          <a:stretch>
-            <a:fillRect/>
-          </a:stretch>
-        </p:blipFill>
-        <p:spPr>
-          <a:xfrm>
-            <a:off x="6126480" y="4928010"/>
-            <a:ext cx="5672747" cy="1049458"/>
-          </a:xfrm>
-          <a:prstGeom prst="rect">
-            <a:avLst/>
-          </a:prstGeom>
-        </p:spPr>
-      </p:pic>
     </p:spTree>
     <p:extLst>
       <p:ext uri="{BB962C8B-B14F-4D97-AF65-F5344CB8AC3E}">
-        <p14:creationId xmlns:p14="http://schemas.microsoft.com/office/powerpoint/2010/main" val="1415348217"/>
+        <p14:creationId xmlns:p14="http://schemas.microsoft.com/office/powerpoint/2010/main" val="1043108648"/>
       </p:ext>
     </p:extLst>
   </p:cSld>
@@ -10476,7 +10777,7 @@
           <p:cNvPr id="2" name="Titel 1">
             <a:extLst>
               <a:ext uri="{FF2B5EF4-FFF2-40B4-BE49-F238E27FC236}">
-                <a16:creationId xmlns:a16="http://schemas.microsoft.com/office/drawing/2014/main" id="{2AA55C7D-CA8C-4F20-85CF-DDD501CDF16B}"/>
+                <a16:creationId xmlns:a16="http://schemas.microsoft.com/office/drawing/2014/main" id="{8B254885-3ADA-4045-9ACB-BF13BC33B956}"/>
               </a:ext>
             </a:extLst>
           </p:cNvPr>
@@ -10489,24 +10790,22 @@
         </p:nvSpPr>
         <p:spPr/>
         <p:txBody>
-          <a:bodyPr>
-            <a:normAutofit/>
-          </a:bodyPr>
+          <a:bodyPr/>
           <a:lstStyle/>
           <a:p>
             <a:r>
-              <a:rPr lang="en-GB" sz="4400" dirty="0" err="1">
+              <a:rPr lang="en-GB" dirty="0" err="1">
                 <a:latin typeface="Segoe UI" panose="020B0502040204020203" pitchFamily="34" charset="0"/>
                 <a:cs typeface="Segoe UI" panose="020B0502040204020203" pitchFamily="34" charset="0"/>
               </a:rPr>
               <a:t>Licenties</a:t>
             </a:r>
             <a:r>
-              <a:rPr lang="en-GB" sz="4400" dirty="0">
-                <a:latin typeface="Segoe UI" panose="020B0502040204020203" pitchFamily="34" charset="0"/>
-                <a:cs typeface="Segoe UI" panose="020B0502040204020203" pitchFamily="34" charset="0"/>
-              </a:rPr>
-              <a:t>: Office 365 Business Premium</a:t>
+              <a:rPr lang="en-GB" dirty="0">
+                <a:latin typeface="Segoe UI" panose="020B0502040204020203" pitchFamily="34" charset="0"/>
+                <a:cs typeface="Segoe UI" panose="020B0502040204020203" pitchFamily="34" charset="0"/>
+              </a:rPr>
+              <a:t>: Microsoft Windows 10 Pro</a:t>
             </a:r>
           </a:p>
         </p:txBody>
@@ -10516,7 +10815,7 @@
           <p:cNvPr id="3" name="Tijdelijke aanduiding voor inhoud 2">
             <a:extLst>
               <a:ext uri="{FF2B5EF4-FFF2-40B4-BE49-F238E27FC236}">
-                <a16:creationId xmlns:a16="http://schemas.microsoft.com/office/drawing/2014/main" id="{11DA97F4-63CF-4062-BD2C-6FF0940630E8}"/>
+                <a16:creationId xmlns:a16="http://schemas.microsoft.com/office/drawing/2014/main" id="{CC7AC8B4-164A-461A-AEE1-2BDB77BAAEDD}"/>
               </a:ext>
             </a:extLst>
           </p:cNvPr>
@@ -10548,7 +10847,7 @@
                 <a:latin typeface="Segoe UI" panose="020B0502040204020203" pitchFamily="34" charset="0"/>
                 <a:cs typeface="Segoe UI" panose="020B0502040204020203" pitchFamily="34" charset="0"/>
               </a:rPr>
-              <a:t>Volledig</a:t>
+              <a:t>Geavanceerde</a:t>
             </a:r>
             <a:r>
               <a:rPr lang="en-GB" dirty="0">
@@ -10562,34 +10861,60 @@
                 <a:latin typeface="Segoe UI" panose="020B0502040204020203" pitchFamily="34" charset="0"/>
                 <a:cs typeface="Segoe UI" panose="020B0502040204020203" pitchFamily="34" charset="0"/>
               </a:rPr>
-              <a:t>Officepakket</a:t>
-            </a:r>
-            <a:r>
-              <a:rPr lang="en-GB" dirty="0">
-                <a:latin typeface="Segoe UI" panose="020B0502040204020203" pitchFamily="34" charset="0"/>
-                <a:cs typeface="Segoe UI" panose="020B0502040204020203" pitchFamily="34" charset="0"/>
-              </a:rPr>
-              <a:t>: Outlook, Word, Excel…</a:t>
-            </a:r>
-          </a:p>
-          <a:p>
-            <a:pPr>
-              <a:buFont typeface="Arial" panose="020B0604020202020204" pitchFamily="34" charset="0"/>
-              <a:buChar char="•"/>
-            </a:pPr>
-            <a:r>
-              <a:rPr lang="en-GB" dirty="0">
-                <a:latin typeface="Segoe UI" panose="020B0502040204020203" pitchFamily="34" charset="0"/>
-                <a:cs typeface="Segoe UI" panose="020B0502040204020203" pitchFamily="34" charset="0"/>
-              </a:rPr>
-              <a:t> </a:t>
-            </a:r>
-            <a:r>
-              <a:rPr lang="nl-NL" dirty="0">
-                <a:latin typeface="Segoe UI" panose="020B0502040204020203" pitchFamily="34" charset="0"/>
-                <a:cs typeface="Segoe UI" panose="020B0502040204020203" pitchFamily="34" charset="0"/>
-              </a:rPr>
-              <a:t>E-maildomeinadres</a:t>
+              <a:t>beveiliging</a:t>
+            </a:r>
+            <a:r>
+              <a:rPr lang="en-GB" dirty="0">
+                <a:latin typeface="Segoe UI" panose="020B0502040204020203" pitchFamily="34" charset="0"/>
+                <a:cs typeface="Segoe UI" panose="020B0502040204020203" pitchFamily="34" charset="0"/>
+              </a:rPr>
+              <a:t>: BitLocker</a:t>
+            </a:r>
+          </a:p>
+          <a:p>
+            <a:pPr>
+              <a:buFont typeface="Arial" panose="020B0604020202020204" pitchFamily="34" charset="0"/>
+              <a:buChar char="•"/>
+            </a:pPr>
+            <a:r>
+              <a:rPr lang="en-GB" dirty="0">
+                <a:latin typeface="Segoe UI" panose="020B0502040204020203" pitchFamily="34" charset="0"/>
+                <a:cs typeface="Segoe UI" panose="020B0502040204020203" pitchFamily="34" charset="0"/>
+              </a:rPr>
+              <a:t> Whiteboard</a:t>
+            </a:r>
+          </a:p>
+          <a:p>
+            <a:pPr>
+              <a:buFont typeface="Arial" panose="020B0604020202020204" pitchFamily="34" charset="0"/>
+              <a:buChar char="•"/>
+            </a:pPr>
+            <a:r>
+              <a:rPr lang="en-GB" dirty="0">
+                <a:latin typeface="Segoe UI" panose="020B0502040204020203" pitchFamily="34" charset="0"/>
+                <a:cs typeface="Segoe UI" panose="020B0502040204020203" pitchFamily="34" charset="0"/>
+              </a:rPr>
+              <a:t> Multi Device Integration</a:t>
+            </a:r>
+          </a:p>
+          <a:p>
+            <a:pPr>
+              <a:buFont typeface="Arial" panose="020B0604020202020204" pitchFamily="34" charset="0"/>
+              <a:buChar char="•"/>
+            </a:pPr>
+            <a:r>
+              <a:rPr lang="en-GB" dirty="0">
+                <a:latin typeface="Segoe UI" panose="020B0502040204020203" pitchFamily="34" charset="0"/>
+                <a:cs typeface="Segoe UI" panose="020B0502040204020203" pitchFamily="34" charset="0"/>
+              </a:rPr>
+              <a:t> Office 365 For Business </a:t>
+            </a:r>
+            <a:r>
+              <a:rPr lang="en-GB" dirty="0" err="1">
+                <a:latin typeface="Segoe UI" panose="020B0502040204020203" pitchFamily="34" charset="0"/>
+                <a:cs typeface="Segoe UI" panose="020B0502040204020203" pitchFamily="34" charset="0"/>
+              </a:rPr>
+              <a:t>integratie</a:t>
             </a:r>
             <a:endParaRPr lang="en-GB" dirty="0">
               <a:latin typeface="Segoe UI" panose="020B0502040204020203" pitchFamily="34" charset="0"/>
@@ -10602,62 +10927,40 @@
               <a:buChar char="•"/>
             </a:pPr>
             <a:r>
-              <a:rPr lang="nl-NL" dirty="0">
-                <a:latin typeface="Segoe UI" panose="020B0502040204020203" pitchFamily="34" charset="0"/>
-                <a:cs typeface="Segoe UI" panose="020B0502040204020203" pitchFamily="34" charset="0"/>
-              </a:rPr>
-              <a:t> Postvak 50 GB</a:t>
-            </a:r>
-          </a:p>
-          <a:p>
-            <a:pPr>
-              <a:buFont typeface="Arial" panose="020B0604020202020204" pitchFamily="34" charset="0"/>
-              <a:buChar char="•"/>
-            </a:pPr>
-            <a:r>
-              <a:rPr lang="nl-NL" dirty="0">
-                <a:latin typeface="Segoe UI" panose="020B0502040204020203" pitchFamily="34" charset="0"/>
-                <a:cs typeface="Segoe UI" panose="020B0502040204020203" pitchFamily="34" charset="0"/>
-              </a:rPr>
-              <a:t> 1TB OneDrive opslag</a:t>
-            </a:r>
-          </a:p>
-          <a:p>
-            <a:pPr>
-              <a:buFont typeface="Arial" panose="020B0604020202020204" pitchFamily="34" charset="0"/>
-              <a:buChar char="•"/>
-            </a:pPr>
-            <a:r>
-              <a:rPr lang="nl-NL" dirty="0">
-                <a:latin typeface="Segoe UI" panose="020B0502040204020203" pitchFamily="34" charset="0"/>
-                <a:cs typeface="Segoe UI" panose="020B0502040204020203" pitchFamily="34" charset="0"/>
-              </a:rPr>
-              <a:t> Aantal: 3</a:t>
-            </a:r>
-          </a:p>
-          <a:p>
-            <a:pPr>
-              <a:buFont typeface="Arial" panose="020B0604020202020204" pitchFamily="34" charset="0"/>
-              <a:buChar char="•"/>
-            </a:pPr>
-            <a:endParaRPr lang="en-GB" dirty="0">
-              <a:latin typeface="Segoe UI" panose="020B0502040204020203" pitchFamily="34" charset="0"/>
-              <a:cs typeface="Segoe UI" panose="020B0502040204020203" pitchFamily="34" charset="0"/>
-            </a:endParaRPr>
+              <a:rPr lang="en-GB" dirty="0">
+                <a:latin typeface="Segoe UI" panose="020B0502040204020203" pitchFamily="34" charset="0"/>
+                <a:cs typeface="Segoe UI" panose="020B0502040204020203" pitchFamily="34" charset="0"/>
+              </a:rPr>
+              <a:t> </a:t>
+            </a:r>
+            <a:r>
+              <a:rPr lang="en-GB" dirty="0" err="1">
+                <a:latin typeface="Segoe UI" panose="020B0502040204020203" pitchFamily="34" charset="0"/>
+                <a:cs typeface="Segoe UI" panose="020B0502040204020203" pitchFamily="34" charset="0"/>
+              </a:rPr>
+              <a:t>Aantal</a:t>
+            </a:r>
+            <a:r>
+              <a:rPr lang="en-GB" dirty="0">
+                <a:latin typeface="Segoe UI" panose="020B0502040204020203" pitchFamily="34" charset="0"/>
+                <a:cs typeface="Segoe UI" panose="020B0502040204020203" pitchFamily="34" charset="0"/>
+              </a:rPr>
+              <a:t>: 5</a:t>
+            </a:r>
           </a:p>
         </p:txBody>
       </p:sp>
       <p:pic>
         <p:nvPicPr>
-          <p:cNvPr id="4100" name="Picture 4" descr="Image result for office 365 logo png">
+          <p:cNvPr id="13" name="Afbeelding 12">
             <a:extLst>
               <a:ext uri="{FF2B5EF4-FFF2-40B4-BE49-F238E27FC236}">
-                <a16:creationId xmlns:a16="http://schemas.microsoft.com/office/drawing/2014/main" id="{9C37A40D-6E03-46B7-86C8-FDDCB3D714D9}"/>
+                <a16:creationId xmlns:a16="http://schemas.microsoft.com/office/drawing/2014/main" id="{2E47A4EF-AA04-40BF-BD04-8BEE8A5B05E0}"/>
               </a:ext>
             </a:extLst>
           </p:cNvPr>
           <p:cNvPicPr>
-            <a:picLocks noChangeAspect="1" noChangeArrowheads="1"/>
+            <a:picLocks noChangeAspect="1"/>
           </p:cNvPicPr>
           <p:nvPr/>
         </p:nvPicPr>
@@ -10669,35 +10972,24 @@
               </a:ext>
             </a:extLst>
           </a:blip>
-          <a:srcRect/>
           <a:stretch>
             <a:fillRect/>
           </a:stretch>
         </p:blipFill>
-        <p:spPr bwMode="auto">
+        <p:spPr>
           <a:xfrm>
-            <a:off x="6738824" y="4787474"/>
-            <a:ext cx="4980808" cy="1146624"/>
+            <a:off x="6126480" y="4928010"/>
+            <a:ext cx="5672747" cy="1049458"/>
           </a:xfrm>
           <a:prstGeom prst="rect">
             <a:avLst/>
           </a:prstGeom>
-          <a:noFill/>
-          <a:extLst>
-            <a:ext uri="{909E8E84-426E-40DD-AFC4-6F175D3DCCD1}">
-              <a14:hiddenFill xmlns:a14="http://schemas.microsoft.com/office/drawing/2010/main">
-                <a:solidFill>
-                  <a:srgbClr val="FFFFFF"/>
-                </a:solidFill>
-              </a14:hiddenFill>
-            </a:ext>
-          </a:extLst>
         </p:spPr>
       </p:pic>
     </p:spTree>
     <p:extLst>
       <p:ext uri="{BB962C8B-B14F-4D97-AF65-F5344CB8AC3E}">
-        <p14:creationId xmlns:p14="http://schemas.microsoft.com/office/powerpoint/2010/main" val="2456303568"/>
+        <p14:creationId xmlns:p14="http://schemas.microsoft.com/office/powerpoint/2010/main" val="1415348217"/>
       </p:ext>
     </p:extLst>
   </p:cSld>
@@ -10855,6 +11147,262 @@
           <p:cNvPr id="2" name="Titel 1">
             <a:extLst>
               <a:ext uri="{FF2B5EF4-FFF2-40B4-BE49-F238E27FC236}">
+                <a16:creationId xmlns:a16="http://schemas.microsoft.com/office/drawing/2014/main" id="{2AA55C7D-CA8C-4F20-85CF-DDD501CDF16B}"/>
+              </a:ext>
+            </a:extLst>
+          </p:cNvPr>
+          <p:cNvSpPr>
+            <a:spLocks noGrp="1"/>
+          </p:cNvSpPr>
+          <p:nvPr>
+            <p:ph type="title"/>
+          </p:nvPr>
+        </p:nvSpPr>
+        <p:spPr/>
+        <p:txBody>
+          <a:bodyPr>
+            <a:normAutofit/>
+          </a:bodyPr>
+          <a:lstStyle/>
+          <a:p>
+            <a:r>
+              <a:rPr lang="en-GB" sz="4400" dirty="0" err="1">
+                <a:latin typeface="Segoe UI" panose="020B0502040204020203" pitchFamily="34" charset="0"/>
+                <a:cs typeface="Segoe UI" panose="020B0502040204020203" pitchFamily="34" charset="0"/>
+              </a:rPr>
+              <a:t>Licenties</a:t>
+            </a:r>
+            <a:r>
+              <a:rPr lang="en-GB" sz="4400" dirty="0">
+                <a:latin typeface="Segoe UI" panose="020B0502040204020203" pitchFamily="34" charset="0"/>
+                <a:cs typeface="Segoe UI" panose="020B0502040204020203" pitchFamily="34" charset="0"/>
+              </a:rPr>
+              <a:t>: Office 365 Business Premium</a:t>
+            </a:r>
+          </a:p>
+        </p:txBody>
+      </p:sp>
+      <p:sp>
+        <p:nvSpPr>
+          <p:cNvPr id="3" name="Tijdelijke aanduiding voor inhoud 2">
+            <a:extLst>
+              <a:ext uri="{FF2B5EF4-FFF2-40B4-BE49-F238E27FC236}">
+                <a16:creationId xmlns:a16="http://schemas.microsoft.com/office/drawing/2014/main" id="{11DA97F4-63CF-4062-BD2C-6FF0940630E8}"/>
+              </a:ext>
+            </a:extLst>
+          </p:cNvPr>
+          <p:cNvSpPr>
+            <a:spLocks noGrp="1"/>
+          </p:cNvSpPr>
+          <p:nvPr>
+            <p:ph idx="1"/>
+          </p:nvPr>
+        </p:nvSpPr>
+        <p:spPr/>
+        <p:txBody>
+          <a:bodyPr/>
+          <a:lstStyle/>
+          <a:p>
+            <a:pPr>
+              <a:buFont typeface="Arial" panose="020B0604020202020204" pitchFamily="34" charset="0"/>
+              <a:buChar char="•"/>
+            </a:pPr>
+            <a:r>
+              <a:rPr lang="en-GB" dirty="0">
+                <a:latin typeface="Segoe UI" panose="020B0502040204020203" pitchFamily="34" charset="0"/>
+                <a:cs typeface="Segoe UI" panose="020B0502040204020203" pitchFamily="34" charset="0"/>
+              </a:rPr>
+              <a:t> </a:t>
+            </a:r>
+            <a:r>
+              <a:rPr lang="en-GB" dirty="0" err="1">
+                <a:latin typeface="Segoe UI" panose="020B0502040204020203" pitchFamily="34" charset="0"/>
+                <a:cs typeface="Segoe UI" panose="020B0502040204020203" pitchFamily="34" charset="0"/>
+              </a:rPr>
+              <a:t>Volledig</a:t>
+            </a:r>
+            <a:r>
+              <a:rPr lang="en-GB" dirty="0">
+                <a:latin typeface="Segoe UI" panose="020B0502040204020203" pitchFamily="34" charset="0"/>
+                <a:cs typeface="Segoe UI" panose="020B0502040204020203" pitchFamily="34" charset="0"/>
+              </a:rPr>
+              <a:t> </a:t>
+            </a:r>
+            <a:r>
+              <a:rPr lang="en-GB" dirty="0" err="1">
+                <a:latin typeface="Segoe UI" panose="020B0502040204020203" pitchFamily="34" charset="0"/>
+                <a:cs typeface="Segoe UI" panose="020B0502040204020203" pitchFamily="34" charset="0"/>
+              </a:rPr>
+              <a:t>Officepakket</a:t>
+            </a:r>
+            <a:r>
+              <a:rPr lang="en-GB" dirty="0">
+                <a:latin typeface="Segoe UI" panose="020B0502040204020203" pitchFamily="34" charset="0"/>
+                <a:cs typeface="Segoe UI" panose="020B0502040204020203" pitchFamily="34" charset="0"/>
+              </a:rPr>
+              <a:t>: Outlook, Word, Excel…</a:t>
+            </a:r>
+          </a:p>
+          <a:p>
+            <a:pPr>
+              <a:buFont typeface="Arial" panose="020B0604020202020204" pitchFamily="34" charset="0"/>
+              <a:buChar char="•"/>
+            </a:pPr>
+            <a:r>
+              <a:rPr lang="en-GB" dirty="0">
+                <a:latin typeface="Segoe UI" panose="020B0502040204020203" pitchFamily="34" charset="0"/>
+                <a:cs typeface="Segoe UI" panose="020B0502040204020203" pitchFamily="34" charset="0"/>
+              </a:rPr>
+              <a:t> </a:t>
+            </a:r>
+            <a:r>
+              <a:rPr lang="nl-NL" dirty="0">
+                <a:latin typeface="Segoe UI" panose="020B0502040204020203" pitchFamily="34" charset="0"/>
+                <a:cs typeface="Segoe UI" panose="020B0502040204020203" pitchFamily="34" charset="0"/>
+              </a:rPr>
+              <a:t>E-maildomeinadres</a:t>
+            </a:r>
+            <a:endParaRPr lang="en-GB" dirty="0">
+              <a:latin typeface="Segoe UI" panose="020B0502040204020203" pitchFamily="34" charset="0"/>
+              <a:cs typeface="Segoe UI" panose="020B0502040204020203" pitchFamily="34" charset="0"/>
+            </a:endParaRPr>
+          </a:p>
+          <a:p>
+            <a:pPr>
+              <a:buFont typeface="Arial" panose="020B0604020202020204" pitchFamily="34" charset="0"/>
+              <a:buChar char="•"/>
+            </a:pPr>
+            <a:r>
+              <a:rPr lang="nl-NL" dirty="0">
+                <a:latin typeface="Segoe UI" panose="020B0502040204020203" pitchFamily="34" charset="0"/>
+                <a:cs typeface="Segoe UI" panose="020B0502040204020203" pitchFamily="34" charset="0"/>
+              </a:rPr>
+              <a:t> Postvak 50 GB</a:t>
+            </a:r>
+          </a:p>
+          <a:p>
+            <a:pPr>
+              <a:buFont typeface="Arial" panose="020B0604020202020204" pitchFamily="34" charset="0"/>
+              <a:buChar char="•"/>
+            </a:pPr>
+            <a:r>
+              <a:rPr lang="nl-NL" dirty="0">
+                <a:latin typeface="Segoe UI" panose="020B0502040204020203" pitchFamily="34" charset="0"/>
+                <a:cs typeface="Segoe UI" panose="020B0502040204020203" pitchFamily="34" charset="0"/>
+              </a:rPr>
+              <a:t> 1TB OneDrive opslag</a:t>
+            </a:r>
+          </a:p>
+          <a:p>
+            <a:pPr>
+              <a:buFont typeface="Arial" panose="020B0604020202020204" pitchFamily="34" charset="0"/>
+              <a:buChar char="•"/>
+            </a:pPr>
+            <a:r>
+              <a:rPr lang="nl-NL" dirty="0">
+                <a:latin typeface="Segoe UI" panose="020B0502040204020203" pitchFamily="34" charset="0"/>
+                <a:cs typeface="Segoe UI" panose="020B0502040204020203" pitchFamily="34" charset="0"/>
+              </a:rPr>
+              <a:t> Aantal: 3</a:t>
+            </a:r>
+          </a:p>
+          <a:p>
+            <a:pPr>
+              <a:buFont typeface="Arial" panose="020B0604020202020204" pitchFamily="34" charset="0"/>
+              <a:buChar char="•"/>
+            </a:pPr>
+            <a:endParaRPr lang="en-GB" dirty="0">
+              <a:latin typeface="Segoe UI" panose="020B0502040204020203" pitchFamily="34" charset="0"/>
+              <a:cs typeface="Segoe UI" panose="020B0502040204020203" pitchFamily="34" charset="0"/>
+            </a:endParaRPr>
+          </a:p>
+        </p:txBody>
+      </p:sp>
+      <p:pic>
+        <p:nvPicPr>
+          <p:cNvPr id="4100" name="Picture 4" descr="Image result for office 365 logo png">
+            <a:extLst>
+              <a:ext uri="{FF2B5EF4-FFF2-40B4-BE49-F238E27FC236}">
+                <a16:creationId xmlns:a16="http://schemas.microsoft.com/office/drawing/2014/main" id="{9C37A40D-6E03-46B7-86C8-FDDCB3D714D9}"/>
+              </a:ext>
+            </a:extLst>
+          </p:cNvPr>
+          <p:cNvPicPr>
+            <a:picLocks noChangeAspect="1" noChangeArrowheads="1"/>
+          </p:cNvPicPr>
+          <p:nvPr/>
+        </p:nvPicPr>
+        <p:blipFill>
+          <a:blip r:embed="rId2">
+            <a:extLst>
+              <a:ext uri="{28A0092B-C50C-407E-A947-70E740481C1C}">
+                <a14:useLocalDpi xmlns:a14="http://schemas.microsoft.com/office/drawing/2010/main" val="0"/>
+              </a:ext>
+            </a:extLst>
+          </a:blip>
+          <a:srcRect/>
+          <a:stretch>
+            <a:fillRect/>
+          </a:stretch>
+        </p:blipFill>
+        <p:spPr bwMode="auto">
+          <a:xfrm>
+            <a:off x="6738824" y="4787474"/>
+            <a:ext cx="4980808" cy="1146624"/>
+          </a:xfrm>
+          <a:prstGeom prst="rect">
+            <a:avLst/>
+          </a:prstGeom>
+          <a:noFill/>
+          <a:extLst>
+            <a:ext uri="{909E8E84-426E-40DD-AFC4-6F175D3DCCD1}">
+              <a14:hiddenFill xmlns:a14="http://schemas.microsoft.com/office/drawing/2010/main">
+                <a:solidFill>
+                  <a:srgbClr val="FFFFFF"/>
+                </a:solidFill>
+              </a14:hiddenFill>
+            </a:ext>
+          </a:extLst>
+        </p:spPr>
+      </p:pic>
+    </p:spTree>
+    <p:extLst>
+      <p:ext uri="{BB962C8B-B14F-4D97-AF65-F5344CB8AC3E}">
+        <p14:creationId xmlns:p14="http://schemas.microsoft.com/office/powerpoint/2010/main" val="2456303568"/>
+      </p:ext>
+    </p:extLst>
+  </p:cSld>
+  <p:clrMapOvr>
+    <a:masterClrMapping/>
+  </p:clrMapOvr>
+  <p:transition>
+    <p:fade/>
+  </p:transition>
+</p:sld>
+</file>
+
+<file path=ppt/slides/slide31.xml><?xml version="1.0" encoding="utf-8"?>
+<p:sld xmlns:a="http://schemas.openxmlformats.org/drawingml/2006/main" xmlns:r="http://schemas.openxmlformats.org/officeDocument/2006/relationships" xmlns:p="http://schemas.openxmlformats.org/presentationml/2006/main">
+  <p:cSld>
+    <p:spTree>
+      <p:nvGrpSpPr>
+        <p:cNvPr id="1" name=""/>
+        <p:cNvGrpSpPr/>
+        <p:nvPr/>
+      </p:nvGrpSpPr>
+      <p:grpSpPr>
+        <a:xfrm>
+          <a:off x="0" y="0"/>
+          <a:ext cx="0" cy="0"/>
+          <a:chOff x="0" y="0"/>
+          <a:chExt cx="0" cy="0"/>
+        </a:xfrm>
+      </p:grpSpPr>
+      <p:sp>
+        <p:nvSpPr>
+          <p:cNvPr id="2" name="Titel 1">
+            <a:extLst>
+              <a:ext uri="{FF2B5EF4-FFF2-40B4-BE49-F238E27FC236}">
                 <a16:creationId xmlns:a16="http://schemas.microsoft.com/office/drawing/2014/main" id="{96FDC39C-A138-4112-88C9-2A9790E245D3}"/>
               </a:ext>
             </a:extLst>
@@ -11104,7 +11652,7 @@
 </p:sld>
 </file>
 
-<file path=ppt/slides/slide31.xml><?xml version="1.0" encoding="utf-8"?>
+<file path=ppt/slides/slide32.xml><?xml version="1.0" encoding="utf-8"?>
 <p:sld xmlns:a="http://schemas.openxmlformats.org/drawingml/2006/main" xmlns:r="http://schemas.openxmlformats.org/officeDocument/2006/relationships" xmlns:p="http://schemas.openxmlformats.org/presentationml/2006/main">
   <p:cSld>
     <p:spTree>
@@ -11342,7 +11890,7 @@
 </p:sld>
 </file>
 
-<file path=ppt/slides/slide32.xml><?xml version="1.0" encoding="utf-8"?>
+<file path=ppt/slides/slide33.xml><?xml version="1.0" encoding="utf-8"?>
 <p:sld xmlns:a="http://schemas.openxmlformats.org/drawingml/2006/main" xmlns:r="http://schemas.openxmlformats.org/officeDocument/2006/relationships" xmlns:p="http://schemas.openxmlformats.org/presentationml/2006/main">
   <p:cSld>
     <p:spTree>
@@ -11572,7 +12120,7 @@
 </p:sld>
 </file>
 
-<file path=ppt/slides/slide33.xml><?xml version="1.0" encoding="utf-8"?>
+<file path=ppt/slides/slide34.xml><?xml version="1.0" encoding="utf-8"?>
 <p:sld xmlns:a="http://schemas.openxmlformats.org/drawingml/2006/main" xmlns:r="http://schemas.openxmlformats.org/officeDocument/2006/relationships" xmlns:p="http://schemas.openxmlformats.org/presentationml/2006/main">
   <p:cSld>
     <p:spTree>
@@ -11772,396 +12320,6 @@
 </p:sld>
 </file>
 
-<file path=ppt/slides/slide34.xml><?xml version="1.0" encoding="utf-8"?>
-<p:sld xmlns:a="http://schemas.openxmlformats.org/drawingml/2006/main" xmlns:r="http://schemas.openxmlformats.org/officeDocument/2006/relationships" xmlns:p="http://schemas.openxmlformats.org/presentationml/2006/main">
-  <p:cSld>
-    <p:spTree>
-      <p:nvGrpSpPr>
-        <p:cNvPr id="1" name=""/>
-        <p:cNvGrpSpPr/>
-        <p:nvPr/>
-      </p:nvGrpSpPr>
-      <p:grpSpPr>
-        <a:xfrm>
-          <a:off x="0" y="0"/>
-          <a:ext cx="0" cy="0"/>
-          <a:chOff x="0" y="0"/>
-          <a:chExt cx="0" cy="0"/>
-        </a:xfrm>
-      </p:grpSpPr>
-      <p:sp>
-        <p:nvSpPr>
-          <p:cNvPr id="2" name="Titel 1">
-            <a:extLst>
-              <a:ext uri="{FF2B5EF4-FFF2-40B4-BE49-F238E27FC236}">
-                <a16:creationId xmlns:a16="http://schemas.microsoft.com/office/drawing/2014/main" id="{AF8602B3-218E-49DA-8CFF-C7CE0F8C82BC}"/>
-              </a:ext>
-            </a:extLst>
-          </p:cNvPr>
-          <p:cNvSpPr>
-            <a:spLocks noGrp="1"/>
-          </p:cNvSpPr>
-          <p:nvPr>
-            <p:ph type="title"/>
-          </p:nvPr>
-        </p:nvSpPr>
-        <p:spPr/>
-        <p:txBody>
-          <a:bodyPr/>
-          <a:lstStyle/>
-          <a:p>
-            <a:r>
-              <a:rPr lang="en-GB" dirty="0" err="1">
-                <a:latin typeface="Segoe UI" panose="020B0502040204020203" pitchFamily="34" charset="0"/>
-                <a:cs typeface="Segoe UI" panose="020B0502040204020203" pitchFamily="34" charset="0"/>
-              </a:rPr>
-              <a:t>Installatie</a:t>
-            </a:r>
-            <a:r>
-              <a:rPr lang="en-GB" dirty="0">
-                <a:latin typeface="Segoe UI" panose="020B0502040204020203" pitchFamily="34" charset="0"/>
-                <a:cs typeface="Segoe UI" panose="020B0502040204020203" pitchFamily="34" charset="0"/>
-              </a:rPr>
-              <a:t> &amp; </a:t>
-            </a:r>
-            <a:r>
-              <a:rPr lang="en-GB" dirty="0" err="1">
-                <a:latin typeface="Segoe UI" panose="020B0502040204020203" pitchFamily="34" charset="0"/>
-                <a:cs typeface="Segoe UI" panose="020B0502040204020203" pitchFamily="34" charset="0"/>
-              </a:rPr>
-              <a:t>Verder</a:t>
-            </a:r>
-            <a:r>
-              <a:rPr lang="en-GB" dirty="0">
-                <a:latin typeface="Segoe UI" panose="020B0502040204020203" pitchFamily="34" charset="0"/>
-                <a:cs typeface="Segoe UI" panose="020B0502040204020203" pitchFamily="34" charset="0"/>
-              </a:rPr>
-              <a:t> </a:t>
-            </a:r>
-            <a:r>
-              <a:rPr lang="en-GB" dirty="0" err="1">
-                <a:latin typeface="Segoe UI" panose="020B0502040204020203" pitchFamily="34" charset="0"/>
-                <a:cs typeface="Segoe UI" panose="020B0502040204020203" pitchFamily="34" charset="0"/>
-              </a:rPr>
-              <a:t>Verloop</a:t>
-            </a:r>
-            <a:endParaRPr lang="en-GB" dirty="0">
-              <a:latin typeface="Segoe UI" panose="020B0502040204020203" pitchFamily="34" charset="0"/>
-              <a:cs typeface="Segoe UI" panose="020B0502040204020203" pitchFamily="34" charset="0"/>
-            </a:endParaRPr>
-          </a:p>
-        </p:txBody>
-      </p:sp>
-      <p:sp>
-        <p:nvSpPr>
-          <p:cNvPr id="3" name="Tijdelijke aanduiding voor inhoud 2">
-            <a:extLst>
-              <a:ext uri="{FF2B5EF4-FFF2-40B4-BE49-F238E27FC236}">
-                <a16:creationId xmlns:a16="http://schemas.microsoft.com/office/drawing/2014/main" id="{514F0ABA-EC52-4AAF-9E74-5D85A79C9199}"/>
-              </a:ext>
-            </a:extLst>
-          </p:cNvPr>
-          <p:cNvSpPr>
-            <a:spLocks noGrp="1"/>
-          </p:cNvSpPr>
-          <p:nvPr>
-            <p:ph idx="1"/>
-          </p:nvPr>
-        </p:nvSpPr>
-        <p:spPr/>
-        <p:txBody>
-          <a:bodyPr/>
-          <a:lstStyle/>
-          <a:p>
-            <a:pPr>
-              <a:buFont typeface="Arial" panose="020B0604020202020204" pitchFamily="34" charset="0"/>
-              <a:buChar char="•"/>
-            </a:pPr>
-            <a:r>
-              <a:rPr lang="en-GB" dirty="0">
-                <a:latin typeface="Segoe UI" panose="020B0502040204020203" pitchFamily="34" charset="0"/>
-                <a:cs typeface="Segoe UI" panose="020B0502040204020203" pitchFamily="34" charset="0"/>
-              </a:rPr>
-              <a:t> </a:t>
-            </a:r>
-            <a:r>
-              <a:rPr lang="en-GB" dirty="0" err="1">
-                <a:latin typeface="Segoe UI" panose="020B0502040204020203" pitchFamily="34" charset="0"/>
-                <a:cs typeface="Segoe UI" panose="020B0502040204020203" pitchFamily="34" charset="0"/>
-              </a:rPr>
-              <a:t>Geschatte</a:t>
-            </a:r>
-            <a:r>
-              <a:rPr lang="en-GB" dirty="0">
-                <a:latin typeface="Segoe UI" panose="020B0502040204020203" pitchFamily="34" charset="0"/>
-                <a:cs typeface="Segoe UI" panose="020B0502040204020203" pitchFamily="34" charset="0"/>
-              </a:rPr>
-              <a:t> </a:t>
-            </a:r>
-            <a:r>
-              <a:rPr lang="en-GB" dirty="0" err="1">
-                <a:latin typeface="Segoe UI" panose="020B0502040204020203" pitchFamily="34" charset="0"/>
-                <a:cs typeface="Segoe UI" panose="020B0502040204020203" pitchFamily="34" charset="0"/>
-              </a:rPr>
-              <a:t>installatieduur</a:t>
-            </a:r>
-            <a:r>
-              <a:rPr lang="en-GB" dirty="0">
-                <a:latin typeface="Segoe UI" panose="020B0502040204020203" pitchFamily="34" charset="0"/>
-                <a:cs typeface="Segoe UI" panose="020B0502040204020203" pitchFamily="34" charset="0"/>
-              </a:rPr>
-              <a:t>: 5 </a:t>
-            </a:r>
-            <a:r>
-              <a:rPr lang="en-GB" dirty="0" err="1">
-                <a:latin typeface="Segoe UI" panose="020B0502040204020203" pitchFamily="34" charset="0"/>
-                <a:cs typeface="Segoe UI" panose="020B0502040204020203" pitchFamily="34" charset="0"/>
-              </a:rPr>
-              <a:t>werkdagen</a:t>
-            </a:r>
-            <a:r>
-              <a:rPr lang="en-GB" dirty="0">
-                <a:latin typeface="Segoe UI" panose="020B0502040204020203" pitchFamily="34" charset="0"/>
-                <a:cs typeface="Segoe UI" panose="020B0502040204020203" pitchFamily="34" charset="0"/>
-              </a:rPr>
-              <a:t> (40 </a:t>
-            </a:r>
-            <a:r>
-              <a:rPr lang="en-GB" dirty="0" err="1">
-                <a:latin typeface="Segoe UI" panose="020B0502040204020203" pitchFamily="34" charset="0"/>
-                <a:cs typeface="Segoe UI" panose="020B0502040204020203" pitchFamily="34" charset="0"/>
-              </a:rPr>
-              <a:t>uur</a:t>
-            </a:r>
-            <a:r>
-              <a:rPr lang="en-GB" dirty="0">
-                <a:latin typeface="Segoe UI" panose="020B0502040204020203" pitchFamily="34" charset="0"/>
-                <a:cs typeface="Segoe UI" panose="020B0502040204020203" pitchFamily="34" charset="0"/>
-              </a:rPr>
-              <a:t>)</a:t>
-            </a:r>
-          </a:p>
-          <a:p>
-            <a:pPr>
-              <a:buFont typeface="Arial" panose="020B0604020202020204" pitchFamily="34" charset="0"/>
-              <a:buChar char="•"/>
-            </a:pPr>
-            <a:r>
-              <a:rPr lang="en-GB" dirty="0">
-                <a:latin typeface="Segoe UI" panose="020B0502040204020203" pitchFamily="34" charset="0"/>
-                <a:cs typeface="Segoe UI" panose="020B0502040204020203" pitchFamily="34" charset="0"/>
-              </a:rPr>
-              <a:t> </a:t>
-            </a:r>
-            <a:r>
-              <a:rPr lang="en-GB" dirty="0" err="1">
-                <a:latin typeface="Segoe UI" panose="020B0502040204020203" pitchFamily="34" charset="0"/>
-                <a:cs typeface="Segoe UI" panose="020B0502040204020203" pitchFamily="34" charset="0"/>
-              </a:rPr>
-              <a:t>Opleiding</a:t>
-            </a:r>
-            <a:r>
-              <a:rPr lang="en-GB" dirty="0">
-                <a:latin typeface="Segoe UI" panose="020B0502040204020203" pitchFamily="34" charset="0"/>
-                <a:cs typeface="Segoe UI" panose="020B0502040204020203" pitchFamily="34" charset="0"/>
-              </a:rPr>
-              <a:t>: 2 </a:t>
-            </a:r>
-            <a:r>
-              <a:rPr lang="en-GB" dirty="0" err="1">
-                <a:latin typeface="Segoe UI" panose="020B0502040204020203" pitchFamily="34" charset="0"/>
-                <a:cs typeface="Segoe UI" panose="020B0502040204020203" pitchFamily="34" charset="0"/>
-              </a:rPr>
-              <a:t>dagen</a:t>
-            </a:r>
-            <a:r>
-              <a:rPr lang="en-GB" dirty="0">
-                <a:latin typeface="Segoe UI" panose="020B0502040204020203" pitchFamily="34" charset="0"/>
-                <a:cs typeface="Segoe UI" panose="020B0502040204020203" pitchFamily="34" charset="0"/>
-              </a:rPr>
-              <a:t> (16 </a:t>
-            </a:r>
-            <a:r>
-              <a:rPr lang="en-GB" dirty="0" err="1">
-                <a:latin typeface="Segoe UI" panose="020B0502040204020203" pitchFamily="34" charset="0"/>
-                <a:cs typeface="Segoe UI" panose="020B0502040204020203" pitchFamily="34" charset="0"/>
-              </a:rPr>
-              <a:t>uur</a:t>
-            </a:r>
-            <a:r>
-              <a:rPr lang="en-GB" dirty="0">
-                <a:latin typeface="Segoe UI" panose="020B0502040204020203" pitchFamily="34" charset="0"/>
-                <a:cs typeface="Segoe UI" panose="020B0502040204020203" pitchFamily="34" charset="0"/>
-              </a:rPr>
-              <a:t>)</a:t>
-            </a:r>
-          </a:p>
-          <a:p>
-            <a:pPr>
-              <a:buFont typeface="Arial" panose="020B0604020202020204" pitchFamily="34" charset="0"/>
-              <a:buChar char="•"/>
-            </a:pPr>
-            <a:r>
-              <a:rPr lang="en-GB" dirty="0">
-                <a:latin typeface="Segoe UI" panose="020B0502040204020203" pitchFamily="34" charset="0"/>
-                <a:cs typeface="Segoe UI" panose="020B0502040204020203" pitchFamily="34" charset="0"/>
-              </a:rPr>
-              <a:t> </a:t>
-            </a:r>
-            <a:r>
-              <a:rPr lang="en-GB" dirty="0" err="1">
-                <a:latin typeface="Segoe UI" panose="020B0502040204020203" pitchFamily="34" charset="0"/>
-                <a:cs typeface="Segoe UI" panose="020B0502040204020203" pitchFamily="34" charset="0"/>
-              </a:rPr>
-              <a:t>Garantie</a:t>
-            </a:r>
-            <a:r>
-              <a:rPr lang="en-GB" dirty="0">
-                <a:latin typeface="Segoe UI" panose="020B0502040204020203" pitchFamily="34" charset="0"/>
-                <a:cs typeface="Segoe UI" panose="020B0502040204020203" pitchFamily="34" charset="0"/>
-              </a:rPr>
-              <a:t> op </a:t>
-            </a:r>
-            <a:r>
-              <a:rPr lang="en-GB" dirty="0" err="1">
-                <a:latin typeface="Segoe UI" panose="020B0502040204020203" pitchFamily="34" charset="0"/>
-                <a:cs typeface="Segoe UI" panose="020B0502040204020203" pitchFamily="34" charset="0"/>
-              </a:rPr>
-              <a:t>installatie</a:t>
-            </a:r>
-            <a:r>
-              <a:rPr lang="en-GB" dirty="0">
-                <a:latin typeface="Segoe UI" panose="020B0502040204020203" pitchFamily="34" charset="0"/>
-                <a:cs typeface="Segoe UI" panose="020B0502040204020203" pitchFamily="34" charset="0"/>
-              </a:rPr>
-              <a:t> </a:t>
-            </a:r>
-            <a:r>
-              <a:rPr lang="en-GB" dirty="0" err="1">
-                <a:latin typeface="Segoe UI" panose="020B0502040204020203" pitchFamily="34" charset="0"/>
-                <a:cs typeface="Segoe UI" panose="020B0502040204020203" pitchFamily="34" charset="0"/>
-              </a:rPr>
-              <a:t>en</a:t>
-            </a:r>
-            <a:r>
-              <a:rPr lang="en-GB" dirty="0">
-                <a:latin typeface="Segoe UI" panose="020B0502040204020203" pitchFamily="34" charset="0"/>
-                <a:cs typeface="Segoe UI" panose="020B0502040204020203" pitchFamily="34" charset="0"/>
-              </a:rPr>
-              <a:t> </a:t>
-            </a:r>
-            <a:r>
-              <a:rPr lang="en-GB" dirty="0" err="1">
-                <a:latin typeface="Segoe UI" panose="020B0502040204020203" pitchFamily="34" charset="0"/>
-                <a:cs typeface="Segoe UI" panose="020B0502040204020203" pitchFamily="34" charset="0"/>
-              </a:rPr>
-              <a:t>apparatuur</a:t>
-            </a:r>
-            <a:r>
-              <a:rPr lang="en-GB" dirty="0">
-                <a:latin typeface="Segoe UI" panose="020B0502040204020203" pitchFamily="34" charset="0"/>
-                <a:cs typeface="Segoe UI" panose="020B0502040204020203" pitchFamily="34" charset="0"/>
-              </a:rPr>
-              <a:t>: 2 </a:t>
-            </a:r>
-            <a:r>
-              <a:rPr lang="en-GB" dirty="0" err="1">
-                <a:latin typeface="Segoe UI" panose="020B0502040204020203" pitchFamily="34" charset="0"/>
-                <a:cs typeface="Segoe UI" panose="020B0502040204020203" pitchFamily="34" charset="0"/>
-              </a:rPr>
-              <a:t>jaar</a:t>
-            </a:r>
-            <a:endParaRPr lang="en-GB" dirty="0">
-              <a:latin typeface="Segoe UI" panose="020B0502040204020203" pitchFamily="34" charset="0"/>
-              <a:cs typeface="Segoe UI" panose="020B0502040204020203" pitchFamily="34" charset="0"/>
-            </a:endParaRPr>
-          </a:p>
-          <a:p>
-            <a:pPr>
-              <a:buFont typeface="Arial" panose="020B0604020202020204" pitchFamily="34" charset="0"/>
-              <a:buChar char="•"/>
-            </a:pPr>
-            <a:r>
-              <a:rPr lang="en-GB" dirty="0">
-                <a:latin typeface="Segoe UI" panose="020B0502040204020203" pitchFamily="34" charset="0"/>
-                <a:cs typeface="Segoe UI" panose="020B0502040204020203" pitchFamily="34" charset="0"/>
-              </a:rPr>
-              <a:t> </a:t>
-            </a:r>
-            <a:r>
-              <a:rPr lang="en-GB" dirty="0" err="1">
-                <a:latin typeface="Segoe UI" panose="020B0502040204020203" pitchFamily="34" charset="0"/>
-                <a:cs typeface="Segoe UI" panose="020B0502040204020203" pitchFamily="34" charset="0"/>
-              </a:rPr>
-              <a:t>Optioneel</a:t>
-            </a:r>
-            <a:r>
-              <a:rPr lang="en-GB" dirty="0">
-                <a:latin typeface="Segoe UI" panose="020B0502040204020203" pitchFamily="34" charset="0"/>
-                <a:cs typeface="Segoe UI" panose="020B0502040204020203" pitchFamily="34" charset="0"/>
-              </a:rPr>
-              <a:t> </a:t>
-            </a:r>
-            <a:r>
-              <a:rPr lang="en-GB" dirty="0" err="1">
-                <a:latin typeface="Segoe UI" panose="020B0502040204020203" pitchFamily="34" charset="0"/>
-                <a:cs typeface="Segoe UI" panose="020B0502040204020203" pitchFamily="34" charset="0"/>
-              </a:rPr>
-              <a:t>onderhoudscontract</a:t>
-            </a:r>
-            <a:endParaRPr lang="en-GB" dirty="0">
-              <a:latin typeface="Segoe UI" panose="020B0502040204020203" pitchFamily="34" charset="0"/>
-              <a:cs typeface="Segoe UI" panose="020B0502040204020203" pitchFamily="34" charset="0"/>
-            </a:endParaRPr>
-          </a:p>
-          <a:p>
-            <a:pPr lvl="1">
-              <a:buFont typeface="Arial" panose="020B0604020202020204" pitchFamily="34" charset="0"/>
-              <a:buChar char="•"/>
-            </a:pPr>
-            <a:r>
-              <a:rPr lang="en-GB" dirty="0">
-                <a:latin typeface="Segoe UI" panose="020B0502040204020203" pitchFamily="34" charset="0"/>
-                <a:cs typeface="Segoe UI" panose="020B0502040204020203" pitchFamily="34" charset="0"/>
-              </a:rPr>
-              <a:t>24/7 Helpdesk</a:t>
-            </a:r>
-          </a:p>
-          <a:p>
-            <a:pPr lvl="1">
-              <a:buFont typeface="Arial" panose="020B0604020202020204" pitchFamily="34" charset="0"/>
-              <a:buChar char="•"/>
-            </a:pPr>
-            <a:r>
-              <a:rPr lang="en-GB" dirty="0" err="1">
-                <a:latin typeface="Segoe UI" panose="020B0502040204020203" pitchFamily="34" charset="0"/>
-                <a:cs typeface="Segoe UI" panose="020B0502040204020203" pitchFamily="34" charset="0"/>
-              </a:rPr>
-              <a:t>Interventies</a:t>
-            </a:r>
-            <a:endParaRPr lang="en-GB" dirty="0">
-              <a:latin typeface="Segoe UI" panose="020B0502040204020203" pitchFamily="34" charset="0"/>
-              <a:cs typeface="Segoe UI" panose="020B0502040204020203" pitchFamily="34" charset="0"/>
-            </a:endParaRPr>
-          </a:p>
-        </p:txBody>
-      </p:sp>
-    </p:spTree>
-    <p:extLst>
-      <p:ext uri="{BB962C8B-B14F-4D97-AF65-F5344CB8AC3E}">
-        <p14:creationId xmlns:p14="http://schemas.microsoft.com/office/powerpoint/2010/main" val="1669128925"/>
-      </p:ext>
-    </p:extLst>
-  </p:cSld>
-  <p:clrMapOvr>
-    <a:masterClrMapping/>
-  </p:clrMapOvr>
-  <p:transition>
-    <p:fade/>
-  </p:transition>
-</p:sld>
-</file>
-
 <file path=ppt/slides/slide35.xml><?xml version="1.0" encoding="utf-8"?>
 <p:sld xmlns:a="http://schemas.openxmlformats.org/drawingml/2006/main" xmlns:r="http://schemas.openxmlformats.org/officeDocument/2006/relationships" xmlns:p="http://schemas.openxmlformats.org/presentationml/2006/main">
   <p:cSld>
@@ -12184,6 +12342,396 @@
           <p:cNvPr id="2" name="Titel 1">
             <a:extLst>
               <a:ext uri="{FF2B5EF4-FFF2-40B4-BE49-F238E27FC236}">
+                <a16:creationId xmlns:a16="http://schemas.microsoft.com/office/drawing/2014/main" id="{AF8602B3-218E-49DA-8CFF-C7CE0F8C82BC}"/>
+              </a:ext>
+            </a:extLst>
+          </p:cNvPr>
+          <p:cNvSpPr>
+            <a:spLocks noGrp="1"/>
+          </p:cNvSpPr>
+          <p:nvPr>
+            <p:ph type="title"/>
+          </p:nvPr>
+        </p:nvSpPr>
+        <p:spPr/>
+        <p:txBody>
+          <a:bodyPr/>
+          <a:lstStyle/>
+          <a:p>
+            <a:r>
+              <a:rPr lang="en-GB" dirty="0" err="1">
+                <a:latin typeface="Segoe UI" panose="020B0502040204020203" pitchFamily="34" charset="0"/>
+                <a:cs typeface="Segoe UI" panose="020B0502040204020203" pitchFamily="34" charset="0"/>
+              </a:rPr>
+              <a:t>Installatie</a:t>
+            </a:r>
+            <a:r>
+              <a:rPr lang="en-GB" dirty="0">
+                <a:latin typeface="Segoe UI" panose="020B0502040204020203" pitchFamily="34" charset="0"/>
+                <a:cs typeface="Segoe UI" panose="020B0502040204020203" pitchFamily="34" charset="0"/>
+              </a:rPr>
+              <a:t> &amp; </a:t>
+            </a:r>
+            <a:r>
+              <a:rPr lang="en-GB" dirty="0" err="1">
+                <a:latin typeface="Segoe UI" panose="020B0502040204020203" pitchFamily="34" charset="0"/>
+                <a:cs typeface="Segoe UI" panose="020B0502040204020203" pitchFamily="34" charset="0"/>
+              </a:rPr>
+              <a:t>Verder</a:t>
+            </a:r>
+            <a:r>
+              <a:rPr lang="en-GB" dirty="0">
+                <a:latin typeface="Segoe UI" panose="020B0502040204020203" pitchFamily="34" charset="0"/>
+                <a:cs typeface="Segoe UI" panose="020B0502040204020203" pitchFamily="34" charset="0"/>
+              </a:rPr>
+              <a:t> </a:t>
+            </a:r>
+            <a:r>
+              <a:rPr lang="en-GB" dirty="0" err="1">
+                <a:latin typeface="Segoe UI" panose="020B0502040204020203" pitchFamily="34" charset="0"/>
+                <a:cs typeface="Segoe UI" panose="020B0502040204020203" pitchFamily="34" charset="0"/>
+              </a:rPr>
+              <a:t>Verloop</a:t>
+            </a:r>
+            <a:endParaRPr lang="en-GB" dirty="0">
+              <a:latin typeface="Segoe UI" panose="020B0502040204020203" pitchFamily="34" charset="0"/>
+              <a:cs typeface="Segoe UI" panose="020B0502040204020203" pitchFamily="34" charset="0"/>
+            </a:endParaRPr>
+          </a:p>
+        </p:txBody>
+      </p:sp>
+      <p:sp>
+        <p:nvSpPr>
+          <p:cNvPr id="3" name="Tijdelijke aanduiding voor inhoud 2">
+            <a:extLst>
+              <a:ext uri="{FF2B5EF4-FFF2-40B4-BE49-F238E27FC236}">
+                <a16:creationId xmlns:a16="http://schemas.microsoft.com/office/drawing/2014/main" id="{514F0ABA-EC52-4AAF-9E74-5D85A79C9199}"/>
+              </a:ext>
+            </a:extLst>
+          </p:cNvPr>
+          <p:cNvSpPr>
+            <a:spLocks noGrp="1"/>
+          </p:cNvSpPr>
+          <p:nvPr>
+            <p:ph idx="1"/>
+          </p:nvPr>
+        </p:nvSpPr>
+        <p:spPr/>
+        <p:txBody>
+          <a:bodyPr/>
+          <a:lstStyle/>
+          <a:p>
+            <a:pPr>
+              <a:buFont typeface="Arial" panose="020B0604020202020204" pitchFamily="34" charset="0"/>
+              <a:buChar char="•"/>
+            </a:pPr>
+            <a:r>
+              <a:rPr lang="en-GB" dirty="0">
+                <a:latin typeface="Segoe UI" panose="020B0502040204020203" pitchFamily="34" charset="0"/>
+                <a:cs typeface="Segoe UI" panose="020B0502040204020203" pitchFamily="34" charset="0"/>
+              </a:rPr>
+              <a:t> </a:t>
+            </a:r>
+            <a:r>
+              <a:rPr lang="en-GB" dirty="0" err="1">
+                <a:latin typeface="Segoe UI" panose="020B0502040204020203" pitchFamily="34" charset="0"/>
+                <a:cs typeface="Segoe UI" panose="020B0502040204020203" pitchFamily="34" charset="0"/>
+              </a:rPr>
+              <a:t>Geschatte</a:t>
+            </a:r>
+            <a:r>
+              <a:rPr lang="en-GB" dirty="0">
+                <a:latin typeface="Segoe UI" panose="020B0502040204020203" pitchFamily="34" charset="0"/>
+                <a:cs typeface="Segoe UI" panose="020B0502040204020203" pitchFamily="34" charset="0"/>
+              </a:rPr>
+              <a:t> </a:t>
+            </a:r>
+            <a:r>
+              <a:rPr lang="en-GB" dirty="0" err="1">
+                <a:latin typeface="Segoe UI" panose="020B0502040204020203" pitchFamily="34" charset="0"/>
+                <a:cs typeface="Segoe UI" panose="020B0502040204020203" pitchFamily="34" charset="0"/>
+              </a:rPr>
+              <a:t>installatieduur</a:t>
+            </a:r>
+            <a:r>
+              <a:rPr lang="en-GB" dirty="0">
+                <a:latin typeface="Segoe UI" panose="020B0502040204020203" pitchFamily="34" charset="0"/>
+                <a:cs typeface="Segoe UI" panose="020B0502040204020203" pitchFamily="34" charset="0"/>
+              </a:rPr>
+              <a:t>: 5 </a:t>
+            </a:r>
+            <a:r>
+              <a:rPr lang="en-GB" dirty="0" err="1">
+                <a:latin typeface="Segoe UI" panose="020B0502040204020203" pitchFamily="34" charset="0"/>
+                <a:cs typeface="Segoe UI" panose="020B0502040204020203" pitchFamily="34" charset="0"/>
+              </a:rPr>
+              <a:t>werkdagen</a:t>
+            </a:r>
+            <a:r>
+              <a:rPr lang="en-GB" dirty="0">
+                <a:latin typeface="Segoe UI" panose="020B0502040204020203" pitchFamily="34" charset="0"/>
+                <a:cs typeface="Segoe UI" panose="020B0502040204020203" pitchFamily="34" charset="0"/>
+              </a:rPr>
+              <a:t> (40 </a:t>
+            </a:r>
+            <a:r>
+              <a:rPr lang="en-GB" dirty="0" err="1">
+                <a:latin typeface="Segoe UI" panose="020B0502040204020203" pitchFamily="34" charset="0"/>
+                <a:cs typeface="Segoe UI" panose="020B0502040204020203" pitchFamily="34" charset="0"/>
+              </a:rPr>
+              <a:t>uur</a:t>
+            </a:r>
+            <a:r>
+              <a:rPr lang="en-GB" dirty="0">
+                <a:latin typeface="Segoe UI" panose="020B0502040204020203" pitchFamily="34" charset="0"/>
+                <a:cs typeface="Segoe UI" panose="020B0502040204020203" pitchFamily="34" charset="0"/>
+              </a:rPr>
+              <a:t>)</a:t>
+            </a:r>
+          </a:p>
+          <a:p>
+            <a:pPr>
+              <a:buFont typeface="Arial" panose="020B0604020202020204" pitchFamily="34" charset="0"/>
+              <a:buChar char="•"/>
+            </a:pPr>
+            <a:r>
+              <a:rPr lang="en-GB" dirty="0">
+                <a:latin typeface="Segoe UI" panose="020B0502040204020203" pitchFamily="34" charset="0"/>
+                <a:cs typeface="Segoe UI" panose="020B0502040204020203" pitchFamily="34" charset="0"/>
+              </a:rPr>
+              <a:t> </a:t>
+            </a:r>
+            <a:r>
+              <a:rPr lang="en-GB" dirty="0" err="1">
+                <a:latin typeface="Segoe UI" panose="020B0502040204020203" pitchFamily="34" charset="0"/>
+                <a:cs typeface="Segoe UI" panose="020B0502040204020203" pitchFamily="34" charset="0"/>
+              </a:rPr>
+              <a:t>Opleiding</a:t>
+            </a:r>
+            <a:r>
+              <a:rPr lang="en-GB" dirty="0">
+                <a:latin typeface="Segoe UI" panose="020B0502040204020203" pitchFamily="34" charset="0"/>
+                <a:cs typeface="Segoe UI" panose="020B0502040204020203" pitchFamily="34" charset="0"/>
+              </a:rPr>
+              <a:t>: 2 </a:t>
+            </a:r>
+            <a:r>
+              <a:rPr lang="en-GB" dirty="0" err="1">
+                <a:latin typeface="Segoe UI" panose="020B0502040204020203" pitchFamily="34" charset="0"/>
+                <a:cs typeface="Segoe UI" panose="020B0502040204020203" pitchFamily="34" charset="0"/>
+              </a:rPr>
+              <a:t>dagen</a:t>
+            </a:r>
+            <a:r>
+              <a:rPr lang="en-GB" dirty="0">
+                <a:latin typeface="Segoe UI" panose="020B0502040204020203" pitchFamily="34" charset="0"/>
+                <a:cs typeface="Segoe UI" panose="020B0502040204020203" pitchFamily="34" charset="0"/>
+              </a:rPr>
+              <a:t> (16 </a:t>
+            </a:r>
+            <a:r>
+              <a:rPr lang="en-GB" dirty="0" err="1">
+                <a:latin typeface="Segoe UI" panose="020B0502040204020203" pitchFamily="34" charset="0"/>
+                <a:cs typeface="Segoe UI" panose="020B0502040204020203" pitchFamily="34" charset="0"/>
+              </a:rPr>
+              <a:t>uur</a:t>
+            </a:r>
+            <a:r>
+              <a:rPr lang="en-GB" dirty="0">
+                <a:latin typeface="Segoe UI" panose="020B0502040204020203" pitchFamily="34" charset="0"/>
+                <a:cs typeface="Segoe UI" panose="020B0502040204020203" pitchFamily="34" charset="0"/>
+              </a:rPr>
+              <a:t>)</a:t>
+            </a:r>
+          </a:p>
+          <a:p>
+            <a:pPr>
+              <a:buFont typeface="Arial" panose="020B0604020202020204" pitchFamily="34" charset="0"/>
+              <a:buChar char="•"/>
+            </a:pPr>
+            <a:r>
+              <a:rPr lang="en-GB" dirty="0">
+                <a:latin typeface="Segoe UI" panose="020B0502040204020203" pitchFamily="34" charset="0"/>
+                <a:cs typeface="Segoe UI" panose="020B0502040204020203" pitchFamily="34" charset="0"/>
+              </a:rPr>
+              <a:t> </a:t>
+            </a:r>
+            <a:r>
+              <a:rPr lang="en-GB" dirty="0" err="1">
+                <a:latin typeface="Segoe UI" panose="020B0502040204020203" pitchFamily="34" charset="0"/>
+                <a:cs typeface="Segoe UI" panose="020B0502040204020203" pitchFamily="34" charset="0"/>
+              </a:rPr>
+              <a:t>Garantie</a:t>
+            </a:r>
+            <a:r>
+              <a:rPr lang="en-GB" dirty="0">
+                <a:latin typeface="Segoe UI" panose="020B0502040204020203" pitchFamily="34" charset="0"/>
+                <a:cs typeface="Segoe UI" panose="020B0502040204020203" pitchFamily="34" charset="0"/>
+              </a:rPr>
+              <a:t> op </a:t>
+            </a:r>
+            <a:r>
+              <a:rPr lang="en-GB" dirty="0" err="1">
+                <a:latin typeface="Segoe UI" panose="020B0502040204020203" pitchFamily="34" charset="0"/>
+                <a:cs typeface="Segoe UI" panose="020B0502040204020203" pitchFamily="34" charset="0"/>
+              </a:rPr>
+              <a:t>installatie</a:t>
+            </a:r>
+            <a:r>
+              <a:rPr lang="en-GB" dirty="0">
+                <a:latin typeface="Segoe UI" panose="020B0502040204020203" pitchFamily="34" charset="0"/>
+                <a:cs typeface="Segoe UI" panose="020B0502040204020203" pitchFamily="34" charset="0"/>
+              </a:rPr>
+              <a:t> </a:t>
+            </a:r>
+            <a:r>
+              <a:rPr lang="en-GB" dirty="0" err="1">
+                <a:latin typeface="Segoe UI" panose="020B0502040204020203" pitchFamily="34" charset="0"/>
+                <a:cs typeface="Segoe UI" panose="020B0502040204020203" pitchFamily="34" charset="0"/>
+              </a:rPr>
+              <a:t>en</a:t>
+            </a:r>
+            <a:r>
+              <a:rPr lang="en-GB" dirty="0">
+                <a:latin typeface="Segoe UI" panose="020B0502040204020203" pitchFamily="34" charset="0"/>
+                <a:cs typeface="Segoe UI" panose="020B0502040204020203" pitchFamily="34" charset="0"/>
+              </a:rPr>
+              <a:t> </a:t>
+            </a:r>
+            <a:r>
+              <a:rPr lang="en-GB" dirty="0" err="1">
+                <a:latin typeface="Segoe UI" panose="020B0502040204020203" pitchFamily="34" charset="0"/>
+                <a:cs typeface="Segoe UI" panose="020B0502040204020203" pitchFamily="34" charset="0"/>
+              </a:rPr>
+              <a:t>apparatuur</a:t>
+            </a:r>
+            <a:r>
+              <a:rPr lang="en-GB" dirty="0">
+                <a:latin typeface="Segoe UI" panose="020B0502040204020203" pitchFamily="34" charset="0"/>
+                <a:cs typeface="Segoe UI" panose="020B0502040204020203" pitchFamily="34" charset="0"/>
+              </a:rPr>
+              <a:t>: 2 </a:t>
+            </a:r>
+            <a:r>
+              <a:rPr lang="en-GB" dirty="0" err="1">
+                <a:latin typeface="Segoe UI" panose="020B0502040204020203" pitchFamily="34" charset="0"/>
+                <a:cs typeface="Segoe UI" panose="020B0502040204020203" pitchFamily="34" charset="0"/>
+              </a:rPr>
+              <a:t>jaar</a:t>
+            </a:r>
+            <a:endParaRPr lang="en-GB" dirty="0">
+              <a:latin typeface="Segoe UI" panose="020B0502040204020203" pitchFamily="34" charset="0"/>
+              <a:cs typeface="Segoe UI" panose="020B0502040204020203" pitchFamily="34" charset="0"/>
+            </a:endParaRPr>
+          </a:p>
+          <a:p>
+            <a:pPr>
+              <a:buFont typeface="Arial" panose="020B0604020202020204" pitchFamily="34" charset="0"/>
+              <a:buChar char="•"/>
+            </a:pPr>
+            <a:r>
+              <a:rPr lang="en-GB" dirty="0">
+                <a:latin typeface="Segoe UI" panose="020B0502040204020203" pitchFamily="34" charset="0"/>
+                <a:cs typeface="Segoe UI" panose="020B0502040204020203" pitchFamily="34" charset="0"/>
+              </a:rPr>
+              <a:t> </a:t>
+            </a:r>
+            <a:r>
+              <a:rPr lang="en-GB" dirty="0" err="1">
+                <a:latin typeface="Segoe UI" panose="020B0502040204020203" pitchFamily="34" charset="0"/>
+                <a:cs typeface="Segoe UI" panose="020B0502040204020203" pitchFamily="34" charset="0"/>
+              </a:rPr>
+              <a:t>Optioneel</a:t>
+            </a:r>
+            <a:r>
+              <a:rPr lang="en-GB" dirty="0">
+                <a:latin typeface="Segoe UI" panose="020B0502040204020203" pitchFamily="34" charset="0"/>
+                <a:cs typeface="Segoe UI" panose="020B0502040204020203" pitchFamily="34" charset="0"/>
+              </a:rPr>
+              <a:t> </a:t>
+            </a:r>
+            <a:r>
+              <a:rPr lang="en-GB" dirty="0" err="1">
+                <a:latin typeface="Segoe UI" panose="020B0502040204020203" pitchFamily="34" charset="0"/>
+                <a:cs typeface="Segoe UI" panose="020B0502040204020203" pitchFamily="34" charset="0"/>
+              </a:rPr>
+              <a:t>onderhoudscontract</a:t>
+            </a:r>
+            <a:endParaRPr lang="en-GB" dirty="0">
+              <a:latin typeface="Segoe UI" panose="020B0502040204020203" pitchFamily="34" charset="0"/>
+              <a:cs typeface="Segoe UI" panose="020B0502040204020203" pitchFamily="34" charset="0"/>
+            </a:endParaRPr>
+          </a:p>
+          <a:p>
+            <a:pPr lvl="1">
+              <a:buFont typeface="Arial" panose="020B0604020202020204" pitchFamily="34" charset="0"/>
+              <a:buChar char="•"/>
+            </a:pPr>
+            <a:r>
+              <a:rPr lang="en-GB" dirty="0">
+                <a:latin typeface="Segoe UI" panose="020B0502040204020203" pitchFamily="34" charset="0"/>
+                <a:cs typeface="Segoe UI" panose="020B0502040204020203" pitchFamily="34" charset="0"/>
+              </a:rPr>
+              <a:t>24/7 Helpdesk</a:t>
+            </a:r>
+          </a:p>
+          <a:p>
+            <a:pPr lvl="1">
+              <a:buFont typeface="Arial" panose="020B0604020202020204" pitchFamily="34" charset="0"/>
+              <a:buChar char="•"/>
+            </a:pPr>
+            <a:r>
+              <a:rPr lang="en-GB" dirty="0" err="1">
+                <a:latin typeface="Segoe UI" panose="020B0502040204020203" pitchFamily="34" charset="0"/>
+                <a:cs typeface="Segoe UI" panose="020B0502040204020203" pitchFamily="34" charset="0"/>
+              </a:rPr>
+              <a:t>Interventies</a:t>
+            </a:r>
+            <a:endParaRPr lang="en-GB" dirty="0">
+              <a:latin typeface="Segoe UI" panose="020B0502040204020203" pitchFamily="34" charset="0"/>
+              <a:cs typeface="Segoe UI" panose="020B0502040204020203" pitchFamily="34" charset="0"/>
+            </a:endParaRPr>
+          </a:p>
+        </p:txBody>
+      </p:sp>
+    </p:spTree>
+    <p:extLst>
+      <p:ext uri="{BB962C8B-B14F-4D97-AF65-F5344CB8AC3E}">
+        <p14:creationId xmlns:p14="http://schemas.microsoft.com/office/powerpoint/2010/main" val="1669128925"/>
+      </p:ext>
+    </p:extLst>
+  </p:cSld>
+  <p:clrMapOvr>
+    <a:masterClrMapping/>
+  </p:clrMapOvr>
+  <p:transition>
+    <p:fade/>
+  </p:transition>
+</p:sld>
+</file>
+
+<file path=ppt/slides/slide36.xml><?xml version="1.0" encoding="utf-8"?>
+<p:sld xmlns:a="http://schemas.openxmlformats.org/drawingml/2006/main" xmlns:r="http://schemas.openxmlformats.org/officeDocument/2006/relationships" xmlns:p="http://schemas.openxmlformats.org/presentationml/2006/main">
+  <p:cSld>
+    <p:spTree>
+      <p:nvGrpSpPr>
+        <p:cNvPr id="1" name=""/>
+        <p:cNvGrpSpPr/>
+        <p:nvPr/>
+      </p:nvGrpSpPr>
+      <p:grpSpPr>
+        <a:xfrm>
+          <a:off x="0" y="0"/>
+          <a:ext cx="0" cy="0"/>
+          <a:chOff x="0" y="0"/>
+          <a:chExt cx="0" cy="0"/>
+        </a:xfrm>
+      </p:grpSpPr>
+      <p:sp>
+        <p:nvSpPr>
+          <p:cNvPr id="2" name="Titel 1">
+            <a:extLst>
+              <a:ext uri="{FF2B5EF4-FFF2-40B4-BE49-F238E27FC236}">
                 <a16:creationId xmlns:a16="http://schemas.microsoft.com/office/drawing/2014/main" id="{B9150B5B-D4AB-4360-8885-408FB39752A3}"/>
               </a:ext>
             </a:extLst>
@@ -12285,7 +12833,7 @@
 </p:sld>
 </file>
 
-<file path=ppt/slides/slide36.xml><?xml version="1.0" encoding="utf-8"?>
+<file path=ppt/slides/slide37.xml><?xml version="1.0" encoding="utf-8"?>
 <p:sld xmlns:a="http://schemas.openxmlformats.org/drawingml/2006/main" xmlns:r="http://schemas.openxmlformats.org/officeDocument/2006/relationships" xmlns:p="http://schemas.openxmlformats.org/presentationml/2006/main">
   <p:cSld>
     <p:bg>
@@ -13424,7 +13972,7 @@
           <a:bodyPr/>
           <a:lstStyle/>
           <a:p>
-            <a:endParaRPr lang="en-GB"/>
+            <a:endParaRPr lang="en-GB" dirty="0"/>
           </a:p>
         </p:txBody>
       </p:sp>

</xml_diff>